<commit_message>
Tag-1_1: Speaker (DKrämer und MFischer) und anderScore-Vorstellungsslide hinzugefügt
</commit_message>
<xml_diff>
--- a/slides/Tag-1_1-Begruessung.pptx
+++ b/slides/Tag-1_1-Begruessung.pptx
@@ -6,16 +6,19 @@
     <p:sldMasterId id="2147483649" r:id="rId2"/>
   </p:sldMasterIdLst>
   <p:notesMasterIdLst>
-    <p:notesMasterId r:id="rId7"/>
+    <p:notesMasterId r:id="rId10"/>
   </p:notesMasterIdLst>
   <p:handoutMasterIdLst>
-    <p:handoutMasterId r:id="rId8"/>
+    <p:handoutMasterId r:id="rId11"/>
   </p:handoutMasterIdLst>
   <p:sldIdLst>
     <p:sldId id="288" r:id="rId3"/>
     <p:sldId id="289" r:id="rId4"/>
     <p:sldId id="291" r:id="rId5"/>
     <p:sldId id="587" r:id="rId6"/>
+    <p:sldId id="324" r:id="rId7"/>
+    <p:sldId id="589" r:id="rId8"/>
+    <p:sldId id="466" r:id="rId9"/>
   </p:sldIdLst>
   <p:sldSz cx="9144000" cy="6858000" type="screen4x3"/>
   <p:notesSz cx="6784975" cy="9921875"/>
@@ -921,6 +924,261 @@
     </a:lvl9pPr>
   </p:notesStyle>
 </p:notesMaster>
+</file>
+
+<file path=ppt/notesSlides/notesSlide1.xml><?xml version="1.0" encoding="utf-8"?>
+<p:notes xmlns:a="http://schemas.openxmlformats.org/drawingml/2006/main" xmlns:r="http://schemas.openxmlformats.org/officeDocument/2006/relationships" xmlns:p="http://schemas.openxmlformats.org/presentationml/2006/main">
+  <p:cSld>
+    <p:spTree>
+      <p:nvGrpSpPr>
+        <p:cNvPr id="1" name=""/>
+        <p:cNvGrpSpPr/>
+        <p:nvPr/>
+      </p:nvGrpSpPr>
+      <p:grpSpPr>
+        <a:xfrm>
+          <a:off x="0" y="0"/>
+          <a:ext cx="0" cy="0"/>
+          <a:chOff x="0" y="0"/>
+          <a:chExt cx="0" cy="0"/>
+        </a:xfrm>
+      </p:grpSpPr>
+      <p:sp>
+        <p:nvSpPr>
+          <p:cNvPr id="2" name="Folienbildplatzhalter 1"/>
+          <p:cNvSpPr>
+            <a:spLocks noGrp="1" noRot="1" noChangeAspect="1"/>
+          </p:cNvSpPr>
+          <p:nvPr>
+            <p:ph type="sldImg"/>
+          </p:nvPr>
+        </p:nvSpPr>
+        <p:spPr/>
+      </p:sp>
+      <p:sp>
+        <p:nvSpPr>
+          <p:cNvPr id="3" name="Notizenplatzhalter 2"/>
+          <p:cNvSpPr>
+            <a:spLocks noGrp="1"/>
+          </p:cNvSpPr>
+          <p:nvPr>
+            <p:ph type="body" idx="1"/>
+          </p:nvPr>
+        </p:nvSpPr>
+        <p:spPr/>
+        <p:txBody>
+          <a:bodyPr/>
+          <a:lstStyle/>
+          <a:p>
+            <a:endParaRPr lang="de-DE" dirty="0"/>
+          </a:p>
+        </p:txBody>
+      </p:sp>
+      <p:sp>
+        <p:nvSpPr>
+          <p:cNvPr id="4" name="Foliennummernplatzhalter 3"/>
+          <p:cNvSpPr>
+            <a:spLocks noGrp="1"/>
+          </p:cNvSpPr>
+          <p:nvPr>
+            <p:ph type="sldNum" sz="quarter" idx="5"/>
+          </p:nvPr>
+        </p:nvSpPr>
+        <p:spPr/>
+        <p:txBody>
+          <a:bodyPr/>
+          <a:lstStyle/>
+          <a:p>
+            <a:fld id="{18182567-388C-4D33-8B7B-A651F195F118}" type="slidenum">
+              <a:rPr lang="de-DE" altLang="de-DE" smtClean="0"/>
+              <a:pPr/>
+              <a:t>5</a:t>
+            </a:fld>
+            <a:endParaRPr lang="de-DE" altLang="de-DE"/>
+          </a:p>
+        </p:txBody>
+      </p:sp>
+    </p:spTree>
+    <p:extLst>
+      <p:ext uri="{BB962C8B-B14F-4D97-AF65-F5344CB8AC3E}">
+        <p14:creationId xmlns:p14="http://schemas.microsoft.com/office/powerpoint/2010/main" val="4097419684"/>
+      </p:ext>
+    </p:extLst>
+  </p:cSld>
+  <p:clrMapOvr>
+    <a:masterClrMapping/>
+  </p:clrMapOvr>
+</p:notes>
+</file>
+
+<file path=ppt/notesSlides/notesSlide2.xml><?xml version="1.0" encoding="utf-8"?>
+<p:notes xmlns:a="http://schemas.openxmlformats.org/drawingml/2006/main" xmlns:r="http://schemas.openxmlformats.org/officeDocument/2006/relationships" xmlns:p="http://schemas.openxmlformats.org/presentationml/2006/main">
+  <p:cSld>
+    <p:spTree>
+      <p:nvGrpSpPr>
+        <p:cNvPr id="1" name=""/>
+        <p:cNvGrpSpPr/>
+        <p:nvPr/>
+      </p:nvGrpSpPr>
+      <p:grpSpPr>
+        <a:xfrm>
+          <a:off x="0" y="0"/>
+          <a:ext cx="0" cy="0"/>
+          <a:chOff x="0" y="0"/>
+          <a:chExt cx="0" cy="0"/>
+        </a:xfrm>
+      </p:grpSpPr>
+      <p:sp>
+        <p:nvSpPr>
+          <p:cNvPr id="2" name="Folienbildplatzhalter 1"/>
+          <p:cNvSpPr>
+            <a:spLocks noGrp="1" noRot="1" noChangeAspect="1"/>
+          </p:cNvSpPr>
+          <p:nvPr>
+            <p:ph type="sldImg"/>
+          </p:nvPr>
+        </p:nvSpPr>
+        <p:spPr/>
+      </p:sp>
+      <p:sp>
+        <p:nvSpPr>
+          <p:cNvPr id="3" name="Notizenplatzhalter 2"/>
+          <p:cNvSpPr>
+            <a:spLocks noGrp="1"/>
+          </p:cNvSpPr>
+          <p:nvPr>
+            <p:ph type="body" idx="1"/>
+          </p:nvPr>
+        </p:nvSpPr>
+        <p:spPr/>
+        <p:txBody>
+          <a:bodyPr/>
+          <a:lstStyle/>
+          <a:p>
+            <a:endParaRPr lang="de-DE" dirty="0"/>
+          </a:p>
+        </p:txBody>
+      </p:sp>
+      <p:sp>
+        <p:nvSpPr>
+          <p:cNvPr id="4" name="Foliennummernplatzhalter 3"/>
+          <p:cNvSpPr>
+            <a:spLocks noGrp="1"/>
+          </p:cNvSpPr>
+          <p:nvPr>
+            <p:ph type="sldNum" sz="quarter" idx="5"/>
+          </p:nvPr>
+        </p:nvSpPr>
+        <p:spPr/>
+        <p:txBody>
+          <a:bodyPr/>
+          <a:lstStyle/>
+          <a:p>
+            <a:fld id="{18182567-388C-4D33-8B7B-A651F195F118}" type="slidenum">
+              <a:rPr lang="de-DE" altLang="de-DE" smtClean="0"/>
+              <a:pPr/>
+              <a:t>6</a:t>
+            </a:fld>
+            <a:endParaRPr lang="de-DE" altLang="de-DE"/>
+          </a:p>
+        </p:txBody>
+      </p:sp>
+    </p:spTree>
+    <p:extLst>
+      <p:ext uri="{BB962C8B-B14F-4D97-AF65-F5344CB8AC3E}">
+        <p14:creationId xmlns:p14="http://schemas.microsoft.com/office/powerpoint/2010/main" val="3863189166"/>
+      </p:ext>
+    </p:extLst>
+  </p:cSld>
+  <p:clrMapOvr>
+    <a:masterClrMapping/>
+  </p:clrMapOvr>
+</p:notes>
+</file>
+
+<file path=ppt/notesSlides/notesSlide3.xml><?xml version="1.0" encoding="utf-8"?>
+<p:notes xmlns:a="http://schemas.openxmlformats.org/drawingml/2006/main" xmlns:r="http://schemas.openxmlformats.org/officeDocument/2006/relationships" xmlns:p="http://schemas.openxmlformats.org/presentationml/2006/main">
+  <p:cSld>
+    <p:spTree>
+      <p:nvGrpSpPr>
+        <p:cNvPr id="1" name=""/>
+        <p:cNvGrpSpPr/>
+        <p:nvPr/>
+      </p:nvGrpSpPr>
+      <p:grpSpPr>
+        <a:xfrm>
+          <a:off x="0" y="0"/>
+          <a:ext cx="0" cy="0"/>
+          <a:chOff x="0" y="0"/>
+          <a:chExt cx="0" cy="0"/>
+        </a:xfrm>
+      </p:grpSpPr>
+      <p:sp>
+        <p:nvSpPr>
+          <p:cNvPr id="2" name="Folienbildplatzhalter 1"/>
+          <p:cNvSpPr>
+            <a:spLocks noGrp="1" noRot="1" noChangeAspect="1"/>
+          </p:cNvSpPr>
+          <p:nvPr>
+            <p:ph type="sldImg"/>
+          </p:nvPr>
+        </p:nvSpPr>
+        <p:spPr/>
+      </p:sp>
+      <p:sp>
+        <p:nvSpPr>
+          <p:cNvPr id="3" name="Notizenplatzhalter 2"/>
+          <p:cNvSpPr>
+            <a:spLocks noGrp="1"/>
+          </p:cNvSpPr>
+          <p:nvPr>
+            <p:ph type="body" idx="1"/>
+          </p:nvPr>
+        </p:nvSpPr>
+        <p:spPr/>
+        <p:txBody>
+          <a:bodyPr/>
+          <a:lstStyle/>
+          <a:p>
+            <a:endParaRPr lang="de-DE" dirty="0"/>
+          </a:p>
+        </p:txBody>
+      </p:sp>
+      <p:sp>
+        <p:nvSpPr>
+          <p:cNvPr id="4" name="Foliennummernplatzhalter 3"/>
+          <p:cNvSpPr>
+            <a:spLocks noGrp="1"/>
+          </p:cNvSpPr>
+          <p:nvPr>
+            <p:ph type="sldNum" sz="quarter" idx="5"/>
+          </p:nvPr>
+        </p:nvSpPr>
+        <p:spPr/>
+        <p:txBody>
+          <a:bodyPr/>
+          <a:lstStyle/>
+          <a:p>
+            <a:fld id="{18182567-388C-4D33-8B7B-A651F195F118}" type="slidenum">
+              <a:rPr lang="de-DE" altLang="de-DE" smtClean="0"/>
+              <a:pPr/>
+              <a:t>7</a:t>
+            </a:fld>
+            <a:endParaRPr lang="de-DE" altLang="de-DE"/>
+          </a:p>
+        </p:txBody>
+      </p:sp>
+    </p:spTree>
+    <p:extLst>
+      <p:ext uri="{BB962C8B-B14F-4D97-AF65-F5344CB8AC3E}">
+        <p14:creationId xmlns:p14="http://schemas.microsoft.com/office/powerpoint/2010/main" val="727468044"/>
+      </p:ext>
+    </p:extLst>
+  </p:cSld>
+  <p:clrMapOvr>
+    <a:masterClrMapping/>
+  </p:clrMapOvr>
+</p:notes>
 </file>
 
 <file path=ppt/slideLayouts/slideLayout1.xml><?xml version="1.0" encoding="utf-8"?>
@@ -4517,6 +4775,4669 @@
   <p:clrMapOvr>
     <a:masterClrMapping/>
   </p:clrMapOvr>
+</p:sld>
+</file>
+
+<file path=ppt/slides/slide5.xml><?xml version="1.0" encoding="utf-8"?>
+<p:sld xmlns:a="http://schemas.openxmlformats.org/drawingml/2006/main" xmlns:r="http://schemas.openxmlformats.org/officeDocument/2006/relationships" xmlns:p="http://schemas.openxmlformats.org/presentationml/2006/main" show="0">
+  <p:cSld>
+    <p:spTree>
+      <p:nvGrpSpPr>
+        <p:cNvPr id="1" name=""/>
+        <p:cNvGrpSpPr/>
+        <p:nvPr/>
+      </p:nvGrpSpPr>
+      <p:grpSpPr>
+        <a:xfrm>
+          <a:off x="0" y="0"/>
+          <a:ext cx="0" cy="0"/>
+          <a:chOff x="0" y="0"/>
+          <a:chExt cx="0" cy="0"/>
+        </a:xfrm>
+      </p:grpSpPr>
+      <p:sp>
+        <p:nvSpPr>
+          <p:cNvPr id="17410" name="Inhaltsplatzhalter 2"/>
+          <p:cNvSpPr>
+            <a:spLocks noGrp="1"/>
+          </p:cNvSpPr>
+          <p:nvPr>
+            <p:ph idx="1"/>
+          </p:nvPr>
+        </p:nvSpPr>
+        <p:spPr>
+          <a:xfrm>
+            <a:off x="303213" y="1462108"/>
+            <a:ext cx="8589962" cy="4824412"/>
+          </a:xfrm>
+        </p:spPr>
+        <p:txBody>
+          <a:bodyPr/>
+          <a:lstStyle/>
+          <a:p>
+            <a:pPr>
+              <a:buNone/>
+            </a:pPr>
+            <a:r>
+              <a:rPr lang="de-DE" b="1" dirty="0"/>
+              <a:t>Daniel Krämer (</a:t>
+            </a:r>
+            <a:r>
+              <a:rPr lang="de-DE" b="1" dirty="0" err="1"/>
+              <a:t>M.Sc</a:t>
+            </a:r>
+            <a:r>
+              <a:rPr lang="de-DE" b="1" dirty="0"/>
+              <a:t>. C.S.)</a:t>
+            </a:r>
+          </a:p>
+          <a:p>
+            <a:pPr marL="342900" lvl="1" indent="-342900">
+              <a:buFont typeface="Arial" charset="0"/>
+              <a:buChar char="●"/>
+            </a:pPr>
+            <a:r>
+              <a:rPr lang="de-DE" altLang="de-DE" dirty="0">
+                <a:ea typeface="+mn-ea"/>
+                <a:cs typeface="+mn-cs"/>
+              </a:rPr>
+              <a:t>Senior Software Engineer</a:t>
+            </a:r>
+          </a:p>
+          <a:p>
+            <a:pPr marL="342900" lvl="1" indent="-342900">
+              <a:buFont typeface="Arial" charset="0"/>
+              <a:buChar char="●"/>
+            </a:pPr>
+            <a:r>
+              <a:rPr lang="de-DE" altLang="de-DE" dirty="0">
+                <a:ea typeface="+mn-ea"/>
+                <a:cs typeface="+mn-cs"/>
+              </a:rPr>
+              <a:t>Schwerpunkte</a:t>
+            </a:r>
+          </a:p>
+          <a:p>
+            <a:pPr marL="762000" lvl="3" indent="-342900">
+              <a:buFont typeface="Arial" charset="0"/>
+              <a:buChar char="●"/>
+            </a:pPr>
+            <a:r>
+              <a:rPr lang="de-DE" altLang="de-DE" sz="2000" dirty="0">
+                <a:ea typeface="+mn-ea"/>
+                <a:cs typeface="+mn-cs"/>
+              </a:rPr>
+              <a:t>Software-Architektur</a:t>
+            </a:r>
+          </a:p>
+          <a:p>
+            <a:pPr marL="762000" lvl="3" indent="-342900">
+              <a:buFont typeface="Arial" charset="0"/>
+              <a:buChar char="●"/>
+            </a:pPr>
+            <a:r>
+              <a:rPr lang="de-DE" altLang="de-DE" sz="2000" dirty="0"/>
+              <a:t>Integration und Migration</a:t>
+            </a:r>
+          </a:p>
+          <a:p>
+            <a:pPr marL="762000" lvl="3" indent="-342900">
+              <a:buFont typeface="Arial" charset="0"/>
+              <a:buChar char="●"/>
+            </a:pPr>
+            <a:r>
+              <a:rPr lang="de-DE" altLang="de-DE" sz="2000" dirty="0"/>
+              <a:t>Web Engineering</a:t>
+            </a:r>
+          </a:p>
+          <a:p>
+            <a:pPr marL="762000" lvl="3" indent="-342900">
+              <a:buFont typeface="Arial" charset="0"/>
+              <a:buChar char="●"/>
+            </a:pPr>
+            <a:r>
+              <a:rPr lang="de-DE" altLang="de-DE" sz="2000" dirty="0"/>
+              <a:t>Clean Code</a:t>
+            </a:r>
+          </a:p>
+          <a:p>
+            <a:pPr marL="762000" lvl="3" indent="-342900">
+              <a:buFont typeface="Arial" charset="0"/>
+              <a:buChar char="●"/>
+            </a:pPr>
+            <a:r>
+              <a:rPr lang="de-DE" altLang="de-DE" sz="2000" dirty="0"/>
+              <a:t>Testautomatisierung</a:t>
+            </a:r>
+          </a:p>
+          <a:p>
+            <a:pPr marL="762000" lvl="3" indent="-342900">
+              <a:buFont typeface="Arial" charset="0"/>
+              <a:buChar char="●"/>
+            </a:pPr>
+            <a:r>
+              <a:rPr lang="de-DE" altLang="de-DE" sz="2000" dirty="0"/>
+              <a:t>Trainings</a:t>
+            </a:r>
+          </a:p>
+          <a:p>
+            <a:pPr marL="342900" lvl="1" indent="-342900">
+              <a:buFont typeface="Arial" charset="0"/>
+              <a:buChar char="●"/>
+            </a:pPr>
+            <a:r>
+              <a:rPr lang="de-DE" altLang="de-DE" dirty="0">
+                <a:ea typeface="+mn-ea"/>
+                <a:cs typeface="+mn-cs"/>
+              </a:rPr>
+              <a:t>Java, Spring, Microservices, …</a:t>
+            </a:r>
+          </a:p>
+        </p:txBody>
+      </p:sp>
+      <p:sp>
+        <p:nvSpPr>
+          <p:cNvPr id="17411" name="Rectangle 1062"/>
+          <p:cNvSpPr>
+            <a:spLocks noGrp="1" noChangeArrowheads="1"/>
+          </p:cNvSpPr>
+          <p:nvPr>
+            <p:ph type="title"/>
+          </p:nvPr>
+        </p:nvSpPr>
+        <p:spPr>
+          <a:xfrm>
+            <a:off x="285750" y="142875"/>
+            <a:ext cx="5654675" cy="706438"/>
+          </a:xfrm>
+        </p:spPr>
+        <p:txBody>
+          <a:bodyPr/>
+          <a:lstStyle/>
+          <a:p>
+            <a:r>
+              <a:rPr lang="de-DE" dirty="0"/>
+              <a:t>Vorstellung</a:t>
+            </a:r>
+          </a:p>
+        </p:txBody>
+      </p:sp>
+      <p:pic>
+        <p:nvPicPr>
+          <p:cNvPr id="3" name="Grafik 2">
+            <a:extLst>
+              <a:ext uri="{FF2B5EF4-FFF2-40B4-BE49-F238E27FC236}">
+                <a16:creationId xmlns:a16="http://schemas.microsoft.com/office/drawing/2014/main" id="{3F79FD5D-E216-7E73-83F3-AD212BE55B35}"/>
+              </a:ext>
+            </a:extLst>
+          </p:cNvPr>
+          <p:cNvPicPr>
+            <a:picLocks noChangeAspect="1"/>
+          </p:cNvPicPr>
+          <p:nvPr/>
+        </p:nvPicPr>
+        <p:blipFill>
+          <a:blip r:embed="rId3">
+            <a:extLst>
+              <a:ext uri="{28A0092B-C50C-407E-A947-70E740481C1C}">
+                <a14:useLocalDpi xmlns:a14="http://schemas.microsoft.com/office/drawing/2010/main" val="0"/>
+              </a:ext>
+            </a:extLst>
+          </a:blip>
+          <a:stretch>
+            <a:fillRect/>
+          </a:stretch>
+        </p:blipFill>
+        <p:spPr>
+          <a:xfrm>
+            <a:off x="4578535" y="1988840"/>
+            <a:ext cx="4321535" cy="2880320"/>
+          </a:xfrm>
+          <a:prstGeom prst="rect">
+            <a:avLst/>
+          </a:prstGeom>
+        </p:spPr>
+      </p:pic>
+    </p:spTree>
+  </p:cSld>
+  <p:clrMapOvr>
+    <a:masterClrMapping/>
+  </p:clrMapOvr>
+</p:sld>
+</file>
+
+<file path=ppt/slides/slide6.xml><?xml version="1.0" encoding="utf-8"?>
+<p:sld xmlns:a="http://schemas.openxmlformats.org/drawingml/2006/main" xmlns:r="http://schemas.openxmlformats.org/officeDocument/2006/relationships" xmlns:p="http://schemas.openxmlformats.org/presentationml/2006/main" show="0">
+  <p:cSld>
+    <p:spTree>
+      <p:nvGrpSpPr>
+        <p:cNvPr id="1" name=""/>
+        <p:cNvGrpSpPr/>
+        <p:nvPr/>
+      </p:nvGrpSpPr>
+      <p:grpSpPr>
+        <a:xfrm>
+          <a:off x="0" y="0"/>
+          <a:ext cx="0" cy="0"/>
+          <a:chOff x="0" y="0"/>
+          <a:chExt cx="0" cy="0"/>
+        </a:xfrm>
+      </p:grpSpPr>
+      <p:sp>
+        <p:nvSpPr>
+          <p:cNvPr id="17410" name="Inhaltsplatzhalter 2"/>
+          <p:cNvSpPr>
+            <a:spLocks noGrp="1"/>
+          </p:cNvSpPr>
+          <p:nvPr>
+            <p:ph idx="1"/>
+          </p:nvPr>
+        </p:nvSpPr>
+        <p:spPr>
+          <a:xfrm>
+            <a:off x="303213" y="1462108"/>
+            <a:ext cx="8589962" cy="4824412"/>
+          </a:xfrm>
+        </p:spPr>
+        <p:txBody>
+          <a:bodyPr/>
+          <a:lstStyle/>
+          <a:p>
+            <a:pPr>
+              <a:buNone/>
+            </a:pPr>
+            <a:r>
+              <a:rPr lang="de-DE" b="1" dirty="0"/>
+              <a:t>Malte Fischer</a:t>
+            </a:r>
+          </a:p>
+          <a:p>
+            <a:pPr marL="342900" lvl="1" indent="-342900">
+              <a:buFont typeface="Arial" charset="0"/>
+              <a:buChar char="●"/>
+            </a:pPr>
+            <a:r>
+              <a:rPr lang="de-DE" altLang="de-DE" dirty="0">
+                <a:ea typeface="+mn-ea"/>
+                <a:cs typeface="+mn-cs"/>
+              </a:rPr>
+              <a:t>Software Engineer</a:t>
+            </a:r>
+          </a:p>
+          <a:p>
+            <a:pPr marL="342900" lvl="1" indent="-342900">
+              <a:buFont typeface="Arial" charset="0"/>
+              <a:buChar char="●"/>
+            </a:pPr>
+            <a:r>
+              <a:rPr lang="de-DE" altLang="de-DE" dirty="0">
+                <a:ea typeface="+mn-ea"/>
+                <a:cs typeface="+mn-cs"/>
+              </a:rPr>
+              <a:t>Schwerpunkte</a:t>
+            </a:r>
+          </a:p>
+          <a:p>
+            <a:pPr marL="762000" lvl="3" indent="-342900">
+              <a:buFont typeface="Arial" charset="0"/>
+              <a:buChar char="●"/>
+            </a:pPr>
+            <a:r>
+              <a:rPr lang="de-DE" altLang="de-DE" sz="2000" dirty="0">
+                <a:highlight>
+                  <a:srgbClr val="FFFF00"/>
+                </a:highlight>
+                <a:ea typeface="+mn-ea"/>
+                <a:cs typeface="+mn-cs"/>
+              </a:rPr>
+              <a:t>Hier bitte</a:t>
+            </a:r>
+          </a:p>
+          <a:p>
+            <a:pPr marL="762000" lvl="3" indent="-342900">
+              <a:buFont typeface="Arial" charset="0"/>
+              <a:buChar char="●"/>
+            </a:pPr>
+            <a:r>
+              <a:rPr lang="de-DE" altLang="de-DE" sz="2000" dirty="0">
+                <a:highlight>
+                  <a:srgbClr val="FFFF00"/>
+                </a:highlight>
+                <a:ea typeface="+mn-ea"/>
+                <a:cs typeface="+mn-cs"/>
+              </a:rPr>
+              <a:t>Einige Punkte ergänzen</a:t>
+            </a:r>
+          </a:p>
+          <a:p>
+            <a:pPr marL="762000" lvl="3" indent="-342900">
+              <a:buFont typeface="Arial" charset="0"/>
+              <a:buChar char="●"/>
+            </a:pPr>
+            <a:r>
+              <a:rPr lang="de-DE" altLang="de-DE" sz="2000" dirty="0">
+                <a:highlight>
+                  <a:srgbClr val="FFFF00"/>
+                </a:highlight>
+                <a:ea typeface="+mn-ea"/>
+                <a:cs typeface="+mn-cs"/>
+              </a:rPr>
+              <a:t>Am CV kann man sich</a:t>
+            </a:r>
+          </a:p>
+          <a:p>
+            <a:pPr marL="762000" lvl="3" indent="-342900">
+              <a:buFont typeface="Arial" charset="0"/>
+              <a:buChar char="●"/>
+            </a:pPr>
+            <a:r>
+              <a:rPr lang="de-DE" altLang="de-DE" sz="2000" dirty="0">
+                <a:highlight>
+                  <a:srgbClr val="FFFF00"/>
+                </a:highlight>
+                <a:ea typeface="+mn-ea"/>
+                <a:cs typeface="+mn-cs"/>
+              </a:rPr>
+              <a:t>Immer sehr gut</a:t>
+            </a:r>
+          </a:p>
+          <a:p>
+            <a:pPr marL="762000" lvl="3" indent="-342900">
+              <a:buFont typeface="Arial" charset="0"/>
+              <a:buChar char="●"/>
+            </a:pPr>
+            <a:r>
+              <a:rPr lang="de-DE" altLang="de-DE" sz="2000" dirty="0">
+                <a:highlight>
+                  <a:srgbClr val="FFFF00"/>
+                </a:highlight>
+                <a:ea typeface="+mn-ea"/>
+                <a:cs typeface="+mn-cs"/>
+              </a:rPr>
+              <a:t>orientieren</a:t>
+            </a:r>
+            <a:endParaRPr lang="de-DE" altLang="de-DE" sz="2000" dirty="0">
+              <a:highlight>
+                <a:srgbClr val="FFFF00"/>
+              </a:highlight>
+            </a:endParaRPr>
+          </a:p>
+          <a:p>
+            <a:pPr marL="342900" lvl="1" indent="-342900">
+              <a:buFont typeface="Arial" charset="0"/>
+              <a:buChar char="●"/>
+            </a:pPr>
+            <a:r>
+              <a:rPr lang="de-DE" altLang="de-DE" dirty="0">
+                <a:highlight>
+                  <a:srgbClr val="FFFF00"/>
+                </a:highlight>
+                <a:ea typeface="+mn-ea"/>
+                <a:cs typeface="+mn-cs"/>
+              </a:rPr>
+              <a:t>Hier stehen Techniken</a:t>
+            </a:r>
+          </a:p>
+        </p:txBody>
+      </p:sp>
+      <p:sp>
+        <p:nvSpPr>
+          <p:cNvPr id="17411" name="Rectangle 1062"/>
+          <p:cNvSpPr>
+            <a:spLocks noGrp="1" noChangeArrowheads="1"/>
+          </p:cNvSpPr>
+          <p:nvPr>
+            <p:ph type="title"/>
+          </p:nvPr>
+        </p:nvSpPr>
+        <p:spPr>
+          <a:xfrm>
+            <a:off x="285750" y="142875"/>
+            <a:ext cx="5654675" cy="706438"/>
+          </a:xfrm>
+        </p:spPr>
+        <p:txBody>
+          <a:bodyPr/>
+          <a:lstStyle/>
+          <a:p>
+            <a:r>
+              <a:rPr lang="de-DE" dirty="0"/>
+              <a:t>Vorstellung</a:t>
+            </a:r>
+          </a:p>
+        </p:txBody>
+      </p:sp>
+      <p:pic>
+        <p:nvPicPr>
+          <p:cNvPr id="4" name="Grafik 3">
+            <a:extLst>
+              <a:ext uri="{FF2B5EF4-FFF2-40B4-BE49-F238E27FC236}">
+                <a16:creationId xmlns:a16="http://schemas.microsoft.com/office/drawing/2014/main" id="{84AB5998-D6D3-47E0-7D46-BBDDBC316E50}"/>
+              </a:ext>
+            </a:extLst>
+          </p:cNvPr>
+          <p:cNvPicPr>
+            <a:picLocks noChangeAspect="1"/>
+          </p:cNvPicPr>
+          <p:nvPr/>
+        </p:nvPicPr>
+        <p:blipFill>
+          <a:blip r:embed="rId3">
+            <a:extLst>
+              <a:ext uri="{28A0092B-C50C-407E-A947-70E740481C1C}">
+                <a14:useLocalDpi xmlns:a14="http://schemas.microsoft.com/office/drawing/2010/main" val="0"/>
+              </a:ext>
+            </a:extLst>
+          </a:blip>
+          <a:stretch>
+            <a:fillRect/>
+          </a:stretch>
+        </p:blipFill>
+        <p:spPr>
+          <a:xfrm rot="16200000">
+            <a:off x="4935213" y="2345709"/>
+            <a:ext cx="3882089" cy="2592288"/>
+          </a:xfrm>
+          <a:prstGeom prst="rect">
+            <a:avLst/>
+          </a:prstGeom>
+        </p:spPr>
+      </p:pic>
+    </p:spTree>
+    <p:extLst>
+      <p:ext uri="{BB962C8B-B14F-4D97-AF65-F5344CB8AC3E}">
+        <p14:creationId xmlns:p14="http://schemas.microsoft.com/office/powerpoint/2010/main" val="71435870"/>
+      </p:ext>
+    </p:extLst>
+  </p:cSld>
+  <p:clrMapOvr>
+    <a:masterClrMapping/>
+  </p:clrMapOvr>
+</p:sld>
+</file>
+
+<file path=ppt/slides/slide7.xml><?xml version="1.0" encoding="utf-8"?>
+<p:sld xmlns:a="http://schemas.openxmlformats.org/drawingml/2006/main" xmlns:r="http://schemas.openxmlformats.org/officeDocument/2006/relationships" xmlns:p="http://schemas.openxmlformats.org/presentationml/2006/main">
+  <p:cSld>
+    <p:spTree>
+      <p:nvGrpSpPr>
+        <p:cNvPr id="1" name=""/>
+        <p:cNvGrpSpPr/>
+        <p:nvPr/>
+      </p:nvGrpSpPr>
+      <p:grpSpPr>
+        <a:xfrm>
+          <a:off x="0" y="0"/>
+          <a:ext cx="0" cy="0"/>
+          <a:chOff x="0" y="0"/>
+          <a:chExt cx="0" cy="0"/>
+        </a:xfrm>
+      </p:grpSpPr>
+      <p:sp>
+        <p:nvSpPr>
+          <p:cNvPr id="4" name="Rechteck 3"/>
+          <p:cNvSpPr>
+            <a:spLocks noChangeArrowheads="1"/>
+          </p:cNvSpPr>
+          <p:nvPr/>
+        </p:nvSpPr>
+        <p:spPr bwMode="auto">
+          <a:xfrm rot="-820623">
+            <a:off x="7629525" y="4868863"/>
+            <a:ext cx="1268413" cy="427037"/>
+          </a:xfrm>
+          <a:prstGeom prst="rect">
+            <a:avLst/>
+          </a:prstGeom>
+          <a:solidFill>
+            <a:srgbClr val="DDFFF3"/>
+          </a:solidFill>
+          <a:ln>
+            <a:noFill/>
+          </a:ln>
+          <a:extLst>
+            <a:ext uri="{91240B29-F687-4F45-9708-019B960494DF}">
+              <a14:hiddenLine xmlns:a14="http://schemas.microsoft.com/office/drawing/2010/main" w="12700" algn="ctr">
+                <a:solidFill>
+                  <a:srgbClr val="000000"/>
+                </a:solidFill>
+                <a:round/>
+                <a:headEnd type="none" w="sm" len="sm"/>
+                <a:tailEnd type="none" w="sm" len="sm"/>
+              </a14:hiddenLine>
+            </a:ext>
+          </a:extLst>
+        </p:spPr>
+        <p:txBody>
+          <a:bodyPr/>
+          <a:lstStyle>
+            <a:lvl1pPr eaLnBrk="0" hangingPunct="0">
+              <a:defRPr sz="2400">
+                <a:solidFill>
+                  <a:schemeClr val="tx1"/>
+                </a:solidFill>
+                <a:latin typeface="Times New Roman" panose="02020603050405020304" pitchFamily="18" charset="0"/>
+                <a:cs typeface="Arial" panose="020B0604020202020204" pitchFamily="34" charset="0"/>
+              </a:defRPr>
+            </a:lvl1pPr>
+            <a:lvl2pPr marL="742950" indent="-285750" eaLnBrk="0" hangingPunct="0">
+              <a:defRPr sz="2400">
+                <a:solidFill>
+                  <a:schemeClr val="tx1"/>
+                </a:solidFill>
+                <a:latin typeface="Times New Roman" panose="02020603050405020304" pitchFamily="18" charset="0"/>
+                <a:cs typeface="Arial" panose="020B0604020202020204" pitchFamily="34" charset="0"/>
+              </a:defRPr>
+            </a:lvl2pPr>
+            <a:lvl3pPr marL="1143000" indent="-228600" eaLnBrk="0" hangingPunct="0">
+              <a:defRPr sz="2400">
+                <a:solidFill>
+                  <a:schemeClr val="tx1"/>
+                </a:solidFill>
+                <a:latin typeface="Times New Roman" panose="02020603050405020304" pitchFamily="18" charset="0"/>
+                <a:cs typeface="Arial" panose="020B0604020202020204" pitchFamily="34" charset="0"/>
+              </a:defRPr>
+            </a:lvl3pPr>
+            <a:lvl4pPr marL="1600200" indent="-228600" eaLnBrk="0" hangingPunct="0">
+              <a:defRPr sz="2400">
+                <a:solidFill>
+                  <a:schemeClr val="tx1"/>
+                </a:solidFill>
+                <a:latin typeface="Times New Roman" panose="02020603050405020304" pitchFamily="18" charset="0"/>
+                <a:cs typeface="Arial" panose="020B0604020202020204" pitchFamily="34" charset="0"/>
+              </a:defRPr>
+            </a:lvl4pPr>
+            <a:lvl5pPr marL="2057400" indent="-228600" eaLnBrk="0" hangingPunct="0">
+              <a:defRPr sz="2400">
+                <a:solidFill>
+                  <a:schemeClr val="tx1"/>
+                </a:solidFill>
+                <a:latin typeface="Times New Roman" panose="02020603050405020304" pitchFamily="18" charset="0"/>
+                <a:cs typeface="Arial" panose="020B0604020202020204" pitchFamily="34" charset="0"/>
+              </a:defRPr>
+            </a:lvl5pPr>
+            <a:lvl6pPr marL="2514600" indent="-228600" eaLnBrk="0" fontAlgn="base" hangingPunct="0">
+              <a:spcBef>
+                <a:spcPct val="0"/>
+              </a:spcBef>
+              <a:spcAft>
+                <a:spcPct val="0"/>
+              </a:spcAft>
+              <a:defRPr sz="2400">
+                <a:solidFill>
+                  <a:schemeClr val="tx1"/>
+                </a:solidFill>
+                <a:latin typeface="Times New Roman" panose="02020603050405020304" pitchFamily="18" charset="0"/>
+                <a:cs typeface="Arial" panose="020B0604020202020204" pitchFamily="34" charset="0"/>
+              </a:defRPr>
+            </a:lvl6pPr>
+            <a:lvl7pPr marL="2971800" indent="-228600" eaLnBrk="0" fontAlgn="base" hangingPunct="0">
+              <a:spcBef>
+                <a:spcPct val="0"/>
+              </a:spcBef>
+              <a:spcAft>
+                <a:spcPct val="0"/>
+              </a:spcAft>
+              <a:defRPr sz="2400">
+                <a:solidFill>
+                  <a:schemeClr val="tx1"/>
+                </a:solidFill>
+                <a:latin typeface="Times New Roman" panose="02020603050405020304" pitchFamily="18" charset="0"/>
+                <a:cs typeface="Arial" panose="020B0604020202020204" pitchFamily="34" charset="0"/>
+              </a:defRPr>
+            </a:lvl7pPr>
+            <a:lvl8pPr marL="3429000" indent="-228600" eaLnBrk="0" fontAlgn="base" hangingPunct="0">
+              <a:spcBef>
+                <a:spcPct val="0"/>
+              </a:spcBef>
+              <a:spcAft>
+                <a:spcPct val="0"/>
+              </a:spcAft>
+              <a:defRPr sz="2400">
+                <a:solidFill>
+                  <a:schemeClr val="tx1"/>
+                </a:solidFill>
+                <a:latin typeface="Times New Roman" panose="02020603050405020304" pitchFamily="18" charset="0"/>
+                <a:cs typeface="Arial" panose="020B0604020202020204" pitchFamily="34" charset="0"/>
+              </a:defRPr>
+            </a:lvl8pPr>
+            <a:lvl9pPr marL="3886200" indent="-228600" eaLnBrk="0" fontAlgn="base" hangingPunct="0">
+              <a:spcBef>
+                <a:spcPct val="0"/>
+              </a:spcBef>
+              <a:spcAft>
+                <a:spcPct val="0"/>
+              </a:spcAft>
+              <a:defRPr sz="2400">
+                <a:solidFill>
+                  <a:schemeClr val="tx1"/>
+                </a:solidFill>
+                <a:latin typeface="Times New Roman" panose="02020603050405020304" pitchFamily="18" charset="0"/>
+                <a:cs typeface="Arial" panose="020B0604020202020204" pitchFamily="34" charset="0"/>
+              </a:defRPr>
+            </a:lvl9pPr>
+          </a:lstStyle>
+          <a:p>
+            <a:endParaRPr lang="de-DE" altLang="de-DE" sz="1400"/>
+          </a:p>
+        </p:txBody>
+      </p:sp>
+      <p:sp>
+        <p:nvSpPr>
+          <p:cNvPr id="5" name="Rechteck 4"/>
+          <p:cNvSpPr>
+            <a:spLocks noChangeArrowheads="1"/>
+          </p:cNvSpPr>
+          <p:nvPr/>
+        </p:nvSpPr>
+        <p:spPr bwMode="auto">
+          <a:xfrm rot="-376468">
+            <a:off x="4627563" y="1976438"/>
+            <a:ext cx="1868487" cy="476250"/>
+          </a:xfrm>
+          <a:prstGeom prst="rect">
+            <a:avLst/>
+          </a:prstGeom>
+          <a:solidFill>
+            <a:srgbClr val="DDFFF3"/>
+          </a:solidFill>
+          <a:ln>
+            <a:noFill/>
+          </a:ln>
+          <a:extLst>
+            <a:ext uri="{91240B29-F687-4F45-9708-019B960494DF}">
+              <a14:hiddenLine xmlns:a14="http://schemas.microsoft.com/office/drawing/2010/main" w="12700" algn="ctr">
+                <a:solidFill>
+                  <a:srgbClr val="000000"/>
+                </a:solidFill>
+                <a:round/>
+                <a:headEnd type="none" w="sm" len="sm"/>
+                <a:tailEnd type="none" w="sm" len="sm"/>
+              </a14:hiddenLine>
+            </a:ext>
+          </a:extLst>
+        </p:spPr>
+        <p:txBody>
+          <a:bodyPr/>
+          <a:lstStyle>
+            <a:lvl1pPr eaLnBrk="0" hangingPunct="0">
+              <a:defRPr sz="2400">
+                <a:solidFill>
+                  <a:schemeClr val="tx1"/>
+                </a:solidFill>
+                <a:latin typeface="Times New Roman" panose="02020603050405020304" pitchFamily="18" charset="0"/>
+                <a:cs typeface="Arial" panose="020B0604020202020204" pitchFamily="34" charset="0"/>
+              </a:defRPr>
+            </a:lvl1pPr>
+            <a:lvl2pPr marL="742950" indent="-285750" eaLnBrk="0" hangingPunct="0">
+              <a:defRPr sz="2400">
+                <a:solidFill>
+                  <a:schemeClr val="tx1"/>
+                </a:solidFill>
+                <a:latin typeface="Times New Roman" panose="02020603050405020304" pitchFamily="18" charset="0"/>
+                <a:cs typeface="Arial" panose="020B0604020202020204" pitchFamily="34" charset="0"/>
+              </a:defRPr>
+            </a:lvl2pPr>
+            <a:lvl3pPr marL="1143000" indent="-228600" eaLnBrk="0" hangingPunct="0">
+              <a:defRPr sz="2400">
+                <a:solidFill>
+                  <a:schemeClr val="tx1"/>
+                </a:solidFill>
+                <a:latin typeface="Times New Roman" panose="02020603050405020304" pitchFamily="18" charset="0"/>
+                <a:cs typeface="Arial" panose="020B0604020202020204" pitchFamily="34" charset="0"/>
+              </a:defRPr>
+            </a:lvl3pPr>
+            <a:lvl4pPr marL="1600200" indent="-228600" eaLnBrk="0" hangingPunct="0">
+              <a:defRPr sz="2400">
+                <a:solidFill>
+                  <a:schemeClr val="tx1"/>
+                </a:solidFill>
+                <a:latin typeface="Times New Roman" panose="02020603050405020304" pitchFamily="18" charset="0"/>
+                <a:cs typeface="Arial" panose="020B0604020202020204" pitchFamily="34" charset="0"/>
+              </a:defRPr>
+            </a:lvl4pPr>
+            <a:lvl5pPr marL="2057400" indent="-228600" eaLnBrk="0" hangingPunct="0">
+              <a:defRPr sz="2400">
+                <a:solidFill>
+                  <a:schemeClr val="tx1"/>
+                </a:solidFill>
+                <a:latin typeface="Times New Roman" panose="02020603050405020304" pitchFamily="18" charset="0"/>
+                <a:cs typeface="Arial" panose="020B0604020202020204" pitchFamily="34" charset="0"/>
+              </a:defRPr>
+            </a:lvl5pPr>
+            <a:lvl6pPr marL="2514600" indent="-228600" eaLnBrk="0" fontAlgn="base" hangingPunct="0">
+              <a:spcBef>
+                <a:spcPct val="0"/>
+              </a:spcBef>
+              <a:spcAft>
+                <a:spcPct val="0"/>
+              </a:spcAft>
+              <a:defRPr sz="2400">
+                <a:solidFill>
+                  <a:schemeClr val="tx1"/>
+                </a:solidFill>
+                <a:latin typeface="Times New Roman" panose="02020603050405020304" pitchFamily="18" charset="0"/>
+                <a:cs typeface="Arial" panose="020B0604020202020204" pitchFamily="34" charset="0"/>
+              </a:defRPr>
+            </a:lvl6pPr>
+            <a:lvl7pPr marL="2971800" indent="-228600" eaLnBrk="0" fontAlgn="base" hangingPunct="0">
+              <a:spcBef>
+                <a:spcPct val="0"/>
+              </a:spcBef>
+              <a:spcAft>
+                <a:spcPct val="0"/>
+              </a:spcAft>
+              <a:defRPr sz="2400">
+                <a:solidFill>
+                  <a:schemeClr val="tx1"/>
+                </a:solidFill>
+                <a:latin typeface="Times New Roman" panose="02020603050405020304" pitchFamily="18" charset="0"/>
+                <a:cs typeface="Arial" panose="020B0604020202020204" pitchFamily="34" charset="0"/>
+              </a:defRPr>
+            </a:lvl7pPr>
+            <a:lvl8pPr marL="3429000" indent="-228600" eaLnBrk="0" fontAlgn="base" hangingPunct="0">
+              <a:spcBef>
+                <a:spcPct val="0"/>
+              </a:spcBef>
+              <a:spcAft>
+                <a:spcPct val="0"/>
+              </a:spcAft>
+              <a:defRPr sz="2400">
+                <a:solidFill>
+                  <a:schemeClr val="tx1"/>
+                </a:solidFill>
+                <a:latin typeface="Times New Roman" panose="02020603050405020304" pitchFamily="18" charset="0"/>
+                <a:cs typeface="Arial" panose="020B0604020202020204" pitchFamily="34" charset="0"/>
+              </a:defRPr>
+            </a:lvl8pPr>
+            <a:lvl9pPr marL="3886200" indent="-228600" eaLnBrk="0" fontAlgn="base" hangingPunct="0">
+              <a:spcBef>
+                <a:spcPct val="0"/>
+              </a:spcBef>
+              <a:spcAft>
+                <a:spcPct val="0"/>
+              </a:spcAft>
+              <a:defRPr sz="2400">
+                <a:solidFill>
+                  <a:schemeClr val="tx1"/>
+                </a:solidFill>
+                <a:latin typeface="Times New Roman" panose="02020603050405020304" pitchFamily="18" charset="0"/>
+                <a:cs typeface="Arial" panose="020B0604020202020204" pitchFamily="34" charset="0"/>
+              </a:defRPr>
+            </a:lvl9pPr>
+          </a:lstStyle>
+          <a:p>
+            <a:endParaRPr lang="de-DE" altLang="de-DE" sz="1400"/>
+          </a:p>
+        </p:txBody>
+      </p:sp>
+      <p:sp>
+        <p:nvSpPr>
+          <p:cNvPr id="6" name="Rechteck 5"/>
+          <p:cNvSpPr>
+            <a:spLocks noChangeArrowheads="1"/>
+          </p:cNvSpPr>
+          <p:nvPr/>
+        </p:nvSpPr>
+        <p:spPr bwMode="auto">
+          <a:xfrm rot="-669469">
+            <a:off x="5592763" y="2697163"/>
+            <a:ext cx="1069975" cy="444500"/>
+          </a:xfrm>
+          <a:prstGeom prst="rect">
+            <a:avLst/>
+          </a:prstGeom>
+          <a:solidFill>
+            <a:srgbClr val="DDFFF3"/>
+          </a:solidFill>
+          <a:ln>
+            <a:noFill/>
+          </a:ln>
+          <a:extLst>
+            <a:ext uri="{91240B29-F687-4F45-9708-019B960494DF}">
+              <a14:hiddenLine xmlns:a14="http://schemas.microsoft.com/office/drawing/2010/main" w="12700" algn="ctr">
+                <a:solidFill>
+                  <a:srgbClr val="000000"/>
+                </a:solidFill>
+                <a:round/>
+                <a:headEnd type="none" w="sm" len="sm"/>
+                <a:tailEnd type="none" w="sm" len="sm"/>
+              </a14:hiddenLine>
+            </a:ext>
+          </a:extLst>
+        </p:spPr>
+        <p:txBody>
+          <a:bodyPr/>
+          <a:lstStyle>
+            <a:lvl1pPr eaLnBrk="0" hangingPunct="0">
+              <a:defRPr sz="2400">
+                <a:solidFill>
+                  <a:schemeClr val="tx1"/>
+                </a:solidFill>
+                <a:latin typeface="Times New Roman" panose="02020603050405020304" pitchFamily="18" charset="0"/>
+                <a:cs typeface="Arial" panose="020B0604020202020204" pitchFamily="34" charset="0"/>
+              </a:defRPr>
+            </a:lvl1pPr>
+            <a:lvl2pPr marL="742950" indent="-285750" eaLnBrk="0" hangingPunct="0">
+              <a:defRPr sz="2400">
+                <a:solidFill>
+                  <a:schemeClr val="tx1"/>
+                </a:solidFill>
+                <a:latin typeface="Times New Roman" panose="02020603050405020304" pitchFamily="18" charset="0"/>
+                <a:cs typeface="Arial" panose="020B0604020202020204" pitchFamily="34" charset="0"/>
+              </a:defRPr>
+            </a:lvl2pPr>
+            <a:lvl3pPr marL="1143000" indent="-228600" eaLnBrk="0" hangingPunct="0">
+              <a:defRPr sz="2400">
+                <a:solidFill>
+                  <a:schemeClr val="tx1"/>
+                </a:solidFill>
+                <a:latin typeface="Times New Roman" panose="02020603050405020304" pitchFamily="18" charset="0"/>
+                <a:cs typeface="Arial" panose="020B0604020202020204" pitchFamily="34" charset="0"/>
+              </a:defRPr>
+            </a:lvl3pPr>
+            <a:lvl4pPr marL="1600200" indent="-228600" eaLnBrk="0" hangingPunct="0">
+              <a:defRPr sz="2400">
+                <a:solidFill>
+                  <a:schemeClr val="tx1"/>
+                </a:solidFill>
+                <a:latin typeface="Times New Roman" panose="02020603050405020304" pitchFamily="18" charset="0"/>
+                <a:cs typeface="Arial" panose="020B0604020202020204" pitchFamily="34" charset="0"/>
+              </a:defRPr>
+            </a:lvl4pPr>
+            <a:lvl5pPr marL="2057400" indent="-228600" eaLnBrk="0" hangingPunct="0">
+              <a:defRPr sz="2400">
+                <a:solidFill>
+                  <a:schemeClr val="tx1"/>
+                </a:solidFill>
+                <a:latin typeface="Times New Roman" panose="02020603050405020304" pitchFamily="18" charset="0"/>
+                <a:cs typeface="Arial" panose="020B0604020202020204" pitchFamily="34" charset="0"/>
+              </a:defRPr>
+            </a:lvl5pPr>
+            <a:lvl6pPr marL="2514600" indent="-228600" eaLnBrk="0" fontAlgn="base" hangingPunct="0">
+              <a:spcBef>
+                <a:spcPct val="0"/>
+              </a:spcBef>
+              <a:spcAft>
+                <a:spcPct val="0"/>
+              </a:spcAft>
+              <a:defRPr sz="2400">
+                <a:solidFill>
+                  <a:schemeClr val="tx1"/>
+                </a:solidFill>
+                <a:latin typeface="Times New Roman" panose="02020603050405020304" pitchFamily="18" charset="0"/>
+                <a:cs typeface="Arial" panose="020B0604020202020204" pitchFamily="34" charset="0"/>
+              </a:defRPr>
+            </a:lvl6pPr>
+            <a:lvl7pPr marL="2971800" indent="-228600" eaLnBrk="0" fontAlgn="base" hangingPunct="0">
+              <a:spcBef>
+                <a:spcPct val="0"/>
+              </a:spcBef>
+              <a:spcAft>
+                <a:spcPct val="0"/>
+              </a:spcAft>
+              <a:defRPr sz="2400">
+                <a:solidFill>
+                  <a:schemeClr val="tx1"/>
+                </a:solidFill>
+                <a:latin typeface="Times New Roman" panose="02020603050405020304" pitchFamily="18" charset="0"/>
+                <a:cs typeface="Arial" panose="020B0604020202020204" pitchFamily="34" charset="0"/>
+              </a:defRPr>
+            </a:lvl7pPr>
+            <a:lvl8pPr marL="3429000" indent="-228600" eaLnBrk="0" fontAlgn="base" hangingPunct="0">
+              <a:spcBef>
+                <a:spcPct val="0"/>
+              </a:spcBef>
+              <a:spcAft>
+                <a:spcPct val="0"/>
+              </a:spcAft>
+              <a:defRPr sz="2400">
+                <a:solidFill>
+                  <a:schemeClr val="tx1"/>
+                </a:solidFill>
+                <a:latin typeface="Times New Roman" panose="02020603050405020304" pitchFamily="18" charset="0"/>
+                <a:cs typeface="Arial" panose="020B0604020202020204" pitchFamily="34" charset="0"/>
+              </a:defRPr>
+            </a:lvl8pPr>
+            <a:lvl9pPr marL="3886200" indent="-228600" eaLnBrk="0" fontAlgn="base" hangingPunct="0">
+              <a:spcBef>
+                <a:spcPct val="0"/>
+              </a:spcBef>
+              <a:spcAft>
+                <a:spcPct val="0"/>
+              </a:spcAft>
+              <a:defRPr sz="2400">
+                <a:solidFill>
+                  <a:schemeClr val="tx1"/>
+                </a:solidFill>
+                <a:latin typeface="Times New Roman" panose="02020603050405020304" pitchFamily="18" charset="0"/>
+                <a:cs typeface="Arial" panose="020B0604020202020204" pitchFamily="34" charset="0"/>
+              </a:defRPr>
+            </a:lvl9pPr>
+          </a:lstStyle>
+          <a:p>
+            <a:endParaRPr lang="de-DE" altLang="de-DE" sz="1400"/>
+          </a:p>
+        </p:txBody>
+      </p:sp>
+      <p:sp>
+        <p:nvSpPr>
+          <p:cNvPr id="7" name="Rechteck 6"/>
+          <p:cNvSpPr>
+            <a:spLocks noChangeArrowheads="1"/>
+          </p:cNvSpPr>
+          <p:nvPr/>
+        </p:nvSpPr>
+        <p:spPr bwMode="auto">
+          <a:xfrm>
+            <a:off x="4632325" y="3422650"/>
+            <a:ext cx="1524000" cy="438150"/>
+          </a:xfrm>
+          <a:prstGeom prst="rect">
+            <a:avLst/>
+          </a:prstGeom>
+          <a:solidFill>
+            <a:srgbClr val="DDFFF3"/>
+          </a:solidFill>
+          <a:ln>
+            <a:noFill/>
+          </a:ln>
+          <a:extLst>
+            <a:ext uri="{91240B29-F687-4F45-9708-019B960494DF}">
+              <a14:hiddenLine xmlns:a14="http://schemas.microsoft.com/office/drawing/2010/main" w="12700" algn="ctr">
+                <a:solidFill>
+                  <a:srgbClr val="000000"/>
+                </a:solidFill>
+                <a:round/>
+                <a:headEnd type="none" w="sm" len="sm"/>
+                <a:tailEnd type="none" w="sm" len="sm"/>
+              </a14:hiddenLine>
+            </a:ext>
+          </a:extLst>
+        </p:spPr>
+        <p:txBody>
+          <a:bodyPr/>
+          <a:lstStyle>
+            <a:lvl1pPr eaLnBrk="0" hangingPunct="0">
+              <a:defRPr sz="2400">
+                <a:solidFill>
+                  <a:schemeClr val="tx1"/>
+                </a:solidFill>
+                <a:latin typeface="Times New Roman" panose="02020603050405020304" pitchFamily="18" charset="0"/>
+                <a:cs typeface="Arial" panose="020B0604020202020204" pitchFamily="34" charset="0"/>
+              </a:defRPr>
+            </a:lvl1pPr>
+            <a:lvl2pPr marL="742950" indent="-285750" eaLnBrk="0" hangingPunct="0">
+              <a:defRPr sz="2400">
+                <a:solidFill>
+                  <a:schemeClr val="tx1"/>
+                </a:solidFill>
+                <a:latin typeface="Times New Roman" panose="02020603050405020304" pitchFamily="18" charset="0"/>
+                <a:cs typeface="Arial" panose="020B0604020202020204" pitchFamily="34" charset="0"/>
+              </a:defRPr>
+            </a:lvl2pPr>
+            <a:lvl3pPr marL="1143000" indent="-228600" eaLnBrk="0" hangingPunct="0">
+              <a:defRPr sz="2400">
+                <a:solidFill>
+                  <a:schemeClr val="tx1"/>
+                </a:solidFill>
+                <a:latin typeface="Times New Roman" panose="02020603050405020304" pitchFamily="18" charset="0"/>
+                <a:cs typeface="Arial" panose="020B0604020202020204" pitchFamily="34" charset="0"/>
+              </a:defRPr>
+            </a:lvl3pPr>
+            <a:lvl4pPr marL="1600200" indent="-228600" eaLnBrk="0" hangingPunct="0">
+              <a:defRPr sz="2400">
+                <a:solidFill>
+                  <a:schemeClr val="tx1"/>
+                </a:solidFill>
+                <a:latin typeface="Times New Roman" panose="02020603050405020304" pitchFamily="18" charset="0"/>
+                <a:cs typeface="Arial" panose="020B0604020202020204" pitchFamily="34" charset="0"/>
+              </a:defRPr>
+            </a:lvl4pPr>
+            <a:lvl5pPr marL="2057400" indent="-228600" eaLnBrk="0" hangingPunct="0">
+              <a:defRPr sz="2400">
+                <a:solidFill>
+                  <a:schemeClr val="tx1"/>
+                </a:solidFill>
+                <a:latin typeface="Times New Roman" panose="02020603050405020304" pitchFamily="18" charset="0"/>
+                <a:cs typeface="Arial" panose="020B0604020202020204" pitchFamily="34" charset="0"/>
+              </a:defRPr>
+            </a:lvl5pPr>
+            <a:lvl6pPr marL="2514600" indent="-228600" eaLnBrk="0" fontAlgn="base" hangingPunct="0">
+              <a:spcBef>
+                <a:spcPct val="0"/>
+              </a:spcBef>
+              <a:spcAft>
+                <a:spcPct val="0"/>
+              </a:spcAft>
+              <a:defRPr sz="2400">
+                <a:solidFill>
+                  <a:schemeClr val="tx1"/>
+                </a:solidFill>
+                <a:latin typeface="Times New Roman" panose="02020603050405020304" pitchFamily="18" charset="0"/>
+                <a:cs typeface="Arial" panose="020B0604020202020204" pitchFamily="34" charset="0"/>
+              </a:defRPr>
+            </a:lvl6pPr>
+            <a:lvl7pPr marL="2971800" indent="-228600" eaLnBrk="0" fontAlgn="base" hangingPunct="0">
+              <a:spcBef>
+                <a:spcPct val="0"/>
+              </a:spcBef>
+              <a:spcAft>
+                <a:spcPct val="0"/>
+              </a:spcAft>
+              <a:defRPr sz="2400">
+                <a:solidFill>
+                  <a:schemeClr val="tx1"/>
+                </a:solidFill>
+                <a:latin typeface="Times New Roman" panose="02020603050405020304" pitchFamily="18" charset="0"/>
+                <a:cs typeface="Arial" panose="020B0604020202020204" pitchFamily="34" charset="0"/>
+              </a:defRPr>
+            </a:lvl7pPr>
+            <a:lvl8pPr marL="3429000" indent="-228600" eaLnBrk="0" fontAlgn="base" hangingPunct="0">
+              <a:spcBef>
+                <a:spcPct val="0"/>
+              </a:spcBef>
+              <a:spcAft>
+                <a:spcPct val="0"/>
+              </a:spcAft>
+              <a:defRPr sz="2400">
+                <a:solidFill>
+                  <a:schemeClr val="tx1"/>
+                </a:solidFill>
+                <a:latin typeface="Times New Roman" panose="02020603050405020304" pitchFamily="18" charset="0"/>
+                <a:cs typeface="Arial" panose="020B0604020202020204" pitchFamily="34" charset="0"/>
+              </a:defRPr>
+            </a:lvl8pPr>
+            <a:lvl9pPr marL="3886200" indent="-228600" eaLnBrk="0" fontAlgn="base" hangingPunct="0">
+              <a:spcBef>
+                <a:spcPct val="0"/>
+              </a:spcBef>
+              <a:spcAft>
+                <a:spcPct val="0"/>
+              </a:spcAft>
+              <a:defRPr sz="2400">
+                <a:solidFill>
+                  <a:schemeClr val="tx1"/>
+                </a:solidFill>
+                <a:latin typeface="Times New Roman" panose="02020603050405020304" pitchFamily="18" charset="0"/>
+                <a:cs typeface="Arial" panose="020B0604020202020204" pitchFamily="34" charset="0"/>
+              </a:defRPr>
+            </a:lvl9pPr>
+          </a:lstStyle>
+          <a:p>
+            <a:endParaRPr lang="de-DE" altLang="de-DE" sz="1400"/>
+          </a:p>
+        </p:txBody>
+      </p:sp>
+      <p:sp>
+        <p:nvSpPr>
+          <p:cNvPr id="8" name="Rechteck 7"/>
+          <p:cNvSpPr>
+            <a:spLocks noChangeArrowheads="1"/>
+          </p:cNvSpPr>
+          <p:nvPr/>
+        </p:nvSpPr>
+        <p:spPr bwMode="auto">
+          <a:xfrm rot="638866">
+            <a:off x="4062413" y="4198938"/>
+            <a:ext cx="1570037" cy="428625"/>
+          </a:xfrm>
+          <a:prstGeom prst="rect">
+            <a:avLst/>
+          </a:prstGeom>
+          <a:solidFill>
+            <a:srgbClr val="DDFFF3"/>
+          </a:solidFill>
+          <a:ln>
+            <a:noFill/>
+          </a:ln>
+          <a:extLst>
+            <a:ext uri="{91240B29-F687-4F45-9708-019B960494DF}">
+              <a14:hiddenLine xmlns:a14="http://schemas.microsoft.com/office/drawing/2010/main" w="12700" algn="ctr">
+                <a:solidFill>
+                  <a:srgbClr val="000000"/>
+                </a:solidFill>
+                <a:round/>
+                <a:headEnd type="none" w="sm" len="sm"/>
+                <a:tailEnd type="none" w="sm" len="sm"/>
+              </a14:hiddenLine>
+            </a:ext>
+          </a:extLst>
+        </p:spPr>
+        <p:txBody>
+          <a:bodyPr/>
+          <a:lstStyle>
+            <a:lvl1pPr eaLnBrk="0" hangingPunct="0">
+              <a:defRPr sz="2400">
+                <a:solidFill>
+                  <a:schemeClr val="tx1"/>
+                </a:solidFill>
+                <a:latin typeface="Times New Roman" panose="02020603050405020304" pitchFamily="18" charset="0"/>
+                <a:cs typeface="Arial" panose="020B0604020202020204" pitchFamily="34" charset="0"/>
+              </a:defRPr>
+            </a:lvl1pPr>
+            <a:lvl2pPr marL="742950" indent="-285750" eaLnBrk="0" hangingPunct="0">
+              <a:defRPr sz="2400">
+                <a:solidFill>
+                  <a:schemeClr val="tx1"/>
+                </a:solidFill>
+                <a:latin typeface="Times New Roman" panose="02020603050405020304" pitchFamily="18" charset="0"/>
+                <a:cs typeface="Arial" panose="020B0604020202020204" pitchFamily="34" charset="0"/>
+              </a:defRPr>
+            </a:lvl2pPr>
+            <a:lvl3pPr marL="1143000" indent="-228600" eaLnBrk="0" hangingPunct="0">
+              <a:defRPr sz="2400">
+                <a:solidFill>
+                  <a:schemeClr val="tx1"/>
+                </a:solidFill>
+                <a:latin typeface="Times New Roman" panose="02020603050405020304" pitchFamily="18" charset="0"/>
+                <a:cs typeface="Arial" panose="020B0604020202020204" pitchFamily="34" charset="0"/>
+              </a:defRPr>
+            </a:lvl3pPr>
+            <a:lvl4pPr marL="1600200" indent="-228600" eaLnBrk="0" hangingPunct="0">
+              <a:defRPr sz="2400">
+                <a:solidFill>
+                  <a:schemeClr val="tx1"/>
+                </a:solidFill>
+                <a:latin typeface="Times New Roman" panose="02020603050405020304" pitchFamily="18" charset="0"/>
+                <a:cs typeface="Arial" panose="020B0604020202020204" pitchFamily="34" charset="0"/>
+              </a:defRPr>
+            </a:lvl4pPr>
+            <a:lvl5pPr marL="2057400" indent="-228600" eaLnBrk="0" hangingPunct="0">
+              <a:defRPr sz="2400">
+                <a:solidFill>
+                  <a:schemeClr val="tx1"/>
+                </a:solidFill>
+                <a:latin typeface="Times New Roman" panose="02020603050405020304" pitchFamily="18" charset="0"/>
+                <a:cs typeface="Arial" panose="020B0604020202020204" pitchFamily="34" charset="0"/>
+              </a:defRPr>
+            </a:lvl5pPr>
+            <a:lvl6pPr marL="2514600" indent="-228600" eaLnBrk="0" fontAlgn="base" hangingPunct="0">
+              <a:spcBef>
+                <a:spcPct val="0"/>
+              </a:spcBef>
+              <a:spcAft>
+                <a:spcPct val="0"/>
+              </a:spcAft>
+              <a:defRPr sz="2400">
+                <a:solidFill>
+                  <a:schemeClr val="tx1"/>
+                </a:solidFill>
+                <a:latin typeface="Times New Roman" panose="02020603050405020304" pitchFamily="18" charset="0"/>
+                <a:cs typeface="Arial" panose="020B0604020202020204" pitchFamily="34" charset="0"/>
+              </a:defRPr>
+            </a:lvl6pPr>
+            <a:lvl7pPr marL="2971800" indent="-228600" eaLnBrk="0" fontAlgn="base" hangingPunct="0">
+              <a:spcBef>
+                <a:spcPct val="0"/>
+              </a:spcBef>
+              <a:spcAft>
+                <a:spcPct val="0"/>
+              </a:spcAft>
+              <a:defRPr sz="2400">
+                <a:solidFill>
+                  <a:schemeClr val="tx1"/>
+                </a:solidFill>
+                <a:latin typeface="Times New Roman" panose="02020603050405020304" pitchFamily="18" charset="0"/>
+                <a:cs typeface="Arial" panose="020B0604020202020204" pitchFamily="34" charset="0"/>
+              </a:defRPr>
+            </a:lvl7pPr>
+            <a:lvl8pPr marL="3429000" indent="-228600" eaLnBrk="0" fontAlgn="base" hangingPunct="0">
+              <a:spcBef>
+                <a:spcPct val="0"/>
+              </a:spcBef>
+              <a:spcAft>
+                <a:spcPct val="0"/>
+              </a:spcAft>
+              <a:defRPr sz="2400">
+                <a:solidFill>
+                  <a:schemeClr val="tx1"/>
+                </a:solidFill>
+                <a:latin typeface="Times New Roman" panose="02020603050405020304" pitchFamily="18" charset="0"/>
+                <a:cs typeface="Arial" panose="020B0604020202020204" pitchFamily="34" charset="0"/>
+              </a:defRPr>
+            </a:lvl8pPr>
+            <a:lvl9pPr marL="3886200" indent="-228600" eaLnBrk="0" fontAlgn="base" hangingPunct="0">
+              <a:spcBef>
+                <a:spcPct val="0"/>
+              </a:spcBef>
+              <a:spcAft>
+                <a:spcPct val="0"/>
+              </a:spcAft>
+              <a:defRPr sz="2400">
+                <a:solidFill>
+                  <a:schemeClr val="tx1"/>
+                </a:solidFill>
+                <a:latin typeface="Times New Roman" panose="02020603050405020304" pitchFamily="18" charset="0"/>
+                <a:cs typeface="Arial" panose="020B0604020202020204" pitchFamily="34" charset="0"/>
+              </a:defRPr>
+            </a:lvl9pPr>
+          </a:lstStyle>
+          <a:p>
+            <a:endParaRPr lang="de-DE" altLang="de-DE" sz="1400"/>
+          </a:p>
+        </p:txBody>
+      </p:sp>
+      <p:sp>
+        <p:nvSpPr>
+          <p:cNvPr id="9" name="Rechteck 8"/>
+          <p:cNvSpPr>
+            <a:spLocks noChangeArrowheads="1"/>
+          </p:cNvSpPr>
+          <p:nvPr/>
+        </p:nvSpPr>
+        <p:spPr bwMode="auto">
+          <a:xfrm rot="-529204">
+            <a:off x="3927475" y="5214938"/>
+            <a:ext cx="1428750" cy="211137"/>
+          </a:xfrm>
+          <a:prstGeom prst="rect">
+            <a:avLst/>
+          </a:prstGeom>
+          <a:solidFill>
+            <a:srgbClr val="DDFFF3"/>
+          </a:solidFill>
+          <a:ln>
+            <a:noFill/>
+          </a:ln>
+          <a:extLst>
+            <a:ext uri="{91240B29-F687-4F45-9708-019B960494DF}">
+              <a14:hiddenLine xmlns:a14="http://schemas.microsoft.com/office/drawing/2010/main" w="12700" algn="ctr">
+                <a:solidFill>
+                  <a:srgbClr val="000000"/>
+                </a:solidFill>
+                <a:round/>
+                <a:headEnd type="none" w="sm" len="sm"/>
+                <a:tailEnd type="none" w="sm" len="sm"/>
+              </a14:hiddenLine>
+            </a:ext>
+          </a:extLst>
+        </p:spPr>
+        <p:txBody>
+          <a:bodyPr/>
+          <a:lstStyle>
+            <a:lvl1pPr eaLnBrk="0" hangingPunct="0">
+              <a:defRPr sz="2400">
+                <a:solidFill>
+                  <a:schemeClr val="tx1"/>
+                </a:solidFill>
+                <a:latin typeface="Times New Roman" panose="02020603050405020304" pitchFamily="18" charset="0"/>
+                <a:cs typeface="Arial" panose="020B0604020202020204" pitchFamily="34" charset="0"/>
+              </a:defRPr>
+            </a:lvl1pPr>
+            <a:lvl2pPr marL="742950" indent="-285750" eaLnBrk="0" hangingPunct="0">
+              <a:defRPr sz="2400">
+                <a:solidFill>
+                  <a:schemeClr val="tx1"/>
+                </a:solidFill>
+                <a:latin typeface="Times New Roman" panose="02020603050405020304" pitchFamily="18" charset="0"/>
+                <a:cs typeface="Arial" panose="020B0604020202020204" pitchFamily="34" charset="0"/>
+              </a:defRPr>
+            </a:lvl2pPr>
+            <a:lvl3pPr marL="1143000" indent="-228600" eaLnBrk="0" hangingPunct="0">
+              <a:defRPr sz="2400">
+                <a:solidFill>
+                  <a:schemeClr val="tx1"/>
+                </a:solidFill>
+                <a:latin typeface="Times New Roman" panose="02020603050405020304" pitchFamily="18" charset="0"/>
+                <a:cs typeface="Arial" panose="020B0604020202020204" pitchFamily="34" charset="0"/>
+              </a:defRPr>
+            </a:lvl3pPr>
+            <a:lvl4pPr marL="1600200" indent="-228600" eaLnBrk="0" hangingPunct="0">
+              <a:defRPr sz="2400">
+                <a:solidFill>
+                  <a:schemeClr val="tx1"/>
+                </a:solidFill>
+                <a:latin typeface="Times New Roman" panose="02020603050405020304" pitchFamily="18" charset="0"/>
+                <a:cs typeface="Arial" panose="020B0604020202020204" pitchFamily="34" charset="0"/>
+              </a:defRPr>
+            </a:lvl4pPr>
+            <a:lvl5pPr marL="2057400" indent="-228600" eaLnBrk="0" hangingPunct="0">
+              <a:defRPr sz="2400">
+                <a:solidFill>
+                  <a:schemeClr val="tx1"/>
+                </a:solidFill>
+                <a:latin typeface="Times New Roman" panose="02020603050405020304" pitchFamily="18" charset="0"/>
+                <a:cs typeface="Arial" panose="020B0604020202020204" pitchFamily="34" charset="0"/>
+              </a:defRPr>
+            </a:lvl5pPr>
+            <a:lvl6pPr marL="2514600" indent="-228600" eaLnBrk="0" fontAlgn="base" hangingPunct="0">
+              <a:spcBef>
+                <a:spcPct val="0"/>
+              </a:spcBef>
+              <a:spcAft>
+                <a:spcPct val="0"/>
+              </a:spcAft>
+              <a:defRPr sz="2400">
+                <a:solidFill>
+                  <a:schemeClr val="tx1"/>
+                </a:solidFill>
+                <a:latin typeface="Times New Roman" panose="02020603050405020304" pitchFamily="18" charset="0"/>
+                <a:cs typeface="Arial" panose="020B0604020202020204" pitchFamily="34" charset="0"/>
+              </a:defRPr>
+            </a:lvl6pPr>
+            <a:lvl7pPr marL="2971800" indent="-228600" eaLnBrk="0" fontAlgn="base" hangingPunct="0">
+              <a:spcBef>
+                <a:spcPct val="0"/>
+              </a:spcBef>
+              <a:spcAft>
+                <a:spcPct val="0"/>
+              </a:spcAft>
+              <a:defRPr sz="2400">
+                <a:solidFill>
+                  <a:schemeClr val="tx1"/>
+                </a:solidFill>
+                <a:latin typeface="Times New Roman" panose="02020603050405020304" pitchFamily="18" charset="0"/>
+                <a:cs typeface="Arial" panose="020B0604020202020204" pitchFamily="34" charset="0"/>
+              </a:defRPr>
+            </a:lvl7pPr>
+            <a:lvl8pPr marL="3429000" indent="-228600" eaLnBrk="0" fontAlgn="base" hangingPunct="0">
+              <a:spcBef>
+                <a:spcPct val="0"/>
+              </a:spcBef>
+              <a:spcAft>
+                <a:spcPct val="0"/>
+              </a:spcAft>
+              <a:defRPr sz="2400">
+                <a:solidFill>
+                  <a:schemeClr val="tx1"/>
+                </a:solidFill>
+                <a:latin typeface="Times New Roman" panose="02020603050405020304" pitchFamily="18" charset="0"/>
+                <a:cs typeface="Arial" panose="020B0604020202020204" pitchFamily="34" charset="0"/>
+              </a:defRPr>
+            </a:lvl8pPr>
+            <a:lvl9pPr marL="3886200" indent="-228600" eaLnBrk="0" fontAlgn="base" hangingPunct="0">
+              <a:spcBef>
+                <a:spcPct val="0"/>
+              </a:spcBef>
+              <a:spcAft>
+                <a:spcPct val="0"/>
+              </a:spcAft>
+              <a:defRPr sz="2400">
+                <a:solidFill>
+                  <a:schemeClr val="tx1"/>
+                </a:solidFill>
+                <a:latin typeface="Times New Roman" panose="02020603050405020304" pitchFamily="18" charset="0"/>
+                <a:cs typeface="Arial" panose="020B0604020202020204" pitchFamily="34" charset="0"/>
+              </a:defRPr>
+            </a:lvl9pPr>
+          </a:lstStyle>
+          <a:p>
+            <a:endParaRPr lang="de-DE" altLang="de-DE" sz="1400"/>
+          </a:p>
+        </p:txBody>
+      </p:sp>
+      <p:sp>
+        <p:nvSpPr>
+          <p:cNvPr id="10" name="Rechteck 9"/>
+          <p:cNvSpPr>
+            <a:spLocks noChangeArrowheads="1"/>
+          </p:cNvSpPr>
+          <p:nvPr/>
+        </p:nvSpPr>
+        <p:spPr bwMode="auto">
+          <a:xfrm rot="-840298">
+            <a:off x="6416675" y="3133725"/>
+            <a:ext cx="1257300" cy="454025"/>
+          </a:xfrm>
+          <a:prstGeom prst="rect">
+            <a:avLst/>
+          </a:prstGeom>
+          <a:solidFill>
+            <a:srgbClr val="DDFFF3"/>
+          </a:solidFill>
+          <a:ln>
+            <a:noFill/>
+          </a:ln>
+          <a:extLst>
+            <a:ext uri="{91240B29-F687-4F45-9708-019B960494DF}">
+              <a14:hiddenLine xmlns:a14="http://schemas.microsoft.com/office/drawing/2010/main" w="12700" algn="ctr">
+                <a:solidFill>
+                  <a:srgbClr val="000000"/>
+                </a:solidFill>
+                <a:round/>
+                <a:headEnd type="none" w="sm" len="sm"/>
+                <a:tailEnd type="none" w="sm" len="sm"/>
+              </a14:hiddenLine>
+            </a:ext>
+          </a:extLst>
+        </p:spPr>
+        <p:txBody>
+          <a:bodyPr/>
+          <a:lstStyle>
+            <a:lvl1pPr eaLnBrk="0" hangingPunct="0">
+              <a:defRPr sz="2400">
+                <a:solidFill>
+                  <a:schemeClr val="tx1"/>
+                </a:solidFill>
+                <a:latin typeface="Times New Roman" panose="02020603050405020304" pitchFamily="18" charset="0"/>
+                <a:cs typeface="Arial" panose="020B0604020202020204" pitchFamily="34" charset="0"/>
+              </a:defRPr>
+            </a:lvl1pPr>
+            <a:lvl2pPr marL="742950" indent="-285750" eaLnBrk="0" hangingPunct="0">
+              <a:defRPr sz="2400">
+                <a:solidFill>
+                  <a:schemeClr val="tx1"/>
+                </a:solidFill>
+                <a:latin typeface="Times New Roman" panose="02020603050405020304" pitchFamily="18" charset="0"/>
+                <a:cs typeface="Arial" panose="020B0604020202020204" pitchFamily="34" charset="0"/>
+              </a:defRPr>
+            </a:lvl2pPr>
+            <a:lvl3pPr marL="1143000" indent="-228600" eaLnBrk="0" hangingPunct="0">
+              <a:defRPr sz="2400">
+                <a:solidFill>
+                  <a:schemeClr val="tx1"/>
+                </a:solidFill>
+                <a:latin typeface="Times New Roman" panose="02020603050405020304" pitchFamily="18" charset="0"/>
+                <a:cs typeface="Arial" panose="020B0604020202020204" pitchFamily="34" charset="0"/>
+              </a:defRPr>
+            </a:lvl3pPr>
+            <a:lvl4pPr marL="1600200" indent="-228600" eaLnBrk="0" hangingPunct="0">
+              <a:defRPr sz="2400">
+                <a:solidFill>
+                  <a:schemeClr val="tx1"/>
+                </a:solidFill>
+                <a:latin typeface="Times New Roman" panose="02020603050405020304" pitchFamily="18" charset="0"/>
+                <a:cs typeface="Arial" panose="020B0604020202020204" pitchFamily="34" charset="0"/>
+              </a:defRPr>
+            </a:lvl4pPr>
+            <a:lvl5pPr marL="2057400" indent="-228600" eaLnBrk="0" hangingPunct="0">
+              <a:defRPr sz="2400">
+                <a:solidFill>
+                  <a:schemeClr val="tx1"/>
+                </a:solidFill>
+                <a:latin typeface="Times New Roman" panose="02020603050405020304" pitchFamily="18" charset="0"/>
+                <a:cs typeface="Arial" panose="020B0604020202020204" pitchFamily="34" charset="0"/>
+              </a:defRPr>
+            </a:lvl5pPr>
+            <a:lvl6pPr marL="2514600" indent="-228600" eaLnBrk="0" fontAlgn="base" hangingPunct="0">
+              <a:spcBef>
+                <a:spcPct val="0"/>
+              </a:spcBef>
+              <a:spcAft>
+                <a:spcPct val="0"/>
+              </a:spcAft>
+              <a:defRPr sz="2400">
+                <a:solidFill>
+                  <a:schemeClr val="tx1"/>
+                </a:solidFill>
+                <a:latin typeface="Times New Roman" panose="02020603050405020304" pitchFamily="18" charset="0"/>
+                <a:cs typeface="Arial" panose="020B0604020202020204" pitchFamily="34" charset="0"/>
+              </a:defRPr>
+            </a:lvl6pPr>
+            <a:lvl7pPr marL="2971800" indent="-228600" eaLnBrk="0" fontAlgn="base" hangingPunct="0">
+              <a:spcBef>
+                <a:spcPct val="0"/>
+              </a:spcBef>
+              <a:spcAft>
+                <a:spcPct val="0"/>
+              </a:spcAft>
+              <a:defRPr sz="2400">
+                <a:solidFill>
+                  <a:schemeClr val="tx1"/>
+                </a:solidFill>
+                <a:latin typeface="Times New Roman" panose="02020603050405020304" pitchFamily="18" charset="0"/>
+                <a:cs typeface="Arial" panose="020B0604020202020204" pitchFamily="34" charset="0"/>
+              </a:defRPr>
+            </a:lvl7pPr>
+            <a:lvl8pPr marL="3429000" indent="-228600" eaLnBrk="0" fontAlgn="base" hangingPunct="0">
+              <a:spcBef>
+                <a:spcPct val="0"/>
+              </a:spcBef>
+              <a:spcAft>
+                <a:spcPct val="0"/>
+              </a:spcAft>
+              <a:defRPr sz="2400">
+                <a:solidFill>
+                  <a:schemeClr val="tx1"/>
+                </a:solidFill>
+                <a:latin typeface="Times New Roman" panose="02020603050405020304" pitchFamily="18" charset="0"/>
+                <a:cs typeface="Arial" panose="020B0604020202020204" pitchFamily="34" charset="0"/>
+              </a:defRPr>
+            </a:lvl8pPr>
+            <a:lvl9pPr marL="3886200" indent="-228600" eaLnBrk="0" fontAlgn="base" hangingPunct="0">
+              <a:spcBef>
+                <a:spcPct val="0"/>
+              </a:spcBef>
+              <a:spcAft>
+                <a:spcPct val="0"/>
+              </a:spcAft>
+              <a:defRPr sz="2400">
+                <a:solidFill>
+                  <a:schemeClr val="tx1"/>
+                </a:solidFill>
+                <a:latin typeface="Times New Roman" panose="02020603050405020304" pitchFamily="18" charset="0"/>
+                <a:cs typeface="Arial" panose="020B0604020202020204" pitchFamily="34" charset="0"/>
+              </a:defRPr>
+            </a:lvl9pPr>
+          </a:lstStyle>
+          <a:p>
+            <a:endParaRPr lang="de-DE" altLang="de-DE" sz="1400"/>
+          </a:p>
+        </p:txBody>
+      </p:sp>
+      <p:sp>
+        <p:nvSpPr>
+          <p:cNvPr id="11" name="Rechteck 10"/>
+          <p:cNvSpPr>
+            <a:spLocks noChangeArrowheads="1"/>
+          </p:cNvSpPr>
+          <p:nvPr/>
+        </p:nvSpPr>
+        <p:spPr bwMode="auto">
+          <a:xfrm rot="233927">
+            <a:off x="7023100" y="1735138"/>
+            <a:ext cx="1258888" cy="227012"/>
+          </a:xfrm>
+          <a:prstGeom prst="rect">
+            <a:avLst/>
+          </a:prstGeom>
+          <a:solidFill>
+            <a:srgbClr val="DDFFF3"/>
+          </a:solidFill>
+          <a:ln>
+            <a:noFill/>
+          </a:ln>
+          <a:extLst>
+            <a:ext uri="{91240B29-F687-4F45-9708-019B960494DF}">
+              <a14:hiddenLine xmlns:a14="http://schemas.microsoft.com/office/drawing/2010/main" w="12700" algn="ctr">
+                <a:solidFill>
+                  <a:srgbClr val="000000"/>
+                </a:solidFill>
+                <a:round/>
+                <a:headEnd type="none" w="sm" len="sm"/>
+                <a:tailEnd type="none" w="sm" len="sm"/>
+              </a14:hiddenLine>
+            </a:ext>
+          </a:extLst>
+        </p:spPr>
+        <p:txBody>
+          <a:bodyPr/>
+          <a:lstStyle>
+            <a:lvl1pPr eaLnBrk="0" hangingPunct="0">
+              <a:defRPr sz="2400">
+                <a:solidFill>
+                  <a:schemeClr val="tx1"/>
+                </a:solidFill>
+                <a:latin typeface="Times New Roman" panose="02020603050405020304" pitchFamily="18" charset="0"/>
+                <a:cs typeface="Arial" panose="020B0604020202020204" pitchFamily="34" charset="0"/>
+              </a:defRPr>
+            </a:lvl1pPr>
+            <a:lvl2pPr marL="742950" indent="-285750" eaLnBrk="0" hangingPunct="0">
+              <a:defRPr sz="2400">
+                <a:solidFill>
+                  <a:schemeClr val="tx1"/>
+                </a:solidFill>
+                <a:latin typeface="Times New Roman" panose="02020603050405020304" pitchFamily="18" charset="0"/>
+                <a:cs typeface="Arial" panose="020B0604020202020204" pitchFamily="34" charset="0"/>
+              </a:defRPr>
+            </a:lvl2pPr>
+            <a:lvl3pPr marL="1143000" indent="-228600" eaLnBrk="0" hangingPunct="0">
+              <a:defRPr sz="2400">
+                <a:solidFill>
+                  <a:schemeClr val="tx1"/>
+                </a:solidFill>
+                <a:latin typeface="Times New Roman" panose="02020603050405020304" pitchFamily="18" charset="0"/>
+                <a:cs typeface="Arial" panose="020B0604020202020204" pitchFamily="34" charset="0"/>
+              </a:defRPr>
+            </a:lvl3pPr>
+            <a:lvl4pPr marL="1600200" indent="-228600" eaLnBrk="0" hangingPunct="0">
+              <a:defRPr sz="2400">
+                <a:solidFill>
+                  <a:schemeClr val="tx1"/>
+                </a:solidFill>
+                <a:latin typeface="Times New Roman" panose="02020603050405020304" pitchFamily="18" charset="0"/>
+                <a:cs typeface="Arial" panose="020B0604020202020204" pitchFamily="34" charset="0"/>
+              </a:defRPr>
+            </a:lvl4pPr>
+            <a:lvl5pPr marL="2057400" indent="-228600" eaLnBrk="0" hangingPunct="0">
+              <a:defRPr sz="2400">
+                <a:solidFill>
+                  <a:schemeClr val="tx1"/>
+                </a:solidFill>
+                <a:latin typeface="Times New Roman" panose="02020603050405020304" pitchFamily="18" charset="0"/>
+                <a:cs typeface="Arial" panose="020B0604020202020204" pitchFamily="34" charset="0"/>
+              </a:defRPr>
+            </a:lvl5pPr>
+            <a:lvl6pPr marL="2514600" indent="-228600" eaLnBrk="0" fontAlgn="base" hangingPunct="0">
+              <a:spcBef>
+                <a:spcPct val="0"/>
+              </a:spcBef>
+              <a:spcAft>
+                <a:spcPct val="0"/>
+              </a:spcAft>
+              <a:defRPr sz="2400">
+                <a:solidFill>
+                  <a:schemeClr val="tx1"/>
+                </a:solidFill>
+                <a:latin typeface="Times New Roman" panose="02020603050405020304" pitchFamily="18" charset="0"/>
+                <a:cs typeface="Arial" panose="020B0604020202020204" pitchFamily="34" charset="0"/>
+              </a:defRPr>
+            </a:lvl6pPr>
+            <a:lvl7pPr marL="2971800" indent="-228600" eaLnBrk="0" fontAlgn="base" hangingPunct="0">
+              <a:spcBef>
+                <a:spcPct val="0"/>
+              </a:spcBef>
+              <a:spcAft>
+                <a:spcPct val="0"/>
+              </a:spcAft>
+              <a:defRPr sz="2400">
+                <a:solidFill>
+                  <a:schemeClr val="tx1"/>
+                </a:solidFill>
+                <a:latin typeface="Times New Roman" panose="02020603050405020304" pitchFamily="18" charset="0"/>
+                <a:cs typeface="Arial" panose="020B0604020202020204" pitchFamily="34" charset="0"/>
+              </a:defRPr>
+            </a:lvl7pPr>
+            <a:lvl8pPr marL="3429000" indent="-228600" eaLnBrk="0" fontAlgn="base" hangingPunct="0">
+              <a:spcBef>
+                <a:spcPct val="0"/>
+              </a:spcBef>
+              <a:spcAft>
+                <a:spcPct val="0"/>
+              </a:spcAft>
+              <a:defRPr sz="2400">
+                <a:solidFill>
+                  <a:schemeClr val="tx1"/>
+                </a:solidFill>
+                <a:latin typeface="Times New Roman" panose="02020603050405020304" pitchFamily="18" charset="0"/>
+                <a:cs typeface="Arial" panose="020B0604020202020204" pitchFamily="34" charset="0"/>
+              </a:defRPr>
+            </a:lvl8pPr>
+            <a:lvl9pPr marL="3886200" indent="-228600" eaLnBrk="0" fontAlgn="base" hangingPunct="0">
+              <a:spcBef>
+                <a:spcPct val="0"/>
+              </a:spcBef>
+              <a:spcAft>
+                <a:spcPct val="0"/>
+              </a:spcAft>
+              <a:defRPr sz="2400">
+                <a:solidFill>
+                  <a:schemeClr val="tx1"/>
+                </a:solidFill>
+                <a:latin typeface="Times New Roman" panose="02020603050405020304" pitchFamily="18" charset="0"/>
+                <a:cs typeface="Arial" panose="020B0604020202020204" pitchFamily="34" charset="0"/>
+              </a:defRPr>
+            </a:lvl9pPr>
+          </a:lstStyle>
+          <a:p>
+            <a:endParaRPr lang="de-DE" altLang="de-DE" sz="1400"/>
+          </a:p>
+        </p:txBody>
+      </p:sp>
+      <p:sp>
+        <p:nvSpPr>
+          <p:cNvPr id="12" name="Rechteck 11"/>
+          <p:cNvSpPr>
+            <a:spLocks noChangeArrowheads="1"/>
+          </p:cNvSpPr>
+          <p:nvPr/>
+        </p:nvSpPr>
+        <p:spPr bwMode="auto">
+          <a:xfrm rot="879827">
+            <a:off x="7083425" y="2414588"/>
+            <a:ext cx="1822450" cy="420687"/>
+          </a:xfrm>
+          <a:prstGeom prst="rect">
+            <a:avLst/>
+          </a:prstGeom>
+          <a:solidFill>
+            <a:srgbClr val="DDFFF3"/>
+          </a:solidFill>
+          <a:ln>
+            <a:noFill/>
+          </a:ln>
+          <a:extLst>
+            <a:ext uri="{91240B29-F687-4F45-9708-019B960494DF}">
+              <a14:hiddenLine xmlns:a14="http://schemas.microsoft.com/office/drawing/2010/main" w="12700" algn="ctr">
+                <a:solidFill>
+                  <a:srgbClr val="000000"/>
+                </a:solidFill>
+                <a:round/>
+                <a:headEnd type="none" w="sm" len="sm"/>
+                <a:tailEnd type="none" w="sm" len="sm"/>
+              </a14:hiddenLine>
+            </a:ext>
+          </a:extLst>
+        </p:spPr>
+        <p:txBody>
+          <a:bodyPr/>
+          <a:lstStyle>
+            <a:lvl1pPr eaLnBrk="0" hangingPunct="0">
+              <a:defRPr sz="2400">
+                <a:solidFill>
+                  <a:schemeClr val="tx1"/>
+                </a:solidFill>
+                <a:latin typeface="Times New Roman" panose="02020603050405020304" pitchFamily="18" charset="0"/>
+                <a:cs typeface="Arial" panose="020B0604020202020204" pitchFamily="34" charset="0"/>
+              </a:defRPr>
+            </a:lvl1pPr>
+            <a:lvl2pPr marL="742950" indent="-285750" eaLnBrk="0" hangingPunct="0">
+              <a:defRPr sz="2400">
+                <a:solidFill>
+                  <a:schemeClr val="tx1"/>
+                </a:solidFill>
+                <a:latin typeface="Times New Roman" panose="02020603050405020304" pitchFamily="18" charset="0"/>
+                <a:cs typeface="Arial" panose="020B0604020202020204" pitchFamily="34" charset="0"/>
+              </a:defRPr>
+            </a:lvl2pPr>
+            <a:lvl3pPr marL="1143000" indent="-228600" eaLnBrk="0" hangingPunct="0">
+              <a:defRPr sz="2400">
+                <a:solidFill>
+                  <a:schemeClr val="tx1"/>
+                </a:solidFill>
+                <a:latin typeface="Times New Roman" panose="02020603050405020304" pitchFamily="18" charset="0"/>
+                <a:cs typeface="Arial" panose="020B0604020202020204" pitchFamily="34" charset="0"/>
+              </a:defRPr>
+            </a:lvl3pPr>
+            <a:lvl4pPr marL="1600200" indent="-228600" eaLnBrk="0" hangingPunct="0">
+              <a:defRPr sz="2400">
+                <a:solidFill>
+                  <a:schemeClr val="tx1"/>
+                </a:solidFill>
+                <a:latin typeface="Times New Roman" panose="02020603050405020304" pitchFamily="18" charset="0"/>
+                <a:cs typeface="Arial" panose="020B0604020202020204" pitchFamily="34" charset="0"/>
+              </a:defRPr>
+            </a:lvl4pPr>
+            <a:lvl5pPr marL="2057400" indent="-228600" eaLnBrk="0" hangingPunct="0">
+              <a:defRPr sz="2400">
+                <a:solidFill>
+                  <a:schemeClr val="tx1"/>
+                </a:solidFill>
+                <a:latin typeface="Times New Roman" panose="02020603050405020304" pitchFamily="18" charset="0"/>
+                <a:cs typeface="Arial" panose="020B0604020202020204" pitchFamily="34" charset="0"/>
+              </a:defRPr>
+            </a:lvl5pPr>
+            <a:lvl6pPr marL="2514600" indent="-228600" eaLnBrk="0" fontAlgn="base" hangingPunct="0">
+              <a:spcBef>
+                <a:spcPct val="0"/>
+              </a:spcBef>
+              <a:spcAft>
+                <a:spcPct val="0"/>
+              </a:spcAft>
+              <a:defRPr sz="2400">
+                <a:solidFill>
+                  <a:schemeClr val="tx1"/>
+                </a:solidFill>
+                <a:latin typeface="Times New Roman" panose="02020603050405020304" pitchFamily="18" charset="0"/>
+                <a:cs typeface="Arial" panose="020B0604020202020204" pitchFamily="34" charset="0"/>
+              </a:defRPr>
+            </a:lvl6pPr>
+            <a:lvl7pPr marL="2971800" indent="-228600" eaLnBrk="0" fontAlgn="base" hangingPunct="0">
+              <a:spcBef>
+                <a:spcPct val="0"/>
+              </a:spcBef>
+              <a:spcAft>
+                <a:spcPct val="0"/>
+              </a:spcAft>
+              <a:defRPr sz="2400">
+                <a:solidFill>
+                  <a:schemeClr val="tx1"/>
+                </a:solidFill>
+                <a:latin typeface="Times New Roman" panose="02020603050405020304" pitchFamily="18" charset="0"/>
+                <a:cs typeface="Arial" panose="020B0604020202020204" pitchFamily="34" charset="0"/>
+              </a:defRPr>
+            </a:lvl7pPr>
+            <a:lvl8pPr marL="3429000" indent="-228600" eaLnBrk="0" fontAlgn="base" hangingPunct="0">
+              <a:spcBef>
+                <a:spcPct val="0"/>
+              </a:spcBef>
+              <a:spcAft>
+                <a:spcPct val="0"/>
+              </a:spcAft>
+              <a:defRPr sz="2400">
+                <a:solidFill>
+                  <a:schemeClr val="tx1"/>
+                </a:solidFill>
+                <a:latin typeface="Times New Roman" panose="02020603050405020304" pitchFamily="18" charset="0"/>
+                <a:cs typeface="Arial" panose="020B0604020202020204" pitchFamily="34" charset="0"/>
+              </a:defRPr>
+            </a:lvl8pPr>
+            <a:lvl9pPr marL="3886200" indent="-228600" eaLnBrk="0" fontAlgn="base" hangingPunct="0">
+              <a:spcBef>
+                <a:spcPct val="0"/>
+              </a:spcBef>
+              <a:spcAft>
+                <a:spcPct val="0"/>
+              </a:spcAft>
+              <a:defRPr sz="2400">
+                <a:solidFill>
+                  <a:schemeClr val="tx1"/>
+                </a:solidFill>
+                <a:latin typeface="Times New Roman" panose="02020603050405020304" pitchFamily="18" charset="0"/>
+                <a:cs typeface="Arial" panose="020B0604020202020204" pitchFamily="34" charset="0"/>
+              </a:defRPr>
+            </a:lvl9pPr>
+          </a:lstStyle>
+          <a:p>
+            <a:endParaRPr lang="de-DE" altLang="de-DE" sz="1400"/>
+          </a:p>
+        </p:txBody>
+      </p:sp>
+      <p:sp>
+        <p:nvSpPr>
+          <p:cNvPr id="13" name="Rechteck 12"/>
+          <p:cNvSpPr>
+            <a:spLocks noChangeArrowheads="1"/>
+          </p:cNvSpPr>
+          <p:nvPr/>
+        </p:nvSpPr>
+        <p:spPr bwMode="auto">
+          <a:xfrm rot="795994">
+            <a:off x="5741988" y="5133975"/>
+            <a:ext cx="1589087" cy="422275"/>
+          </a:xfrm>
+          <a:prstGeom prst="rect">
+            <a:avLst/>
+          </a:prstGeom>
+          <a:solidFill>
+            <a:srgbClr val="DDFFF3"/>
+          </a:solidFill>
+          <a:ln>
+            <a:noFill/>
+          </a:ln>
+          <a:extLst>
+            <a:ext uri="{91240B29-F687-4F45-9708-019B960494DF}">
+              <a14:hiddenLine xmlns:a14="http://schemas.microsoft.com/office/drawing/2010/main" w="12700" algn="ctr">
+                <a:solidFill>
+                  <a:srgbClr val="000000"/>
+                </a:solidFill>
+                <a:round/>
+                <a:headEnd type="none" w="sm" len="sm"/>
+                <a:tailEnd type="none" w="sm" len="sm"/>
+              </a14:hiddenLine>
+            </a:ext>
+          </a:extLst>
+        </p:spPr>
+        <p:txBody>
+          <a:bodyPr/>
+          <a:lstStyle>
+            <a:lvl1pPr eaLnBrk="0" hangingPunct="0">
+              <a:defRPr sz="2400">
+                <a:solidFill>
+                  <a:schemeClr val="tx1"/>
+                </a:solidFill>
+                <a:latin typeface="Times New Roman" panose="02020603050405020304" pitchFamily="18" charset="0"/>
+                <a:cs typeface="Arial" panose="020B0604020202020204" pitchFamily="34" charset="0"/>
+              </a:defRPr>
+            </a:lvl1pPr>
+            <a:lvl2pPr marL="742950" indent="-285750" eaLnBrk="0" hangingPunct="0">
+              <a:defRPr sz="2400">
+                <a:solidFill>
+                  <a:schemeClr val="tx1"/>
+                </a:solidFill>
+                <a:latin typeface="Times New Roman" panose="02020603050405020304" pitchFamily="18" charset="0"/>
+                <a:cs typeface="Arial" panose="020B0604020202020204" pitchFamily="34" charset="0"/>
+              </a:defRPr>
+            </a:lvl2pPr>
+            <a:lvl3pPr marL="1143000" indent="-228600" eaLnBrk="0" hangingPunct="0">
+              <a:defRPr sz="2400">
+                <a:solidFill>
+                  <a:schemeClr val="tx1"/>
+                </a:solidFill>
+                <a:latin typeface="Times New Roman" panose="02020603050405020304" pitchFamily="18" charset="0"/>
+                <a:cs typeface="Arial" panose="020B0604020202020204" pitchFamily="34" charset="0"/>
+              </a:defRPr>
+            </a:lvl3pPr>
+            <a:lvl4pPr marL="1600200" indent="-228600" eaLnBrk="0" hangingPunct="0">
+              <a:defRPr sz="2400">
+                <a:solidFill>
+                  <a:schemeClr val="tx1"/>
+                </a:solidFill>
+                <a:latin typeface="Times New Roman" panose="02020603050405020304" pitchFamily="18" charset="0"/>
+                <a:cs typeface="Arial" panose="020B0604020202020204" pitchFamily="34" charset="0"/>
+              </a:defRPr>
+            </a:lvl4pPr>
+            <a:lvl5pPr marL="2057400" indent="-228600" eaLnBrk="0" hangingPunct="0">
+              <a:defRPr sz="2400">
+                <a:solidFill>
+                  <a:schemeClr val="tx1"/>
+                </a:solidFill>
+                <a:latin typeface="Times New Roman" panose="02020603050405020304" pitchFamily="18" charset="0"/>
+                <a:cs typeface="Arial" panose="020B0604020202020204" pitchFamily="34" charset="0"/>
+              </a:defRPr>
+            </a:lvl5pPr>
+            <a:lvl6pPr marL="2514600" indent="-228600" eaLnBrk="0" fontAlgn="base" hangingPunct="0">
+              <a:spcBef>
+                <a:spcPct val="0"/>
+              </a:spcBef>
+              <a:spcAft>
+                <a:spcPct val="0"/>
+              </a:spcAft>
+              <a:defRPr sz="2400">
+                <a:solidFill>
+                  <a:schemeClr val="tx1"/>
+                </a:solidFill>
+                <a:latin typeface="Times New Roman" panose="02020603050405020304" pitchFamily="18" charset="0"/>
+                <a:cs typeface="Arial" panose="020B0604020202020204" pitchFamily="34" charset="0"/>
+              </a:defRPr>
+            </a:lvl6pPr>
+            <a:lvl7pPr marL="2971800" indent="-228600" eaLnBrk="0" fontAlgn="base" hangingPunct="0">
+              <a:spcBef>
+                <a:spcPct val="0"/>
+              </a:spcBef>
+              <a:spcAft>
+                <a:spcPct val="0"/>
+              </a:spcAft>
+              <a:defRPr sz="2400">
+                <a:solidFill>
+                  <a:schemeClr val="tx1"/>
+                </a:solidFill>
+                <a:latin typeface="Times New Roman" panose="02020603050405020304" pitchFamily="18" charset="0"/>
+                <a:cs typeface="Arial" panose="020B0604020202020204" pitchFamily="34" charset="0"/>
+              </a:defRPr>
+            </a:lvl7pPr>
+            <a:lvl8pPr marL="3429000" indent="-228600" eaLnBrk="0" fontAlgn="base" hangingPunct="0">
+              <a:spcBef>
+                <a:spcPct val="0"/>
+              </a:spcBef>
+              <a:spcAft>
+                <a:spcPct val="0"/>
+              </a:spcAft>
+              <a:defRPr sz="2400">
+                <a:solidFill>
+                  <a:schemeClr val="tx1"/>
+                </a:solidFill>
+                <a:latin typeface="Times New Roman" panose="02020603050405020304" pitchFamily="18" charset="0"/>
+                <a:cs typeface="Arial" panose="020B0604020202020204" pitchFamily="34" charset="0"/>
+              </a:defRPr>
+            </a:lvl8pPr>
+            <a:lvl9pPr marL="3886200" indent="-228600" eaLnBrk="0" fontAlgn="base" hangingPunct="0">
+              <a:spcBef>
+                <a:spcPct val="0"/>
+              </a:spcBef>
+              <a:spcAft>
+                <a:spcPct val="0"/>
+              </a:spcAft>
+              <a:defRPr sz="2400">
+                <a:solidFill>
+                  <a:schemeClr val="tx1"/>
+                </a:solidFill>
+                <a:latin typeface="Times New Roman" panose="02020603050405020304" pitchFamily="18" charset="0"/>
+                <a:cs typeface="Arial" panose="020B0604020202020204" pitchFamily="34" charset="0"/>
+              </a:defRPr>
+            </a:lvl9pPr>
+          </a:lstStyle>
+          <a:p>
+            <a:endParaRPr lang="de-DE" altLang="de-DE" sz="1400"/>
+          </a:p>
+        </p:txBody>
+      </p:sp>
+      <p:sp>
+        <p:nvSpPr>
+          <p:cNvPr id="14" name="Rechteck 13"/>
+          <p:cNvSpPr>
+            <a:spLocks noChangeArrowheads="1"/>
+          </p:cNvSpPr>
+          <p:nvPr/>
+        </p:nvSpPr>
+        <p:spPr bwMode="auto">
+          <a:xfrm rot="-466071">
+            <a:off x="7297738" y="3535363"/>
+            <a:ext cx="1687512" cy="501650"/>
+          </a:xfrm>
+          <a:prstGeom prst="rect">
+            <a:avLst/>
+          </a:prstGeom>
+          <a:solidFill>
+            <a:srgbClr val="DDFFF3"/>
+          </a:solidFill>
+          <a:ln>
+            <a:noFill/>
+          </a:ln>
+          <a:extLst>
+            <a:ext uri="{91240B29-F687-4F45-9708-019B960494DF}">
+              <a14:hiddenLine xmlns:a14="http://schemas.microsoft.com/office/drawing/2010/main" w="12700" algn="ctr">
+                <a:solidFill>
+                  <a:srgbClr val="000000"/>
+                </a:solidFill>
+                <a:round/>
+                <a:headEnd type="none" w="sm" len="sm"/>
+                <a:tailEnd type="none" w="sm" len="sm"/>
+              </a14:hiddenLine>
+            </a:ext>
+          </a:extLst>
+        </p:spPr>
+        <p:txBody>
+          <a:bodyPr/>
+          <a:lstStyle>
+            <a:lvl1pPr eaLnBrk="0" hangingPunct="0">
+              <a:defRPr sz="2400">
+                <a:solidFill>
+                  <a:schemeClr val="tx1"/>
+                </a:solidFill>
+                <a:latin typeface="Times New Roman" panose="02020603050405020304" pitchFamily="18" charset="0"/>
+                <a:cs typeface="Arial" panose="020B0604020202020204" pitchFamily="34" charset="0"/>
+              </a:defRPr>
+            </a:lvl1pPr>
+            <a:lvl2pPr marL="742950" indent="-285750" eaLnBrk="0" hangingPunct="0">
+              <a:defRPr sz="2400">
+                <a:solidFill>
+                  <a:schemeClr val="tx1"/>
+                </a:solidFill>
+                <a:latin typeface="Times New Roman" panose="02020603050405020304" pitchFamily="18" charset="0"/>
+                <a:cs typeface="Arial" panose="020B0604020202020204" pitchFamily="34" charset="0"/>
+              </a:defRPr>
+            </a:lvl2pPr>
+            <a:lvl3pPr marL="1143000" indent="-228600" eaLnBrk="0" hangingPunct="0">
+              <a:defRPr sz="2400">
+                <a:solidFill>
+                  <a:schemeClr val="tx1"/>
+                </a:solidFill>
+                <a:latin typeface="Times New Roman" panose="02020603050405020304" pitchFamily="18" charset="0"/>
+                <a:cs typeface="Arial" panose="020B0604020202020204" pitchFamily="34" charset="0"/>
+              </a:defRPr>
+            </a:lvl3pPr>
+            <a:lvl4pPr marL="1600200" indent="-228600" eaLnBrk="0" hangingPunct="0">
+              <a:defRPr sz="2400">
+                <a:solidFill>
+                  <a:schemeClr val="tx1"/>
+                </a:solidFill>
+                <a:latin typeface="Times New Roman" panose="02020603050405020304" pitchFamily="18" charset="0"/>
+                <a:cs typeface="Arial" panose="020B0604020202020204" pitchFamily="34" charset="0"/>
+              </a:defRPr>
+            </a:lvl4pPr>
+            <a:lvl5pPr marL="2057400" indent="-228600" eaLnBrk="0" hangingPunct="0">
+              <a:defRPr sz="2400">
+                <a:solidFill>
+                  <a:schemeClr val="tx1"/>
+                </a:solidFill>
+                <a:latin typeface="Times New Roman" panose="02020603050405020304" pitchFamily="18" charset="0"/>
+                <a:cs typeface="Arial" panose="020B0604020202020204" pitchFamily="34" charset="0"/>
+              </a:defRPr>
+            </a:lvl5pPr>
+            <a:lvl6pPr marL="2514600" indent="-228600" eaLnBrk="0" fontAlgn="base" hangingPunct="0">
+              <a:spcBef>
+                <a:spcPct val="0"/>
+              </a:spcBef>
+              <a:spcAft>
+                <a:spcPct val="0"/>
+              </a:spcAft>
+              <a:defRPr sz="2400">
+                <a:solidFill>
+                  <a:schemeClr val="tx1"/>
+                </a:solidFill>
+                <a:latin typeface="Times New Roman" panose="02020603050405020304" pitchFamily="18" charset="0"/>
+                <a:cs typeface="Arial" panose="020B0604020202020204" pitchFamily="34" charset="0"/>
+              </a:defRPr>
+            </a:lvl6pPr>
+            <a:lvl7pPr marL="2971800" indent="-228600" eaLnBrk="0" fontAlgn="base" hangingPunct="0">
+              <a:spcBef>
+                <a:spcPct val="0"/>
+              </a:spcBef>
+              <a:spcAft>
+                <a:spcPct val="0"/>
+              </a:spcAft>
+              <a:defRPr sz="2400">
+                <a:solidFill>
+                  <a:schemeClr val="tx1"/>
+                </a:solidFill>
+                <a:latin typeface="Times New Roman" panose="02020603050405020304" pitchFamily="18" charset="0"/>
+                <a:cs typeface="Arial" panose="020B0604020202020204" pitchFamily="34" charset="0"/>
+              </a:defRPr>
+            </a:lvl7pPr>
+            <a:lvl8pPr marL="3429000" indent="-228600" eaLnBrk="0" fontAlgn="base" hangingPunct="0">
+              <a:spcBef>
+                <a:spcPct val="0"/>
+              </a:spcBef>
+              <a:spcAft>
+                <a:spcPct val="0"/>
+              </a:spcAft>
+              <a:defRPr sz="2400">
+                <a:solidFill>
+                  <a:schemeClr val="tx1"/>
+                </a:solidFill>
+                <a:latin typeface="Times New Roman" panose="02020603050405020304" pitchFamily="18" charset="0"/>
+                <a:cs typeface="Arial" panose="020B0604020202020204" pitchFamily="34" charset="0"/>
+              </a:defRPr>
+            </a:lvl8pPr>
+            <a:lvl9pPr marL="3886200" indent="-228600" eaLnBrk="0" fontAlgn="base" hangingPunct="0">
+              <a:spcBef>
+                <a:spcPct val="0"/>
+              </a:spcBef>
+              <a:spcAft>
+                <a:spcPct val="0"/>
+              </a:spcAft>
+              <a:defRPr sz="2400">
+                <a:solidFill>
+                  <a:schemeClr val="tx1"/>
+                </a:solidFill>
+                <a:latin typeface="Times New Roman" panose="02020603050405020304" pitchFamily="18" charset="0"/>
+                <a:cs typeface="Arial" panose="020B0604020202020204" pitchFamily="34" charset="0"/>
+              </a:defRPr>
+            </a:lvl9pPr>
+          </a:lstStyle>
+          <a:p>
+            <a:endParaRPr lang="de-DE" altLang="de-DE" sz="1400"/>
+          </a:p>
+        </p:txBody>
+      </p:sp>
+      <p:sp>
+        <p:nvSpPr>
+          <p:cNvPr id="15" name="Rechteck 14"/>
+          <p:cNvSpPr>
+            <a:spLocks noChangeArrowheads="1"/>
+          </p:cNvSpPr>
+          <p:nvPr/>
+        </p:nvSpPr>
+        <p:spPr bwMode="auto">
+          <a:xfrm>
+            <a:off x="6202363" y="4249738"/>
+            <a:ext cx="1465262" cy="503237"/>
+          </a:xfrm>
+          <a:prstGeom prst="rect">
+            <a:avLst/>
+          </a:prstGeom>
+          <a:solidFill>
+            <a:srgbClr val="DDFFF3"/>
+          </a:solidFill>
+          <a:ln>
+            <a:noFill/>
+          </a:ln>
+          <a:extLst>
+            <a:ext uri="{91240B29-F687-4F45-9708-019B960494DF}">
+              <a14:hiddenLine xmlns:a14="http://schemas.microsoft.com/office/drawing/2010/main" w="12700" algn="ctr">
+                <a:solidFill>
+                  <a:srgbClr val="000000"/>
+                </a:solidFill>
+                <a:round/>
+                <a:headEnd type="none" w="sm" len="sm"/>
+                <a:tailEnd type="none" w="sm" len="sm"/>
+              </a14:hiddenLine>
+            </a:ext>
+          </a:extLst>
+        </p:spPr>
+        <p:txBody>
+          <a:bodyPr/>
+          <a:lstStyle>
+            <a:lvl1pPr eaLnBrk="0" hangingPunct="0">
+              <a:defRPr sz="2400">
+                <a:solidFill>
+                  <a:schemeClr val="tx1"/>
+                </a:solidFill>
+                <a:latin typeface="Times New Roman" panose="02020603050405020304" pitchFamily="18" charset="0"/>
+                <a:cs typeface="Arial" panose="020B0604020202020204" pitchFamily="34" charset="0"/>
+              </a:defRPr>
+            </a:lvl1pPr>
+            <a:lvl2pPr marL="742950" indent="-285750" eaLnBrk="0" hangingPunct="0">
+              <a:defRPr sz="2400">
+                <a:solidFill>
+                  <a:schemeClr val="tx1"/>
+                </a:solidFill>
+                <a:latin typeface="Times New Roman" panose="02020603050405020304" pitchFamily="18" charset="0"/>
+                <a:cs typeface="Arial" panose="020B0604020202020204" pitchFamily="34" charset="0"/>
+              </a:defRPr>
+            </a:lvl2pPr>
+            <a:lvl3pPr marL="1143000" indent="-228600" eaLnBrk="0" hangingPunct="0">
+              <a:defRPr sz="2400">
+                <a:solidFill>
+                  <a:schemeClr val="tx1"/>
+                </a:solidFill>
+                <a:latin typeface="Times New Roman" panose="02020603050405020304" pitchFamily="18" charset="0"/>
+                <a:cs typeface="Arial" panose="020B0604020202020204" pitchFamily="34" charset="0"/>
+              </a:defRPr>
+            </a:lvl3pPr>
+            <a:lvl4pPr marL="1600200" indent="-228600" eaLnBrk="0" hangingPunct="0">
+              <a:defRPr sz="2400">
+                <a:solidFill>
+                  <a:schemeClr val="tx1"/>
+                </a:solidFill>
+                <a:latin typeface="Times New Roman" panose="02020603050405020304" pitchFamily="18" charset="0"/>
+                <a:cs typeface="Arial" panose="020B0604020202020204" pitchFamily="34" charset="0"/>
+              </a:defRPr>
+            </a:lvl4pPr>
+            <a:lvl5pPr marL="2057400" indent="-228600" eaLnBrk="0" hangingPunct="0">
+              <a:defRPr sz="2400">
+                <a:solidFill>
+                  <a:schemeClr val="tx1"/>
+                </a:solidFill>
+                <a:latin typeface="Times New Roman" panose="02020603050405020304" pitchFamily="18" charset="0"/>
+                <a:cs typeface="Arial" panose="020B0604020202020204" pitchFamily="34" charset="0"/>
+              </a:defRPr>
+            </a:lvl5pPr>
+            <a:lvl6pPr marL="2514600" indent="-228600" eaLnBrk="0" fontAlgn="base" hangingPunct="0">
+              <a:spcBef>
+                <a:spcPct val="0"/>
+              </a:spcBef>
+              <a:spcAft>
+                <a:spcPct val="0"/>
+              </a:spcAft>
+              <a:defRPr sz="2400">
+                <a:solidFill>
+                  <a:schemeClr val="tx1"/>
+                </a:solidFill>
+                <a:latin typeface="Times New Roman" panose="02020603050405020304" pitchFamily="18" charset="0"/>
+                <a:cs typeface="Arial" panose="020B0604020202020204" pitchFamily="34" charset="0"/>
+              </a:defRPr>
+            </a:lvl6pPr>
+            <a:lvl7pPr marL="2971800" indent="-228600" eaLnBrk="0" fontAlgn="base" hangingPunct="0">
+              <a:spcBef>
+                <a:spcPct val="0"/>
+              </a:spcBef>
+              <a:spcAft>
+                <a:spcPct val="0"/>
+              </a:spcAft>
+              <a:defRPr sz="2400">
+                <a:solidFill>
+                  <a:schemeClr val="tx1"/>
+                </a:solidFill>
+                <a:latin typeface="Times New Roman" panose="02020603050405020304" pitchFamily="18" charset="0"/>
+                <a:cs typeface="Arial" panose="020B0604020202020204" pitchFamily="34" charset="0"/>
+              </a:defRPr>
+            </a:lvl7pPr>
+            <a:lvl8pPr marL="3429000" indent="-228600" eaLnBrk="0" fontAlgn="base" hangingPunct="0">
+              <a:spcBef>
+                <a:spcPct val="0"/>
+              </a:spcBef>
+              <a:spcAft>
+                <a:spcPct val="0"/>
+              </a:spcAft>
+              <a:defRPr sz="2400">
+                <a:solidFill>
+                  <a:schemeClr val="tx1"/>
+                </a:solidFill>
+                <a:latin typeface="Times New Roman" panose="02020603050405020304" pitchFamily="18" charset="0"/>
+                <a:cs typeface="Arial" panose="020B0604020202020204" pitchFamily="34" charset="0"/>
+              </a:defRPr>
+            </a:lvl8pPr>
+            <a:lvl9pPr marL="3886200" indent="-228600" eaLnBrk="0" fontAlgn="base" hangingPunct="0">
+              <a:spcBef>
+                <a:spcPct val="0"/>
+              </a:spcBef>
+              <a:spcAft>
+                <a:spcPct val="0"/>
+              </a:spcAft>
+              <a:defRPr sz="2400">
+                <a:solidFill>
+                  <a:schemeClr val="tx1"/>
+                </a:solidFill>
+                <a:latin typeface="Times New Roman" panose="02020603050405020304" pitchFamily="18" charset="0"/>
+                <a:cs typeface="Arial" panose="020B0604020202020204" pitchFamily="34" charset="0"/>
+              </a:defRPr>
+            </a:lvl9pPr>
+          </a:lstStyle>
+          <a:p>
+            <a:endParaRPr lang="de-DE" altLang="de-DE" sz="1400"/>
+          </a:p>
+        </p:txBody>
+      </p:sp>
+      <p:sp>
+        <p:nvSpPr>
+          <p:cNvPr id="16" name="Titel 1"/>
+          <p:cNvSpPr txBox="1">
+            <a:spLocks noChangeArrowheads="1"/>
+          </p:cNvSpPr>
+          <p:nvPr/>
+        </p:nvSpPr>
+        <p:spPr bwMode="auto">
+          <a:xfrm>
+            <a:off x="179388" y="130175"/>
+            <a:ext cx="7405687" cy="706438"/>
+          </a:xfrm>
+          <a:prstGeom prst="rect">
+            <a:avLst/>
+          </a:prstGeom>
+          <a:noFill/>
+          <a:ln w="9525">
+            <a:noFill/>
+            <a:miter lim="800000"/>
+            <a:headEnd/>
+            <a:tailEnd/>
+          </a:ln>
+        </p:spPr>
+        <p:txBody>
+          <a:bodyPr anchor="ctr"/>
+          <a:lstStyle/>
+          <a:p>
+            <a:pPr eaLnBrk="0" hangingPunct="0">
+              <a:defRPr/>
+            </a:pPr>
+            <a:r>
+              <a:rPr lang="de-DE" altLang="de-DE" sz="3000" kern="0" dirty="0">
+                <a:solidFill>
+                  <a:srgbClr val="0D4F3C"/>
+                </a:solidFill>
+                <a:latin typeface="+mj-lt"/>
+                <a:ea typeface="+mj-ea"/>
+                <a:cs typeface="+mj-cs"/>
+              </a:rPr>
+              <a:t>Unternehmen</a:t>
+            </a:r>
+          </a:p>
+        </p:txBody>
+      </p:sp>
+      <p:sp>
+        <p:nvSpPr>
+          <p:cNvPr id="17" name="Inhaltsplatzhalter 2"/>
+          <p:cNvSpPr>
+            <a:spLocks noGrp="1" noChangeArrowheads="1"/>
+          </p:cNvSpPr>
+          <p:nvPr>
+            <p:ph idx="1"/>
+          </p:nvPr>
+        </p:nvSpPr>
+        <p:spPr>
+          <a:xfrm>
+            <a:off x="34925" y="1123950"/>
+            <a:ext cx="6697663" cy="5400675"/>
+          </a:xfrm>
+        </p:spPr>
+        <p:txBody>
+          <a:bodyPr/>
+          <a:lstStyle/>
+          <a:p>
+            <a:pPr marL="447675" indent="-285750">
+              <a:buFont typeface="Monotype Sorts" pitchFamily="2" charset="2"/>
+              <a:buNone/>
+            </a:pPr>
+            <a:r>
+              <a:rPr lang="en-US" altLang="de-DE" sz="1600" dirty="0" err="1"/>
+              <a:t>Individuelle</a:t>
+            </a:r>
+            <a:r>
+              <a:rPr lang="en-US" altLang="de-DE" sz="1600" dirty="0"/>
+              <a:t> </a:t>
+            </a:r>
+            <a:r>
+              <a:rPr lang="en-US" altLang="de-DE" sz="1600" dirty="0" err="1"/>
+              <a:t>Anwendungsentwicklung</a:t>
+            </a:r>
+            <a:r>
+              <a:rPr lang="en-US" altLang="de-DE" sz="1600" dirty="0"/>
+              <a:t> - Java enterprise, web, mobile</a:t>
+            </a:r>
+          </a:p>
+          <a:p>
+            <a:pPr marL="447675" lvl="1">
+              <a:buFont typeface="Arial" panose="020B0604020202020204" pitchFamily="34" charset="0"/>
+              <a:buChar char="•"/>
+            </a:pPr>
+            <a:r>
+              <a:rPr lang="en-US" altLang="de-DE" sz="1600" dirty="0" err="1"/>
+              <a:t>seit</a:t>
+            </a:r>
+            <a:r>
+              <a:rPr lang="en-US" altLang="de-DE" sz="1600" dirty="0"/>
+              <a:t> 2005 </a:t>
+            </a:r>
+            <a:r>
+              <a:rPr lang="de-DE" altLang="de-DE" sz="1600" dirty="0">
+                <a:solidFill>
+                  <a:srgbClr val="008C5A"/>
+                </a:solidFill>
+                <a:cs typeface="Arial" panose="020B0604020202020204" pitchFamily="34" charset="0"/>
+              </a:rPr>
+              <a:t>♦</a:t>
+            </a:r>
+            <a:r>
+              <a:rPr lang="en-US" altLang="de-DE" sz="1600" dirty="0"/>
+              <a:t> in Köln </a:t>
+            </a:r>
+            <a:r>
+              <a:rPr lang="de-DE" altLang="de-DE" sz="1600" dirty="0">
+                <a:solidFill>
+                  <a:srgbClr val="008C5A"/>
+                </a:solidFill>
+                <a:cs typeface="Arial" panose="020B0604020202020204" pitchFamily="34" charset="0"/>
+              </a:rPr>
+              <a:t>♦</a:t>
+            </a:r>
+            <a:r>
+              <a:rPr lang="en-US" altLang="de-DE" sz="1600" dirty="0"/>
+              <a:t> für alle </a:t>
+            </a:r>
+            <a:r>
+              <a:rPr lang="en-US" altLang="de-DE" sz="1600" dirty="0" err="1"/>
+              <a:t>Branchen</a:t>
+            </a:r>
+            <a:r>
+              <a:rPr lang="en-US" altLang="de-DE" sz="1600" dirty="0"/>
+              <a:t> </a:t>
+            </a:r>
+            <a:r>
+              <a:rPr lang="de-DE" altLang="de-DE" sz="1600" dirty="0">
+                <a:solidFill>
+                  <a:srgbClr val="008C5A"/>
+                </a:solidFill>
+                <a:cs typeface="Arial" panose="020B0604020202020204" pitchFamily="34" charset="0"/>
+              </a:rPr>
+              <a:t>♦</a:t>
+            </a:r>
+            <a:r>
+              <a:rPr lang="en-US" altLang="de-DE" sz="1600" dirty="0"/>
+              <a:t> </a:t>
+            </a:r>
+          </a:p>
+          <a:p>
+            <a:pPr marL="447675" lvl="1">
+              <a:buFont typeface="Arial" panose="020B0604020202020204" pitchFamily="34" charset="0"/>
+              <a:buChar char="•"/>
+            </a:pPr>
+            <a:r>
+              <a:rPr lang="en-US" altLang="de-DE" sz="1600" dirty="0" err="1"/>
+              <a:t>nach</a:t>
+            </a:r>
+            <a:r>
+              <a:rPr lang="en-US" altLang="de-DE" sz="1600" dirty="0"/>
+              <a:t> </a:t>
+            </a:r>
+            <a:r>
+              <a:rPr lang="en-US" altLang="de-DE" sz="1600" dirty="0" err="1"/>
+              <a:t>Aufwand</a:t>
+            </a:r>
+            <a:r>
+              <a:rPr lang="en-US" altLang="de-DE" sz="1600" dirty="0"/>
+              <a:t> &amp; </a:t>
+            </a:r>
+            <a:r>
+              <a:rPr lang="en-US" altLang="de-DE" sz="1600" dirty="0" err="1"/>
+              <a:t>im</a:t>
+            </a:r>
+            <a:r>
+              <a:rPr lang="en-US" altLang="de-DE" sz="1600" dirty="0"/>
+              <a:t> </a:t>
+            </a:r>
+            <a:r>
+              <a:rPr lang="en-US" altLang="de-DE" sz="1600" dirty="0" err="1"/>
+              <a:t>Festpreis</a:t>
+            </a:r>
+            <a:endParaRPr lang="en-US" altLang="de-DE" sz="1600" dirty="0"/>
+          </a:p>
+          <a:p>
+            <a:pPr marL="447675" lvl="1">
+              <a:buFont typeface="Wingdings" panose="05000000000000000000" pitchFamily="2" charset="2"/>
+              <a:buChar char="ü"/>
+            </a:pPr>
+            <a:r>
+              <a:rPr lang="en-US" altLang="de-DE" sz="1600" dirty="0" err="1"/>
+              <a:t>Digitalisierung</a:t>
+            </a:r>
+            <a:r>
+              <a:rPr lang="en-US" altLang="de-DE" sz="1600" dirty="0"/>
+              <a:t>/ </a:t>
+            </a:r>
+            <a:r>
+              <a:rPr lang="en-US" altLang="de-DE" sz="1600" dirty="0" err="1"/>
+              <a:t>Prozesse</a:t>
+            </a:r>
+            <a:r>
+              <a:rPr lang="en-US" altLang="de-DE" sz="1600" dirty="0"/>
+              <a:t>/ Integration </a:t>
+            </a:r>
+          </a:p>
+          <a:p>
+            <a:pPr marL="447675" lvl="1">
+              <a:buFont typeface="Wingdings" panose="05000000000000000000" pitchFamily="2" charset="2"/>
+              <a:buChar char="ü"/>
+            </a:pPr>
+            <a:r>
+              <a:rPr lang="en-US" altLang="de-DE" sz="1600" dirty="0"/>
+              <a:t>Migration</a:t>
+            </a:r>
+          </a:p>
+          <a:p>
+            <a:pPr marL="447675" lvl="1">
+              <a:buFont typeface="Wingdings" panose="05000000000000000000" pitchFamily="2" charset="2"/>
+              <a:buChar char="ü"/>
+            </a:pPr>
+            <a:r>
+              <a:rPr lang="en-US" altLang="de-DE" sz="1600" dirty="0" err="1"/>
+              <a:t>Neuentwicklung</a:t>
+            </a:r>
+            <a:endParaRPr lang="en-US" altLang="de-DE" sz="1600" dirty="0"/>
+          </a:p>
+          <a:p>
+            <a:pPr marL="447675" lvl="1">
+              <a:buFont typeface="Wingdings" panose="05000000000000000000" pitchFamily="2" charset="2"/>
+              <a:buChar char="ü"/>
+            </a:pPr>
+            <a:r>
+              <a:rPr lang="en-US" altLang="de-DE" sz="1600" dirty="0" err="1"/>
+              <a:t>Notfall</a:t>
+            </a:r>
+            <a:r>
+              <a:rPr lang="en-US" altLang="de-DE" sz="1600" dirty="0"/>
+              <a:t>/ </a:t>
+            </a:r>
+            <a:r>
+              <a:rPr lang="en-US" altLang="de-DE" sz="1600" dirty="0" err="1"/>
+              <a:t>kritische</a:t>
+            </a:r>
+            <a:r>
+              <a:rPr lang="en-US" altLang="de-DE" sz="1600" dirty="0"/>
+              <a:t> Situation</a:t>
+            </a:r>
+          </a:p>
+          <a:p>
+            <a:pPr marL="447675" lvl="1">
+              <a:buFont typeface="Wingdings 3" panose="05040102010807070707" pitchFamily="18" charset="2"/>
+              <a:buChar char="Ú"/>
+            </a:pPr>
+            <a:r>
+              <a:rPr lang="en-US" altLang="de-DE" sz="1600" dirty="0" err="1"/>
+              <a:t>pragmatisch</a:t>
+            </a:r>
+            <a:r>
+              <a:rPr lang="en-US" altLang="de-DE" sz="1600" dirty="0"/>
+              <a:t>, </a:t>
+            </a:r>
+            <a:r>
+              <a:rPr lang="en-US" altLang="de-DE" sz="1600" dirty="0" err="1"/>
+              <a:t>zielgerichtet</a:t>
+            </a:r>
+            <a:r>
+              <a:rPr lang="en-US" altLang="de-DE" sz="1600" dirty="0"/>
+              <a:t>, </a:t>
+            </a:r>
+            <a:r>
+              <a:rPr lang="en-US" altLang="de-DE" sz="1600" dirty="0" err="1"/>
+              <a:t>zuverlässig</a:t>
+            </a:r>
+            <a:br>
+              <a:rPr lang="en-US" altLang="de-DE" sz="1600" dirty="0"/>
+            </a:br>
+            <a:endParaRPr lang="en-US" altLang="de-DE" sz="1600" dirty="0"/>
+          </a:p>
+          <a:p>
+            <a:pPr marL="447675" indent="-285750">
+              <a:buFont typeface="Monotype Sorts" pitchFamily="2" charset="2"/>
+              <a:buNone/>
+            </a:pPr>
+            <a:r>
+              <a:rPr lang="en-US" altLang="de-DE" sz="1600" dirty="0" err="1"/>
+              <a:t>Kompletter</a:t>
+            </a:r>
+            <a:r>
+              <a:rPr lang="en-US" altLang="de-DE" sz="1600" dirty="0"/>
+              <a:t> SW Life Cycle</a:t>
+            </a:r>
+          </a:p>
+          <a:p>
+            <a:pPr marL="447675" lvl="1">
+              <a:buFont typeface="Arial" panose="020B0604020202020204" pitchFamily="34" charset="0"/>
+              <a:buChar char="•"/>
+            </a:pPr>
+            <a:r>
+              <a:rPr lang="en-US" altLang="de-DE" sz="1600" dirty="0" err="1"/>
+              <a:t>Projektmanagement</a:t>
+            </a:r>
+            <a:r>
+              <a:rPr lang="en-US" altLang="de-DE" sz="1600" dirty="0"/>
+              <a:t>/ agile </a:t>
+            </a:r>
+            <a:r>
+              <a:rPr lang="en-US" altLang="de-DE" sz="1600" dirty="0" err="1"/>
+              <a:t>Methodik</a:t>
+            </a:r>
+            <a:endParaRPr lang="en-US" altLang="de-DE" sz="1600" dirty="0"/>
+          </a:p>
+          <a:p>
+            <a:pPr marL="447675" lvl="1">
+              <a:buFont typeface="Arial" panose="020B0604020202020204" pitchFamily="34" charset="0"/>
+              <a:buChar char="•"/>
+            </a:pPr>
+            <a:r>
+              <a:rPr lang="en-US" altLang="de-DE" sz="1600" dirty="0" err="1"/>
+              <a:t>Anforderungsanalyse</a:t>
+            </a:r>
+            <a:endParaRPr lang="en-US" altLang="de-DE" sz="1600" dirty="0"/>
+          </a:p>
+          <a:p>
+            <a:pPr marL="447675" lvl="1">
+              <a:buFont typeface="Arial" panose="020B0604020202020204" pitchFamily="34" charset="0"/>
+              <a:buChar char="•"/>
+            </a:pPr>
+            <a:r>
+              <a:rPr lang="en-US" altLang="de-DE" sz="1600" dirty="0" err="1"/>
+              <a:t>Architektur</a:t>
+            </a:r>
+            <a:r>
+              <a:rPr lang="en-US" altLang="de-DE" sz="1600" dirty="0"/>
+              <a:t> &amp; SW-Design</a:t>
+            </a:r>
+          </a:p>
+          <a:p>
+            <a:pPr marL="447675" lvl="1">
+              <a:buFont typeface="Arial" panose="020B0604020202020204" pitchFamily="34" charset="0"/>
+              <a:buChar char="•"/>
+            </a:pPr>
+            <a:r>
+              <a:rPr lang="en-US" altLang="de-DE" sz="1600" dirty="0" err="1"/>
+              <a:t>Implementierung</a:t>
+            </a:r>
+            <a:r>
+              <a:rPr lang="en-US" altLang="de-DE" sz="1600" dirty="0"/>
+              <a:t> &amp; </a:t>
+            </a:r>
+            <a:r>
+              <a:rPr lang="en-US" altLang="de-DE" sz="1600" dirty="0" err="1"/>
+              <a:t>Testautomation</a:t>
+            </a:r>
+            <a:endParaRPr lang="en-US" altLang="de-DE" sz="1600" dirty="0"/>
+          </a:p>
+          <a:p>
+            <a:pPr marL="447675" lvl="1">
+              <a:buFont typeface="Arial" panose="020B0604020202020204" pitchFamily="34" charset="0"/>
+              <a:buChar char="•"/>
+            </a:pPr>
+            <a:r>
+              <a:rPr lang="en-US" altLang="de-DE" sz="1600" dirty="0" err="1"/>
+              <a:t>Studien</a:t>
+            </a:r>
+            <a:r>
+              <a:rPr lang="en-US" altLang="de-DE" sz="1600" dirty="0"/>
+              <a:t> &amp; </a:t>
+            </a:r>
+            <a:r>
+              <a:rPr lang="en-US" altLang="de-DE" sz="1600" dirty="0" err="1"/>
+              <a:t>Seminare</a:t>
+            </a:r>
+            <a:endParaRPr lang="en-US" altLang="de-DE" sz="1600" dirty="0"/>
+          </a:p>
+        </p:txBody>
+      </p:sp>
+      <p:sp>
+        <p:nvSpPr>
+          <p:cNvPr id="18" name="Inhaltsplatzhalter 2"/>
+          <p:cNvSpPr txBox="1">
+            <a:spLocks noChangeArrowheads="1"/>
+          </p:cNvSpPr>
+          <p:nvPr/>
+        </p:nvSpPr>
+        <p:spPr bwMode="auto">
+          <a:xfrm rot="157779">
+            <a:off x="6959600" y="1684338"/>
+            <a:ext cx="1852613" cy="504825"/>
+          </a:xfrm>
+          <a:prstGeom prst="rect">
+            <a:avLst/>
+          </a:prstGeom>
+          <a:noFill/>
+          <a:ln>
+            <a:noFill/>
+          </a:ln>
+        </p:spPr>
+        <p:txBody>
+          <a:bodyPr lIns="92075" tIns="46038" rIns="92075" bIns="46038"/>
+          <a:lstStyle/>
+          <a:p>
+            <a:pPr eaLnBrk="0" hangingPunct="0">
+              <a:spcBef>
+                <a:spcPct val="20000"/>
+              </a:spcBef>
+              <a:buClr>
+                <a:srgbClr val="008C5A"/>
+              </a:buClr>
+              <a:defRPr/>
+            </a:pPr>
+            <a:r>
+              <a:rPr lang="en-US" altLang="de-DE" sz="1400" kern="0">
+                <a:latin typeface="+mn-lt"/>
+                <a:cs typeface="+mn-cs"/>
+              </a:rPr>
+              <a:t>online banking</a:t>
+            </a:r>
+            <a:endParaRPr lang="en-US" altLang="de-DE" sz="1400" kern="0" dirty="0">
+              <a:latin typeface="+mn-lt"/>
+              <a:cs typeface="+mn-cs"/>
+            </a:endParaRPr>
+          </a:p>
+        </p:txBody>
+      </p:sp>
+      <p:sp>
+        <p:nvSpPr>
+          <p:cNvPr id="19" name="Inhaltsplatzhalter 2"/>
+          <p:cNvSpPr txBox="1">
+            <a:spLocks noChangeArrowheads="1"/>
+          </p:cNvSpPr>
+          <p:nvPr/>
+        </p:nvSpPr>
+        <p:spPr bwMode="auto">
+          <a:xfrm rot="21122013">
+            <a:off x="3870325" y="5133975"/>
+            <a:ext cx="1763713" cy="377825"/>
+          </a:xfrm>
+          <a:prstGeom prst="rect">
+            <a:avLst/>
+          </a:prstGeom>
+          <a:noFill/>
+          <a:ln>
+            <a:noFill/>
+          </a:ln>
+        </p:spPr>
+        <p:txBody>
+          <a:bodyPr lIns="92075" tIns="46038" rIns="92075" bIns="46038"/>
+          <a:lstStyle/>
+          <a:p>
+            <a:pPr eaLnBrk="0" hangingPunct="0">
+              <a:spcBef>
+                <a:spcPct val="20000"/>
+              </a:spcBef>
+              <a:buClr>
+                <a:srgbClr val="008C5A"/>
+              </a:buClr>
+              <a:defRPr/>
+            </a:pPr>
+            <a:r>
+              <a:rPr lang="en-US" altLang="de-DE" sz="1400" kern="0">
+                <a:latin typeface="+mn-lt"/>
+                <a:cs typeface="+mn-cs"/>
+              </a:rPr>
+              <a:t>security Härtung</a:t>
+            </a:r>
+            <a:endParaRPr lang="en-US" altLang="de-DE" sz="1400" kern="0" dirty="0">
+              <a:latin typeface="+mn-lt"/>
+              <a:cs typeface="+mn-cs"/>
+            </a:endParaRPr>
+          </a:p>
+        </p:txBody>
+      </p:sp>
+      <p:sp>
+        <p:nvSpPr>
+          <p:cNvPr id="20" name="Inhaltsplatzhalter 2"/>
+          <p:cNvSpPr txBox="1">
+            <a:spLocks noChangeArrowheads="1"/>
+          </p:cNvSpPr>
+          <p:nvPr/>
+        </p:nvSpPr>
+        <p:spPr bwMode="auto">
+          <a:xfrm rot="21233116">
+            <a:off x="4565650" y="1885950"/>
+            <a:ext cx="2736850" cy="503238"/>
+          </a:xfrm>
+          <a:prstGeom prst="rect">
+            <a:avLst/>
+          </a:prstGeom>
+          <a:noFill/>
+          <a:ln>
+            <a:noFill/>
+          </a:ln>
+        </p:spPr>
+        <p:txBody>
+          <a:bodyPr lIns="92075" tIns="46038" rIns="92075" bIns="46038"/>
+          <a:lstStyle/>
+          <a:p>
+            <a:pPr eaLnBrk="0" hangingPunct="0">
+              <a:spcBef>
+                <a:spcPct val="20000"/>
+              </a:spcBef>
+              <a:buClr>
+                <a:srgbClr val="008C5A"/>
+              </a:buClr>
+              <a:defRPr/>
+            </a:pPr>
+            <a:r>
+              <a:rPr lang="en-US" altLang="de-DE" sz="1400" kern="0">
+                <a:latin typeface="+mn-lt"/>
+                <a:cs typeface="+mn-cs"/>
+              </a:rPr>
+              <a:t>Einführung neues Versicherungsprodukt</a:t>
+            </a:r>
+            <a:endParaRPr lang="en-US" altLang="de-DE" sz="1400" kern="0" dirty="0">
+              <a:latin typeface="+mn-lt"/>
+              <a:cs typeface="+mn-cs"/>
+            </a:endParaRPr>
+          </a:p>
+        </p:txBody>
+      </p:sp>
+      <p:sp>
+        <p:nvSpPr>
+          <p:cNvPr id="21" name="Inhaltsplatzhalter 2"/>
+          <p:cNvSpPr txBox="1">
+            <a:spLocks noChangeArrowheads="1"/>
+          </p:cNvSpPr>
+          <p:nvPr/>
+        </p:nvSpPr>
+        <p:spPr bwMode="auto">
+          <a:xfrm rot="20779455">
+            <a:off x="7577138" y="4826000"/>
+            <a:ext cx="1400175" cy="504825"/>
+          </a:xfrm>
+          <a:prstGeom prst="rect">
+            <a:avLst/>
+          </a:prstGeom>
+          <a:noFill/>
+          <a:ln>
+            <a:noFill/>
+          </a:ln>
+        </p:spPr>
+        <p:txBody>
+          <a:bodyPr lIns="92075" tIns="46038" rIns="92075" bIns="46038"/>
+          <a:lstStyle/>
+          <a:p>
+            <a:pPr eaLnBrk="0" hangingPunct="0">
+              <a:spcBef>
+                <a:spcPct val="20000"/>
+              </a:spcBef>
+              <a:buClr>
+                <a:srgbClr val="008C5A"/>
+              </a:buClr>
+              <a:defRPr/>
+            </a:pPr>
+            <a:r>
+              <a:rPr lang="en-US" altLang="de-DE" sz="1400" kern="0">
+                <a:latin typeface="+mn-lt"/>
+                <a:cs typeface="+mn-cs"/>
+              </a:rPr>
+              <a:t>Börsenhandel Wertpapiere</a:t>
+            </a:r>
+            <a:endParaRPr lang="en-US" altLang="de-DE" sz="1400" kern="0" dirty="0">
+              <a:latin typeface="+mn-lt"/>
+              <a:cs typeface="+mn-cs"/>
+            </a:endParaRPr>
+          </a:p>
+        </p:txBody>
+      </p:sp>
+      <p:sp>
+        <p:nvSpPr>
+          <p:cNvPr id="22" name="Inhaltsplatzhalter 2"/>
+          <p:cNvSpPr txBox="1">
+            <a:spLocks noChangeArrowheads="1"/>
+          </p:cNvSpPr>
+          <p:nvPr/>
+        </p:nvSpPr>
+        <p:spPr bwMode="auto">
+          <a:xfrm>
+            <a:off x="6130925" y="4221163"/>
+            <a:ext cx="2089150" cy="504825"/>
+          </a:xfrm>
+          <a:prstGeom prst="rect">
+            <a:avLst/>
+          </a:prstGeom>
+          <a:noFill/>
+          <a:ln>
+            <a:noFill/>
+          </a:ln>
+        </p:spPr>
+        <p:txBody>
+          <a:bodyPr lIns="92075" tIns="46038" rIns="92075" bIns="46038"/>
+          <a:lstStyle/>
+          <a:p>
+            <a:pPr eaLnBrk="0" hangingPunct="0">
+              <a:spcBef>
+                <a:spcPct val="20000"/>
+              </a:spcBef>
+              <a:buClr>
+                <a:srgbClr val="008C5A"/>
+              </a:buClr>
+              <a:defRPr/>
+            </a:pPr>
+            <a:r>
+              <a:rPr lang="en-US" altLang="de-DE" sz="1400" kern="0">
+                <a:latin typeface="+mn-lt"/>
+                <a:cs typeface="+mn-cs"/>
+              </a:rPr>
+              <a:t>Nutzerservices Energieversorger</a:t>
+            </a:r>
+            <a:endParaRPr lang="en-US" altLang="de-DE" sz="1400" kern="0" dirty="0">
+              <a:latin typeface="+mn-lt"/>
+              <a:cs typeface="+mn-cs"/>
+            </a:endParaRPr>
+          </a:p>
+        </p:txBody>
+      </p:sp>
+      <p:sp>
+        <p:nvSpPr>
+          <p:cNvPr id="23" name="Inhaltsplatzhalter 2"/>
+          <p:cNvSpPr txBox="1">
+            <a:spLocks noChangeArrowheads="1"/>
+          </p:cNvSpPr>
+          <p:nvPr/>
+        </p:nvSpPr>
+        <p:spPr bwMode="auto">
+          <a:xfrm rot="836597">
+            <a:off x="7059613" y="2420938"/>
+            <a:ext cx="2447925" cy="504825"/>
+          </a:xfrm>
+          <a:prstGeom prst="rect">
+            <a:avLst/>
+          </a:prstGeom>
+          <a:noFill/>
+          <a:ln>
+            <a:noFill/>
+          </a:ln>
+        </p:spPr>
+        <p:txBody>
+          <a:bodyPr lIns="92075" tIns="46038" rIns="92075" bIns="46038"/>
+          <a:lstStyle/>
+          <a:p>
+            <a:pPr eaLnBrk="0" hangingPunct="0">
+              <a:spcBef>
+                <a:spcPct val="20000"/>
+              </a:spcBef>
+              <a:buClr>
+                <a:srgbClr val="008C5A"/>
+              </a:buClr>
+              <a:defRPr/>
+            </a:pPr>
+            <a:r>
+              <a:rPr lang="en-US" altLang="de-DE" sz="1400" kern="0">
+                <a:latin typeface="+mn-lt"/>
+                <a:cs typeface="+mn-cs"/>
+              </a:rPr>
+              <a:t>Naturschutz: Kartie-</a:t>
+            </a:r>
+            <a:br>
+              <a:rPr lang="en-US" altLang="de-DE" sz="1400" kern="0">
+                <a:latin typeface="+mn-lt"/>
+                <a:cs typeface="+mn-cs"/>
+              </a:rPr>
+            </a:br>
+            <a:r>
+              <a:rPr lang="en-US" altLang="de-DE" sz="1400" kern="0">
+                <a:latin typeface="+mn-lt"/>
+                <a:cs typeface="+mn-cs"/>
+              </a:rPr>
+              <a:t>rung bedrohter Arten</a:t>
+            </a:r>
+            <a:endParaRPr lang="en-US" altLang="de-DE" sz="1400" kern="0" dirty="0">
+              <a:latin typeface="+mn-lt"/>
+              <a:cs typeface="+mn-cs"/>
+            </a:endParaRPr>
+          </a:p>
+        </p:txBody>
+      </p:sp>
+      <p:sp>
+        <p:nvSpPr>
+          <p:cNvPr id="24" name="Inhaltsplatzhalter 2"/>
+          <p:cNvSpPr txBox="1">
+            <a:spLocks noChangeArrowheads="1"/>
+          </p:cNvSpPr>
+          <p:nvPr/>
+        </p:nvSpPr>
+        <p:spPr bwMode="auto">
+          <a:xfrm rot="670649">
+            <a:off x="4030663" y="4125913"/>
+            <a:ext cx="1654175" cy="503237"/>
+          </a:xfrm>
+          <a:prstGeom prst="rect">
+            <a:avLst/>
+          </a:prstGeom>
+          <a:noFill/>
+          <a:ln>
+            <a:noFill/>
+          </a:ln>
+        </p:spPr>
+        <p:txBody>
+          <a:bodyPr lIns="92075" tIns="46038" rIns="92075" bIns="46038"/>
+          <a:lstStyle/>
+          <a:p>
+            <a:pPr eaLnBrk="0" hangingPunct="0">
+              <a:spcBef>
+                <a:spcPct val="20000"/>
+              </a:spcBef>
+              <a:buClr>
+                <a:srgbClr val="008C5A"/>
+              </a:buClr>
+              <a:defRPr/>
+            </a:pPr>
+            <a:r>
+              <a:rPr lang="en-US" altLang="de-DE" sz="1400" kern="0">
+                <a:latin typeface="+mn-lt"/>
+                <a:cs typeface="+mn-cs"/>
+              </a:rPr>
+              <a:t>Adressverwaltung</a:t>
+            </a:r>
+            <a:br>
+              <a:rPr lang="en-US" altLang="de-DE" sz="1400" kern="0">
+                <a:latin typeface="+mn-lt"/>
+                <a:cs typeface="+mn-cs"/>
+              </a:rPr>
+            </a:br>
+            <a:r>
+              <a:rPr lang="en-US" altLang="de-DE" sz="1400" kern="0">
+                <a:latin typeface="+mn-lt"/>
+                <a:cs typeface="+mn-cs"/>
+              </a:rPr>
+              <a:t> Logistik</a:t>
+            </a:r>
+            <a:endParaRPr lang="en-US" altLang="de-DE" sz="1400" kern="0" dirty="0">
+              <a:latin typeface="+mn-lt"/>
+              <a:cs typeface="+mn-cs"/>
+            </a:endParaRPr>
+          </a:p>
+        </p:txBody>
+      </p:sp>
+      <p:sp>
+        <p:nvSpPr>
+          <p:cNvPr id="25" name="Inhaltsplatzhalter 2"/>
+          <p:cNvSpPr txBox="1">
+            <a:spLocks noChangeArrowheads="1"/>
+          </p:cNvSpPr>
+          <p:nvPr/>
+        </p:nvSpPr>
+        <p:spPr bwMode="auto">
+          <a:xfrm rot="21095875">
+            <a:off x="5530850" y="2579688"/>
+            <a:ext cx="1477963" cy="504825"/>
+          </a:xfrm>
+          <a:prstGeom prst="rect">
+            <a:avLst/>
+          </a:prstGeom>
+          <a:noFill/>
+          <a:ln>
+            <a:noFill/>
+          </a:ln>
+        </p:spPr>
+        <p:txBody>
+          <a:bodyPr lIns="92075" tIns="46038" rIns="92075" bIns="46038"/>
+          <a:lstStyle/>
+          <a:p>
+            <a:pPr eaLnBrk="0" hangingPunct="0">
+              <a:spcBef>
+                <a:spcPct val="20000"/>
+              </a:spcBef>
+              <a:buClr>
+                <a:srgbClr val="008C5A"/>
+              </a:buClr>
+              <a:defRPr/>
+            </a:pPr>
+            <a:r>
+              <a:rPr lang="en-US" altLang="de-DE" sz="1400" kern="0">
+                <a:latin typeface="+mn-lt"/>
+                <a:cs typeface="+mn-cs"/>
+              </a:rPr>
+              <a:t>µservices </a:t>
+            </a:r>
+            <a:br>
+              <a:rPr lang="en-US" altLang="de-DE" sz="1400" kern="0">
+                <a:latin typeface="+mn-lt"/>
+                <a:cs typeface="+mn-cs"/>
+              </a:rPr>
+            </a:br>
+            <a:r>
+              <a:rPr lang="en-US" altLang="de-DE" sz="1400" kern="0">
+                <a:latin typeface="+mn-lt"/>
+                <a:cs typeface="+mn-cs"/>
+              </a:rPr>
+              <a:t>Automotive</a:t>
+            </a:r>
+            <a:endParaRPr lang="en-US" altLang="de-DE" sz="1400" kern="0" dirty="0">
+              <a:latin typeface="+mn-lt"/>
+              <a:cs typeface="+mn-cs"/>
+            </a:endParaRPr>
+          </a:p>
+        </p:txBody>
+      </p:sp>
+      <p:sp>
+        <p:nvSpPr>
+          <p:cNvPr id="26" name="Inhaltsplatzhalter 2"/>
+          <p:cNvSpPr txBox="1">
+            <a:spLocks noChangeArrowheads="1"/>
+          </p:cNvSpPr>
+          <p:nvPr/>
+        </p:nvSpPr>
+        <p:spPr bwMode="auto">
+          <a:xfrm>
+            <a:off x="4619625" y="3357563"/>
+            <a:ext cx="2016125" cy="504825"/>
+          </a:xfrm>
+          <a:prstGeom prst="rect">
+            <a:avLst/>
+          </a:prstGeom>
+          <a:noFill/>
+          <a:ln>
+            <a:noFill/>
+          </a:ln>
+        </p:spPr>
+        <p:txBody>
+          <a:bodyPr lIns="92075" tIns="46038" rIns="92075" bIns="46038"/>
+          <a:lstStyle/>
+          <a:p>
+            <a:pPr eaLnBrk="0" hangingPunct="0">
+              <a:spcBef>
+                <a:spcPct val="20000"/>
+              </a:spcBef>
+              <a:buClr>
+                <a:srgbClr val="008C5A"/>
+              </a:buClr>
+              <a:defRPr/>
+            </a:pPr>
+            <a:r>
+              <a:rPr lang="en-US" altLang="de-DE" sz="1400" kern="0">
+                <a:latin typeface="+mn-lt"/>
+                <a:cs typeface="+mn-cs"/>
+              </a:rPr>
+              <a:t>Migration Energieversorger</a:t>
+            </a:r>
+            <a:endParaRPr lang="en-US" altLang="de-DE" sz="1400" kern="0" dirty="0">
+              <a:latin typeface="+mn-lt"/>
+              <a:cs typeface="+mn-cs"/>
+            </a:endParaRPr>
+          </a:p>
+        </p:txBody>
+      </p:sp>
+      <p:sp>
+        <p:nvSpPr>
+          <p:cNvPr id="27" name="Inhaltsplatzhalter 2"/>
+          <p:cNvSpPr txBox="1">
+            <a:spLocks noChangeArrowheads="1"/>
+          </p:cNvSpPr>
+          <p:nvPr/>
+        </p:nvSpPr>
+        <p:spPr bwMode="auto">
+          <a:xfrm rot="21190261">
+            <a:off x="7259638" y="3527425"/>
+            <a:ext cx="1717675" cy="504825"/>
+          </a:xfrm>
+          <a:prstGeom prst="rect">
+            <a:avLst/>
+          </a:prstGeom>
+          <a:noFill/>
+          <a:ln>
+            <a:noFill/>
+          </a:ln>
+        </p:spPr>
+        <p:txBody>
+          <a:bodyPr lIns="92075" tIns="46038" rIns="92075" bIns="46038"/>
+          <a:lstStyle/>
+          <a:p>
+            <a:pPr eaLnBrk="0" hangingPunct="0">
+              <a:spcBef>
+                <a:spcPct val="20000"/>
+              </a:spcBef>
+              <a:buClr>
+                <a:srgbClr val="008C5A"/>
+              </a:buClr>
+              <a:defRPr/>
+            </a:pPr>
+            <a:r>
+              <a:rPr lang="en-US" altLang="de-DE" sz="1400" kern="0">
+                <a:latin typeface="+mn-lt"/>
+                <a:cs typeface="+mn-cs"/>
+              </a:rPr>
+              <a:t>Schnittstellen Gesundheitswesen</a:t>
+            </a:r>
+            <a:endParaRPr lang="en-US" altLang="de-DE" sz="1400" kern="0" dirty="0">
+              <a:latin typeface="+mn-lt"/>
+              <a:cs typeface="+mn-cs"/>
+            </a:endParaRPr>
+          </a:p>
+        </p:txBody>
+      </p:sp>
+      <p:sp>
+        <p:nvSpPr>
+          <p:cNvPr id="28" name="Inhaltsplatzhalter 2"/>
+          <p:cNvSpPr txBox="1">
+            <a:spLocks noChangeArrowheads="1"/>
+          </p:cNvSpPr>
+          <p:nvPr/>
+        </p:nvSpPr>
+        <p:spPr bwMode="auto">
+          <a:xfrm rot="700261">
+            <a:off x="5686425" y="5040313"/>
+            <a:ext cx="1651000" cy="504825"/>
+          </a:xfrm>
+          <a:prstGeom prst="rect">
+            <a:avLst/>
+          </a:prstGeom>
+          <a:noFill/>
+          <a:ln>
+            <a:noFill/>
+          </a:ln>
+        </p:spPr>
+        <p:txBody>
+          <a:bodyPr lIns="92075" tIns="46038" rIns="92075" bIns="46038"/>
+          <a:lstStyle/>
+          <a:p>
+            <a:pPr eaLnBrk="0" hangingPunct="0">
+              <a:spcBef>
+                <a:spcPct val="20000"/>
+              </a:spcBef>
+              <a:buClr>
+                <a:srgbClr val="008C5A"/>
+              </a:buClr>
+              <a:defRPr/>
+            </a:pPr>
+            <a:r>
+              <a:rPr lang="en-US" altLang="de-DE" sz="1400" kern="0">
+                <a:latin typeface="+mn-lt"/>
+                <a:cs typeface="+mn-cs"/>
+              </a:rPr>
+              <a:t>EAM &amp; refactoring leasing</a:t>
+            </a:r>
+            <a:endParaRPr lang="en-US" altLang="de-DE" sz="1400" kern="0" dirty="0">
+              <a:latin typeface="+mn-lt"/>
+              <a:cs typeface="+mn-cs"/>
+            </a:endParaRPr>
+          </a:p>
+        </p:txBody>
+      </p:sp>
+      <p:sp>
+        <p:nvSpPr>
+          <p:cNvPr id="29" name="Inhaltsplatzhalter 2"/>
+          <p:cNvSpPr txBox="1">
+            <a:spLocks noChangeArrowheads="1"/>
+          </p:cNvSpPr>
+          <p:nvPr/>
+        </p:nvSpPr>
+        <p:spPr bwMode="auto">
+          <a:xfrm rot="20721036">
+            <a:off x="6424613" y="3025775"/>
+            <a:ext cx="1458912" cy="503238"/>
+          </a:xfrm>
+          <a:prstGeom prst="rect">
+            <a:avLst/>
+          </a:prstGeom>
+          <a:noFill/>
+          <a:ln>
+            <a:noFill/>
+          </a:ln>
+        </p:spPr>
+        <p:txBody>
+          <a:bodyPr lIns="92075" tIns="46038" rIns="92075" bIns="46038"/>
+          <a:lstStyle/>
+          <a:p>
+            <a:pPr eaLnBrk="0" hangingPunct="0">
+              <a:spcBef>
+                <a:spcPct val="20000"/>
+              </a:spcBef>
+              <a:buClr>
+                <a:srgbClr val="008C5A"/>
+              </a:buClr>
+              <a:defRPr/>
+            </a:pPr>
+            <a:r>
+              <a:rPr lang="en-US" altLang="de-DE" sz="1400" kern="0">
+                <a:latin typeface="+mn-lt"/>
+                <a:cs typeface="+mn-cs"/>
+              </a:rPr>
+              <a:t>Stabilisierung Retail</a:t>
+            </a:r>
+            <a:endParaRPr lang="en-US" altLang="de-DE" sz="1400" kern="0" dirty="0">
+              <a:latin typeface="+mn-lt"/>
+              <a:cs typeface="+mn-cs"/>
+            </a:endParaRPr>
+          </a:p>
+        </p:txBody>
+      </p:sp>
+      <p:sp>
+        <p:nvSpPr>
+          <p:cNvPr id="30" name="Inhaltsplatzhalter 2"/>
+          <p:cNvSpPr txBox="1">
+            <a:spLocks noChangeArrowheads="1"/>
+          </p:cNvSpPr>
+          <p:nvPr/>
+        </p:nvSpPr>
+        <p:spPr bwMode="auto">
+          <a:xfrm>
+            <a:off x="5181600" y="6021388"/>
+            <a:ext cx="4143375" cy="503237"/>
+          </a:xfrm>
+          <a:prstGeom prst="rect">
+            <a:avLst/>
+          </a:prstGeom>
+          <a:noFill/>
+          <a:ln>
+            <a:noFill/>
+          </a:ln>
+        </p:spPr>
+        <p:txBody>
+          <a:bodyPr lIns="92075" tIns="46038" rIns="92075" bIns="46038"/>
+          <a:lstStyle/>
+          <a:p>
+            <a:pPr eaLnBrk="0" hangingPunct="0">
+              <a:spcBef>
+                <a:spcPct val="20000"/>
+              </a:spcBef>
+              <a:buClr>
+                <a:srgbClr val="008C5A"/>
+              </a:buClr>
+              <a:defRPr/>
+            </a:pPr>
+            <a:r>
+              <a:rPr lang="en-US" altLang="de-DE" sz="1600" b="1" kern="0">
+                <a:solidFill>
+                  <a:srgbClr val="037D2C"/>
+                </a:solidFill>
+                <a:latin typeface="+mn-lt"/>
+                <a:cs typeface="+mn-cs"/>
+              </a:rPr>
+              <a:t>... und für Sie? Sprechen Sie uns an!</a:t>
+            </a:r>
+            <a:endParaRPr lang="en-US" altLang="de-DE" sz="1600" b="1" kern="0" dirty="0">
+              <a:solidFill>
+                <a:srgbClr val="037D2C"/>
+              </a:solidFill>
+              <a:latin typeface="+mn-lt"/>
+              <a:cs typeface="+mn-cs"/>
+            </a:endParaRPr>
+          </a:p>
+        </p:txBody>
+      </p:sp>
+      <p:pic>
+        <p:nvPicPr>
+          <p:cNvPr id="31" name="Picture 6"/>
+          <p:cNvPicPr>
+            <a:picLocks noChangeAspect="1" noChangeArrowheads="1"/>
+          </p:cNvPicPr>
+          <p:nvPr/>
+        </p:nvPicPr>
+        <p:blipFill>
+          <a:blip r:embed="rId3">
+            <a:extLst>
+              <a:ext uri="{28A0092B-C50C-407E-A947-70E740481C1C}">
+                <a14:useLocalDpi xmlns:a14="http://schemas.microsoft.com/office/drawing/2010/main" val="0"/>
+              </a:ext>
+            </a:extLst>
+          </a:blip>
+          <a:srcRect/>
+          <a:stretch>
+            <a:fillRect/>
+          </a:stretch>
+        </p:blipFill>
+        <p:spPr bwMode="auto">
+          <a:xfrm>
+            <a:off x="4189413" y="1446213"/>
+            <a:ext cx="2736850" cy="298450"/>
+          </a:xfrm>
+          <a:prstGeom prst="rect">
+            <a:avLst/>
+          </a:prstGeom>
+          <a:noFill/>
+          <a:ln>
+            <a:noFill/>
+          </a:ln>
+          <a:extLst>
+            <a:ext uri="{909E8E84-426E-40DD-AFC4-6F175D3DCCD1}">
+              <a14:hiddenFill xmlns:a14="http://schemas.microsoft.com/office/drawing/2010/main">
+                <a:solidFill>
+                  <a:srgbClr val="FFFFFF"/>
+                </a:solidFill>
+              </a14:hiddenFill>
+            </a:ext>
+            <a:ext uri="{91240B29-F687-4F45-9708-019B960494DF}">
+              <a14:hiddenLine xmlns:a14="http://schemas.microsoft.com/office/drawing/2010/main" w="12700">
+                <a:solidFill>
+                  <a:srgbClr val="000000"/>
+                </a:solidFill>
+                <a:miter lim="800000"/>
+                <a:headEnd type="none" w="sm" len="sm"/>
+                <a:tailEnd type="none" w="sm" len="sm"/>
+              </a14:hiddenLine>
+            </a:ext>
+          </a:extLst>
+        </p:spPr>
+      </p:pic>
+    </p:spTree>
+    <p:extLst>
+      <p:ext uri="{BB962C8B-B14F-4D97-AF65-F5344CB8AC3E}">
+        <p14:creationId xmlns:p14="http://schemas.microsoft.com/office/powerpoint/2010/main" val="1880972598"/>
+      </p:ext>
+    </p:extLst>
+  </p:cSld>
+  <p:clrMapOvr>
+    <a:masterClrMapping/>
+  </p:clrMapOvr>
+  <p:timing>
+    <p:tnLst>
+      <p:par>
+        <p:cTn id="1" dur="indefinite" restart="never" nodeType="tmRoot">
+          <p:childTnLst>
+            <p:seq concurrent="1" nextAc="seek">
+              <p:cTn id="2" dur="indefinite" nodeType="mainSeq">
+                <p:childTnLst>
+                  <p:par>
+                    <p:cTn id="3" fill="hold" nodeType="clickPar">
+                      <p:stCondLst>
+                        <p:cond delay="indefinite"/>
+                        <p:cond evt="onBegin" delay="0">
+                          <p:tn val="2"/>
+                        </p:cond>
+                      </p:stCondLst>
+                      <p:childTnLst>
+                        <p:par>
+                          <p:cTn id="4" fill="hold" nodeType="withGroup">
+                            <p:stCondLst>
+                              <p:cond delay="0"/>
+                            </p:stCondLst>
+                            <p:childTnLst>
+                              <p:par>
+                                <p:cTn id="5" presetID="1" presetClass="entr" presetSubtype="0" fill="hold" nodeType="withEffect">
+                                  <p:stCondLst>
+                                    <p:cond delay="0"/>
+                                  </p:stCondLst>
+                                  <p:childTnLst>
+                                    <p:set>
+                                      <p:cBhvr>
+                                        <p:cTn id="6" dur="1" fill="hold">
+                                          <p:stCondLst>
+                                            <p:cond delay="0"/>
+                                          </p:stCondLst>
+                                        </p:cTn>
+                                        <p:tgtEl>
+                                          <p:spTgt spid="31"/>
+                                        </p:tgtEl>
+                                        <p:attrNameLst>
+                                          <p:attrName>style.visibility</p:attrName>
+                                        </p:attrNameLst>
+                                      </p:cBhvr>
+                                      <p:to>
+                                        <p:strVal val="visible"/>
+                                      </p:to>
+                                    </p:set>
+                                  </p:childTnLst>
+                                </p:cTn>
+                              </p:par>
+                              <p:par>
+                                <p:cTn id="7" presetID="1" presetClass="entr" presetSubtype="0" fill="hold" grpId="0" nodeType="withEffect">
+                                  <p:stCondLst>
+                                    <p:cond delay="0"/>
+                                  </p:stCondLst>
+                                  <p:childTnLst>
+                                    <p:set>
+                                      <p:cBhvr>
+                                        <p:cTn id="8" dur="1" fill="hold">
+                                          <p:stCondLst>
+                                            <p:cond delay="0"/>
+                                          </p:stCondLst>
+                                        </p:cTn>
+                                        <p:tgtEl>
+                                          <p:spTgt spid="17">
+                                            <p:txEl>
+                                              <p:pRg st="0" end="0"/>
+                                            </p:txEl>
+                                          </p:spTgt>
+                                        </p:tgtEl>
+                                        <p:attrNameLst>
+                                          <p:attrName>style.visibility</p:attrName>
+                                        </p:attrNameLst>
+                                      </p:cBhvr>
+                                      <p:to>
+                                        <p:strVal val="visible"/>
+                                      </p:to>
+                                    </p:set>
+                                  </p:childTnLst>
+                                </p:cTn>
+                              </p:par>
+                              <p:par>
+                                <p:cTn id="9" presetID="1" presetClass="entr" presetSubtype="0" fill="hold" grpId="0" nodeType="withEffect">
+                                  <p:stCondLst>
+                                    <p:cond delay="0"/>
+                                  </p:stCondLst>
+                                  <p:childTnLst>
+                                    <p:set>
+                                      <p:cBhvr>
+                                        <p:cTn id="10" dur="1" fill="hold">
+                                          <p:stCondLst>
+                                            <p:cond delay="0"/>
+                                          </p:stCondLst>
+                                        </p:cTn>
+                                        <p:tgtEl>
+                                          <p:spTgt spid="17">
+                                            <p:txEl>
+                                              <p:pRg st="1" end="1"/>
+                                            </p:txEl>
+                                          </p:spTgt>
+                                        </p:tgtEl>
+                                        <p:attrNameLst>
+                                          <p:attrName>style.visibility</p:attrName>
+                                        </p:attrNameLst>
+                                      </p:cBhvr>
+                                      <p:to>
+                                        <p:strVal val="visible"/>
+                                      </p:to>
+                                    </p:set>
+                                  </p:childTnLst>
+                                </p:cTn>
+                              </p:par>
+                              <p:par>
+                                <p:cTn id="11" presetID="1" presetClass="entr" presetSubtype="0" fill="hold" grpId="0" nodeType="withEffect">
+                                  <p:stCondLst>
+                                    <p:cond delay="0"/>
+                                  </p:stCondLst>
+                                  <p:childTnLst>
+                                    <p:set>
+                                      <p:cBhvr>
+                                        <p:cTn id="12" dur="1" fill="hold">
+                                          <p:stCondLst>
+                                            <p:cond delay="0"/>
+                                          </p:stCondLst>
+                                        </p:cTn>
+                                        <p:tgtEl>
+                                          <p:spTgt spid="17">
+                                            <p:txEl>
+                                              <p:pRg st="2" end="2"/>
+                                            </p:txEl>
+                                          </p:spTgt>
+                                        </p:tgtEl>
+                                        <p:attrNameLst>
+                                          <p:attrName>style.visibility</p:attrName>
+                                        </p:attrNameLst>
+                                      </p:cBhvr>
+                                      <p:to>
+                                        <p:strVal val="visible"/>
+                                      </p:to>
+                                    </p:set>
+                                  </p:childTnLst>
+                                </p:cTn>
+                              </p:par>
+                            </p:childTnLst>
+                          </p:cTn>
+                        </p:par>
+                      </p:childTnLst>
+                    </p:cTn>
+                  </p:par>
+                  <p:par>
+                    <p:cTn id="13" fill="hold" nodeType="clickPar">
+                      <p:stCondLst>
+                        <p:cond delay="indefinite"/>
+                      </p:stCondLst>
+                      <p:childTnLst>
+                        <p:par>
+                          <p:cTn id="14" fill="hold" nodeType="withGroup">
+                            <p:stCondLst>
+                              <p:cond delay="0"/>
+                            </p:stCondLst>
+                            <p:childTnLst>
+                              <p:par>
+                                <p:cTn id="15" presetID="1" presetClass="entr" presetSubtype="0" fill="hold" grpId="0" nodeType="clickEffect">
+                                  <p:stCondLst>
+                                    <p:cond delay="0"/>
+                                  </p:stCondLst>
+                                  <p:childTnLst>
+                                    <p:set>
+                                      <p:cBhvr>
+                                        <p:cTn id="16" dur="1" fill="hold">
+                                          <p:stCondLst>
+                                            <p:cond delay="0"/>
+                                          </p:stCondLst>
+                                        </p:cTn>
+                                        <p:tgtEl>
+                                          <p:spTgt spid="17">
+                                            <p:txEl>
+                                              <p:pRg st="3" end="3"/>
+                                            </p:txEl>
+                                          </p:spTgt>
+                                        </p:tgtEl>
+                                        <p:attrNameLst>
+                                          <p:attrName>style.visibility</p:attrName>
+                                        </p:attrNameLst>
+                                      </p:cBhvr>
+                                      <p:to>
+                                        <p:strVal val="visible"/>
+                                      </p:to>
+                                    </p:set>
+                                  </p:childTnLst>
+                                </p:cTn>
+                              </p:par>
+                              <p:par>
+                                <p:cTn id="17" presetID="1" presetClass="entr" presetSubtype="0" fill="hold" grpId="0" nodeType="withEffect">
+                                  <p:stCondLst>
+                                    <p:cond delay="0"/>
+                                  </p:stCondLst>
+                                  <p:childTnLst>
+                                    <p:set>
+                                      <p:cBhvr>
+                                        <p:cTn id="18" dur="1" fill="hold">
+                                          <p:stCondLst>
+                                            <p:cond delay="0"/>
+                                          </p:stCondLst>
+                                        </p:cTn>
+                                        <p:tgtEl>
+                                          <p:spTgt spid="17">
+                                            <p:txEl>
+                                              <p:pRg st="4" end="4"/>
+                                            </p:txEl>
+                                          </p:spTgt>
+                                        </p:tgtEl>
+                                        <p:attrNameLst>
+                                          <p:attrName>style.visibility</p:attrName>
+                                        </p:attrNameLst>
+                                      </p:cBhvr>
+                                      <p:to>
+                                        <p:strVal val="visible"/>
+                                      </p:to>
+                                    </p:set>
+                                  </p:childTnLst>
+                                </p:cTn>
+                              </p:par>
+                              <p:par>
+                                <p:cTn id="19" presetID="1" presetClass="entr" presetSubtype="0" fill="hold" grpId="0" nodeType="withEffect">
+                                  <p:stCondLst>
+                                    <p:cond delay="0"/>
+                                  </p:stCondLst>
+                                  <p:childTnLst>
+                                    <p:set>
+                                      <p:cBhvr>
+                                        <p:cTn id="20" dur="1" fill="hold">
+                                          <p:stCondLst>
+                                            <p:cond delay="0"/>
+                                          </p:stCondLst>
+                                        </p:cTn>
+                                        <p:tgtEl>
+                                          <p:spTgt spid="17">
+                                            <p:txEl>
+                                              <p:pRg st="5" end="5"/>
+                                            </p:txEl>
+                                          </p:spTgt>
+                                        </p:tgtEl>
+                                        <p:attrNameLst>
+                                          <p:attrName>style.visibility</p:attrName>
+                                        </p:attrNameLst>
+                                      </p:cBhvr>
+                                      <p:to>
+                                        <p:strVal val="visible"/>
+                                      </p:to>
+                                    </p:set>
+                                  </p:childTnLst>
+                                </p:cTn>
+                              </p:par>
+                              <p:par>
+                                <p:cTn id="21" presetID="1" presetClass="entr" presetSubtype="0" fill="hold" grpId="0" nodeType="withEffect">
+                                  <p:stCondLst>
+                                    <p:cond delay="0"/>
+                                  </p:stCondLst>
+                                  <p:childTnLst>
+                                    <p:set>
+                                      <p:cBhvr>
+                                        <p:cTn id="22" dur="1" fill="hold">
+                                          <p:stCondLst>
+                                            <p:cond delay="0"/>
+                                          </p:stCondLst>
+                                        </p:cTn>
+                                        <p:tgtEl>
+                                          <p:spTgt spid="17">
+                                            <p:txEl>
+                                              <p:pRg st="6" end="6"/>
+                                            </p:txEl>
+                                          </p:spTgt>
+                                        </p:tgtEl>
+                                        <p:attrNameLst>
+                                          <p:attrName>style.visibility</p:attrName>
+                                        </p:attrNameLst>
+                                      </p:cBhvr>
+                                      <p:to>
+                                        <p:strVal val="visible"/>
+                                      </p:to>
+                                    </p:set>
+                                  </p:childTnLst>
+                                </p:cTn>
+                              </p:par>
+                              <p:par>
+                                <p:cTn id="23" presetID="1" presetClass="entr" presetSubtype="0" fill="hold" grpId="0" nodeType="withEffect">
+                                  <p:stCondLst>
+                                    <p:cond delay="0"/>
+                                  </p:stCondLst>
+                                  <p:childTnLst>
+                                    <p:set>
+                                      <p:cBhvr>
+                                        <p:cTn id="24" dur="1" fill="hold">
+                                          <p:stCondLst>
+                                            <p:cond delay="0"/>
+                                          </p:stCondLst>
+                                        </p:cTn>
+                                        <p:tgtEl>
+                                          <p:spTgt spid="17">
+                                            <p:txEl>
+                                              <p:pRg st="7" end="7"/>
+                                            </p:txEl>
+                                          </p:spTgt>
+                                        </p:tgtEl>
+                                        <p:attrNameLst>
+                                          <p:attrName>style.visibility</p:attrName>
+                                        </p:attrNameLst>
+                                      </p:cBhvr>
+                                      <p:to>
+                                        <p:strVal val="visible"/>
+                                      </p:to>
+                                    </p:set>
+                                  </p:childTnLst>
+                                </p:cTn>
+                              </p:par>
+                            </p:childTnLst>
+                          </p:cTn>
+                        </p:par>
+                      </p:childTnLst>
+                    </p:cTn>
+                  </p:par>
+                  <p:par>
+                    <p:cTn id="25" fill="hold" nodeType="clickPar">
+                      <p:stCondLst>
+                        <p:cond delay="indefinite"/>
+                      </p:stCondLst>
+                      <p:childTnLst>
+                        <p:par>
+                          <p:cTn id="26" fill="hold" nodeType="withGroup">
+                            <p:stCondLst>
+                              <p:cond delay="0"/>
+                            </p:stCondLst>
+                            <p:childTnLst>
+                              <p:par>
+                                <p:cTn id="27" presetID="1" presetClass="entr" presetSubtype="0" fill="hold" grpId="0" nodeType="clickEffect">
+                                  <p:stCondLst>
+                                    <p:cond delay="0"/>
+                                  </p:stCondLst>
+                                  <p:childTnLst>
+                                    <p:set>
+                                      <p:cBhvr>
+                                        <p:cTn id="28" dur="1" fill="hold">
+                                          <p:stCondLst>
+                                            <p:cond delay="0"/>
+                                          </p:stCondLst>
+                                        </p:cTn>
+                                        <p:tgtEl>
+                                          <p:spTgt spid="4"/>
+                                        </p:tgtEl>
+                                        <p:attrNameLst>
+                                          <p:attrName>style.visibility</p:attrName>
+                                        </p:attrNameLst>
+                                      </p:cBhvr>
+                                      <p:to>
+                                        <p:strVal val="visible"/>
+                                      </p:to>
+                                    </p:set>
+                                  </p:childTnLst>
+                                </p:cTn>
+                              </p:par>
+                              <p:par>
+                                <p:cTn id="29" presetID="1" presetClass="entr" presetSubtype="0" fill="hold" grpId="0" nodeType="withEffect">
+                                  <p:stCondLst>
+                                    <p:cond delay="0"/>
+                                  </p:stCondLst>
+                                  <p:childTnLst>
+                                    <p:set>
+                                      <p:cBhvr>
+                                        <p:cTn id="30" dur="1" fill="hold">
+                                          <p:stCondLst>
+                                            <p:cond delay="0"/>
+                                          </p:stCondLst>
+                                        </p:cTn>
+                                        <p:tgtEl>
+                                          <p:spTgt spid="5"/>
+                                        </p:tgtEl>
+                                        <p:attrNameLst>
+                                          <p:attrName>style.visibility</p:attrName>
+                                        </p:attrNameLst>
+                                      </p:cBhvr>
+                                      <p:to>
+                                        <p:strVal val="visible"/>
+                                      </p:to>
+                                    </p:set>
+                                  </p:childTnLst>
+                                </p:cTn>
+                              </p:par>
+                              <p:par>
+                                <p:cTn id="31" presetID="1" presetClass="entr" presetSubtype="0" fill="hold" grpId="0" nodeType="withEffect">
+                                  <p:stCondLst>
+                                    <p:cond delay="0"/>
+                                  </p:stCondLst>
+                                  <p:childTnLst>
+                                    <p:set>
+                                      <p:cBhvr>
+                                        <p:cTn id="32" dur="1" fill="hold">
+                                          <p:stCondLst>
+                                            <p:cond delay="0"/>
+                                          </p:stCondLst>
+                                        </p:cTn>
+                                        <p:tgtEl>
+                                          <p:spTgt spid="6"/>
+                                        </p:tgtEl>
+                                        <p:attrNameLst>
+                                          <p:attrName>style.visibility</p:attrName>
+                                        </p:attrNameLst>
+                                      </p:cBhvr>
+                                      <p:to>
+                                        <p:strVal val="visible"/>
+                                      </p:to>
+                                    </p:set>
+                                  </p:childTnLst>
+                                </p:cTn>
+                              </p:par>
+                              <p:par>
+                                <p:cTn id="33" presetID="1" presetClass="entr" presetSubtype="0" fill="hold" grpId="0" nodeType="withEffect">
+                                  <p:stCondLst>
+                                    <p:cond delay="0"/>
+                                  </p:stCondLst>
+                                  <p:childTnLst>
+                                    <p:set>
+                                      <p:cBhvr>
+                                        <p:cTn id="34" dur="1" fill="hold">
+                                          <p:stCondLst>
+                                            <p:cond delay="0"/>
+                                          </p:stCondLst>
+                                        </p:cTn>
+                                        <p:tgtEl>
+                                          <p:spTgt spid="7"/>
+                                        </p:tgtEl>
+                                        <p:attrNameLst>
+                                          <p:attrName>style.visibility</p:attrName>
+                                        </p:attrNameLst>
+                                      </p:cBhvr>
+                                      <p:to>
+                                        <p:strVal val="visible"/>
+                                      </p:to>
+                                    </p:set>
+                                  </p:childTnLst>
+                                </p:cTn>
+                              </p:par>
+                              <p:par>
+                                <p:cTn id="35" presetID="1" presetClass="entr" presetSubtype="0" fill="hold" grpId="0" nodeType="withEffect">
+                                  <p:stCondLst>
+                                    <p:cond delay="0"/>
+                                  </p:stCondLst>
+                                  <p:childTnLst>
+                                    <p:set>
+                                      <p:cBhvr>
+                                        <p:cTn id="36" dur="1" fill="hold">
+                                          <p:stCondLst>
+                                            <p:cond delay="0"/>
+                                          </p:stCondLst>
+                                        </p:cTn>
+                                        <p:tgtEl>
+                                          <p:spTgt spid="8"/>
+                                        </p:tgtEl>
+                                        <p:attrNameLst>
+                                          <p:attrName>style.visibility</p:attrName>
+                                        </p:attrNameLst>
+                                      </p:cBhvr>
+                                      <p:to>
+                                        <p:strVal val="visible"/>
+                                      </p:to>
+                                    </p:set>
+                                  </p:childTnLst>
+                                </p:cTn>
+                              </p:par>
+                              <p:par>
+                                <p:cTn id="37" presetID="1" presetClass="entr" presetSubtype="0" fill="hold" grpId="0" nodeType="withEffect">
+                                  <p:stCondLst>
+                                    <p:cond delay="0"/>
+                                  </p:stCondLst>
+                                  <p:childTnLst>
+                                    <p:set>
+                                      <p:cBhvr>
+                                        <p:cTn id="38" dur="1" fill="hold">
+                                          <p:stCondLst>
+                                            <p:cond delay="0"/>
+                                          </p:stCondLst>
+                                        </p:cTn>
+                                        <p:tgtEl>
+                                          <p:spTgt spid="9"/>
+                                        </p:tgtEl>
+                                        <p:attrNameLst>
+                                          <p:attrName>style.visibility</p:attrName>
+                                        </p:attrNameLst>
+                                      </p:cBhvr>
+                                      <p:to>
+                                        <p:strVal val="visible"/>
+                                      </p:to>
+                                    </p:set>
+                                  </p:childTnLst>
+                                </p:cTn>
+                              </p:par>
+                              <p:par>
+                                <p:cTn id="39" presetID="1" presetClass="entr" presetSubtype="0" fill="hold" grpId="0" nodeType="withEffect">
+                                  <p:stCondLst>
+                                    <p:cond delay="0"/>
+                                  </p:stCondLst>
+                                  <p:childTnLst>
+                                    <p:set>
+                                      <p:cBhvr>
+                                        <p:cTn id="40" dur="1" fill="hold">
+                                          <p:stCondLst>
+                                            <p:cond delay="0"/>
+                                          </p:stCondLst>
+                                        </p:cTn>
+                                        <p:tgtEl>
+                                          <p:spTgt spid="10"/>
+                                        </p:tgtEl>
+                                        <p:attrNameLst>
+                                          <p:attrName>style.visibility</p:attrName>
+                                        </p:attrNameLst>
+                                      </p:cBhvr>
+                                      <p:to>
+                                        <p:strVal val="visible"/>
+                                      </p:to>
+                                    </p:set>
+                                  </p:childTnLst>
+                                </p:cTn>
+                              </p:par>
+                              <p:par>
+                                <p:cTn id="41" presetID="1" presetClass="entr" presetSubtype="0" fill="hold" grpId="0" nodeType="withEffect">
+                                  <p:stCondLst>
+                                    <p:cond delay="0"/>
+                                  </p:stCondLst>
+                                  <p:childTnLst>
+                                    <p:set>
+                                      <p:cBhvr>
+                                        <p:cTn id="42" dur="1" fill="hold">
+                                          <p:stCondLst>
+                                            <p:cond delay="0"/>
+                                          </p:stCondLst>
+                                        </p:cTn>
+                                        <p:tgtEl>
+                                          <p:spTgt spid="11"/>
+                                        </p:tgtEl>
+                                        <p:attrNameLst>
+                                          <p:attrName>style.visibility</p:attrName>
+                                        </p:attrNameLst>
+                                      </p:cBhvr>
+                                      <p:to>
+                                        <p:strVal val="visible"/>
+                                      </p:to>
+                                    </p:set>
+                                  </p:childTnLst>
+                                </p:cTn>
+                              </p:par>
+                              <p:par>
+                                <p:cTn id="43" presetID="1" presetClass="entr" presetSubtype="0" fill="hold" grpId="0" nodeType="withEffect">
+                                  <p:stCondLst>
+                                    <p:cond delay="0"/>
+                                  </p:stCondLst>
+                                  <p:childTnLst>
+                                    <p:set>
+                                      <p:cBhvr>
+                                        <p:cTn id="44" dur="1" fill="hold">
+                                          <p:stCondLst>
+                                            <p:cond delay="0"/>
+                                          </p:stCondLst>
+                                        </p:cTn>
+                                        <p:tgtEl>
+                                          <p:spTgt spid="12"/>
+                                        </p:tgtEl>
+                                        <p:attrNameLst>
+                                          <p:attrName>style.visibility</p:attrName>
+                                        </p:attrNameLst>
+                                      </p:cBhvr>
+                                      <p:to>
+                                        <p:strVal val="visible"/>
+                                      </p:to>
+                                    </p:set>
+                                  </p:childTnLst>
+                                </p:cTn>
+                              </p:par>
+                              <p:par>
+                                <p:cTn id="45" presetID="1" presetClass="entr" presetSubtype="0" fill="hold" grpId="0" nodeType="withEffect">
+                                  <p:stCondLst>
+                                    <p:cond delay="0"/>
+                                  </p:stCondLst>
+                                  <p:childTnLst>
+                                    <p:set>
+                                      <p:cBhvr>
+                                        <p:cTn id="46" dur="1" fill="hold">
+                                          <p:stCondLst>
+                                            <p:cond delay="0"/>
+                                          </p:stCondLst>
+                                        </p:cTn>
+                                        <p:tgtEl>
+                                          <p:spTgt spid="13"/>
+                                        </p:tgtEl>
+                                        <p:attrNameLst>
+                                          <p:attrName>style.visibility</p:attrName>
+                                        </p:attrNameLst>
+                                      </p:cBhvr>
+                                      <p:to>
+                                        <p:strVal val="visible"/>
+                                      </p:to>
+                                    </p:set>
+                                  </p:childTnLst>
+                                </p:cTn>
+                              </p:par>
+                              <p:par>
+                                <p:cTn id="47" presetID="1" presetClass="entr" presetSubtype="0" fill="hold" grpId="0" nodeType="withEffect">
+                                  <p:stCondLst>
+                                    <p:cond delay="0"/>
+                                  </p:stCondLst>
+                                  <p:childTnLst>
+                                    <p:set>
+                                      <p:cBhvr>
+                                        <p:cTn id="48" dur="1" fill="hold">
+                                          <p:stCondLst>
+                                            <p:cond delay="0"/>
+                                          </p:stCondLst>
+                                        </p:cTn>
+                                        <p:tgtEl>
+                                          <p:spTgt spid="14"/>
+                                        </p:tgtEl>
+                                        <p:attrNameLst>
+                                          <p:attrName>style.visibility</p:attrName>
+                                        </p:attrNameLst>
+                                      </p:cBhvr>
+                                      <p:to>
+                                        <p:strVal val="visible"/>
+                                      </p:to>
+                                    </p:set>
+                                  </p:childTnLst>
+                                </p:cTn>
+                              </p:par>
+                              <p:par>
+                                <p:cTn id="49" presetID="1" presetClass="entr" presetSubtype="0" fill="hold" grpId="0" nodeType="withEffect">
+                                  <p:stCondLst>
+                                    <p:cond delay="0"/>
+                                  </p:stCondLst>
+                                  <p:childTnLst>
+                                    <p:set>
+                                      <p:cBhvr>
+                                        <p:cTn id="50" dur="1" fill="hold">
+                                          <p:stCondLst>
+                                            <p:cond delay="0"/>
+                                          </p:stCondLst>
+                                        </p:cTn>
+                                        <p:tgtEl>
+                                          <p:spTgt spid="15"/>
+                                        </p:tgtEl>
+                                        <p:attrNameLst>
+                                          <p:attrName>style.visibility</p:attrName>
+                                        </p:attrNameLst>
+                                      </p:cBhvr>
+                                      <p:to>
+                                        <p:strVal val="visible"/>
+                                      </p:to>
+                                    </p:set>
+                                  </p:childTnLst>
+                                </p:cTn>
+                              </p:par>
+                              <p:par>
+                                <p:cTn id="51" presetID="1" presetClass="entr" presetSubtype="0" fill="hold" grpId="0" nodeType="withEffect">
+                                  <p:stCondLst>
+                                    <p:cond delay="0"/>
+                                  </p:stCondLst>
+                                  <p:childTnLst>
+                                    <p:set>
+                                      <p:cBhvr>
+                                        <p:cTn id="52" dur="1" fill="hold">
+                                          <p:stCondLst>
+                                            <p:cond delay="0"/>
+                                          </p:stCondLst>
+                                        </p:cTn>
+                                        <p:tgtEl>
+                                          <p:spTgt spid="18"/>
+                                        </p:tgtEl>
+                                        <p:attrNameLst>
+                                          <p:attrName>style.visibility</p:attrName>
+                                        </p:attrNameLst>
+                                      </p:cBhvr>
+                                      <p:to>
+                                        <p:strVal val="visible"/>
+                                      </p:to>
+                                    </p:set>
+                                  </p:childTnLst>
+                                </p:cTn>
+                              </p:par>
+                              <p:par>
+                                <p:cTn id="53" presetID="1" presetClass="entr" presetSubtype="0" fill="hold" grpId="0" nodeType="withEffect">
+                                  <p:stCondLst>
+                                    <p:cond delay="0"/>
+                                  </p:stCondLst>
+                                  <p:childTnLst>
+                                    <p:set>
+                                      <p:cBhvr>
+                                        <p:cTn id="54" dur="1" fill="hold">
+                                          <p:stCondLst>
+                                            <p:cond delay="0"/>
+                                          </p:stCondLst>
+                                        </p:cTn>
+                                        <p:tgtEl>
+                                          <p:spTgt spid="19"/>
+                                        </p:tgtEl>
+                                        <p:attrNameLst>
+                                          <p:attrName>style.visibility</p:attrName>
+                                        </p:attrNameLst>
+                                      </p:cBhvr>
+                                      <p:to>
+                                        <p:strVal val="visible"/>
+                                      </p:to>
+                                    </p:set>
+                                  </p:childTnLst>
+                                </p:cTn>
+                              </p:par>
+                              <p:par>
+                                <p:cTn id="55" presetID="1" presetClass="entr" presetSubtype="0" fill="hold" grpId="0" nodeType="withEffect">
+                                  <p:stCondLst>
+                                    <p:cond delay="0"/>
+                                  </p:stCondLst>
+                                  <p:childTnLst>
+                                    <p:set>
+                                      <p:cBhvr>
+                                        <p:cTn id="56" dur="1" fill="hold">
+                                          <p:stCondLst>
+                                            <p:cond delay="0"/>
+                                          </p:stCondLst>
+                                        </p:cTn>
+                                        <p:tgtEl>
+                                          <p:spTgt spid="20"/>
+                                        </p:tgtEl>
+                                        <p:attrNameLst>
+                                          <p:attrName>style.visibility</p:attrName>
+                                        </p:attrNameLst>
+                                      </p:cBhvr>
+                                      <p:to>
+                                        <p:strVal val="visible"/>
+                                      </p:to>
+                                    </p:set>
+                                  </p:childTnLst>
+                                </p:cTn>
+                              </p:par>
+                              <p:par>
+                                <p:cTn id="57" presetID="1" presetClass="entr" presetSubtype="0" fill="hold" grpId="0" nodeType="withEffect">
+                                  <p:stCondLst>
+                                    <p:cond delay="0"/>
+                                  </p:stCondLst>
+                                  <p:childTnLst>
+                                    <p:set>
+                                      <p:cBhvr>
+                                        <p:cTn id="58" dur="1" fill="hold">
+                                          <p:stCondLst>
+                                            <p:cond delay="0"/>
+                                          </p:stCondLst>
+                                        </p:cTn>
+                                        <p:tgtEl>
+                                          <p:spTgt spid="21"/>
+                                        </p:tgtEl>
+                                        <p:attrNameLst>
+                                          <p:attrName>style.visibility</p:attrName>
+                                        </p:attrNameLst>
+                                      </p:cBhvr>
+                                      <p:to>
+                                        <p:strVal val="visible"/>
+                                      </p:to>
+                                    </p:set>
+                                  </p:childTnLst>
+                                </p:cTn>
+                              </p:par>
+                              <p:par>
+                                <p:cTn id="59" presetID="1" presetClass="entr" presetSubtype="0" fill="hold" grpId="0" nodeType="withEffect">
+                                  <p:stCondLst>
+                                    <p:cond delay="0"/>
+                                  </p:stCondLst>
+                                  <p:childTnLst>
+                                    <p:set>
+                                      <p:cBhvr>
+                                        <p:cTn id="60" dur="1" fill="hold">
+                                          <p:stCondLst>
+                                            <p:cond delay="0"/>
+                                          </p:stCondLst>
+                                        </p:cTn>
+                                        <p:tgtEl>
+                                          <p:spTgt spid="22"/>
+                                        </p:tgtEl>
+                                        <p:attrNameLst>
+                                          <p:attrName>style.visibility</p:attrName>
+                                        </p:attrNameLst>
+                                      </p:cBhvr>
+                                      <p:to>
+                                        <p:strVal val="visible"/>
+                                      </p:to>
+                                    </p:set>
+                                  </p:childTnLst>
+                                </p:cTn>
+                              </p:par>
+                              <p:par>
+                                <p:cTn id="61" presetID="1" presetClass="entr" presetSubtype="0" fill="hold" grpId="0" nodeType="withEffect">
+                                  <p:stCondLst>
+                                    <p:cond delay="0"/>
+                                  </p:stCondLst>
+                                  <p:childTnLst>
+                                    <p:set>
+                                      <p:cBhvr>
+                                        <p:cTn id="62" dur="1" fill="hold">
+                                          <p:stCondLst>
+                                            <p:cond delay="0"/>
+                                          </p:stCondLst>
+                                        </p:cTn>
+                                        <p:tgtEl>
+                                          <p:spTgt spid="23"/>
+                                        </p:tgtEl>
+                                        <p:attrNameLst>
+                                          <p:attrName>style.visibility</p:attrName>
+                                        </p:attrNameLst>
+                                      </p:cBhvr>
+                                      <p:to>
+                                        <p:strVal val="visible"/>
+                                      </p:to>
+                                    </p:set>
+                                  </p:childTnLst>
+                                </p:cTn>
+                              </p:par>
+                              <p:par>
+                                <p:cTn id="63" presetID="1" presetClass="entr" presetSubtype="0" fill="hold" grpId="0" nodeType="withEffect">
+                                  <p:stCondLst>
+                                    <p:cond delay="0"/>
+                                  </p:stCondLst>
+                                  <p:childTnLst>
+                                    <p:set>
+                                      <p:cBhvr>
+                                        <p:cTn id="64" dur="1" fill="hold">
+                                          <p:stCondLst>
+                                            <p:cond delay="0"/>
+                                          </p:stCondLst>
+                                        </p:cTn>
+                                        <p:tgtEl>
+                                          <p:spTgt spid="24"/>
+                                        </p:tgtEl>
+                                        <p:attrNameLst>
+                                          <p:attrName>style.visibility</p:attrName>
+                                        </p:attrNameLst>
+                                      </p:cBhvr>
+                                      <p:to>
+                                        <p:strVal val="visible"/>
+                                      </p:to>
+                                    </p:set>
+                                  </p:childTnLst>
+                                </p:cTn>
+                              </p:par>
+                              <p:par>
+                                <p:cTn id="65" presetID="1" presetClass="entr" presetSubtype="0" fill="hold" grpId="0" nodeType="withEffect">
+                                  <p:stCondLst>
+                                    <p:cond delay="0"/>
+                                  </p:stCondLst>
+                                  <p:childTnLst>
+                                    <p:set>
+                                      <p:cBhvr>
+                                        <p:cTn id="66" dur="1" fill="hold">
+                                          <p:stCondLst>
+                                            <p:cond delay="0"/>
+                                          </p:stCondLst>
+                                        </p:cTn>
+                                        <p:tgtEl>
+                                          <p:spTgt spid="25"/>
+                                        </p:tgtEl>
+                                        <p:attrNameLst>
+                                          <p:attrName>style.visibility</p:attrName>
+                                        </p:attrNameLst>
+                                      </p:cBhvr>
+                                      <p:to>
+                                        <p:strVal val="visible"/>
+                                      </p:to>
+                                    </p:set>
+                                  </p:childTnLst>
+                                </p:cTn>
+                              </p:par>
+                              <p:par>
+                                <p:cTn id="67" presetID="1" presetClass="entr" presetSubtype="0" fill="hold" grpId="0" nodeType="withEffect">
+                                  <p:stCondLst>
+                                    <p:cond delay="0"/>
+                                  </p:stCondLst>
+                                  <p:childTnLst>
+                                    <p:set>
+                                      <p:cBhvr>
+                                        <p:cTn id="68" dur="1" fill="hold">
+                                          <p:stCondLst>
+                                            <p:cond delay="0"/>
+                                          </p:stCondLst>
+                                        </p:cTn>
+                                        <p:tgtEl>
+                                          <p:spTgt spid="26"/>
+                                        </p:tgtEl>
+                                        <p:attrNameLst>
+                                          <p:attrName>style.visibility</p:attrName>
+                                        </p:attrNameLst>
+                                      </p:cBhvr>
+                                      <p:to>
+                                        <p:strVal val="visible"/>
+                                      </p:to>
+                                    </p:set>
+                                  </p:childTnLst>
+                                </p:cTn>
+                              </p:par>
+                              <p:par>
+                                <p:cTn id="69" presetID="1" presetClass="entr" presetSubtype="0" fill="hold" grpId="0" nodeType="withEffect">
+                                  <p:stCondLst>
+                                    <p:cond delay="0"/>
+                                  </p:stCondLst>
+                                  <p:childTnLst>
+                                    <p:set>
+                                      <p:cBhvr>
+                                        <p:cTn id="70" dur="1" fill="hold">
+                                          <p:stCondLst>
+                                            <p:cond delay="0"/>
+                                          </p:stCondLst>
+                                        </p:cTn>
+                                        <p:tgtEl>
+                                          <p:spTgt spid="27"/>
+                                        </p:tgtEl>
+                                        <p:attrNameLst>
+                                          <p:attrName>style.visibility</p:attrName>
+                                        </p:attrNameLst>
+                                      </p:cBhvr>
+                                      <p:to>
+                                        <p:strVal val="visible"/>
+                                      </p:to>
+                                    </p:set>
+                                  </p:childTnLst>
+                                </p:cTn>
+                              </p:par>
+                              <p:par>
+                                <p:cTn id="71" presetID="1" presetClass="entr" presetSubtype="0" fill="hold" grpId="0" nodeType="withEffect">
+                                  <p:stCondLst>
+                                    <p:cond delay="0"/>
+                                  </p:stCondLst>
+                                  <p:childTnLst>
+                                    <p:set>
+                                      <p:cBhvr>
+                                        <p:cTn id="72" dur="1" fill="hold">
+                                          <p:stCondLst>
+                                            <p:cond delay="0"/>
+                                          </p:stCondLst>
+                                        </p:cTn>
+                                        <p:tgtEl>
+                                          <p:spTgt spid="28"/>
+                                        </p:tgtEl>
+                                        <p:attrNameLst>
+                                          <p:attrName>style.visibility</p:attrName>
+                                        </p:attrNameLst>
+                                      </p:cBhvr>
+                                      <p:to>
+                                        <p:strVal val="visible"/>
+                                      </p:to>
+                                    </p:set>
+                                  </p:childTnLst>
+                                </p:cTn>
+                              </p:par>
+                              <p:par>
+                                <p:cTn id="73" presetID="1" presetClass="entr" presetSubtype="0" fill="hold" grpId="0" nodeType="withEffect">
+                                  <p:stCondLst>
+                                    <p:cond delay="0"/>
+                                  </p:stCondLst>
+                                  <p:childTnLst>
+                                    <p:set>
+                                      <p:cBhvr>
+                                        <p:cTn id="74" dur="1" fill="hold">
+                                          <p:stCondLst>
+                                            <p:cond delay="0"/>
+                                          </p:stCondLst>
+                                        </p:cTn>
+                                        <p:tgtEl>
+                                          <p:spTgt spid="29"/>
+                                        </p:tgtEl>
+                                        <p:attrNameLst>
+                                          <p:attrName>style.visibility</p:attrName>
+                                        </p:attrNameLst>
+                                      </p:cBhvr>
+                                      <p:to>
+                                        <p:strVal val="visible"/>
+                                      </p:to>
+                                    </p:set>
+                                  </p:childTnLst>
+                                </p:cTn>
+                              </p:par>
+                            </p:childTnLst>
+                          </p:cTn>
+                        </p:par>
+                      </p:childTnLst>
+                    </p:cTn>
+                  </p:par>
+                  <p:par>
+                    <p:cTn id="75" fill="hold" nodeType="clickPar">
+                      <p:stCondLst>
+                        <p:cond delay="indefinite"/>
+                      </p:stCondLst>
+                      <p:childTnLst>
+                        <p:par>
+                          <p:cTn id="76" fill="hold" nodeType="withGroup">
+                            <p:stCondLst>
+                              <p:cond delay="0"/>
+                            </p:stCondLst>
+                            <p:childTnLst>
+                              <p:par>
+                                <p:cTn id="77" presetID="1" presetClass="entr" presetSubtype="0" fill="hold" grpId="0" nodeType="clickEffect">
+                                  <p:stCondLst>
+                                    <p:cond delay="0"/>
+                                  </p:stCondLst>
+                                  <p:childTnLst>
+                                    <p:set>
+                                      <p:cBhvr>
+                                        <p:cTn id="78" dur="1" fill="hold">
+                                          <p:stCondLst>
+                                            <p:cond delay="0"/>
+                                          </p:stCondLst>
+                                        </p:cTn>
+                                        <p:tgtEl>
+                                          <p:spTgt spid="17">
+                                            <p:txEl>
+                                              <p:pRg st="8" end="8"/>
+                                            </p:txEl>
+                                          </p:spTgt>
+                                        </p:tgtEl>
+                                        <p:attrNameLst>
+                                          <p:attrName>style.visibility</p:attrName>
+                                        </p:attrNameLst>
+                                      </p:cBhvr>
+                                      <p:to>
+                                        <p:strVal val="visible"/>
+                                      </p:to>
+                                    </p:set>
+                                  </p:childTnLst>
+                                </p:cTn>
+                              </p:par>
+                              <p:par>
+                                <p:cTn id="79" presetID="1" presetClass="entr" presetSubtype="0" fill="hold" grpId="0" nodeType="withEffect">
+                                  <p:stCondLst>
+                                    <p:cond delay="0"/>
+                                  </p:stCondLst>
+                                  <p:childTnLst>
+                                    <p:set>
+                                      <p:cBhvr>
+                                        <p:cTn id="80" dur="1" fill="hold">
+                                          <p:stCondLst>
+                                            <p:cond delay="0"/>
+                                          </p:stCondLst>
+                                        </p:cTn>
+                                        <p:tgtEl>
+                                          <p:spTgt spid="17">
+                                            <p:txEl>
+                                              <p:pRg st="9" end="9"/>
+                                            </p:txEl>
+                                          </p:spTgt>
+                                        </p:tgtEl>
+                                        <p:attrNameLst>
+                                          <p:attrName>style.visibility</p:attrName>
+                                        </p:attrNameLst>
+                                      </p:cBhvr>
+                                      <p:to>
+                                        <p:strVal val="visible"/>
+                                      </p:to>
+                                    </p:set>
+                                  </p:childTnLst>
+                                </p:cTn>
+                              </p:par>
+                              <p:par>
+                                <p:cTn id="81" presetID="1" presetClass="entr" presetSubtype="0" fill="hold" grpId="0" nodeType="withEffect">
+                                  <p:stCondLst>
+                                    <p:cond delay="0"/>
+                                  </p:stCondLst>
+                                  <p:childTnLst>
+                                    <p:set>
+                                      <p:cBhvr>
+                                        <p:cTn id="82" dur="1" fill="hold">
+                                          <p:stCondLst>
+                                            <p:cond delay="0"/>
+                                          </p:stCondLst>
+                                        </p:cTn>
+                                        <p:tgtEl>
+                                          <p:spTgt spid="17">
+                                            <p:txEl>
+                                              <p:pRg st="10" end="10"/>
+                                            </p:txEl>
+                                          </p:spTgt>
+                                        </p:tgtEl>
+                                        <p:attrNameLst>
+                                          <p:attrName>style.visibility</p:attrName>
+                                        </p:attrNameLst>
+                                      </p:cBhvr>
+                                      <p:to>
+                                        <p:strVal val="visible"/>
+                                      </p:to>
+                                    </p:set>
+                                  </p:childTnLst>
+                                </p:cTn>
+                              </p:par>
+                              <p:par>
+                                <p:cTn id="83" presetID="1" presetClass="entr" presetSubtype="0" fill="hold" grpId="0" nodeType="withEffect">
+                                  <p:stCondLst>
+                                    <p:cond delay="0"/>
+                                  </p:stCondLst>
+                                  <p:childTnLst>
+                                    <p:set>
+                                      <p:cBhvr>
+                                        <p:cTn id="84" dur="1" fill="hold">
+                                          <p:stCondLst>
+                                            <p:cond delay="0"/>
+                                          </p:stCondLst>
+                                        </p:cTn>
+                                        <p:tgtEl>
+                                          <p:spTgt spid="17">
+                                            <p:txEl>
+                                              <p:pRg st="11" end="11"/>
+                                            </p:txEl>
+                                          </p:spTgt>
+                                        </p:tgtEl>
+                                        <p:attrNameLst>
+                                          <p:attrName>style.visibility</p:attrName>
+                                        </p:attrNameLst>
+                                      </p:cBhvr>
+                                      <p:to>
+                                        <p:strVal val="visible"/>
+                                      </p:to>
+                                    </p:set>
+                                  </p:childTnLst>
+                                </p:cTn>
+                              </p:par>
+                              <p:par>
+                                <p:cTn id="85" presetID="1" presetClass="entr" presetSubtype="0" fill="hold" grpId="0" nodeType="withEffect">
+                                  <p:stCondLst>
+                                    <p:cond delay="0"/>
+                                  </p:stCondLst>
+                                  <p:childTnLst>
+                                    <p:set>
+                                      <p:cBhvr>
+                                        <p:cTn id="86" dur="1" fill="hold">
+                                          <p:stCondLst>
+                                            <p:cond delay="0"/>
+                                          </p:stCondLst>
+                                        </p:cTn>
+                                        <p:tgtEl>
+                                          <p:spTgt spid="17">
+                                            <p:txEl>
+                                              <p:pRg st="12" end="12"/>
+                                            </p:txEl>
+                                          </p:spTgt>
+                                        </p:tgtEl>
+                                        <p:attrNameLst>
+                                          <p:attrName>style.visibility</p:attrName>
+                                        </p:attrNameLst>
+                                      </p:cBhvr>
+                                      <p:to>
+                                        <p:strVal val="visible"/>
+                                      </p:to>
+                                    </p:set>
+                                  </p:childTnLst>
+                                </p:cTn>
+                              </p:par>
+                              <p:par>
+                                <p:cTn id="87" presetID="1" presetClass="entr" presetSubtype="0" fill="hold" grpId="0" nodeType="withEffect">
+                                  <p:stCondLst>
+                                    <p:cond delay="0"/>
+                                  </p:stCondLst>
+                                  <p:childTnLst>
+                                    <p:set>
+                                      <p:cBhvr>
+                                        <p:cTn id="88" dur="1" fill="hold">
+                                          <p:stCondLst>
+                                            <p:cond delay="0"/>
+                                          </p:stCondLst>
+                                        </p:cTn>
+                                        <p:tgtEl>
+                                          <p:spTgt spid="17">
+                                            <p:txEl>
+                                              <p:pRg st="13" end="13"/>
+                                            </p:txEl>
+                                          </p:spTgt>
+                                        </p:tgtEl>
+                                        <p:attrNameLst>
+                                          <p:attrName>style.visibility</p:attrName>
+                                        </p:attrNameLst>
+                                      </p:cBhvr>
+                                      <p:to>
+                                        <p:strVal val="visible"/>
+                                      </p:to>
+                                    </p:set>
+                                  </p:childTnLst>
+                                </p:cTn>
+                              </p:par>
+                              <p:par>
+                                <p:cTn id="89" presetID="1" presetClass="entr" presetSubtype="0" fill="hold" grpId="0" nodeType="withEffect">
+                                  <p:stCondLst>
+                                    <p:cond delay="0"/>
+                                  </p:stCondLst>
+                                  <p:childTnLst>
+                                    <p:set>
+                                      <p:cBhvr>
+                                        <p:cTn id="90" dur="1" fill="hold">
+                                          <p:stCondLst>
+                                            <p:cond delay="0"/>
+                                          </p:stCondLst>
+                                        </p:cTn>
+                                        <p:tgtEl>
+                                          <p:spTgt spid="30"/>
+                                        </p:tgtEl>
+                                        <p:attrNameLst>
+                                          <p:attrName>style.visibility</p:attrName>
+                                        </p:attrNameLst>
+                                      </p:cBhvr>
+                                      <p:to>
+                                        <p:strVal val="visible"/>
+                                      </p:to>
+                                    </p:set>
+                                  </p:childTnLst>
+                                </p:cTn>
+                              </p:par>
+                            </p:childTnLst>
+                          </p:cTn>
+                        </p:par>
+                      </p:childTnLst>
+                    </p:cTn>
+                  </p:par>
+                </p:childTnLst>
+              </p:cTn>
+              <p:prevCondLst>
+                <p:cond evt="onPrev" delay="0">
+                  <p:tgtEl>
+                    <p:sldTgt/>
+                  </p:tgtEl>
+                </p:cond>
+              </p:prevCondLst>
+              <p:nextCondLst>
+                <p:cond evt="onNext" delay="0">
+                  <p:tgtEl>
+                    <p:sldTgt/>
+                  </p:tgtEl>
+                </p:cond>
+              </p:nextCondLst>
+            </p:seq>
+          </p:childTnLst>
+        </p:cTn>
+      </p:par>
+    </p:tnLst>
+    <p:bldLst>
+      <p:bldP spid="4" grpId="0" animBg="1"/>
+      <p:bldP spid="5" grpId="0" animBg="1"/>
+      <p:bldP spid="6" grpId="0" animBg="1"/>
+      <p:bldP spid="7" grpId="0" animBg="1"/>
+      <p:bldP spid="8" grpId="0" animBg="1"/>
+      <p:bldP spid="9" grpId="0" animBg="1"/>
+      <p:bldP spid="10" grpId="0" animBg="1"/>
+      <p:bldP spid="11" grpId="0" animBg="1"/>
+      <p:bldP spid="12" grpId="0" animBg="1"/>
+      <p:bldP spid="13" grpId="0" animBg="1"/>
+      <p:bldP spid="14" grpId="0" animBg="1"/>
+      <p:bldP spid="15" grpId="0" animBg="1"/>
+      <p:bldP spid="17" grpId="0" build="p"/>
+      <p:bldP spid="18" grpId="0"/>
+      <p:bldP spid="19" grpId="0"/>
+      <p:bldP spid="20" grpId="0"/>
+      <p:bldP spid="21" grpId="0"/>
+      <p:bldP spid="22" grpId="0"/>
+      <p:bldP spid="23" grpId="0"/>
+      <p:bldP spid="24" grpId="0"/>
+      <p:bldP spid="25" grpId="0"/>
+      <p:bldP spid="26" grpId="0"/>
+      <p:bldP spid="27" grpId="0"/>
+      <p:bldP spid="28" grpId="0"/>
+      <p:bldP spid="29" grpId="0"/>
+      <p:bldP spid="30" grpId="0"/>
+    </p:bldLst>
+  </p:timing>
 </p:sld>
 </file>
 

</xml_diff>

<commit_message>
Tag-1_1: Inhalt und Ziel, Agenda, Zeitplan (mit TODOs), Organisation, Literatur und Vorstellung.
</commit_message>
<xml_diff>
--- a/slides/Tag-1_1-Begruessung.pptx
+++ b/slides/Tag-1_1-Begruessung.pptx
@@ -6,19 +6,24 @@
     <p:sldMasterId id="2147483649" r:id="rId2"/>
   </p:sldMasterIdLst>
   <p:notesMasterIdLst>
-    <p:notesMasterId r:id="rId10"/>
+    <p:notesMasterId r:id="rId15"/>
   </p:notesMasterIdLst>
   <p:handoutMasterIdLst>
-    <p:handoutMasterId r:id="rId11"/>
+    <p:handoutMasterId r:id="rId16"/>
   </p:handoutMasterIdLst>
   <p:sldIdLst>
     <p:sldId id="288" r:id="rId3"/>
-    <p:sldId id="289" r:id="rId4"/>
-    <p:sldId id="291" r:id="rId5"/>
-    <p:sldId id="587" r:id="rId6"/>
-    <p:sldId id="324" r:id="rId7"/>
-    <p:sldId id="589" r:id="rId8"/>
-    <p:sldId id="466" r:id="rId9"/>
+    <p:sldId id="587" r:id="rId4"/>
+    <p:sldId id="324" r:id="rId5"/>
+    <p:sldId id="589" r:id="rId6"/>
+    <p:sldId id="466" r:id="rId7"/>
+    <p:sldId id="590" r:id="rId8"/>
+    <p:sldId id="289" r:id="rId9"/>
+    <p:sldId id="291" r:id="rId10"/>
+    <p:sldId id="458" r:id="rId11"/>
+    <p:sldId id="459" r:id="rId12"/>
+    <p:sldId id="461" r:id="rId13"/>
+    <p:sldId id="475" r:id="rId14"/>
   </p:sldIdLst>
   <p:sldSz cx="9144000" cy="6858000" type="screen4x3"/>
   <p:notesSz cx="6784975" cy="9921875"/>
@@ -992,7 +997,7 @@
             <a:fld id="{18182567-388C-4D33-8B7B-A651F195F118}" type="slidenum">
               <a:rPr lang="de-DE" altLang="de-DE" smtClean="0"/>
               <a:pPr/>
-              <a:t>5</a:t>
+              <a:t>3</a:t>
             </a:fld>
             <a:endParaRPr lang="de-DE" altLang="de-DE"/>
           </a:p>
@@ -1077,7 +1082,7 @@
             <a:fld id="{18182567-388C-4D33-8B7B-A651F195F118}" type="slidenum">
               <a:rPr lang="de-DE" altLang="de-DE" smtClean="0"/>
               <a:pPr/>
-              <a:t>6</a:t>
+              <a:t>4</a:t>
             </a:fld>
             <a:endParaRPr lang="de-DE" altLang="de-DE"/>
           </a:p>
@@ -1162,7 +1167,7 @@
             <a:fld id="{18182567-388C-4D33-8B7B-A651F195F118}" type="slidenum">
               <a:rPr lang="de-DE" altLang="de-DE" smtClean="0"/>
               <a:pPr/>
-              <a:t>7</a:t>
+              <a:t>5</a:t>
             </a:fld>
             <a:endParaRPr lang="de-DE" altLang="de-DE"/>
           </a:p>
@@ -1172,6 +1177,176 @@
     <p:extLst>
       <p:ext uri="{BB962C8B-B14F-4D97-AF65-F5344CB8AC3E}">
         <p14:creationId xmlns:p14="http://schemas.microsoft.com/office/powerpoint/2010/main" val="727468044"/>
+      </p:ext>
+    </p:extLst>
+  </p:cSld>
+  <p:clrMapOvr>
+    <a:masterClrMapping/>
+  </p:clrMapOvr>
+</p:notes>
+</file>
+
+<file path=ppt/notesSlides/notesSlide4.xml><?xml version="1.0" encoding="utf-8"?>
+<p:notes xmlns:a="http://schemas.openxmlformats.org/drawingml/2006/main" xmlns:r="http://schemas.openxmlformats.org/officeDocument/2006/relationships" xmlns:p="http://schemas.openxmlformats.org/presentationml/2006/main">
+  <p:cSld>
+    <p:spTree>
+      <p:nvGrpSpPr>
+        <p:cNvPr id="1" name=""/>
+        <p:cNvGrpSpPr/>
+        <p:nvPr/>
+      </p:nvGrpSpPr>
+      <p:grpSpPr>
+        <a:xfrm>
+          <a:off x="0" y="0"/>
+          <a:ext cx="0" cy="0"/>
+          <a:chOff x="0" y="0"/>
+          <a:chExt cx="0" cy="0"/>
+        </a:xfrm>
+      </p:grpSpPr>
+      <p:sp>
+        <p:nvSpPr>
+          <p:cNvPr id="2" name="Folienbildplatzhalter 1"/>
+          <p:cNvSpPr>
+            <a:spLocks noGrp="1" noRot="1" noChangeAspect="1"/>
+          </p:cNvSpPr>
+          <p:nvPr>
+            <p:ph type="sldImg"/>
+          </p:nvPr>
+        </p:nvSpPr>
+        <p:spPr/>
+      </p:sp>
+      <p:sp>
+        <p:nvSpPr>
+          <p:cNvPr id="3" name="Notizenplatzhalter 2"/>
+          <p:cNvSpPr>
+            <a:spLocks noGrp="1"/>
+          </p:cNvSpPr>
+          <p:nvPr>
+            <p:ph type="body" idx="1"/>
+          </p:nvPr>
+        </p:nvSpPr>
+        <p:spPr/>
+        <p:txBody>
+          <a:bodyPr/>
+          <a:lstStyle/>
+          <a:p>
+            <a:endParaRPr lang="de-DE" dirty="0"/>
+          </a:p>
+        </p:txBody>
+      </p:sp>
+      <p:sp>
+        <p:nvSpPr>
+          <p:cNvPr id="4" name="Foliennummernplatzhalter 3"/>
+          <p:cNvSpPr>
+            <a:spLocks noGrp="1"/>
+          </p:cNvSpPr>
+          <p:nvPr>
+            <p:ph type="sldNum" sz="quarter" idx="5"/>
+          </p:nvPr>
+        </p:nvSpPr>
+        <p:spPr/>
+        <p:txBody>
+          <a:bodyPr/>
+          <a:lstStyle/>
+          <a:p>
+            <a:fld id="{18182567-388C-4D33-8B7B-A651F195F118}" type="slidenum">
+              <a:rPr lang="de-DE" altLang="de-DE" smtClean="0"/>
+              <a:pPr/>
+              <a:t>6</a:t>
+            </a:fld>
+            <a:endParaRPr lang="de-DE" altLang="de-DE"/>
+          </a:p>
+        </p:txBody>
+      </p:sp>
+    </p:spTree>
+    <p:extLst>
+      <p:ext uri="{BB962C8B-B14F-4D97-AF65-F5344CB8AC3E}">
+        <p14:creationId xmlns:p14="http://schemas.microsoft.com/office/powerpoint/2010/main" val="3851487306"/>
+      </p:ext>
+    </p:extLst>
+  </p:cSld>
+  <p:clrMapOvr>
+    <a:masterClrMapping/>
+  </p:clrMapOvr>
+</p:notes>
+</file>
+
+<file path=ppt/notesSlides/notesSlide5.xml><?xml version="1.0" encoding="utf-8"?>
+<p:notes xmlns:a="http://schemas.openxmlformats.org/drawingml/2006/main" xmlns:r="http://schemas.openxmlformats.org/officeDocument/2006/relationships" xmlns:p="http://schemas.openxmlformats.org/presentationml/2006/main">
+  <p:cSld>
+    <p:spTree>
+      <p:nvGrpSpPr>
+        <p:cNvPr id="1" name=""/>
+        <p:cNvGrpSpPr/>
+        <p:nvPr/>
+      </p:nvGrpSpPr>
+      <p:grpSpPr>
+        <a:xfrm>
+          <a:off x="0" y="0"/>
+          <a:ext cx="0" cy="0"/>
+          <a:chOff x="0" y="0"/>
+          <a:chExt cx="0" cy="0"/>
+        </a:xfrm>
+      </p:grpSpPr>
+      <p:sp>
+        <p:nvSpPr>
+          <p:cNvPr id="2" name="Folienbildplatzhalter 1"/>
+          <p:cNvSpPr>
+            <a:spLocks noGrp="1" noRot="1" noChangeAspect="1"/>
+          </p:cNvSpPr>
+          <p:nvPr>
+            <p:ph type="sldImg"/>
+          </p:nvPr>
+        </p:nvSpPr>
+        <p:spPr/>
+      </p:sp>
+      <p:sp>
+        <p:nvSpPr>
+          <p:cNvPr id="3" name="Notizenplatzhalter 2"/>
+          <p:cNvSpPr>
+            <a:spLocks noGrp="1"/>
+          </p:cNvSpPr>
+          <p:nvPr>
+            <p:ph type="body" idx="1"/>
+          </p:nvPr>
+        </p:nvSpPr>
+        <p:spPr/>
+        <p:txBody>
+          <a:bodyPr/>
+          <a:lstStyle/>
+          <a:p>
+            <a:endParaRPr lang="de-DE" dirty="0"/>
+          </a:p>
+        </p:txBody>
+      </p:sp>
+      <p:sp>
+        <p:nvSpPr>
+          <p:cNvPr id="4" name="Foliennummernplatzhalter 3"/>
+          <p:cNvSpPr>
+            <a:spLocks noGrp="1"/>
+          </p:cNvSpPr>
+          <p:nvPr>
+            <p:ph type="sldNum" sz="quarter" idx="5"/>
+          </p:nvPr>
+        </p:nvSpPr>
+        <p:spPr/>
+        <p:txBody>
+          <a:bodyPr/>
+          <a:lstStyle/>
+          <a:p>
+            <a:fld id="{18182567-388C-4D33-8B7B-A651F195F118}" type="slidenum">
+              <a:rPr lang="de-DE" altLang="de-DE" smtClean="0"/>
+              <a:pPr/>
+              <a:t>12</a:t>
+            </a:fld>
+            <a:endParaRPr lang="de-DE" altLang="de-DE"/>
+          </a:p>
+        </p:txBody>
+      </p:sp>
+    </p:spTree>
+    <p:extLst>
+      <p:ext uri="{BB962C8B-B14F-4D97-AF65-F5344CB8AC3E}">
+        <p14:creationId xmlns:p14="http://schemas.microsoft.com/office/powerpoint/2010/main" val="3922998751"/>
       </p:ext>
     </p:extLst>
   </p:cSld>
@@ -2041,7 +2216,7 @@
         <p:spPr bwMode="auto">
           <a:xfrm>
             <a:off x="4252913" y="6424613"/>
-            <a:ext cx="2860078" cy="246221"/>
+            <a:ext cx="1699504" cy="246221"/>
           </a:xfrm>
           <a:prstGeom prst="rect">
             <a:avLst/>
@@ -2071,7 +2246,7 @@
                 </a:solidFill>
                 <a:latin typeface="Arial" charset="0"/>
               </a:rPr>
-              <a:t>Tag-3_2-GitLab-Runner-Container-Registry.ppt</a:t>
+              <a:t>Tag-1_1-Begruessung.ppt</a:t>
             </a:r>
             <a:endParaRPr lang="de-DE" dirty="0">
               <a:solidFill>
@@ -3922,7 +4097,7 @@
 </p:sld>
 </file>
 
-<file path=ppt/slides/slide2.xml><?xml version="1.0" encoding="utf-8"?>
+<file path=ppt/slides/slide10.xml><?xml version="1.0" encoding="utf-8"?>
 <p:sld xmlns:a="http://schemas.openxmlformats.org/drawingml/2006/main" xmlns:r="http://schemas.openxmlformats.org/officeDocument/2006/relationships" xmlns:p="http://schemas.openxmlformats.org/presentationml/2006/main">
   <p:cSld>
     <p:spTree>
@@ -3941,13 +4116,7 @@
       </p:grpSpPr>
       <p:sp>
         <p:nvSpPr>
-          <p:cNvPr id="6146" name="Inhaltsplatzhalter 18">
-            <a:extLst>
-              <a:ext uri="{FF2B5EF4-FFF2-40B4-BE49-F238E27FC236}">
-                <a16:creationId xmlns:a16="http://schemas.microsoft.com/office/drawing/2014/main" id="{BE3C4C95-FD5D-27F0-ED0C-AB8113CAC9F1}"/>
-              </a:ext>
-            </a:extLst>
-          </p:cNvPr>
+          <p:cNvPr id="17410" name="Inhaltsplatzhalter 2"/>
           <p:cNvSpPr>
             <a:spLocks noGrp="1"/>
           </p:cNvSpPr>
@@ -3955,331 +4124,139 @@
             <p:ph idx="1"/>
           </p:nvPr>
         </p:nvSpPr>
-        <p:spPr/>
+        <p:spPr>
+          <a:xfrm>
+            <a:off x="303213" y="1462108"/>
+            <a:ext cx="8589962" cy="4824412"/>
+          </a:xfrm>
+        </p:spPr>
         <p:txBody>
           <a:bodyPr/>
           <a:lstStyle/>
           <a:p>
             <a:pPr>
-              <a:buFont typeface="Arial" panose="020B0604020202020204" pitchFamily="34" charset="0"/>
-              <a:buChar char="•"/>
-            </a:pPr>
-            <a:endParaRPr lang="de-DE" altLang="de-DE" sz="1800" b="1" dirty="0"/>
-          </a:p>
-          <a:p>
-            <a:pPr>
-              <a:buFont typeface="Arial" panose="020B0604020202020204" pitchFamily="34" charset="0"/>
-              <a:buChar char="•"/>
-            </a:pPr>
-            <a:r>
-              <a:rPr lang="de-DE" altLang="de-DE" sz="1800" b="1" dirty="0"/>
-              <a:t>Tag 1 – Einführung in </a:t>
-            </a:r>
-            <a:r>
-              <a:rPr lang="de-DE" altLang="de-DE" sz="1800" b="1" dirty="0" err="1"/>
-              <a:t>Git</a:t>
-            </a:r>
-            <a:r>
-              <a:rPr lang="de-DE" altLang="de-DE" sz="1800" b="1" dirty="0"/>
-              <a:t> und </a:t>
-            </a:r>
-            <a:r>
-              <a:rPr lang="de-DE" altLang="de-DE" sz="1800" b="1" dirty="0" err="1"/>
-              <a:t>GitLab</a:t>
-            </a:r>
-            <a:r>
-              <a:rPr lang="de-DE" altLang="de-DE" sz="1800" b="1" dirty="0"/>
-              <a:t>, </a:t>
-            </a:r>
-            <a:r>
-              <a:rPr lang="de-DE" altLang="de-DE" sz="1800" b="1" dirty="0" err="1"/>
-              <a:t>Git</a:t>
-            </a:r>
-            <a:r>
-              <a:rPr lang="de-DE" altLang="de-DE" sz="1800" b="1" dirty="0"/>
-              <a:t>-Workflow im Team</a:t>
-            </a:r>
-          </a:p>
-          <a:p>
-            <a:pPr lvl="1">
-              <a:buFont typeface="Arial" panose="020B0604020202020204" pitchFamily="34" charset="0"/>
-              <a:buChar char="•"/>
-            </a:pPr>
-            <a:r>
-              <a:rPr lang="de-DE" altLang="de-DE" sz="1400" dirty="0"/>
-              <a:t>Einführung &amp; Kursüberblick</a:t>
-            </a:r>
-          </a:p>
-          <a:p>
-            <a:pPr lvl="1">
-              <a:buFont typeface="Arial" panose="020B0604020202020204" pitchFamily="34" charset="0"/>
-              <a:buChar char="•"/>
-            </a:pPr>
-            <a:r>
-              <a:rPr lang="de-DE" altLang="de-DE" sz="1400" dirty="0"/>
-              <a:t>Grundlagen von </a:t>
-            </a:r>
-            <a:r>
-              <a:rPr lang="de-DE" altLang="de-DE" sz="1400" dirty="0" err="1"/>
-              <a:t>Git</a:t>
-            </a:r>
-            <a:r>
-              <a:rPr lang="de-DE" altLang="de-DE" sz="1400" dirty="0"/>
-              <a:t> und </a:t>
-            </a:r>
-            <a:r>
-              <a:rPr lang="de-DE" altLang="de-DE" sz="1400" dirty="0" err="1"/>
-              <a:t>GitLab</a:t>
-            </a:r>
-            <a:endParaRPr lang="de-DE" altLang="de-DE" sz="1400" dirty="0"/>
-          </a:p>
-          <a:p>
-            <a:pPr lvl="1">
-              <a:buFont typeface="Arial" panose="020B0604020202020204" pitchFamily="34" charset="0"/>
-              <a:buChar char="•"/>
-            </a:pPr>
-            <a:r>
-              <a:rPr lang="de-DE" altLang="de-DE" sz="1400" dirty="0" err="1"/>
-              <a:t>Git</a:t>
-            </a:r>
-            <a:r>
-              <a:rPr lang="de-DE" altLang="de-DE" sz="1400" dirty="0"/>
-              <a:t> </a:t>
-            </a:r>
-            <a:r>
-              <a:rPr lang="de-DE" altLang="de-DE" sz="1400" dirty="0" err="1"/>
-              <a:t>Rebase</a:t>
-            </a:r>
-            <a:r>
-              <a:rPr lang="de-DE" altLang="de-DE" sz="1400" dirty="0"/>
-              <a:t> &amp; </a:t>
-            </a:r>
-            <a:r>
-              <a:rPr lang="de-DE" altLang="de-DE" sz="1400" dirty="0" err="1"/>
-              <a:t>Merge</a:t>
-            </a:r>
-            <a:r>
-              <a:rPr lang="de-DE" altLang="de-DE" sz="1400" dirty="0"/>
-              <a:t>-Strategien</a:t>
-            </a:r>
-          </a:p>
-          <a:p>
-            <a:pPr lvl="1">
-              <a:buFont typeface="Arial" panose="020B0604020202020204" pitchFamily="34" charset="0"/>
-              <a:buChar char="•"/>
-            </a:pPr>
-            <a:r>
-              <a:rPr lang="de-DE" altLang="de-DE" sz="1400" dirty="0" err="1"/>
-              <a:t>Git</a:t>
-            </a:r>
-            <a:r>
-              <a:rPr lang="de-DE" altLang="de-DE" sz="1400" dirty="0"/>
-              <a:t>-Workflow im Team</a:t>
-            </a:r>
-          </a:p>
-          <a:p>
-            <a:pPr lvl="1">
-              <a:buFont typeface="Arial" panose="020B0604020202020204" pitchFamily="34" charset="0"/>
-              <a:buChar char="•"/>
-            </a:pPr>
-            <a:endParaRPr lang="de-DE" altLang="de-DE" sz="1400" dirty="0"/>
-          </a:p>
-          <a:p>
-            <a:pPr>
-              <a:buFont typeface="Arial" panose="020B0604020202020204" pitchFamily="34" charset="0"/>
-              <a:buChar char="•"/>
-            </a:pPr>
-            <a:r>
-              <a:rPr lang="de-DE" altLang="de-DE" sz="1800" b="1" dirty="0"/>
-              <a:t>Tag 2 – Vertiefung </a:t>
-            </a:r>
-            <a:r>
-              <a:rPr lang="de-DE" altLang="de-DE" sz="1800" b="1" dirty="0" err="1"/>
-              <a:t>Git</a:t>
-            </a:r>
-            <a:r>
-              <a:rPr lang="de-DE" altLang="de-DE" sz="1800" b="1" dirty="0"/>
-              <a:t>-Workflow, CI/CD &amp; </a:t>
-            </a:r>
-            <a:r>
-              <a:rPr lang="de-DE" altLang="de-DE" sz="1800" b="1" dirty="0" err="1"/>
-              <a:t>GitOps</a:t>
-            </a:r>
-            <a:endParaRPr lang="de-DE" altLang="de-DE" sz="1800" b="1" dirty="0"/>
-          </a:p>
-          <a:p>
-            <a:pPr lvl="1">
-              <a:buFont typeface="Arial" panose="020B0604020202020204" pitchFamily="34" charset="0"/>
-              <a:buChar char="•"/>
-            </a:pPr>
-            <a:r>
-              <a:rPr lang="de-DE" altLang="de-DE" sz="1400" dirty="0" err="1"/>
-              <a:t>Gitflow</a:t>
-            </a:r>
-            <a:r>
-              <a:rPr lang="de-DE" altLang="de-DE" sz="1400" dirty="0"/>
-              <a:t>-Workflow</a:t>
-            </a:r>
-          </a:p>
-          <a:p>
-            <a:pPr lvl="1">
-              <a:buFont typeface="Arial" panose="020B0604020202020204" pitchFamily="34" charset="0"/>
-              <a:buChar char="•"/>
-            </a:pPr>
-            <a:r>
-              <a:rPr lang="de-DE" altLang="de-DE" sz="1400" dirty="0"/>
-              <a:t>Tags, Releases &amp; deren Verwaltung</a:t>
-            </a:r>
-          </a:p>
-          <a:p>
-            <a:pPr lvl="1">
-              <a:buFont typeface="Arial" panose="020B0604020202020204" pitchFamily="34" charset="0"/>
-              <a:buChar char="•"/>
-            </a:pPr>
-            <a:r>
-              <a:rPr lang="de-DE" altLang="de-DE" sz="1400" dirty="0"/>
-              <a:t>Einführung in </a:t>
-            </a:r>
-            <a:r>
-              <a:rPr lang="de-DE" altLang="de-DE" sz="1400" dirty="0" err="1"/>
-              <a:t>GitLab</a:t>
-            </a:r>
-            <a:r>
-              <a:rPr lang="de-DE" altLang="de-DE" sz="1400" dirty="0"/>
-              <a:t> CI/CD &amp; </a:t>
-            </a:r>
-            <a:r>
-              <a:rPr lang="de-DE" altLang="de-DE" sz="1400" dirty="0" err="1"/>
-              <a:t>gitlab.yml</a:t>
-            </a:r>
-            <a:endParaRPr lang="de-DE" altLang="de-DE" sz="1400" dirty="0"/>
-          </a:p>
-          <a:p>
-            <a:pPr lvl="1">
-              <a:buFont typeface="Arial" panose="020B0604020202020204" pitchFamily="34" charset="0"/>
-              <a:buChar char="•"/>
-            </a:pPr>
-            <a:r>
-              <a:rPr lang="de-DE" altLang="de-DE" sz="1400" dirty="0"/>
-              <a:t>Grundlagen von </a:t>
-            </a:r>
-            <a:r>
-              <a:rPr lang="de-DE" altLang="de-DE" sz="1400" dirty="0" err="1"/>
-              <a:t>GitOps</a:t>
-            </a:r>
-            <a:endParaRPr lang="de-DE" altLang="de-DE" sz="1400" dirty="0"/>
-          </a:p>
-          <a:p>
-            <a:pPr lvl="1">
-              <a:buFont typeface="Arial" panose="020B0604020202020204" pitchFamily="34" charset="0"/>
-              <a:buChar char="•"/>
-            </a:pPr>
-            <a:endParaRPr lang="de-DE" altLang="de-DE" sz="1400" dirty="0"/>
-          </a:p>
-          <a:p>
-            <a:pPr>
-              <a:buFont typeface="Arial" panose="020B0604020202020204" pitchFamily="34" charset="0"/>
-              <a:buChar char="•"/>
-            </a:pPr>
-            <a:r>
-              <a:rPr lang="de-DE" altLang="de-DE" sz="1800" b="1" dirty="0"/>
-              <a:t>Tag 3 – Docker in der Entwicklung, </a:t>
-            </a:r>
-            <a:r>
-              <a:rPr lang="de-DE" altLang="de-DE" sz="1800" b="1" dirty="0" err="1"/>
-              <a:t>GitLab</a:t>
-            </a:r>
-            <a:r>
-              <a:rPr lang="de-DE" altLang="de-DE" sz="1800" b="1" dirty="0"/>
-              <a:t> CI und </a:t>
-            </a:r>
-            <a:r>
-              <a:rPr lang="de-DE" altLang="de-DE" sz="1800" b="1" dirty="0" err="1"/>
-              <a:t>Deployment</a:t>
-            </a:r>
-            <a:r>
-              <a:rPr lang="de-DE" altLang="de-DE" sz="1800" b="1" dirty="0"/>
-              <a:t>-Strategien</a:t>
-            </a:r>
-          </a:p>
-          <a:p>
-            <a:pPr lvl="1">
-              <a:buFont typeface="Arial" panose="020B0604020202020204" pitchFamily="34" charset="0"/>
-              <a:buChar char="•"/>
-            </a:pPr>
-            <a:r>
-              <a:rPr lang="de-DE" altLang="de-DE" sz="1400" dirty="0"/>
-              <a:t>Lokale Entwicklung mit Docker</a:t>
-            </a:r>
-          </a:p>
-          <a:p>
-            <a:pPr lvl="1">
-              <a:buFont typeface="Arial" panose="020B0604020202020204" pitchFamily="34" charset="0"/>
-              <a:buChar char="•"/>
-            </a:pPr>
-            <a:r>
-              <a:rPr lang="de-DE" altLang="de-DE" sz="1400" dirty="0" err="1"/>
-              <a:t>GitLab</a:t>
-            </a:r>
-            <a:r>
-              <a:rPr lang="de-DE" altLang="de-DE" sz="1400" dirty="0"/>
-              <a:t>-Runner &amp; Docker-Registry</a:t>
-            </a:r>
-          </a:p>
-          <a:p>
-            <a:pPr lvl="1">
-              <a:buFont typeface="Arial" panose="020B0604020202020204" pitchFamily="34" charset="0"/>
-              <a:buChar char="•"/>
-            </a:pPr>
-            <a:r>
-              <a:rPr lang="de-DE" altLang="de-DE" sz="1400" dirty="0"/>
-              <a:t>Erstellen von Release- und </a:t>
-            </a:r>
-            <a:r>
-              <a:rPr lang="de-DE" altLang="de-DE" sz="1400" dirty="0" err="1"/>
-              <a:t>Tagged</a:t>
-            </a:r>
-            <a:r>
-              <a:rPr lang="de-DE" altLang="de-DE" sz="1400" dirty="0"/>
-              <a:t>-Images</a:t>
-            </a:r>
-          </a:p>
-          <a:p>
-            <a:pPr lvl="1">
-              <a:buFont typeface="Arial" panose="020B0604020202020204" pitchFamily="34" charset="0"/>
-              <a:buChar char="•"/>
-            </a:pPr>
-            <a:r>
-              <a:rPr lang="de-DE" altLang="de-DE" sz="1400" dirty="0"/>
-              <a:t>Möglichkeiten des </a:t>
-            </a:r>
-            <a:r>
-              <a:rPr lang="de-DE" altLang="de-DE" sz="1400" dirty="0" err="1"/>
-              <a:t>Deployments</a:t>
-            </a:r>
-            <a:r>
-              <a:rPr lang="de-DE" altLang="de-DE" sz="1400" dirty="0"/>
-              <a:t> &amp; Verwaltung von Konfiguration</a:t>
-            </a:r>
-          </a:p>
-          <a:p>
-            <a:pPr lvl="1">
-              <a:buFont typeface="Arial" panose="020B0604020202020204" pitchFamily="34" charset="0"/>
-              <a:buChar char="•"/>
-            </a:pPr>
-            <a:endParaRPr lang="de-DE" altLang="de-DE" sz="1400" dirty="0"/>
+              <a:buNone/>
+            </a:pPr>
+            <a:r>
+              <a:rPr lang="de-DE" sz="2000" b="1" dirty="0"/>
+              <a:t>Vorgehen</a:t>
+            </a:r>
+          </a:p>
+          <a:p>
+            <a:pPr marL="342900" lvl="1" indent="-342900">
+              <a:buFont typeface="Arial" charset="0"/>
+              <a:buChar char="●"/>
+            </a:pPr>
+            <a:r>
+              <a:rPr lang="de-DE" altLang="de-DE" dirty="0">
+                <a:ea typeface="+mn-ea"/>
+                <a:cs typeface="+mn-cs"/>
+              </a:rPr>
+              <a:t>Präsentation und Übung im Wechsel</a:t>
+            </a:r>
+          </a:p>
+          <a:p>
+            <a:pPr marL="342900" lvl="1" indent="-342900">
+              <a:buFont typeface="Arial" charset="0"/>
+              <a:buChar char="●"/>
+            </a:pPr>
+            <a:r>
+              <a:rPr lang="de-DE" altLang="de-DE" dirty="0">
+                <a:ea typeface="+mn-ea"/>
+                <a:cs typeface="+mn-cs"/>
+              </a:rPr>
+              <a:t>Besprechung der Musterlösungen</a:t>
+            </a:r>
+          </a:p>
+          <a:p>
+            <a:pPr marL="0" lvl="1" indent="0">
+              <a:buNone/>
+            </a:pPr>
+            <a:endParaRPr lang="de-DE" altLang="de-DE" dirty="0">
+              <a:ea typeface="+mn-ea"/>
+              <a:cs typeface="+mn-cs"/>
+            </a:endParaRPr>
+          </a:p>
+          <a:p>
+            <a:pPr marL="0" lvl="1" indent="0">
+              <a:buNone/>
+            </a:pPr>
+            <a:r>
+              <a:rPr lang="de-DE" altLang="de-DE" b="1" dirty="0">
+                <a:ea typeface="+mn-ea"/>
+                <a:cs typeface="+mn-cs"/>
+              </a:rPr>
+              <a:t>Unterlagen</a:t>
+            </a:r>
+          </a:p>
+          <a:p>
+            <a:pPr marL="342900" lvl="1" indent="-342900">
+              <a:buFont typeface="Arial" charset="0"/>
+              <a:buChar char="●"/>
+            </a:pPr>
+            <a:r>
+              <a:rPr lang="de-DE" altLang="de-DE" dirty="0">
+                <a:ea typeface="+mn-ea"/>
+                <a:cs typeface="+mn-cs"/>
+              </a:rPr>
+              <a:t>Folien</a:t>
+            </a:r>
+          </a:p>
+          <a:p>
+            <a:pPr marL="342900" lvl="1" indent="-342900">
+              <a:buFont typeface="Arial" charset="0"/>
+              <a:buChar char="●"/>
+            </a:pPr>
+            <a:r>
+              <a:rPr lang="de-DE" altLang="de-DE" dirty="0">
+                <a:ea typeface="+mn-ea"/>
+                <a:cs typeface="+mn-cs"/>
+              </a:rPr>
+              <a:t>Musterlösung</a:t>
+            </a:r>
+          </a:p>
+          <a:p>
+            <a:pPr marL="342900" lvl="1" indent="-342900">
+              <a:buFont typeface="Arial" charset="0"/>
+              <a:buChar char="●"/>
+            </a:pPr>
+            <a:endParaRPr lang="de-DE" altLang="de-DE" dirty="0">
+              <a:ea typeface="+mn-ea"/>
+              <a:cs typeface="+mn-cs"/>
+            </a:endParaRPr>
+          </a:p>
+          <a:p>
+            <a:pPr marL="342900" lvl="1" indent="-342900">
+              <a:buFont typeface="Arial" charset="0"/>
+              <a:buChar char="●"/>
+            </a:pPr>
+            <a:r>
+              <a:rPr lang="de-DE" altLang="de-DE" dirty="0">
+                <a:ea typeface="+mn-ea"/>
+                <a:cs typeface="+mn-cs"/>
+              </a:rPr>
+              <a:t>GitHub bereitstellen? </a:t>
+            </a:r>
+            <a:r>
+              <a:rPr lang="de-DE" altLang="de-DE" dirty="0">
+                <a:highlight>
+                  <a:srgbClr val="FFFF00"/>
+                </a:highlight>
+                <a:ea typeface="+mn-ea"/>
+                <a:cs typeface="+mn-cs"/>
+              </a:rPr>
+              <a:t>TODO PUngewiß</a:t>
+            </a:r>
+            <a:endParaRPr lang="de-DE" altLang="de-DE" dirty="0">
+              <a:ea typeface="+mn-ea"/>
+              <a:cs typeface="+mn-cs"/>
+            </a:endParaRPr>
           </a:p>
         </p:txBody>
       </p:sp>
       <p:sp>
         <p:nvSpPr>
-          <p:cNvPr id="6147" name="Rectangle 1062">
-            <a:extLst>
-              <a:ext uri="{FF2B5EF4-FFF2-40B4-BE49-F238E27FC236}">
-                <a16:creationId xmlns:a16="http://schemas.microsoft.com/office/drawing/2014/main" id="{C46E9340-3256-8D55-A265-94F2F41E288E}"/>
-              </a:ext>
-            </a:extLst>
-          </p:cNvPr>
+          <p:cNvPr id="17411" name="Rectangle 1062"/>
           <p:cNvSpPr>
             <a:spLocks noGrp="1" noChangeArrowheads="1"/>
           </p:cNvSpPr>
@@ -4298,398 +4275,8 @@
           <a:lstStyle/>
           <a:p>
             <a:r>
-              <a:rPr lang="de-DE" altLang="de-DE" dirty="0"/>
-              <a:t>Agenda</a:t>
-            </a:r>
-          </a:p>
-        </p:txBody>
-      </p:sp>
-    </p:spTree>
-  </p:cSld>
-  <p:clrMapOvr>
-    <a:masterClrMapping/>
-  </p:clrMapOvr>
-</p:sld>
-</file>
-
-<file path=ppt/slides/slide3.xml><?xml version="1.0" encoding="utf-8"?>
-<p:sld xmlns:a="http://schemas.openxmlformats.org/drawingml/2006/main" xmlns:r="http://schemas.openxmlformats.org/officeDocument/2006/relationships" xmlns:p="http://schemas.openxmlformats.org/presentationml/2006/main">
-  <p:cSld>
-    <p:spTree>
-      <p:nvGrpSpPr>
-        <p:cNvPr id="1" name=""/>
-        <p:cNvGrpSpPr/>
-        <p:nvPr/>
-      </p:nvGrpSpPr>
-      <p:grpSpPr>
-        <a:xfrm>
-          <a:off x="0" y="0"/>
-          <a:ext cx="0" cy="0"/>
-          <a:chOff x="0" y="0"/>
-          <a:chExt cx="0" cy="0"/>
-        </a:xfrm>
-      </p:grpSpPr>
-      <p:sp>
-        <p:nvSpPr>
-          <p:cNvPr id="6146" name="Inhaltsplatzhalter 18">
-            <a:extLst>
-              <a:ext uri="{FF2B5EF4-FFF2-40B4-BE49-F238E27FC236}">
-                <a16:creationId xmlns:a16="http://schemas.microsoft.com/office/drawing/2014/main" id="{BE3C4C95-FD5D-27F0-ED0C-AB8113CAC9F1}"/>
-              </a:ext>
-            </a:extLst>
-          </p:cNvPr>
-          <p:cNvSpPr>
-            <a:spLocks noGrp="1"/>
-          </p:cNvSpPr>
-          <p:nvPr>
-            <p:ph idx="1"/>
-          </p:nvPr>
-        </p:nvSpPr>
-        <p:spPr/>
-        <p:txBody>
-          <a:bodyPr/>
-          <a:lstStyle/>
-          <a:p>
-            <a:pPr>
-              <a:buFont typeface="Arial" panose="020B0604020202020204" pitchFamily="34" charset="0"/>
-              <a:buChar char="•"/>
-            </a:pPr>
-            <a:endParaRPr lang="de-DE" altLang="de-DE" sz="1800" b="1" dirty="0"/>
-          </a:p>
-          <a:p>
-            <a:pPr>
-              <a:buFont typeface="Arial" panose="020B0604020202020204" pitchFamily="34" charset="0"/>
-              <a:buChar char="•"/>
-            </a:pPr>
-            <a:r>
-              <a:rPr lang="de-DE" altLang="de-DE" sz="1800" b="1" dirty="0"/>
-              <a:t>Tag 1 – Einführung in </a:t>
-            </a:r>
-            <a:r>
-              <a:rPr lang="de-DE" altLang="de-DE" sz="1800" b="1" dirty="0" err="1"/>
-              <a:t>Git</a:t>
-            </a:r>
-            <a:r>
-              <a:rPr lang="de-DE" altLang="de-DE" sz="1800" b="1" dirty="0"/>
-              <a:t> und </a:t>
-            </a:r>
-            <a:r>
-              <a:rPr lang="de-DE" altLang="de-DE" sz="1800" b="1" dirty="0" err="1"/>
-              <a:t>GitLab</a:t>
-            </a:r>
-            <a:r>
-              <a:rPr lang="de-DE" altLang="de-DE" sz="1800" b="1" dirty="0"/>
-              <a:t>, </a:t>
-            </a:r>
-            <a:r>
-              <a:rPr lang="de-DE" altLang="de-DE" sz="1800" b="1" dirty="0" err="1"/>
-              <a:t>Git</a:t>
-            </a:r>
-            <a:r>
-              <a:rPr lang="de-DE" altLang="de-DE" sz="1800" b="1" dirty="0"/>
-              <a:t>-Workflow im Team</a:t>
-            </a:r>
-          </a:p>
-          <a:p>
-            <a:pPr lvl="1">
-              <a:buFont typeface="Arial" panose="020B0604020202020204" pitchFamily="34" charset="0"/>
-              <a:buChar char="•"/>
-            </a:pPr>
-            <a:r>
-              <a:rPr lang="de-DE" altLang="de-DE" sz="1400" u="sng" dirty="0"/>
-              <a:t>Einführung &amp; Kursüberblick</a:t>
-            </a:r>
-          </a:p>
-          <a:p>
-            <a:pPr lvl="1">
-              <a:buFont typeface="Arial" panose="020B0604020202020204" pitchFamily="34" charset="0"/>
-              <a:buChar char="•"/>
-            </a:pPr>
-            <a:r>
-              <a:rPr lang="de-DE" altLang="de-DE" sz="1400" dirty="0"/>
-              <a:t>Grundlagen von </a:t>
-            </a:r>
-            <a:r>
-              <a:rPr lang="de-DE" altLang="de-DE" sz="1400" dirty="0" err="1"/>
-              <a:t>Git</a:t>
-            </a:r>
-            <a:r>
-              <a:rPr lang="de-DE" altLang="de-DE" sz="1400" dirty="0"/>
-              <a:t> und </a:t>
-            </a:r>
-            <a:r>
-              <a:rPr lang="de-DE" altLang="de-DE" sz="1400" dirty="0" err="1"/>
-              <a:t>GitLab</a:t>
-            </a:r>
-            <a:endParaRPr lang="de-DE" altLang="de-DE" sz="1400" dirty="0"/>
-          </a:p>
-          <a:p>
-            <a:pPr lvl="1">
-              <a:buFont typeface="Arial" panose="020B0604020202020204" pitchFamily="34" charset="0"/>
-              <a:buChar char="•"/>
-            </a:pPr>
-            <a:r>
-              <a:rPr lang="de-DE" altLang="de-DE" sz="1400" dirty="0" err="1"/>
-              <a:t>Git</a:t>
-            </a:r>
-            <a:r>
-              <a:rPr lang="de-DE" altLang="de-DE" sz="1400" dirty="0"/>
-              <a:t> </a:t>
-            </a:r>
-            <a:r>
-              <a:rPr lang="de-DE" altLang="de-DE" sz="1400" dirty="0" err="1"/>
-              <a:t>Rebase</a:t>
-            </a:r>
-            <a:r>
-              <a:rPr lang="de-DE" altLang="de-DE" sz="1400" dirty="0"/>
-              <a:t> &amp; </a:t>
-            </a:r>
-            <a:r>
-              <a:rPr lang="de-DE" altLang="de-DE" sz="1400" dirty="0" err="1"/>
-              <a:t>Merge</a:t>
-            </a:r>
-            <a:r>
-              <a:rPr lang="de-DE" altLang="de-DE" sz="1400" dirty="0"/>
-              <a:t>-Strategien</a:t>
-            </a:r>
-          </a:p>
-          <a:p>
-            <a:pPr lvl="1">
-              <a:buFont typeface="Arial" panose="020B0604020202020204" pitchFamily="34" charset="0"/>
-              <a:buChar char="•"/>
-            </a:pPr>
-            <a:r>
-              <a:rPr lang="de-DE" altLang="de-DE" sz="1400" dirty="0" err="1"/>
-              <a:t>Git</a:t>
-            </a:r>
-            <a:r>
-              <a:rPr lang="de-DE" altLang="de-DE" sz="1400" dirty="0"/>
-              <a:t>-Workflow im Team</a:t>
-            </a:r>
-          </a:p>
-          <a:p>
-            <a:pPr lvl="1">
-              <a:buFont typeface="Arial" panose="020B0604020202020204" pitchFamily="34" charset="0"/>
-              <a:buChar char="•"/>
-            </a:pPr>
-            <a:endParaRPr lang="de-DE" altLang="de-DE" sz="1400" dirty="0"/>
-          </a:p>
-          <a:p>
-            <a:pPr>
-              <a:buFont typeface="Arial" panose="020B0604020202020204" pitchFamily="34" charset="0"/>
-              <a:buChar char="•"/>
-            </a:pPr>
-            <a:r>
-              <a:rPr lang="de-DE" altLang="de-DE" sz="1800" b="1" dirty="0"/>
-              <a:t>Tag 2 – Vertiefung </a:t>
-            </a:r>
-            <a:r>
-              <a:rPr lang="de-DE" altLang="de-DE" sz="1800" b="1" dirty="0" err="1"/>
-              <a:t>Git</a:t>
-            </a:r>
-            <a:r>
-              <a:rPr lang="de-DE" altLang="de-DE" sz="1800" b="1" dirty="0"/>
-              <a:t>-Workflow, CI/CD &amp; </a:t>
-            </a:r>
-            <a:r>
-              <a:rPr lang="de-DE" altLang="de-DE" sz="1800" b="1" dirty="0" err="1"/>
-              <a:t>GitOps</a:t>
-            </a:r>
-            <a:endParaRPr lang="de-DE" altLang="de-DE" sz="1800" b="1" dirty="0"/>
-          </a:p>
-          <a:p>
-            <a:pPr lvl="1">
-              <a:buFont typeface="Arial" panose="020B0604020202020204" pitchFamily="34" charset="0"/>
-              <a:buChar char="•"/>
-            </a:pPr>
-            <a:r>
-              <a:rPr lang="de-DE" altLang="de-DE" sz="1400" dirty="0" err="1"/>
-              <a:t>Gitflow</a:t>
-            </a:r>
-            <a:r>
-              <a:rPr lang="de-DE" altLang="de-DE" sz="1400" dirty="0"/>
-              <a:t>-Workflow</a:t>
-            </a:r>
-          </a:p>
-          <a:p>
-            <a:pPr lvl="1">
-              <a:buFont typeface="Arial" panose="020B0604020202020204" pitchFamily="34" charset="0"/>
-              <a:buChar char="•"/>
-            </a:pPr>
-            <a:r>
-              <a:rPr lang="de-DE" altLang="de-DE" sz="1400" dirty="0"/>
-              <a:t>Tags, Releases &amp; deren Verwaltung</a:t>
-            </a:r>
-          </a:p>
-          <a:p>
-            <a:pPr lvl="1">
-              <a:buFont typeface="Arial" panose="020B0604020202020204" pitchFamily="34" charset="0"/>
-              <a:buChar char="•"/>
-            </a:pPr>
-            <a:r>
-              <a:rPr lang="de-DE" altLang="de-DE" sz="1400" dirty="0"/>
-              <a:t>Einführung in </a:t>
-            </a:r>
-            <a:r>
-              <a:rPr lang="de-DE" altLang="de-DE" sz="1400" dirty="0" err="1"/>
-              <a:t>GitLab</a:t>
-            </a:r>
-            <a:r>
-              <a:rPr lang="de-DE" altLang="de-DE" sz="1400" dirty="0"/>
-              <a:t> CI/CD &amp; </a:t>
-            </a:r>
-            <a:r>
-              <a:rPr lang="de-DE" altLang="de-DE" sz="1400" dirty="0" err="1"/>
-              <a:t>gitlab.yml</a:t>
-            </a:r>
-            <a:endParaRPr lang="de-DE" altLang="de-DE" sz="1400" dirty="0"/>
-          </a:p>
-          <a:p>
-            <a:pPr lvl="1">
-              <a:buFont typeface="Arial" panose="020B0604020202020204" pitchFamily="34" charset="0"/>
-              <a:buChar char="•"/>
-            </a:pPr>
-            <a:r>
-              <a:rPr lang="de-DE" altLang="de-DE" sz="1400" dirty="0"/>
-              <a:t>Grundlagen von </a:t>
-            </a:r>
-            <a:r>
-              <a:rPr lang="de-DE" altLang="de-DE" sz="1400" dirty="0" err="1"/>
-              <a:t>GitOps</a:t>
-            </a:r>
-            <a:endParaRPr lang="de-DE" altLang="de-DE" sz="1400" dirty="0"/>
-          </a:p>
-          <a:p>
-            <a:pPr lvl="1">
-              <a:buFont typeface="Arial" panose="020B0604020202020204" pitchFamily="34" charset="0"/>
-              <a:buChar char="•"/>
-            </a:pPr>
-            <a:endParaRPr lang="de-DE" altLang="de-DE" sz="1400" dirty="0"/>
-          </a:p>
-          <a:p>
-            <a:pPr>
-              <a:buFont typeface="Arial" panose="020B0604020202020204" pitchFamily="34" charset="0"/>
-              <a:buChar char="•"/>
-            </a:pPr>
-            <a:r>
-              <a:rPr lang="de-DE" altLang="de-DE" sz="1800" b="1" dirty="0"/>
-              <a:t>Tag 3 – Docker in der Entwicklung, </a:t>
-            </a:r>
-            <a:r>
-              <a:rPr lang="de-DE" altLang="de-DE" sz="1800" b="1" dirty="0" err="1"/>
-              <a:t>GitLab</a:t>
-            </a:r>
-            <a:r>
-              <a:rPr lang="de-DE" altLang="de-DE" sz="1800" b="1" dirty="0"/>
-              <a:t> CI und </a:t>
-            </a:r>
-            <a:r>
-              <a:rPr lang="de-DE" altLang="de-DE" sz="1800" b="1" dirty="0" err="1"/>
-              <a:t>Deployment</a:t>
-            </a:r>
-            <a:r>
-              <a:rPr lang="de-DE" altLang="de-DE" sz="1800" b="1" dirty="0"/>
-              <a:t>-Strategien</a:t>
-            </a:r>
-          </a:p>
-          <a:p>
-            <a:pPr lvl="1">
-              <a:buFont typeface="Arial" panose="020B0604020202020204" pitchFamily="34" charset="0"/>
-              <a:buChar char="•"/>
-            </a:pPr>
-            <a:r>
-              <a:rPr lang="de-DE" altLang="de-DE" sz="1400" dirty="0"/>
-              <a:t>Lokale Entwicklung mit Docker</a:t>
-            </a:r>
-          </a:p>
-          <a:p>
-            <a:pPr lvl="1">
-              <a:buFont typeface="Arial" panose="020B0604020202020204" pitchFamily="34" charset="0"/>
-              <a:buChar char="•"/>
-            </a:pPr>
-            <a:r>
-              <a:rPr lang="de-DE" altLang="de-DE" sz="1400" dirty="0" err="1"/>
-              <a:t>GitLab</a:t>
-            </a:r>
-            <a:r>
-              <a:rPr lang="de-DE" altLang="de-DE" sz="1400" dirty="0"/>
-              <a:t>-Runner &amp; Docker-Registry</a:t>
-            </a:r>
-          </a:p>
-          <a:p>
-            <a:pPr lvl="1">
-              <a:buFont typeface="Arial" panose="020B0604020202020204" pitchFamily="34" charset="0"/>
-              <a:buChar char="•"/>
-            </a:pPr>
-            <a:r>
-              <a:rPr lang="de-DE" altLang="de-DE" sz="1400" dirty="0"/>
-              <a:t>Erstellen von Release- und </a:t>
-            </a:r>
-            <a:r>
-              <a:rPr lang="de-DE" altLang="de-DE" sz="1400" dirty="0" err="1"/>
-              <a:t>Tagged</a:t>
-            </a:r>
-            <a:r>
-              <a:rPr lang="de-DE" altLang="de-DE" sz="1400" dirty="0"/>
-              <a:t>-Images</a:t>
-            </a:r>
-          </a:p>
-          <a:p>
-            <a:pPr lvl="1">
-              <a:buFont typeface="Arial" panose="020B0604020202020204" pitchFamily="34" charset="0"/>
-              <a:buChar char="•"/>
-            </a:pPr>
-            <a:r>
-              <a:rPr lang="de-DE" altLang="de-DE" sz="1400" dirty="0"/>
-              <a:t>Möglichkeiten des </a:t>
-            </a:r>
-            <a:r>
-              <a:rPr lang="de-DE" altLang="de-DE" sz="1400" dirty="0" err="1"/>
-              <a:t>Deployments</a:t>
-            </a:r>
-            <a:r>
-              <a:rPr lang="de-DE" altLang="de-DE" sz="1400" dirty="0"/>
-              <a:t> &amp; Verwaltung von Konfiguration</a:t>
-            </a:r>
-          </a:p>
-          <a:p>
-            <a:pPr lvl="1">
-              <a:buFont typeface="Arial" panose="020B0604020202020204" pitchFamily="34" charset="0"/>
-              <a:buChar char="•"/>
-            </a:pPr>
-            <a:endParaRPr lang="de-DE" altLang="de-DE" sz="1400" dirty="0"/>
-          </a:p>
-        </p:txBody>
-      </p:sp>
-      <p:sp>
-        <p:nvSpPr>
-          <p:cNvPr id="6147" name="Rectangle 1062">
-            <a:extLst>
-              <a:ext uri="{FF2B5EF4-FFF2-40B4-BE49-F238E27FC236}">
-                <a16:creationId xmlns:a16="http://schemas.microsoft.com/office/drawing/2014/main" id="{C46E9340-3256-8D55-A265-94F2F41E288E}"/>
-              </a:ext>
-            </a:extLst>
-          </p:cNvPr>
-          <p:cNvSpPr>
-            <a:spLocks noGrp="1" noChangeArrowheads="1"/>
-          </p:cNvSpPr>
-          <p:nvPr>
-            <p:ph type="title"/>
-          </p:nvPr>
-        </p:nvSpPr>
-        <p:spPr>
-          <a:xfrm>
-            <a:off x="285750" y="142875"/>
-            <a:ext cx="5654675" cy="706438"/>
-          </a:xfrm>
-        </p:spPr>
-        <p:txBody>
-          <a:bodyPr/>
-          <a:lstStyle/>
-          <a:p>
-            <a:r>
-              <a:rPr lang="de-DE" altLang="de-DE" dirty="0"/>
-              <a:t>Agenda</a:t>
+              <a:rPr lang="de-DE" dirty="0"/>
+              <a:t>Organisation</a:t>
             </a:r>
           </a:p>
         </p:txBody>
@@ -4697,7 +4284,7 @@
     </p:spTree>
     <p:extLst>
       <p:ext uri="{BB962C8B-B14F-4D97-AF65-F5344CB8AC3E}">
-        <p14:creationId xmlns:p14="http://schemas.microsoft.com/office/powerpoint/2010/main" val="3071277897"/>
+        <p14:creationId xmlns:p14="http://schemas.microsoft.com/office/powerpoint/2010/main" val="863426444"/>
       </p:ext>
     </p:extLst>
   </p:cSld>
@@ -4707,7 +4294,7 @@
 </p:sld>
 </file>
 
-<file path=ppt/slides/slide4.xml><?xml version="1.0" encoding="utf-8"?>
+<file path=ppt/slides/slide11.xml><?xml version="1.0" encoding="utf-8"?>
 <p:sld xmlns:a="http://schemas.openxmlformats.org/drawingml/2006/main" xmlns:r="http://schemas.openxmlformats.org/officeDocument/2006/relationships" xmlns:p="http://schemas.openxmlformats.org/presentationml/2006/main">
   <p:cSld>
     <p:spTree>
@@ -4740,6 +4327,424 @@
           <a:lstStyle/>
           <a:p>
             <a:r>
+              <a:rPr lang="de-DE" dirty="0"/>
+              <a:t>Literatur</a:t>
+            </a:r>
+          </a:p>
+        </p:txBody>
+      </p:sp>
+      <p:sp>
+        <p:nvSpPr>
+          <p:cNvPr id="3" name="Inhaltsplatzhalter 2"/>
+          <p:cNvSpPr>
+            <a:spLocks noGrp="1"/>
+          </p:cNvSpPr>
+          <p:nvPr>
+            <p:ph idx="1"/>
+          </p:nvPr>
+        </p:nvSpPr>
+        <p:spPr/>
+        <p:txBody>
+          <a:bodyPr/>
+          <a:lstStyle/>
+          <a:p>
+            <a:pPr>
+              <a:buFont typeface="Arial" panose="020B0604020202020204" pitchFamily="34" charset="0"/>
+              <a:buChar char="•"/>
+            </a:pPr>
+            <a:endParaRPr lang="de-DE" sz="2600" i="1" dirty="0"/>
+          </a:p>
+          <a:p>
+            <a:pPr>
+              <a:buFont typeface="Arial" panose="020B0604020202020204" pitchFamily="34" charset="0"/>
+              <a:buChar char="•"/>
+            </a:pPr>
+            <a:r>
+              <a:rPr lang="de-DE" sz="2600" i="1" dirty="0" err="1"/>
+              <a:t>git</a:t>
+            </a:r>
+            <a:r>
+              <a:rPr lang="de-DE" sz="2600" i="1" dirty="0"/>
+              <a:t> –</a:t>
+            </a:r>
+            <a:r>
+              <a:rPr lang="de-DE" sz="2600" i="1" dirty="0" err="1"/>
+              <a:t>everything-is-local</a:t>
+            </a:r>
+            <a:br>
+              <a:rPr lang="de-DE" sz="2600" i="1" dirty="0"/>
+            </a:br>
+            <a:r>
+              <a:rPr lang="de-DE" sz="2000" i="1" dirty="0">
+                <a:hlinkClick r:id="rId2"/>
+              </a:rPr>
+              <a:t>https://www.git-scm.com/book/en/v2</a:t>
+            </a:r>
+            <a:r>
+              <a:rPr lang="de-DE" sz="2000" i="1" dirty="0"/>
+              <a:t> </a:t>
+            </a:r>
+          </a:p>
+          <a:p>
+            <a:pPr>
+              <a:buFont typeface="Arial" panose="020B0604020202020204" pitchFamily="34" charset="0"/>
+              <a:buChar char="•"/>
+            </a:pPr>
+            <a:endParaRPr lang="de-DE" sz="2000" dirty="0"/>
+          </a:p>
+          <a:p>
+            <a:pPr>
+              <a:buFont typeface="Arial" panose="020B0604020202020204" pitchFamily="34" charset="0"/>
+              <a:buChar char="•"/>
+            </a:pPr>
+            <a:r>
+              <a:rPr lang="en-US" sz="2600" i="1" dirty="0"/>
+              <a:t>GitLab</a:t>
+            </a:r>
+            <a:br>
+              <a:rPr lang="en-US" i="1" dirty="0"/>
+            </a:br>
+            <a:r>
+              <a:rPr lang="en-US" sz="2000" dirty="0">
+                <a:hlinkClick r:id="rId3"/>
+              </a:rPr>
+              <a:t>https://docs.gitlab.com/</a:t>
+            </a:r>
+            <a:endParaRPr lang="en-US" sz="2000" dirty="0"/>
+          </a:p>
+          <a:p>
+            <a:pPr>
+              <a:buFont typeface="Arial" panose="020B0604020202020204" pitchFamily="34" charset="0"/>
+              <a:buChar char="•"/>
+            </a:pPr>
+            <a:endParaRPr lang="en-US" sz="2000" dirty="0"/>
+          </a:p>
+          <a:p>
+            <a:pPr>
+              <a:buFont typeface="Arial" panose="020B0604020202020204" pitchFamily="34" charset="0"/>
+              <a:buChar char="•"/>
+            </a:pPr>
+            <a:r>
+              <a:rPr lang="en-US" sz="2600" i="1" dirty="0"/>
+              <a:t>Docker</a:t>
+            </a:r>
+            <a:br>
+              <a:rPr lang="en-US" sz="2600" i="1" dirty="0"/>
+            </a:br>
+            <a:r>
+              <a:rPr lang="en-US" sz="2000" dirty="0">
+                <a:hlinkClick r:id="rId4"/>
+              </a:rPr>
+              <a:t>https://docs.docker.com/get-started/</a:t>
+            </a:r>
+            <a:r>
+              <a:rPr lang="en-US" sz="2000" dirty="0"/>
+              <a:t> </a:t>
+            </a:r>
+          </a:p>
+          <a:p>
+            <a:pPr>
+              <a:buFont typeface="Arial" panose="020B0604020202020204" pitchFamily="34" charset="0"/>
+              <a:buChar char="•"/>
+            </a:pPr>
+            <a:endParaRPr lang="en-US" sz="2000" i="1" dirty="0"/>
+          </a:p>
+          <a:p>
+            <a:pPr>
+              <a:buFont typeface="Arial" panose="020B0604020202020204" pitchFamily="34" charset="0"/>
+              <a:buChar char="•"/>
+            </a:pPr>
+            <a:endParaRPr lang="en-US" sz="2000" i="1" dirty="0"/>
+          </a:p>
+          <a:p>
+            <a:pPr>
+              <a:buFont typeface="Arial" panose="020B0604020202020204" pitchFamily="34" charset="0"/>
+              <a:buChar char="•"/>
+            </a:pPr>
+            <a:endParaRPr lang="en-US" sz="2000" i="1" dirty="0"/>
+          </a:p>
+          <a:p>
+            <a:pPr marL="0" indent="0">
+              <a:buNone/>
+            </a:pPr>
+            <a:endParaRPr lang="en-US" sz="2000" i="1" dirty="0"/>
+          </a:p>
+          <a:p>
+            <a:pPr marL="0" indent="0">
+              <a:buNone/>
+            </a:pPr>
+            <a:r>
+              <a:rPr lang="en-US" sz="2000" i="1" dirty="0" err="1"/>
+              <a:t>Hinweis</a:t>
+            </a:r>
+            <a:r>
+              <a:rPr lang="en-US" sz="2000" i="1" dirty="0"/>
+              <a:t>: </a:t>
+            </a:r>
+            <a:r>
+              <a:rPr lang="en-US" sz="2000" i="1" dirty="0" err="1"/>
+              <a:t>Viele</a:t>
+            </a:r>
+            <a:r>
+              <a:rPr lang="en-US" sz="2000" i="1" dirty="0"/>
+              <a:t> </a:t>
+            </a:r>
+            <a:r>
+              <a:rPr lang="en-US" sz="2000" i="1" dirty="0" err="1"/>
+              <a:t>Beispiele</a:t>
+            </a:r>
+            <a:r>
+              <a:rPr lang="en-US" sz="2000" i="1" dirty="0"/>
+              <a:t> </a:t>
+            </a:r>
+            <a:r>
+              <a:rPr lang="en-US" sz="2000" i="1" dirty="0" err="1"/>
+              <a:t>basieren</a:t>
+            </a:r>
+            <a:r>
+              <a:rPr lang="en-US" sz="2000" i="1" dirty="0"/>
+              <a:t> auf der </a:t>
+            </a:r>
+            <a:r>
+              <a:rPr lang="en-US" sz="2000" i="1" dirty="0" err="1"/>
+              <a:t>Literatur</a:t>
+            </a:r>
+            <a:br>
+              <a:rPr lang="de-DE" sz="2000" i="1" dirty="0"/>
+            </a:br>
+            <a:endParaRPr lang="de-DE" sz="2000" i="1" dirty="0"/>
+          </a:p>
+        </p:txBody>
+      </p:sp>
+    </p:spTree>
+    <p:extLst>
+      <p:ext uri="{BB962C8B-B14F-4D97-AF65-F5344CB8AC3E}">
+        <p14:creationId xmlns:p14="http://schemas.microsoft.com/office/powerpoint/2010/main" val="3772347927"/>
+      </p:ext>
+    </p:extLst>
+  </p:cSld>
+  <p:clrMapOvr>
+    <a:masterClrMapping/>
+  </p:clrMapOvr>
+</p:sld>
+</file>
+
+<file path=ppt/slides/slide12.xml><?xml version="1.0" encoding="utf-8"?>
+<p:sld xmlns:a="http://schemas.openxmlformats.org/drawingml/2006/main" xmlns:r="http://schemas.openxmlformats.org/officeDocument/2006/relationships" xmlns:p="http://schemas.openxmlformats.org/presentationml/2006/main">
+  <p:cSld>
+    <p:spTree>
+      <p:nvGrpSpPr>
+        <p:cNvPr id="1" name=""/>
+        <p:cNvGrpSpPr/>
+        <p:nvPr/>
+      </p:nvGrpSpPr>
+      <p:grpSpPr>
+        <a:xfrm>
+          <a:off x="0" y="0"/>
+          <a:ext cx="0" cy="0"/>
+          <a:chOff x="0" y="0"/>
+          <a:chExt cx="0" cy="0"/>
+        </a:xfrm>
+      </p:grpSpPr>
+      <p:sp>
+        <p:nvSpPr>
+          <p:cNvPr id="2" name="Titel 1">
+            <a:extLst>
+              <a:ext uri="{FF2B5EF4-FFF2-40B4-BE49-F238E27FC236}">
+                <a16:creationId xmlns:a16="http://schemas.microsoft.com/office/drawing/2014/main" id="{84F51C63-C8C0-90BF-1A94-E1F9A305AB1D}"/>
+              </a:ext>
+            </a:extLst>
+          </p:cNvPr>
+          <p:cNvSpPr>
+            <a:spLocks noGrp="1"/>
+          </p:cNvSpPr>
+          <p:nvPr>
+            <p:ph type="title"/>
+          </p:nvPr>
+        </p:nvSpPr>
+        <p:spPr/>
+        <p:txBody>
+          <a:bodyPr/>
+          <a:lstStyle/>
+          <a:p>
+            <a:r>
+              <a:rPr lang="de-DE" dirty="0"/>
+              <a:t>Vorstellung</a:t>
+            </a:r>
+          </a:p>
+        </p:txBody>
+      </p:sp>
+      <p:sp>
+        <p:nvSpPr>
+          <p:cNvPr id="3" name="Inhaltsplatzhalter 2">
+            <a:extLst>
+              <a:ext uri="{FF2B5EF4-FFF2-40B4-BE49-F238E27FC236}">
+                <a16:creationId xmlns:a16="http://schemas.microsoft.com/office/drawing/2014/main" id="{257DF32C-BC84-AD35-78FC-CD5F292365EA}"/>
+              </a:ext>
+            </a:extLst>
+          </p:cNvPr>
+          <p:cNvSpPr>
+            <a:spLocks noGrp="1"/>
+          </p:cNvSpPr>
+          <p:nvPr>
+            <p:ph idx="1"/>
+          </p:nvPr>
+        </p:nvSpPr>
+        <p:spPr/>
+        <p:txBody>
+          <a:bodyPr/>
+          <a:lstStyle/>
+          <a:p>
+            <a:pPr>
+              <a:buNone/>
+            </a:pPr>
+            <a:endParaRPr lang="de-DE" b="1" dirty="0"/>
+          </a:p>
+          <a:p>
+            <a:pPr>
+              <a:buNone/>
+            </a:pPr>
+            <a:r>
+              <a:rPr lang="de-DE" b="1" dirty="0"/>
+              <a:t>Jetzt sind Sie dran!</a:t>
+            </a:r>
+          </a:p>
+          <a:p>
+            <a:pPr marL="342900" lvl="1" indent="-342900">
+              <a:buFont typeface="Arial" charset="0"/>
+              <a:buChar char="●"/>
+            </a:pPr>
+            <a:r>
+              <a:rPr lang="de-DE" altLang="de-DE" dirty="0">
+                <a:ea typeface="+mn-ea"/>
+                <a:cs typeface="+mn-cs"/>
+              </a:rPr>
+              <a:t>Name</a:t>
+            </a:r>
+          </a:p>
+          <a:p>
+            <a:pPr marL="342900" lvl="1" indent="-342900">
+              <a:buFont typeface="Arial" charset="0"/>
+              <a:buChar char="●"/>
+            </a:pPr>
+            <a:r>
+              <a:rPr lang="de-DE" altLang="de-DE" dirty="0">
+                <a:ea typeface="+mn-ea"/>
+                <a:cs typeface="+mn-cs"/>
+              </a:rPr>
+              <a:t>Vorwissen</a:t>
+            </a:r>
+          </a:p>
+          <a:p>
+            <a:pPr marL="342900" lvl="1" indent="-342900">
+              <a:buFont typeface="Arial" charset="0"/>
+              <a:buChar char="●"/>
+            </a:pPr>
+            <a:r>
+              <a:rPr lang="de-DE" altLang="de-DE" dirty="0">
+                <a:ea typeface="+mn-ea"/>
+                <a:cs typeface="+mn-cs"/>
+              </a:rPr>
+              <a:t>Erwartungen</a:t>
+            </a:r>
+          </a:p>
+          <a:p>
+            <a:pPr marL="342900" lvl="1" indent="-342900">
+              <a:buFont typeface="Arial" charset="0"/>
+              <a:buChar char="●"/>
+            </a:pPr>
+            <a:r>
+              <a:rPr lang="de-DE" altLang="de-DE" dirty="0">
+                <a:ea typeface="+mn-ea"/>
+                <a:cs typeface="+mn-cs"/>
+              </a:rPr>
+              <a:t>Lernziele</a:t>
+            </a:r>
+          </a:p>
+        </p:txBody>
+      </p:sp>
+      <p:pic>
+        <p:nvPicPr>
+          <p:cNvPr id="7" name="Grafik 6">
+            <a:extLst>
+              <a:ext uri="{FF2B5EF4-FFF2-40B4-BE49-F238E27FC236}">
+                <a16:creationId xmlns:a16="http://schemas.microsoft.com/office/drawing/2014/main" id="{1ADDC280-0A04-FECC-94C8-3BFFADBE14B4}"/>
+              </a:ext>
+            </a:extLst>
+          </p:cNvPr>
+          <p:cNvPicPr>
+            <a:picLocks noChangeAspect="1"/>
+          </p:cNvPicPr>
+          <p:nvPr/>
+        </p:nvPicPr>
+        <p:blipFill>
+          <a:blip r:embed="rId3" cstate="print">
+            <a:extLst>
+              <a:ext uri="{28A0092B-C50C-407E-A947-70E740481C1C}">
+                <a14:useLocalDpi xmlns:a14="http://schemas.microsoft.com/office/drawing/2010/main" val="0"/>
+              </a:ext>
+            </a:extLst>
+          </a:blip>
+          <a:stretch>
+            <a:fillRect/>
+          </a:stretch>
+        </p:blipFill>
+        <p:spPr>
+          <a:xfrm>
+            <a:off x="5220072" y="1628800"/>
+            <a:ext cx="3168352" cy="3168352"/>
+          </a:xfrm>
+          <a:prstGeom prst="rect">
+            <a:avLst/>
+          </a:prstGeom>
+        </p:spPr>
+      </p:pic>
+    </p:spTree>
+    <p:extLst>
+      <p:ext uri="{BB962C8B-B14F-4D97-AF65-F5344CB8AC3E}">
+        <p14:creationId xmlns:p14="http://schemas.microsoft.com/office/powerpoint/2010/main" val="1651317651"/>
+      </p:ext>
+    </p:extLst>
+  </p:cSld>
+  <p:clrMapOvr>
+    <a:masterClrMapping/>
+  </p:clrMapOvr>
+</p:sld>
+</file>
+
+<file path=ppt/slides/slide2.xml><?xml version="1.0" encoding="utf-8"?>
+<p:sld xmlns:a="http://schemas.openxmlformats.org/drawingml/2006/main" xmlns:r="http://schemas.openxmlformats.org/officeDocument/2006/relationships" xmlns:p="http://schemas.openxmlformats.org/presentationml/2006/main">
+  <p:cSld>
+    <p:spTree>
+      <p:nvGrpSpPr>
+        <p:cNvPr id="1" name=""/>
+        <p:cNvGrpSpPr/>
+        <p:nvPr/>
+      </p:nvGrpSpPr>
+      <p:grpSpPr>
+        <a:xfrm>
+          <a:off x="0" y="0"/>
+          <a:ext cx="0" cy="0"/>
+          <a:chOff x="0" y="0"/>
+          <a:chExt cx="0" cy="0"/>
+        </a:xfrm>
+      </p:grpSpPr>
+      <p:sp>
+        <p:nvSpPr>
+          <p:cNvPr id="2" name="Titel 1"/>
+          <p:cNvSpPr>
+            <a:spLocks noGrp="1"/>
+          </p:cNvSpPr>
+          <p:nvPr>
+            <p:ph type="title"/>
+          </p:nvPr>
+        </p:nvSpPr>
+        <p:spPr/>
+        <p:txBody>
+          <a:bodyPr/>
+          <a:lstStyle/>
+          <a:p>
+            <a:r>
               <a:rPr lang="de-DE" cap="none" dirty="0"/>
               <a:t>Einführung &amp; Kursüberblick</a:t>
             </a:r>
@@ -4778,7 +4783,7 @@
 </p:sld>
 </file>
 
-<file path=ppt/slides/slide5.xml><?xml version="1.0" encoding="utf-8"?>
+<file path=ppt/slides/slide3.xml><?xml version="1.0" encoding="utf-8"?>
 <p:sld xmlns:a="http://schemas.openxmlformats.org/drawingml/2006/main" xmlns:r="http://schemas.openxmlformats.org/officeDocument/2006/relationships" xmlns:p="http://schemas.openxmlformats.org/presentationml/2006/main" show="0">
   <p:cSld>
     <p:spTree>
@@ -5006,7 +5011,7 @@
 </p:sld>
 </file>
 
-<file path=ppt/slides/slide6.xml><?xml version="1.0" encoding="utf-8"?>
+<file path=ppt/slides/slide4.xml><?xml version="1.0" encoding="utf-8"?>
 <p:sld xmlns:a="http://schemas.openxmlformats.org/drawingml/2006/main" xmlns:r="http://schemas.openxmlformats.org/officeDocument/2006/relationships" xmlns:p="http://schemas.openxmlformats.org/presentationml/2006/main" show="0">
   <p:cSld>
     <p:spTree>
@@ -5256,7 +5261,7 @@
 </p:sld>
 </file>
 
-<file path=ppt/slides/slide7.xml><?xml version="1.0" encoding="utf-8"?>
+<file path=ppt/slides/slide5.xml><?xml version="1.0" encoding="utf-8"?>
 <p:sld xmlns:a="http://schemas.openxmlformats.org/drawingml/2006/main" xmlns:r="http://schemas.openxmlformats.org/officeDocument/2006/relationships" xmlns:p="http://schemas.openxmlformats.org/presentationml/2006/main">
   <p:cSld>
     <p:spTree>
@@ -9438,6 +9443,1281 @@
       <p:bldP spid="30" grpId="0"/>
     </p:bldLst>
   </p:timing>
+</p:sld>
+</file>
+
+<file path=ppt/slides/slide6.xml><?xml version="1.0" encoding="utf-8"?>
+<p:sld xmlns:a="http://schemas.openxmlformats.org/drawingml/2006/main" xmlns:r="http://schemas.openxmlformats.org/officeDocument/2006/relationships" xmlns:p="http://schemas.openxmlformats.org/presentationml/2006/main">
+  <p:cSld>
+    <p:spTree>
+      <p:nvGrpSpPr>
+        <p:cNvPr id="1" name=""/>
+        <p:cNvGrpSpPr/>
+        <p:nvPr/>
+      </p:nvGrpSpPr>
+      <p:grpSpPr>
+        <a:xfrm>
+          <a:off x="0" y="0"/>
+          <a:ext cx="0" cy="0"/>
+          <a:chOff x="0" y="0"/>
+          <a:chExt cx="0" cy="0"/>
+        </a:xfrm>
+      </p:grpSpPr>
+      <p:sp>
+        <p:nvSpPr>
+          <p:cNvPr id="2" name="Titel 1">
+            <a:extLst>
+              <a:ext uri="{FF2B5EF4-FFF2-40B4-BE49-F238E27FC236}">
+                <a16:creationId xmlns:a16="http://schemas.microsoft.com/office/drawing/2014/main" id="{DB59D175-A07B-28BD-5EA5-819760782926}"/>
+              </a:ext>
+            </a:extLst>
+          </p:cNvPr>
+          <p:cNvSpPr>
+            <a:spLocks noGrp="1"/>
+          </p:cNvSpPr>
+          <p:nvPr>
+            <p:ph type="title"/>
+          </p:nvPr>
+        </p:nvSpPr>
+        <p:spPr/>
+        <p:txBody>
+          <a:bodyPr/>
+          <a:lstStyle/>
+          <a:p>
+            <a:r>
+              <a:rPr lang="de-DE" dirty="0"/>
+              <a:t>Inhalt und Ziel</a:t>
+            </a:r>
+          </a:p>
+        </p:txBody>
+      </p:sp>
+      <p:sp>
+        <p:nvSpPr>
+          <p:cNvPr id="3" name="Inhaltsplatzhalter 2">
+            <a:extLst>
+              <a:ext uri="{FF2B5EF4-FFF2-40B4-BE49-F238E27FC236}">
+                <a16:creationId xmlns:a16="http://schemas.microsoft.com/office/drawing/2014/main" id="{9061FA0D-1282-1AE5-0941-B576192A9CCC}"/>
+              </a:ext>
+            </a:extLst>
+          </p:cNvPr>
+          <p:cNvSpPr>
+            <a:spLocks noGrp="1"/>
+          </p:cNvSpPr>
+          <p:nvPr>
+            <p:ph idx="1"/>
+          </p:nvPr>
+        </p:nvSpPr>
+        <p:spPr/>
+        <p:txBody>
+          <a:bodyPr/>
+          <a:lstStyle/>
+          <a:p>
+            <a:pPr>
+              <a:buFont typeface="Arial" panose="020B0604020202020204" pitchFamily="34" charset="0"/>
+              <a:buChar char="•"/>
+            </a:pPr>
+            <a:r>
+              <a:rPr lang="de-DE" sz="2000" dirty="0"/>
+              <a:t>Workshop</a:t>
+            </a:r>
+          </a:p>
+          <a:p>
+            <a:pPr lvl="1">
+              <a:buFont typeface="Arial" panose="020B0604020202020204" pitchFamily="34" charset="0"/>
+              <a:buChar char="•"/>
+            </a:pPr>
+            <a:r>
+              <a:rPr lang="de-DE" sz="1800" dirty="0"/>
+              <a:t>Erweiterter Einstieg in </a:t>
+            </a:r>
+            <a:r>
+              <a:rPr lang="de-DE" sz="1800" dirty="0" err="1"/>
+              <a:t>Git</a:t>
+            </a:r>
+            <a:r>
+              <a:rPr lang="de-DE" sz="1800" dirty="0"/>
+              <a:t>-Workflows und die Hosting-Plattform </a:t>
+            </a:r>
+            <a:r>
+              <a:rPr lang="de-DE" sz="1800" dirty="0" err="1"/>
+              <a:t>GitLab</a:t>
+            </a:r>
+            <a:endParaRPr lang="de-DE" sz="1800" dirty="0"/>
+          </a:p>
+          <a:p>
+            <a:pPr lvl="1">
+              <a:buFont typeface="Arial" panose="020B0604020202020204" pitchFamily="34" charset="0"/>
+              <a:buChar char="•"/>
+            </a:pPr>
+            <a:r>
+              <a:rPr lang="de-DE" sz="1800" dirty="0"/>
+              <a:t>Basiswissen über die wichtigsten Aspekte der Testautomatisierung</a:t>
+            </a:r>
+          </a:p>
+          <a:p>
+            <a:pPr lvl="1">
+              <a:buFont typeface="Arial" panose="020B0604020202020204" pitchFamily="34" charset="0"/>
+              <a:buChar char="•"/>
+            </a:pPr>
+            <a:r>
+              <a:rPr lang="de-DE" sz="1800" dirty="0"/>
+              <a:t>Erarbeitung eines </a:t>
+            </a:r>
+            <a:r>
+              <a:rPr lang="de-DE" sz="1800" dirty="0" err="1"/>
+              <a:t>Git</a:t>
+            </a:r>
+            <a:r>
+              <a:rPr lang="de-DE" sz="1800" dirty="0"/>
+              <a:t>-Workflows und Erstellung unterschiedlicher CI/CD Pipelines für einfache bis komplexe Software Projekte/Szenarien</a:t>
+            </a:r>
+          </a:p>
+          <a:p>
+            <a:pPr marL="0" indent="0">
+              <a:buNone/>
+            </a:pPr>
+            <a:endParaRPr lang="de-DE" sz="2000" dirty="0"/>
+          </a:p>
+          <a:p>
+            <a:pPr>
+              <a:buFont typeface="Arial" panose="020B0604020202020204" pitchFamily="34" charset="0"/>
+              <a:buChar char="•"/>
+            </a:pPr>
+            <a:r>
+              <a:rPr lang="de-DE" sz="2000" dirty="0"/>
+              <a:t>Zielgruppe</a:t>
+            </a:r>
+          </a:p>
+          <a:p>
+            <a:pPr lvl="1">
+              <a:buFont typeface="Arial" panose="020B0604020202020204" pitchFamily="34" charset="0"/>
+              <a:buChar char="•"/>
+            </a:pPr>
+            <a:r>
+              <a:rPr lang="de-DE" sz="1800" dirty="0"/>
+              <a:t>Alle die </a:t>
+            </a:r>
+            <a:r>
+              <a:rPr lang="de-DE" sz="1800" dirty="0" err="1"/>
+              <a:t>Continuous</a:t>
+            </a:r>
+            <a:r>
+              <a:rPr lang="de-DE" sz="1800" dirty="0"/>
+              <a:t> Integration &amp; </a:t>
+            </a:r>
+            <a:r>
+              <a:rPr lang="de-DE" sz="1800" dirty="0" err="1"/>
+              <a:t>Deployment</a:t>
+            </a:r>
+            <a:r>
+              <a:rPr lang="de-DE" sz="1800" dirty="0"/>
+              <a:t> effektiv in Ihre Prozesse einbinden möchten</a:t>
+            </a:r>
+          </a:p>
+          <a:p>
+            <a:pPr lvl="1">
+              <a:buFont typeface="Arial" panose="020B0604020202020204" pitchFamily="34" charset="0"/>
+              <a:buChar char="•"/>
+            </a:pPr>
+            <a:r>
+              <a:rPr lang="de-DE" sz="1800" dirty="0"/>
+              <a:t>Entwickler, </a:t>
+            </a:r>
+            <a:r>
+              <a:rPr lang="de-DE" sz="1800" dirty="0" err="1"/>
+              <a:t>DevOps</a:t>
+            </a:r>
+            <a:r>
+              <a:rPr lang="de-DE" sz="1800" dirty="0"/>
+              <a:t> &amp; Administratoren</a:t>
+            </a:r>
+          </a:p>
+          <a:p>
+            <a:pPr marL="0" indent="0">
+              <a:buNone/>
+            </a:pPr>
+            <a:endParaRPr lang="de-DE" sz="2000" dirty="0"/>
+          </a:p>
+          <a:p>
+            <a:pPr>
+              <a:buFont typeface="Arial" panose="020B0604020202020204" pitchFamily="34" charset="0"/>
+              <a:buChar char="•"/>
+            </a:pPr>
+            <a:r>
+              <a:rPr lang="de-DE" sz="2000" dirty="0"/>
+              <a:t>Voraussetzungen</a:t>
+            </a:r>
+          </a:p>
+          <a:p>
+            <a:pPr lvl="1">
+              <a:buFont typeface="Arial" panose="020B0604020202020204" pitchFamily="34" charset="0"/>
+              <a:buChar char="•"/>
+            </a:pPr>
+            <a:r>
+              <a:rPr lang="de-DE" sz="1800" dirty="0" err="1"/>
+              <a:t>git</a:t>
+            </a:r>
+            <a:r>
+              <a:rPr lang="de-DE" sz="1800" dirty="0"/>
+              <a:t> Grundkenntnisse</a:t>
+            </a:r>
+          </a:p>
+          <a:p>
+            <a:pPr lvl="1">
+              <a:buFont typeface="Arial" panose="020B0604020202020204" pitchFamily="34" charset="0"/>
+              <a:buChar char="•"/>
+            </a:pPr>
+            <a:r>
+              <a:rPr lang="de-DE" sz="1800" dirty="0"/>
+              <a:t>Sicherer Umgang mit Linux</a:t>
+            </a:r>
+          </a:p>
+          <a:p>
+            <a:pPr lvl="1">
+              <a:buFont typeface="Arial" panose="020B0604020202020204" pitchFamily="34" charset="0"/>
+              <a:buChar char="•"/>
+            </a:pPr>
+            <a:r>
+              <a:rPr lang="de-DE" sz="1800" dirty="0"/>
+              <a:t>Grundlegende Programmierkenntnisse</a:t>
+            </a:r>
+          </a:p>
+        </p:txBody>
+      </p:sp>
+    </p:spTree>
+    <p:extLst>
+      <p:ext uri="{BB962C8B-B14F-4D97-AF65-F5344CB8AC3E}">
+        <p14:creationId xmlns:p14="http://schemas.microsoft.com/office/powerpoint/2010/main" val="3681015918"/>
+      </p:ext>
+    </p:extLst>
+  </p:cSld>
+  <p:clrMapOvr>
+    <a:masterClrMapping/>
+  </p:clrMapOvr>
+</p:sld>
+</file>
+
+<file path=ppt/slides/slide7.xml><?xml version="1.0" encoding="utf-8"?>
+<p:sld xmlns:a="http://schemas.openxmlformats.org/drawingml/2006/main" xmlns:r="http://schemas.openxmlformats.org/officeDocument/2006/relationships" xmlns:p="http://schemas.openxmlformats.org/presentationml/2006/main">
+  <p:cSld>
+    <p:spTree>
+      <p:nvGrpSpPr>
+        <p:cNvPr id="1" name=""/>
+        <p:cNvGrpSpPr/>
+        <p:nvPr/>
+      </p:nvGrpSpPr>
+      <p:grpSpPr>
+        <a:xfrm>
+          <a:off x="0" y="0"/>
+          <a:ext cx="0" cy="0"/>
+          <a:chOff x="0" y="0"/>
+          <a:chExt cx="0" cy="0"/>
+        </a:xfrm>
+      </p:grpSpPr>
+      <p:sp>
+        <p:nvSpPr>
+          <p:cNvPr id="6146" name="Inhaltsplatzhalter 18">
+            <a:extLst>
+              <a:ext uri="{FF2B5EF4-FFF2-40B4-BE49-F238E27FC236}">
+                <a16:creationId xmlns:a16="http://schemas.microsoft.com/office/drawing/2014/main" id="{BE3C4C95-FD5D-27F0-ED0C-AB8113CAC9F1}"/>
+              </a:ext>
+            </a:extLst>
+          </p:cNvPr>
+          <p:cNvSpPr>
+            <a:spLocks noGrp="1"/>
+          </p:cNvSpPr>
+          <p:nvPr>
+            <p:ph idx="1"/>
+          </p:nvPr>
+        </p:nvSpPr>
+        <p:spPr/>
+        <p:txBody>
+          <a:bodyPr/>
+          <a:lstStyle/>
+          <a:p>
+            <a:pPr>
+              <a:buFont typeface="Arial" panose="020B0604020202020204" pitchFamily="34" charset="0"/>
+              <a:buChar char="•"/>
+            </a:pPr>
+            <a:endParaRPr lang="de-DE" altLang="de-DE" sz="1800" b="1" dirty="0"/>
+          </a:p>
+          <a:p>
+            <a:pPr>
+              <a:buFont typeface="Arial" panose="020B0604020202020204" pitchFamily="34" charset="0"/>
+              <a:buChar char="•"/>
+            </a:pPr>
+            <a:r>
+              <a:rPr lang="de-DE" altLang="de-DE" sz="1800" b="1" dirty="0"/>
+              <a:t>Tag 1 – Einführung in </a:t>
+            </a:r>
+            <a:r>
+              <a:rPr lang="de-DE" altLang="de-DE" sz="1800" b="1" dirty="0" err="1"/>
+              <a:t>Git</a:t>
+            </a:r>
+            <a:r>
+              <a:rPr lang="de-DE" altLang="de-DE" sz="1800" b="1" dirty="0"/>
+              <a:t> und </a:t>
+            </a:r>
+            <a:r>
+              <a:rPr lang="de-DE" altLang="de-DE" sz="1800" b="1" dirty="0" err="1"/>
+              <a:t>GitLab</a:t>
+            </a:r>
+            <a:r>
+              <a:rPr lang="de-DE" altLang="de-DE" sz="1800" b="1" dirty="0"/>
+              <a:t>, </a:t>
+            </a:r>
+            <a:r>
+              <a:rPr lang="de-DE" altLang="de-DE" sz="1800" b="1" dirty="0" err="1"/>
+              <a:t>Git</a:t>
+            </a:r>
+            <a:r>
+              <a:rPr lang="de-DE" altLang="de-DE" sz="1800" b="1" dirty="0"/>
+              <a:t>-Workflow im Team</a:t>
+            </a:r>
+          </a:p>
+          <a:p>
+            <a:pPr lvl="1">
+              <a:buFont typeface="Arial" panose="020B0604020202020204" pitchFamily="34" charset="0"/>
+              <a:buChar char="•"/>
+            </a:pPr>
+            <a:r>
+              <a:rPr lang="de-DE" altLang="de-DE" sz="1400" dirty="0"/>
+              <a:t>Einführung &amp; Kursüberblick</a:t>
+            </a:r>
+          </a:p>
+          <a:p>
+            <a:pPr lvl="1">
+              <a:buFont typeface="Arial" panose="020B0604020202020204" pitchFamily="34" charset="0"/>
+              <a:buChar char="•"/>
+            </a:pPr>
+            <a:r>
+              <a:rPr lang="de-DE" altLang="de-DE" sz="1400" dirty="0"/>
+              <a:t>Grundlagen von </a:t>
+            </a:r>
+            <a:r>
+              <a:rPr lang="de-DE" altLang="de-DE" sz="1400" dirty="0" err="1"/>
+              <a:t>Git</a:t>
+            </a:r>
+            <a:r>
+              <a:rPr lang="de-DE" altLang="de-DE" sz="1400" dirty="0"/>
+              <a:t> und </a:t>
+            </a:r>
+            <a:r>
+              <a:rPr lang="de-DE" altLang="de-DE" sz="1400" dirty="0" err="1"/>
+              <a:t>GitLab</a:t>
+            </a:r>
+            <a:endParaRPr lang="de-DE" altLang="de-DE" sz="1400" dirty="0"/>
+          </a:p>
+          <a:p>
+            <a:pPr lvl="1">
+              <a:buFont typeface="Arial" panose="020B0604020202020204" pitchFamily="34" charset="0"/>
+              <a:buChar char="•"/>
+            </a:pPr>
+            <a:r>
+              <a:rPr lang="de-DE" altLang="de-DE" sz="1400" dirty="0" err="1"/>
+              <a:t>Git</a:t>
+            </a:r>
+            <a:r>
+              <a:rPr lang="de-DE" altLang="de-DE" sz="1400" dirty="0"/>
+              <a:t> </a:t>
+            </a:r>
+            <a:r>
+              <a:rPr lang="de-DE" altLang="de-DE" sz="1400" dirty="0" err="1"/>
+              <a:t>Rebase</a:t>
+            </a:r>
+            <a:r>
+              <a:rPr lang="de-DE" altLang="de-DE" sz="1400" dirty="0"/>
+              <a:t> &amp; </a:t>
+            </a:r>
+            <a:r>
+              <a:rPr lang="de-DE" altLang="de-DE" sz="1400" dirty="0" err="1"/>
+              <a:t>Merge</a:t>
+            </a:r>
+            <a:r>
+              <a:rPr lang="de-DE" altLang="de-DE" sz="1400" dirty="0"/>
+              <a:t>-Strategien</a:t>
+            </a:r>
+          </a:p>
+          <a:p>
+            <a:pPr lvl="1">
+              <a:buFont typeface="Arial" panose="020B0604020202020204" pitchFamily="34" charset="0"/>
+              <a:buChar char="•"/>
+            </a:pPr>
+            <a:r>
+              <a:rPr lang="de-DE" altLang="de-DE" sz="1400" dirty="0" err="1"/>
+              <a:t>Git</a:t>
+            </a:r>
+            <a:r>
+              <a:rPr lang="de-DE" altLang="de-DE" sz="1400" dirty="0"/>
+              <a:t>-Workflow im Team</a:t>
+            </a:r>
+          </a:p>
+          <a:p>
+            <a:pPr lvl="1">
+              <a:buFont typeface="Arial" panose="020B0604020202020204" pitchFamily="34" charset="0"/>
+              <a:buChar char="•"/>
+            </a:pPr>
+            <a:endParaRPr lang="de-DE" altLang="de-DE" sz="1400" dirty="0"/>
+          </a:p>
+          <a:p>
+            <a:pPr>
+              <a:buFont typeface="Arial" panose="020B0604020202020204" pitchFamily="34" charset="0"/>
+              <a:buChar char="•"/>
+            </a:pPr>
+            <a:r>
+              <a:rPr lang="de-DE" altLang="de-DE" sz="1800" b="1" dirty="0"/>
+              <a:t>Tag 2 – Vertiefung </a:t>
+            </a:r>
+            <a:r>
+              <a:rPr lang="de-DE" altLang="de-DE" sz="1800" b="1" dirty="0" err="1"/>
+              <a:t>Git</a:t>
+            </a:r>
+            <a:r>
+              <a:rPr lang="de-DE" altLang="de-DE" sz="1800" b="1" dirty="0"/>
+              <a:t>-Workflow, CI/CD &amp; </a:t>
+            </a:r>
+            <a:r>
+              <a:rPr lang="de-DE" altLang="de-DE" sz="1800" b="1" dirty="0" err="1"/>
+              <a:t>GitOps</a:t>
+            </a:r>
+            <a:endParaRPr lang="de-DE" altLang="de-DE" sz="1800" b="1" dirty="0"/>
+          </a:p>
+          <a:p>
+            <a:pPr lvl="1">
+              <a:buFont typeface="Arial" panose="020B0604020202020204" pitchFamily="34" charset="0"/>
+              <a:buChar char="•"/>
+            </a:pPr>
+            <a:r>
+              <a:rPr lang="de-DE" altLang="de-DE" sz="1400" dirty="0" err="1"/>
+              <a:t>Gitflow</a:t>
+            </a:r>
+            <a:r>
+              <a:rPr lang="de-DE" altLang="de-DE" sz="1400" dirty="0"/>
+              <a:t>-Workflow</a:t>
+            </a:r>
+          </a:p>
+          <a:p>
+            <a:pPr lvl="1">
+              <a:buFont typeface="Arial" panose="020B0604020202020204" pitchFamily="34" charset="0"/>
+              <a:buChar char="•"/>
+            </a:pPr>
+            <a:r>
+              <a:rPr lang="de-DE" altLang="de-DE" sz="1400" dirty="0"/>
+              <a:t>Tags, Releases &amp; deren Verwaltung</a:t>
+            </a:r>
+          </a:p>
+          <a:p>
+            <a:pPr lvl="1">
+              <a:buFont typeface="Arial" panose="020B0604020202020204" pitchFamily="34" charset="0"/>
+              <a:buChar char="•"/>
+            </a:pPr>
+            <a:r>
+              <a:rPr lang="de-DE" altLang="de-DE" sz="1400" dirty="0"/>
+              <a:t>Einführung in </a:t>
+            </a:r>
+            <a:r>
+              <a:rPr lang="de-DE" altLang="de-DE" sz="1400" dirty="0" err="1"/>
+              <a:t>GitLab</a:t>
+            </a:r>
+            <a:r>
+              <a:rPr lang="de-DE" altLang="de-DE" sz="1400" dirty="0"/>
+              <a:t> CI/CD &amp; </a:t>
+            </a:r>
+            <a:r>
+              <a:rPr lang="de-DE" altLang="de-DE" sz="1400" dirty="0" err="1"/>
+              <a:t>gitlab.yml</a:t>
+            </a:r>
+            <a:endParaRPr lang="de-DE" altLang="de-DE" sz="1400" dirty="0"/>
+          </a:p>
+          <a:p>
+            <a:pPr lvl="1">
+              <a:buFont typeface="Arial" panose="020B0604020202020204" pitchFamily="34" charset="0"/>
+              <a:buChar char="•"/>
+            </a:pPr>
+            <a:r>
+              <a:rPr lang="de-DE" altLang="de-DE" sz="1400" dirty="0"/>
+              <a:t>Grundlagen von </a:t>
+            </a:r>
+            <a:r>
+              <a:rPr lang="de-DE" altLang="de-DE" sz="1400" dirty="0" err="1"/>
+              <a:t>GitOps</a:t>
+            </a:r>
+            <a:endParaRPr lang="de-DE" altLang="de-DE" sz="1400" dirty="0"/>
+          </a:p>
+          <a:p>
+            <a:pPr lvl="1">
+              <a:buFont typeface="Arial" panose="020B0604020202020204" pitchFamily="34" charset="0"/>
+              <a:buChar char="•"/>
+            </a:pPr>
+            <a:endParaRPr lang="de-DE" altLang="de-DE" sz="1400" dirty="0"/>
+          </a:p>
+          <a:p>
+            <a:pPr>
+              <a:buFont typeface="Arial" panose="020B0604020202020204" pitchFamily="34" charset="0"/>
+              <a:buChar char="•"/>
+            </a:pPr>
+            <a:r>
+              <a:rPr lang="de-DE" altLang="de-DE" sz="1800" b="1" dirty="0"/>
+              <a:t>Tag 3 – Docker in der Entwicklung, </a:t>
+            </a:r>
+            <a:r>
+              <a:rPr lang="de-DE" altLang="de-DE" sz="1800" b="1" dirty="0" err="1"/>
+              <a:t>GitLab</a:t>
+            </a:r>
+            <a:r>
+              <a:rPr lang="de-DE" altLang="de-DE" sz="1800" b="1" dirty="0"/>
+              <a:t> CI und </a:t>
+            </a:r>
+            <a:r>
+              <a:rPr lang="de-DE" altLang="de-DE" sz="1800" b="1" dirty="0" err="1"/>
+              <a:t>Deployment</a:t>
+            </a:r>
+            <a:r>
+              <a:rPr lang="de-DE" altLang="de-DE" sz="1800" b="1" dirty="0"/>
+              <a:t>-Strategien</a:t>
+            </a:r>
+          </a:p>
+          <a:p>
+            <a:pPr lvl="1">
+              <a:buFont typeface="Arial" panose="020B0604020202020204" pitchFamily="34" charset="0"/>
+              <a:buChar char="•"/>
+            </a:pPr>
+            <a:r>
+              <a:rPr lang="de-DE" altLang="de-DE" sz="1400" dirty="0"/>
+              <a:t>Lokale Entwicklung mit Docker</a:t>
+            </a:r>
+          </a:p>
+          <a:p>
+            <a:pPr lvl="1">
+              <a:buFont typeface="Arial" panose="020B0604020202020204" pitchFamily="34" charset="0"/>
+              <a:buChar char="•"/>
+            </a:pPr>
+            <a:r>
+              <a:rPr lang="de-DE" altLang="de-DE" sz="1400" dirty="0" err="1"/>
+              <a:t>GitLab</a:t>
+            </a:r>
+            <a:r>
+              <a:rPr lang="de-DE" altLang="de-DE" sz="1400" dirty="0"/>
+              <a:t>-Runner &amp; Docker-Registry</a:t>
+            </a:r>
+          </a:p>
+          <a:p>
+            <a:pPr lvl="1">
+              <a:buFont typeface="Arial" panose="020B0604020202020204" pitchFamily="34" charset="0"/>
+              <a:buChar char="•"/>
+            </a:pPr>
+            <a:r>
+              <a:rPr lang="de-DE" altLang="de-DE" sz="1400" dirty="0"/>
+              <a:t>Erstellen von Release- und </a:t>
+            </a:r>
+            <a:r>
+              <a:rPr lang="de-DE" altLang="de-DE" sz="1400" dirty="0" err="1"/>
+              <a:t>Tagged</a:t>
+            </a:r>
+            <a:r>
+              <a:rPr lang="de-DE" altLang="de-DE" sz="1400" dirty="0"/>
+              <a:t>-Images</a:t>
+            </a:r>
+          </a:p>
+          <a:p>
+            <a:pPr lvl="1">
+              <a:buFont typeface="Arial" panose="020B0604020202020204" pitchFamily="34" charset="0"/>
+              <a:buChar char="•"/>
+            </a:pPr>
+            <a:r>
+              <a:rPr lang="de-DE" altLang="de-DE" sz="1400" dirty="0"/>
+              <a:t>Möglichkeiten des </a:t>
+            </a:r>
+            <a:r>
+              <a:rPr lang="de-DE" altLang="de-DE" sz="1400" dirty="0" err="1"/>
+              <a:t>Deployments</a:t>
+            </a:r>
+            <a:r>
+              <a:rPr lang="de-DE" altLang="de-DE" sz="1400" dirty="0"/>
+              <a:t> &amp; Verwaltung von Konfiguration</a:t>
+            </a:r>
+          </a:p>
+          <a:p>
+            <a:pPr lvl="1">
+              <a:buFont typeface="Arial" panose="020B0604020202020204" pitchFamily="34" charset="0"/>
+              <a:buChar char="•"/>
+            </a:pPr>
+            <a:endParaRPr lang="de-DE" altLang="de-DE" sz="1400" dirty="0"/>
+          </a:p>
+        </p:txBody>
+      </p:sp>
+      <p:sp>
+        <p:nvSpPr>
+          <p:cNvPr id="6147" name="Rectangle 1062">
+            <a:extLst>
+              <a:ext uri="{FF2B5EF4-FFF2-40B4-BE49-F238E27FC236}">
+                <a16:creationId xmlns:a16="http://schemas.microsoft.com/office/drawing/2014/main" id="{C46E9340-3256-8D55-A265-94F2F41E288E}"/>
+              </a:ext>
+            </a:extLst>
+          </p:cNvPr>
+          <p:cNvSpPr>
+            <a:spLocks noGrp="1" noChangeArrowheads="1"/>
+          </p:cNvSpPr>
+          <p:nvPr>
+            <p:ph type="title"/>
+          </p:nvPr>
+        </p:nvSpPr>
+        <p:spPr>
+          <a:xfrm>
+            <a:off x="285750" y="142875"/>
+            <a:ext cx="5654675" cy="706438"/>
+          </a:xfrm>
+        </p:spPr>
+        <p:txBody>
+          <a:bodyPr/>
+          <a:lstStyle/>
+          <a:p>
+            <a:r>
+              <a:rPr lang="de-DE" altLang="de-DE" dirty="0"/>
+              <a:t>Agenda</a:t>
+            </a:r>
+          </a:p>
+        </p:txBody>
+      </p:sp>
+    </p:spTree>
+  </p:cSld>
+  <p:clrMapOvr>
+    <a:masterClrMapping/>
+  </p:clrMapOvr>
+</p:sld>
+</file>
+
+<file path=ppt/slides/slide8.xml><?xml version="1.0" encoding="utf-8"?>
+<p:sld xmlns:a="http://schemas.openxmlformats.org/drawingml/2006/main" xmlns:r="http://schemas.openxmlformats.org/officeDocument/2006/relationships" xmlns:p="http://schemas.openxmlformats.org/presentationml/2006/main">
+  <p:cSld>
+    <p:spTree>
+      <p:nvGrpSpPr>
+        <p:cNvPr id="1" name=""/>
+        <p:cNvGrpSpPr/>
+        <p:nvPr/>
+      </p:nvGrpSpPr>
+      <p:grpSpPr>
+        <a:xfrm>
+          <a:off x="0" y="0"/>
+          <a:ext cx="0" cy="0"/>
+          <a:chOff x="0" y="0"/>
+          <a:chExt cx="0" cy="0"/>
+        </a:xfrm>
+      </p:grpSpPr>
+      <p:sp>
+        <p:nvSpPr>
+          <p:cNvPr id="6146" name="Inhaltsplatzhalter 18">
+            <a:extLst>
+              <a:ext uri="{FF2B5EF4-FFF2-40B4-BE49-F238E27FC236}">
+                <a16:creationId xmlns:a16="http://schemas.microsoft.com/office/drawing/2014/main" id="{BE3C4C95-FD5D-27F0-ED0C-AB8113CAC9F1}"/>
+              </a:ext>
+            </a:extLst>
+          </p:cNvPr>
+          <p:cNvSpPr>
+            <a:spLocks noGrp="1"/>
+          </p:cNvSpPr>
+          <p:nvPr>
+            <p:ph idx="1"/>
+          </p:nvPr>
+        </p:nvSpPr>
+        <p:spPr/>
+        <p:txBody>
+          <a:bodyPr/>
+          <a:lstStyle/>
+          <a:p>
+            <a:pPr>
+              <a:buFont typeface="Arial" panose="020B0604020202020204" pitchFamily="34" charset="0"/>
+              <a:buChar char="•"/>
+            </a:pPr>
+            <a:endParaRPr lang="de-DE" altLang="de-DE" sz="1800" b="1" dirty="0"/>
+          </a:p>
+          <a:p>
+            <a:pPr>
+              <a:buFont typeface="Arial" panose="020B0604020202020204" pitchFamily="34" charset="0"/>
+              <a:buChar char="•"/>
+            </a:pPr>
+            <a:r>
+              <a:rPr lang="de-DE" altLang="de-DE" sz="1800" b="1" dirty="0"/>
+              <a:t>Tag 1 – Einführung in </a:t>
+            </a:r>
+            <a:r>
+              <a:rPr lang="de-DE" altLang="de-DE" sz="1800" b="1" dirty="0" err="1"/>
+              <a:t>Git</a:t>
+            </a:r>
+            <a:r>
+              <a:rPr lang="de-DE" altLang="de-DE" sz="1800" b="1" dirty="0"/>
+              <a:t> und </a:t>
+            </a:r>
+            <a:r>
+              <a:rPr lang="de-DE" altLang="de-DE" sz="1800" b="1" dirty="0" err="1"/>
+              <a:t>GitLab</a:t>
+            </a:r>
+            <a:r>
+              <a:rPr lang="de-DE" altLang="de-DE" sz="1800" b="1" dirty="0"/>
+              <a:t>, </a:t>
+            </a:r>
+            <a:r>
+              <a:rPr lang="de-DE" altLang="de-DE" sz="1800" b="1" dirty="0" err="1"/>
+              <a:t>Git</a:t>
+            </a:r>
+            <a:r>
+              <a:rPr lang="de-DE" altLang="de-DE" sz="1800" b="1" dirty="0"/>
+              <a:t>-Workflow im Team</a:t>
+            </a:r>
+          </a:p>
+          <a:p>
+            <a:pPr lvl="1">
+              <a:buFont typeface="Arial" panose="020B0604020202020204" pitchFamily="34" charset="0"/>
+              <a:buChar char="•"/>
+            </a:pPr>
+            <a:r>
+              <a:rPr lang="de-DE" altLang="de-DE" sz="1400" u="sng" dirty="0"/>
+              <a:t>Einführung &amp; Kursüberblick</a:t>
+            </a:r>
+          </a:p>
+          <a:p>
+            <a:pPr lvl="1">
+              <a:buFont typeface="Arial" panose="020B0604020202020204" pitchFamily="34" charset="0"/>
+              <a:buChar char="•"/>
+            </a:pPr>
+            <a:r>
+              <a:rPr lang="de-DE" altLang="de-DE" sz="1400" dirty="0"/>
+              <a:t>Grundlagen von </a:t>
+            </a:r>
+            <a:r>
+              <a:rPr lang="de-DE" altLang="de-DE" sz="1400" dirty="0" err="1"/>
+              <a:t>Git</a:t>
+            </a:r>
+            <a:r>
+              <a:rPr lang="de-DE" altLang="de-DE" sz="1400" dirty="0"/>
+              <a:t> und </a:t>
+            </a:r>
+            <a:r>
+              <a:rPr lang="de-DE" altLang="de-DE" sz="1400" dirty="0" err="1"/>
+              <a:t>GitLab</a:t>
+            </a:r>
+            <a:endParaRPr lang="de-DE" altLang="de-DE" sz="1400" dirty="0"/>
+          </a:p>
+          <a:p>
+            <a:pPr lvl="1">
+              <a:buFont typeface="Arial" panose="020B0604020202020204" pitchFamily="34" charset="0"/>
+              <a:buChar char="•"/>
+            </a:pPr>
+            <a:r>
+              <a:rPr lang="de-DE" altLang="de-DE" sz="1400" dirty="0" err="1"/>
+              <a:t>Git</a:t>
+            </a:r>
+            <a:r>
+              <a:rPr lang="de-DE" altLang="de-DE" sz="1400" dirty="0"/>
+              <a:t> </a:t>
+            </a:r>
+            <a:r>
+              <a:rPr lang="de-DE" altLang="de-DE" sz="1400" dirty="0" err="1"/>
+              <a:t>Rebase</a:t>
+            </a:r>
+            <a:r>
+              <a:rPr lang="de-DE" altLang="de-DE" sz="1400" dirty="0"/>
+              <a:t> &amp; </a:t>
+            </a:r>
+            <a:r>
+              <a:rPr lang="de-DE" altLang="de-DE" sz="1400" dirty="0" err="1"/>
+              <a:t>Merge</a:t>
+            </a:r>
+            <a:r>
+              <a:rPr lang="de-DE" altLang="de-DE" sz="1400" dirty="0"/>
+              <a:t>-Strategien</a:t>
+            </a:r>
+          </a:p>
+          <a:p>
+            <a:pPr lvl="1">
+              <a:buFont typeface="Arial" panose="020B0604020202020204" pitchFamily="34" charset="0"/>
+              <a:buChar char="•"/>
+            </a:pPr>
+            <a:r>
+              <a:rPr lang="de-DE" altLang="de-DE" sz="1400" dirty="0" err="1"/>
+              <a:t>Git</a:t>
+            </a:r>
+            <a:r>
+              <a:rPr lang="de-DE" altLang="de-DE" sz="1400" dirty="0"/>
+              <a:t>-Workflow im Team</a:t>
+            </a:r>
+          </a:p>
+          <a:p>
+            <a:pPr lvl="1">
+              <a:buFont typeface="Arial" panose="020B0604020202020204" pitchFamily="34" charset="0"/>
+              <a:buChar char="•"/>
+            </a:pPr>
+            <a:endParaRPr lang="de-DE" altLang="de-DE" sz="1400" dirty="0"/>
+          </a:p>
+          <a:p>
+            <a:pPr>
+              <a:buFont typeface="Arial" panose="020B0604020202020204" pitchFamily="34" charset="0"/>
+              <a:buChar char="•"/>
+            </a:pPr>
+            <a:r>
+              <a:rPr lang="de-DE" altLang="de-DE" sz="1800" b="1" dirty="0"/>
+              <a:t>Tag 2 – Vertiefung </a:t>
+            </a:r>
+            <a:r>
+              <a:rPr lang="de-DE" altLang="de-DE" sz="1800" b="1" dirty="0" err="1"/>
+              <a:t>Git</a:t>
+            </a:r>
+            <a:r>
+              <a:rPr lang="de-DE" altLang="de-DE" sz="1800" b="1" dirty="0"/>
+              <a:t>-Workflow, CI/CD &amp; </a:t>
+            </a:r>
+            <a:r>
+              <a:rPr lang="de-DE" altLang="de-DE" sz="1800" b="1" dirty="0" err="1"/>
+              <a:t>GitOps</a:t>
+            </a:r>
+            <a:endParaRPr lang="de-DE" altLang="de-DE" sz="1800" b="1" dirty="0"/>
+          </a:p>
+          <a:p>
+            <a:pPr lvl="1">
+              <a:buFont typeface="Arial" panose="020B0604020202020204" pitchFamily="34" charset="0"/>
+              <a:buChar char="•"/>
+            </a:pPr>
+            <a:r>
+              <a:rPr lang="de-DE" altLang="de-DE" sz="1400" dirty="0" err="1"/>
+              <a:t>Gitflow</a:t>
+            </a:r>
+            <a:r>
+              <a:rPr lang="de-DE" altLang="de-DE" sz="1400" dirty="0"/>
+              <a:t>-Workflow</a:t>
+            </a:r>
+          </a:p>
+          <a:p>
+            <a:pPr lvl="1">
+              <a:buFont typeface="Arial" panose="020B0604020202020204" pitchFamily="34" charset="0"/>
+              <a:buChar char="•"/>
+            </a:pPr>
+            <a:r>
+              <a:rPr lang="de-DE" altLang="de-DE" sz="1400" dirty="0"/>
+              <a:t>Tags, Releases &amp; deren Verwaltung</a:t>
+            </a:r>
+          </a:p>
+          <a:p>
+            <a:pPr lvl="1">
+              <a:buFont typeface="Arial" panose="020B0604020202020204" pitchFamily="34" charset="0"/>
+              <a:buChar char="•"/>
+            </a:pPr>
+            <a:r>
+              <a:rPr lang="de-DE" altLang="de-DE" sz="1400" dirty="0"/>
+              <a:t>Einführung in </a:t>
+            </a:r>
+            <a:r>
+              <a:rPr lang="de-DE" altLang="de-DE" sz="1400" dirty="0" err="1"/>
+              <a:t>GitLab</a:t>
+            </a:r>
+            <a:r>
+              <a:rPr lang="de-DE" altLang="de-DE" sz="1400" dirty="0"/>
+              <a:t> CI/CD &amp; </a:t>
+            </a:r>
+            <a:r>
+              <a:rPr lang="de-DE" altLang="de-DE" sz="1400" dirty="0" err="1"/>
+              <a:t>gitlab.yml</a:t>
+            </a:r>
+            <a:endParaRPr lang="de-DE" altLang="de-DE" sz="1400" dirty="0"/>
+          </a:p>
+          <a:p>
+            <a:pPr lvl="1">
+              <a:buFont typeface="Arial" panose="020B0604020202020204" pitchFamily="34" charset="0"/>
+              <a:buChar char="•"/>
+            </a:pPr>
+            <a:r>
+              <a:rPr lang="de-DE" altLang="de-DE" sz="1400" dirty="0"/>
+              <a:t>Grundlagen von </a:t>
+            </a:r>
+            <a:r>
+              <a:rPr lang="de-DE" altLang="de-DE" sz="1400" dirty="0" err="1"/>
+              <a:t>GitOps</a:t>
+            </a:r>
+            <a:endParaRPr lang="de-DE" altLang="de-DE" sz="1400" dirty="0"/>
+          </a:p>
+          <a:p>
+            <a:pPr lvl="1">
+              <a:buFont typeface="Arial" panose="020B0604020202020204" pitchFamily="34" charset="0"/>
+              <a:buChar char="•"/>
+            </a:pPr>
+            <a:endParaRPr lang="de-DE" altLang="de-DE" sz="1400" dirty="0"/>
+          </a:p>
+          <a:p>
+            <a:pPr>
+              <a:buFont typeface="Arial" panose="020B0604020202020204" pitchFamily="34" charset="0"/>
+              <a:buChar char="•"/>
+            </a:pPr>
+            <a:r>
+              <a:rPr lang="de-DE" altLang="de-DE" sz="1800" b="1" dirty="0"/>
+              <a:t>Tag 3 – Docker in der Entwicklung, </a:t>
+            </a:r>
+            <a:r>
+              <a:rPr lang="de-DE" altLang="de-DE" sz="1800" b="1" dirty="0" err="1"/>
+              <a:t>GitLab</a:t>
+            </a:r>
+            <a:r>
+              <a:rPr lang="de-DE" altLang="de-DE" sz="1800" b="1" dirty="0"/>
+              <a:t> CI und </a:t>
+            </a:r>
+            <a:r>
+              <a:rPr lang="de-DE" altLang="de-DE" sz="1800" b="1" dirty="0" err="1"/>
+              <a:t>Deployment</a:t>
+            </a:r>
+            <a:r>
+              <a:rPr lang="de-DE" altLang="de-DE" sz="1800" b="1" dirty="0"/>
+              <a:t>-Strategien</a:t>
+            </a:r>
+          </a:p>
+          <a:p>
+            <a:pPr lvl="1">
+              <a:buFont typeface="Arial" panose="020B0604020202020204" pitchFamily="34" charset="0"/>
+              <a:buChar char="•"/>
+            </a:pPr>
+            <a:r>
+              <a:rPr lang="de-DE" altLang="de-DE" sz="1400" dirty="0"/>
+              <a:t>Lokale Entwicklung mit Docker</a:t>
+            </a:r>
+          </a:p>
+          <a:p>
+            <a:pPr lvl="1">
+              <a:buFont typeface="Arial" panose="020B0604020202020204" pitchFamily="34" charset="0"/>
+              <a:buChar char="•"/>
+            </a:pPr>
+            <a:r>
+              <a:rPr lang="de-DE" altLang="de-DE" sz="1400" dirty="0" err="1"/>
+              <a:t>GitLab</a:t>
+            </a:r>
+            <a:r>
+              <a:rPr lang="de-DE" altLang="de-DE" sz="1400" dirty="0"/>
+              <a:t>-Runner &amp; Docker-Registry</a:t>
+            </a:r>
+          </a:p>
+          <a:p>
+            <a:pPr lvl="1">
+              <a:buFont typeface="Arial" panose="020B0604020202020204" pitchFamily="34" charset="0"/>
+              <a:buChar char="•"/>
+            </a:pPr>
+            <a:r>
+              <a:rPr lang="de-DE" altLang="de-DE" sz="1400" dirty="0"/>
+              <a:t>Erstellen von Release- und </a:t>
+            </a:r>
+            <a:r>
+              <a:rPr lang="de-DE" altLang="de-DE" sz="1400" dirty="0" err="1"/>
+              <a:t>Tagged</a:t>
+            </a:r>
+            <a:r>
+              <a:rPr lang="de-DE" altLang="de-DE" sz="1400" dirty="0"/>
+              <a:t>-Images</a:t>
+            </a:r>
+          </a:p>
+          <a:p>
+            <a:pPr lvl="1">
+              <a:buFont typeface="Arial" panose="020B0604020202020204" pitchFamily="34" charset="0"/>
+              <a:buChar char="•"/>
+            </a:pPr>
+            <a:r>
+              <a:rPr lang="de-DE" altLang="de-DE" sz="1400" dirty="0"/>
+              <a:t>Möglichkeiten des </a:t>
+            </a:r>
+            <a:r>
+              <a:rPr lang="de-DE" altLang="de-DE" sz="1400" dirty="0" err="1"/>
+              <a:t>Deployments</a:t>
+            </a:r>
+            <a:r>
+              <a:rPr lang="de-DE" altLang="de-DE" sz="1400" dirty="0"/>
+              <a:t> &amp; Verwaltung von Konfiguration</a:t>
+            </a:r>
+          </a:p>
+          <a:p>
+            <a:pPr lvl="1">
+              <a:buFont typeface="Arial" panose="020B0604020202020204" pitchFamily="34" charset="0"/>
+              <a:buChar char="•"/>
+            </a:pPr>
+            <a:endParaRPr lang="de-DE" altLang="de-DE" sz="1400" dirty="0"/>
+          </a:p>
+        </p:txBody>
+      </p:sp>
+      <p:sp>
+        <p:nvSpPr>
+          <p:cNvPr id="6147" name="Rectangle 1062">
+            <a:extLst>
+              <a:ext uri="{FF2B5EF4-FFF2-40B4-BE49-F238E27FC236}">
+                <a16:creationId xmlns:a16="http://schemas.microsoft.com/office/drawing/2014/main" id="{C46E9340-3256-8D55-A265-94F2F41E288E}"/>
+              </a:ext>
+            </a:extLst>
+          </p:cNvPr>
+          <p:cNvSpPr>
+            <a:spLocks noGrp="1" noChangeArrowheads="1"/>
+          </p:cNvSpPr>
+          <p:nvPr>
+            <p:ph type="title"/>
+          </p:nvPr>
+        </p:nvSpPr>
+        <p:spPr>
+          <a:xfrm>
+            <a:off x="285750" y="142875"/>
+            <a:ext cx="5654675" cy="706438"/>
+          </a:xfrm>
+        </p:spPr>
+        <p:txBody>
+          <a:bodyPr/>
+          <a:lstStyle/>
+          <a:p>
+            <a:r>
+              <a:rPr lang="de-DE" altLang="de-DE" dirty="0"/>
+              <a:t>Agenda</a:t>
+            </a:r>
+          </a:p>
+        </p:txBody>
+      </p:sp>
+    </p:spTree>
+    <p:extLst>
+      <p:ext uri="{BB962C8B-B14F-4D97-AF65-F5344CB8AC3E}">
+        <p14:creationId xmlns:p14="http://schemas.microsoft.com/office/powerpoint/2010/main" val="3071277897"/>
+      </p:ext>
+    </p:extLst>
+  </p:cSld>
+  <p:clrMapOvr>
+    <a:masterClrMapping/>
+  </p:clrMapOvr>
+</p:sld>
+</file>
+
+<file path=ppt/slides/slide9.xml><?xml version="1.0" encoding="utf-8"?>
+<p:sld xmlns:a="http://schemas.openxmlformats.org/drawingml/2006/main" xmlns:r="http://schemas.openxmlformats.org/officeDocument/2006/relationships" xmlns:p="http://schemas.openxmlformats.org/presentationml/2006/main">
+  <p:cSld>
+    <p:spTree>
+      <p:nvGrpSpPr>
+        <p:cNvPr id="1" name=""/>
+        <p:cNvGrpSpPr/>
+        <p:nvPr/>
+      </p:nvGrpSpPr>
+      <p:grpSpPr>
+        <a:xfrm>
+          <a:off x="0" y="0"/>
+          <a:ext cx="0" cy="0"/>
+          <a:chOff x="0" y="0"/>
+          <a:chExt cx="0" cy="0"/>
+        </a:xfrm>
+      </p:grpSpPr>
+      <p:sp>
+        <p:nvSpPr>
+          <p:cNvPr id="17410" name="Inhaltsplatzhalter 2"/>
+          <p:cNvSpPr>
+            <a:spLocks noGrp="1"/>
+          </p:cNvSpPr>
+          <p:nvPr>
+            <p:ph idx="1"/>
+          </p:nvPr>
+        </p:nvSpPr>
+        <p:spPr>
+          <a:xfrm>
+            <a:off x="303213" y="1462108"/>
+            <a:ext cx="8589962" cy="4824412"/>
+          </a:xfrm>
+        </p:spPr>
+        <p:txBody>
+          <a:bodyPr/>
+          <a:lstStyle/>
+          <a:p>
+            <a:pPr>
+              <a:buNone/>
+            </a:pPr>
+            <a:r>
+              <a:rPr lang="de-DE" sz="2000" b="1" dirty="0"/>
+              <a:t>Montag, 17.06.2024</a:t>
+            </a:r>
+          </a:p>
+          <a:p>
+            <a:pPr>
+              <a:buNone/>
+            </a:pPr>
+            <a:r>
+              <a:rPr lang="de-DE" sz="2000" b="1" dirty="0"/>
+              <a:t>Dienstag, 18.06.2024</a:t>
+            </a:r>
+          </a:p>
+          <a:p>
+            <a:pPr>
+              <a:buNone/>
+            </a:pPr>
+            <a:r>
+              <a:rPr lang="de-DE" sz="2000" b="1" dirty="0"/>
+              <a:t>Mittwoch, 19.06.2024</a:t>
+            </a:r>
+          </a:p>
+          <a:p>
+            <a:pPr>
+              <a:buNone/>
+            </a:pPr>
+            <a:r>
+              <a:rPr lang="de-DE" sz="2000" b="1" dirty="0">
+                <a:solidFill>
+                  <a:schemeClr val="bg1"/>
+                </a:solidFill>
+              </a:rPr>
+              <a:t>Mittwoch, 20.03.2019</a:t>
+            </a:r>
+          </a:p>
+          <a:p>
+            <a:pPr>
+              <a:buNone/>
+            </a:pPr>
+            <a:endParaRPr lang="de-DE" altLang="de-DE" dirty="0">
+              <a:ea typeface="+mn-ea"/>
+              <a:cs typeface="+mn-cs"/>
+            </a:endParaRPr>
+          </a:p>
+          <a:p>
+            <a:pPr marL="342900" lvl="1" indent="-342900">
+              <a:buFont typeface="Arial" charset="0"/>
+              <a:buChar char="●"/>
+            </a:pPr>
+            <a:r>
+              <a:rPr lang="de-DE" altLang="de-DE" dirty="0">
+                <a:ea typeface="+mn-ea"/>
+                <a:cs typeface="+mn-cs"/>
+              </a:rPr>
+              <a:t>Beginn:		  8:00/9:00 Uhr </a:t>
+            </a:r>
+            <a:r>
+              <a:rPr lang="de-DE" altLang="de-DE" dirty="0">
+                <a:highlight>
+                  <a:srgbClr val="FFFF00"/>
+                </a:highlight>
+                <a:ea typeface="+mn-ea"/>
+                <a:cs typeface="+mn-cs"/>
+              </a:rPr>
+              <a:t>TODO PUngewiß</a:t>
+            </a:r>
+          </a:p>
+          <a:p>
+            <a:pPr marL="342900" lvl="1" indent="-342900">
+              <a:buFont typeface="Arial" charset="0"/>
+              <a:buChar char="●"/>
+            </a:pPr>
+            <a:r>
+              <a:rPr lang="de-DE" altLang="de-DE" dirty="0">
+                <a:ea typeface="+mn-ea"/>
+                <a:cs typeface="+mn-cs"/>
+              </a:rPr>
+              <a:t>Kaffeepause:          ~ 10:30 Uhr</a:t>
+            </a:r>
+          </a:p>
+          <a:p>
+            <a:pPr marL="342900" lvl="1" indent="-342900">
+              <a:buFont typeface="Arial" charset="0"/>
+              <a:buChar char="●"/>
+            </a:pPr>
+            <a:r>
+              <a:rPr lang="de-DE" altLang="de-DE" dirty="0">
+                <a:ea typeface="+mn-ea"/>
+                <a:cs typeface="+mn-cs"/>
+              </a:rPr>
+              <a:t>Mittagspause: 	12:00 bis 13:00 Uhr</a:t>
+            </a:r>
+          </a:p>
+          <a:p>
+            <a:pPr marL="342900" lvl="1" indent="-342900">
+              <a:buFont typeface="Arial" charset="0"/>
+              <a:buChar char="●"/>
+            </a:pPr>
+            <a:r>
+              <a:rPr lang="de-DE" altLang="de-DE" dirty="0">
+                <a:ea typeface="+mn-ea"/>
+                <a:cs typeface="+mn-cs"/>
+              </a:rPr>
+              <a:t>Ende: 		16:00/1700 Uhr </a:t>
+            </a:r>
+            <a:r>
+              <a:rPr lang="de-DE" altLang="de-DE" dirty="0">
+                <a:solidFill>
+                  <a:schemeClr val="bg1"/>
+                </a:solidFill>
+                <a:ea typeface="+mn-ea"/>
+                <a:cs typeface="+mn-cs"/>
+              </a:rPr>
+              <a:t>(heu</a:t>
+            </a:r>
+            <a:r>
+              <a:rPr lang="de-DE" altLang="de-DE" dirty="0">
+                <a:highlight>
+                  <a:srgbClr val="FFFF00"/>
+                </a:highlight>
+                <a:ea typeface="+mn-ea"/>
+                <a:cs typeface="+mn-cs"/>
+              </a:rPr>
+              <a:t> TODO PUngewiß </a:t>
+            </a:r>
+            <a:r>
+              <a:rPr lang="de-DE" altLang="de-DE" dirty="0" err="1">
+                <a:solidFill>
+                  <a:schemeClr val="bg1"/>
+                </a:solidFill>
+                <a:ea typeface="+mn-ea"/>
+                <a:cs typeface="+mn-cs"/>
+              </a:rPr>
+              <a:t>te</a:t>
+            </a:r>
+            <a:r>
+              <a:rPr lang="de-DE" altLang="de-DE" dirty="0">
+                <a:solidFill>
+                  <a:schemeClr val="bg1"/>
+                </a:solidFill>
+                <a:ea typeface="+mn-ea"/>
+                <a:cs typeface="+mn-cs"/>
+              </a:rPr>
+              <a:t>: 17:00 Uhr)</a:t>
+            </a:r>
+          </a:p>
+          <a:p>
+            <a:pPr marL="342900" lvl="1" indent="-342900">
+              <a:buFont typeface="Arial" charset="0"/>
+              <a:buChar char="●"/>
+            </a:pPr>
+            <a:endParaRPr lang="de-DE" altLang="de-DE" dirty="0">
+              <a:ea typeface="+mn-ea"/>
+              <a:cs typeface="+mn-cs"/>
+            </a:endParaRPr>
+          </a:p>
+        </p:txBody>
+      </p:sp>
+      <p:sp>
+        <p:nvSpPr>
+          <p:cNvPr id="17411" name="Rectangle 1062"/>
+          <p:cNvSpPr>
+            <a:spLocks noGrp="1" noChangeArrowheads="1"/>
+          </p:cNvSpPr>
+          <p:nvPr>
+            <p:ph type="title"/>
+          </p:nvPr>
+        </p:nvSpPr>
+        <p:spPr>
+          <a:xfrm>
+            <a:off x="285750" y="142875"/>
+            <a:ext cx="5654675" cy="706438"/>
+          </a:xfrm>
+        </p:spPr>
+        <p:txBody>
+          <a:bodyPr/>
+          <a:lstStyle/>
+          <a:p>
+            <a:r>
+              <a:rPr lang="de-DE" dirty="0"/>
+              <a:t>Zeitplan</a:t>
+            </a:r>
+          </a:p>
+        </p:txBody>
+      </p:sp>
+    </p:spTree>
+    <p:extLst>
+      <p:ext uri="{BB962C8B-B14F-4D97-AF65-F5344CB8AC3E}">
+        <p14:creationId xmlns:p14="http://schemas.microsoft.com/office/powerpoint/2010/main" val="2151462665"/>
+      </p:ext>
+    </p:extLst>
+  </p:cSld>
+  <p:clrMapOvr>
+    <a:masterClrMapping/>
+  </p:clrMapOvr>
 </p:sld>
 </file>
 

</xml_diff>

<commit_message>
Fix typos, TODOs abgearbeitet
</commit_message>
<xml_diff>
--- a/slides/Tag-1_1-Begruessung.pptx
+++ b/slides/Tag-1_1-Begruessung.pptx
@@ -1337,6 +1337,91 @@
             <a:fld id="{18182567-388C-4D33-8B7B-A651F195F118}" type="slidenum">
               <a:rPr lang="de-DE" altLang="de-DE" smtClean="0"/>
               <a:pPr/>
+              <a:t>10</a:t>
+            </a:fld>
+            <a:endParaRPr lang="de-DE" altLang="de-DE"/>
+          </a:p>
+        </p:txBody>
+      </p:sp>
+    </p:spTree>
+    <p:extLst>
+      <p:ext uri="{BB962C8B-B14F-4D97-AF65-F5344CB8AC3E}">
+        <p14:creationId xmlns:p14="http://schemas.microsoft.com/office/powerpoint/2010/main" val="3007660536"/>
+      </p:ext>
+    </p:extLst>
+  </p:cSld>
+  <p:clrMapOvr>
+    <a:masterClrMapping/>
+  </p:clrMapOvr>
+</p:notes>
+</file>
+
+<file path=ppt/notesSlides/notesSlide6.xml><?xml version="1.0" encoding="utf-8"?>
+<p:notes xmlns:a="http://schemas.openxmlformats.org/drawingml/2006/main" xmlns:r="http://schemas.openxmlformats.org/officeDocument/2006/relationships" xmlns:p="http://schemas.openxmlformats.org/presentationml/2006/main">
+  <p:cSld>
+    <p:spTree>
+      <p:nvGrpSpPr>
+        <p:cNvPr id="1" name=""/>
+        <p:cNvGrpSpPr/>
+        <p:nvPr/>
+      </p:nvGrpSpPr>
+      <p:grpSpPr>
+        <a:xfrm>
+          <a:off x="0" y="0"/>
+          <a:ext cx="0" cy="0"/>
+          <a:chOff x="0" y="0"/>
+          <a:chExt cx="0" cy="0"/>
+        </a:xfrm>
+      </p:grpSpPr>
+      <p:sp>
+        <p:nvSpPr>
+          <p:cNvPr id="2" name="Folienbildplatzhalter 1"/>
+          <p:cNvSpPr>
+            <a:spLocks noGrp="1" noRot="1" noChangeAspect="1"/>
+          </p:cNvSpPr>
+          <p:nvPr>
+            <p:ph type="sldImg"/>
+          </p:nvPr>
+        </p:nvSpPr>
+        <p:spPr/>
+      </p:sp>
+      <p:sp>
+        <p:nvSpPr>
+          <p:cNvPr id="3" name="Notizenplatzhalter 2"/>
+          <p:cNvSpPr>
+            <a:spLocks noGrp="1"/>
+          </p:cNvSpPr>
+          <p:nvPr>
+            <p:ph type="body" idx="1"/>
+          </p:nvPr>
+        </p:nvSpPr>
+        <p:spPr/>
+        <p:txBody>
+          <a:bodyPr/>
+          <a:lstStyle/>
+          <a:p>
+            <a:endParaRPr lang="de-DE" dirty="0"/>
+          </a:p>
+        </p:txBody>
+      </p:sp>
+      <p:sp>
+        <p:nvSpPr>
+          <p:cNvPr id="4" name="Foliennummernplatzhalter 3"/>
+          <p:cNvSpPr>
+            <a:spLocks noGrp="1"/>
+          </p:cNvSpPr>
+          <p:nvPr>
+            <p:ph type="sldNum" sz="quarter" idx="5"/>
+          </p:nvPr>
+        </p:nvSpPr>
+        <p:spPr/>
+        <p:txBody>
+          <a:bodyPr/>
+          <a:lstStyle/>
+          <a:p>
+            <a:fld id="{18182567-388C-4D33-8B7B-A651F195F118}" type="slidenum">
+              <a:rPr lang="de-DE" altLang="de-DE" smtClean="0"/>
+              <a:pPr/>
               <a:t>12</a:t>
             </a:fld>
             <a:endParaRPr lang="de-DE" altLang="de-DE"/>
@@ -1831,7 +1916,7 @@
               <a:pPr algn="ctr">
                 <a:defRPr/>
               </a:pPr>
-              <a:t>04.06.2024</a:t>
+              <a:t>06.06.2024</a:t>
             </a:fld>
             <a:endParaRPr lang="de-DE" sz="1000">
               <a:solidFill>
@@ -4220,33 +4305,6 @@
               <a:buFont typeface="Arial" charset="0"/>
               <a:buChar char="●"/>
             </a:pPr>
-            <a:endParaRPr lang="de-DE" altLang="de-DE" dirty="0">
-              <a:ea typeface="+mn-ea"/>
-              <a:cs typeface="+mn-cs"/>
-            </a:endParaRPr>
-          </a:p>
-          <a:p>
-            <a:pPr marL="342900" lvl="1" indent="-342900">
-              <a:buFont typeface="Arial" charset="0"/>
-              <a:buChar char="●"/>
-            </a:pPr>
-            <a:r>
-              <a:rPr lang="de-DE" altLang="de-DE" dirty="0">
-                <a:ea typeface="+mn-ea"/>
-                <a:cs typeface="+mn-cs"/>
-              </a:rPr>
-              <a:t>GitHub bereitstellen? </a:t>
-            </a:r>
-            <a:r>
-              <a:rPr lang="de-DE" altLang="de-DE" dirty="0">
-                <a:highlight>
-                  <a:srgbClr val="FFFF00"/>
-                </a:highlight>
-                <a:ea typeface="+mn-ea"/>
-                <a:cs typeface="+mn-cs"/>
-              </a:rPr>
-              <a:t>TODO PUngewiß</a:t>
-            </a:r>
             <a:endParaRPr lang="de-DE" altLang="de-DE" dirty="0">
               <a:ea typeface="+mn-ea"/>
               <a:cs typeface="+mn-cs"/>
@@ -10577,18 +10635,15 @@
                 <a:ea typeface="+mn-ea"/>
                 <a:cs typeface="+mn-cs"/>
               </a:rPr>
-              <a:t>Beginn:		  8:00/9:00 Uhr </a:t>
-            </a:r>
-            <a:r>
-              <a:rPr lang="de-DE" altLang="de-DE" dirty="0">
-                <a:highlight>
-                  <a:srgbClr val="FFFF00"/>
-                </a:highlight>
-                <a:ea typeface="+mn-ea"/>
-                <a:cs typeface="+mn-cs"/>
-              </a:rPr>
-              <a:t>TODO PUngewiß</a:t>
-            </a:r>
+              <a:t>Beginn:		  9:00 Uhr</a:t>
+            </a:r>
+            <a:endParaRPr lang="de-DE" altLang="de-DE" dirty="0">
+              <a:highlight>
+                <a:srgbClr val="FFFF00"/>
+              </a:highlight>
+              <a:ea typeface="+mn-ea"/>
+              <a:cs typeface="+mn-cs"/>
+            </a:endParaRPr>
           </a:p>
           <a:p>
             <a:pPr marL="342900" lvl="1" indent="-342900">
@@ -10626,7 +10681,7 @@
                 <a:ea typeface="+mn-ea"/>
                 <a:cs typeface="+mn-cs"/>
               </a:rPr>
-              <a:t>Ende: 		16:00/1700 Uhr </a:t>
+              <a:t>Ende: 		17:00 Uhr </a:t>
             </a:r>
             <a:r>
               <a:rPr lang="de-DE" altLang="de-DE" dirty="0">
@@ -10636,37 +10691,7 @@
                 <a:ea typeface="+mn-ea"/>
                 <a:cs typeface="+mn-cs"/>
               </a:rPr>
-              <a:t>(heu</a:t>
-            </a:r>
-            <a:r>
-              <a:rPr lang="de-DE" altLang="de-DE" dirty="0">
-                <a:highlight>
-                  <a:srgbClr val="FFFF00"/>
-                </a:highlight>
-                <a:ea typeface="+mn-ea"/>
-                <a:cs typeface="+mn-cs"/>
-              </a:rPr>
-              <a:t> TODO PUngewiß </a:t>
-            </a:r>
-            <a:r>
-              <a:rPr lang="de-DE" altLang="de-DE" dirty="0" err="1">
-                <a:solidFill>
-                  <a:schemeClr val="bg1"/>
-                </a:solidFill>
-                <a:ea typeface="+mn-ea"/>
-                <a:cs typeface="+mn-cs"/>
-              </a:rPr>
-              <a:t>te</a:t>
-            </a:r>
-            <a:r>
-              <a:rPr lang="de-DE" altLang="de-DE" dirty="0">
-                <a:solidFill>
-                  <a:schemeClr val="bg1"/>
-                </a:solidFill>
-                <a:ea typeface="+mn-ea"/>
-                <a:cs typeface="+mn-cs"/>
-              </a:rPr>
-              <a:t>: 17:00 Uhr)</a:t>
+              <a:t>(heu: 17:00 Uhr)</a:t>
             </a:r>
           </a:p>
           <a:p>

</xml_diff>

<commit_message>
Speaker Slide Malte Fischer
</commit_message>
<xml_diff>
--- a/slides/Tag-1_1-Begruessung.pptx
+++ b/slides/Tag-1_1-Begruessung.pptx
@@ -1916,7 +1916,7 @@
               <a:pPr algn="ctr">
                 <a:defRPr/>
               </a:pPr>
-              <a:t>06.06.2024</a:t>
+              <a:t>10.06.2024</a:t>
             </a:fld>
             <a:endParaRPr lang="de-DE" sz="1000">
               <a:solidFill>
@@ -5147,13 +5147,10 @@
             </a:pPr>
             <a:r>
               <a:rPr lang="de-DE" altLang="de-DE" sz="2000" dirty="0">
-                <a:highlight>
-                  <a:srgbClr val="FFFF00"/>
-                </a:highlight>
                 <a:ea typeface="+mn-ea"/>
                 <a:cs typeface="+mn-cs"/>
               </a:rPr>
-              <a:t>Hier bitte</a:t>
+              <a:t>Webentwicklung</a:t>
             </a:r>
           </a:p>
           <a:p>
@@ -5163,13 +5160,10 @@
             </a:pPr>
             <a:r>
               <a:rPr lang="de-DE" altLang="de-DE" sz="2000" dirty="0">
-                <a:highlight>
-                  <a:srgbClr val="FFFF00"/>
-                </a:highlight>
                 <a:ea typeface="+mn-ea"/>
                 <a:cs typeface="+mn-cs"/>
               </a:rPr>
-              <a:t>Einige Punkte ergänzen</a:t>
+              <a:t>Front und Backend</a:t>
             </a:r>
           </a:p>
           <a:p>
@@ -5179,13 +5173,10 @@
             </a:pPr>
             <a:r>
               <a:rPr lang="de-DE" altLang="de-DE" sz="2000" dirty="0">
-                <a:highlight>
-                  <a:srgbClr val="FFFF00"/>
-                </a:highlight>
                 <a:ea typeface="+mn-ea"/>
                 <a:cs typeface="+mn-cs"/>
               </a:rPr>
-              <a:t>Am CV kann man sich</a:t>
+              <a:t>Clean Code</a:t>
             </a:r>
           </a:p>
           <a:p>
@@ -5195,51 +5186,35 @@
             </a:pPr>
             <a:r>
               <a:rPr lang="de-DE" altLang="de-DE" sz="2000" dirty="0">
-                <a:highlight>
-                  <a:srgbClr val="FFFF00"/>
-                </a:highlight>
                 <a:ea typeface="+mn-ea"/>
                 <a:cs typeface="+mn-cs"/>
               </a:rPr>
-              <a:t>Immer sehr gut</a:t>
-            </a:r>
-          </a:p>
-          <a:p>
-            <a:pPr marL="762000" lvl="3" indent="-342900">
+              <a:t>Responsive Design</a:t>
+            </a:r>
+          </a:p>
+          <a:p>
+            <a:pPr marL="342900" lvl="1" indent="-342900">
               <a:buFont typeface="Arial" charset="0"/>
               <a:buChar char="●"/>
             </a:pPr>
             <a:r>
-              <a:rPr lang="de-DE" altLang="de-DE" sz="2000" dirty="0">
-                <a:highlight>
-                  <a:srgbClr val="FFFF00"/>
-                </a:highlight>
+              <a:rPr lang="de-DE" altLang="de-DE" dirty="0">
                 <a:ea typeface="+mn-ea"/>
                 <a:cs typeface="+mn-cs"/>
               </a:rPr>
-              <a:t>orientieren</a:t>
-            </a:r>
-            <a:endParaRPr lang="de-DE" altLang="de-DE" sz="2000" dirty="0">
-              <a:highlight>
-                <a:srgbClr val="FFFF00"/>
-              </a:highlight>
-            </a:endParaRPr>
-          </a:p>
-          <a:p>
-            <a:pPr marL="342900" lvl="1" indent="-342900">
-              <a:buFont typeface="Arial" charset="0"/>
-              <a:buChar char="●"/>
-            </a:pPr>
-            <a:r>
-              <a:rPr lang="de-DE" altLang="de-DE" dirty="0">
-                <a:highlight>
-                  <a:srgbClr val="FFFF00"/>
-                </a:highlight>
+              <a:t>Java, Angular, </a:t>
+            </a:r>
+            <a:r>
+              <a:rPr lang="de-DE" altLang="de-DE" dirty="0" err="1">
                 <a:ea typeface="+mn-ea"/>
                 <a:cs typeface="+mn-cs"/>
               </a:rPr>
-              <a:t>Hier stehen Techniken</a:t>
-            </a:r>
+              <a:t>React</a:t>
+            </a:r>
+            <a:endParaRPr lang="de-DE" altLang="de-DE" dirty="0">
+              <a:ea typeface="+mn-ea"/>
+              <a:cs typeface="+mn-cs"/>
+            </a:endParaRPr>
           </a:p>
         </p:txBody>
       </p:sp>

</xml_diff>

<commit_message>
Kundenlogo hinzugefügt, Agenda-Slides angepasst, Footer ergänzt
</commit_message>
<xml_diff>
--- a/slides/Tag-1_1-Begruessung.pptx
+++ b/slides/Tag-1_1-Begruessung.pptx
@@ -19,7 +19,7 @@
     <p:sldId id="466" r:id="rId7"/>
     <p:sldId id="590" r:id="rId8"/>
     <p:sldId id="289" r:id="rId9"/>
-    <p:sldId id="291" r:id="rId10"/>
+    <p:sldId id="591" r:id="rId10"/>
     <p:sldId id="458" r:id="rId11"/>
     <p:sldId id="459" r:id="rId12"/>
     <p:sldId id="461" r:id="rId13"/>
@@ -997,7 +997,7 @@
             <a:fld id="{18182567-388C-4D33-8B7B-A651F195F118}" type="slidenum">
               <a:rPr lang="de-DE" altLang="de-DE" smtClean="0"/>
               <a:pPr/>
-              <a:t>3</a:t>
+              <a:t>1</a:t>
             </a:fld>
             <a:endParaRPr lang="de-DE" altLang="de-DE"/>
           </a:p>
@@ -1006,7 +1006,7 @@
     </p:spTree>
     <p:extLst>
       <p:ext uri="{BB962C8B-B14F-4D97-AF65-F5344CB8AC3E}">
-        <p14:creationId xmlns:p14="http://schemas.microsoft.com/office/powerpoint/2010/main" val="4097419684"/>
+        <p14:creationId xmlns:p14="http://schemas.microsoft.com/office/powerpoint/2010/main" val="2433759516"/>
       </p:ext>
     </p:extLst>
   </p:cSld>
@@ -1082,7 +1082,7 @@
             <a:fld id="{18182567-388C-4D33-8B7B-A651F195F118}" type="slidenum">
               <a:rPr lang="de-DE" altLang="de-DE" smtClean="0"/>
               <a:pPr/>
-              <a:t>4</a:t>
+              <a:t>3</a:t>
             </a:fld>
             <a:endParaRPr lang="de-DE" altLang="de-DE"/>
           </a:p>
@@ -1091,7 +1091,7 @@
     </p:spTree>
     <p:extLst>
       <p:ext uri="{BB962C8B-B14F-4D97-AF65-F5344CB8AC3E}">
-        <p14:creationId xmlns:p14="http://schemas.microsoft.com/office/powerpoint/2010/main" val="3863189166"/>
+        <p14:creationId xmlns:p14="http://schemas.microsoft.com/office/powerpoint/2010/main" val="4097419684"/>
       </p:ext>
     </p:extLst>
   </p:cSld>
@@ -1167,7 +1167,7 @@
             <a:fld id="{18182567-388C-4D33-8B7B-A651F195F118}" type="slidenum">
               <a:rPr lang="de-DE" altLang="de-DE" smtClean="0"/>
               <a:pPr/>
-              <a:t>5</a:t>
+              <a:t>4</a:t>
             </a:fld>
             <a:endParaRPr lang="de-DE" altLang="de-DE"/>
           </a:p>
@@ -1176,7 +1176,7 @@
     </p:spTree>
     <p:extLst>
       <p:ext uri="{BB962C8B-B14F-4D97-AF65-F5344CB8AC3E}">
-        <p14:creationId xmlns:p14="http://schemas.microsoft.com/office/powerpoint/2010/main" val="727468044"/>
+        <p14:creationId xmlns:p14="http://schemas.microsoft.com/office/powerpoint/2010/main" val="3863189166"/>
       </p:ext>
     </p:extLst>
   </p:cSld>
@@ -1252,7 +1252,7 @@
             <a:fld id="{18182567-388C-4D33-8B7B-A651F195F118}" type="slidenum">
               <a:rPr lang="de-DE" altLang="de-DE" smtClean="0"/>
               <a:pPr/>
-              <a:t>6</a:t>
+              <a:t>5</a:t>
             </a:fld>
             <a:endParaRPr lang="de-DE" altLang="de-DE"/>
           </a:p>
@@ -1261,7 +1261,7 @@
     </p:spTree>
     <p:extLst>
       <p:ext uri="{BB962C8B-B14F-4D97-AF65-F5344CB8AC3E}">
-        <p14:creationId xmlns:p14="http://schemas.microsoft.com/office/powerpoint/2010/main" val="3851487306"/>
+        <p14:creationId xmlns:p14="http://schemas.microsoft.com/office/powerpoint/2010/main" val="727468044"/>
       </p:ext>
     </p:extLst>
   </p:cSld>
@@ -1337,6 +1337,176 @@
             <a:fld id="{18182567-388C-4D33-8B7B-A651F195F118}" type="slidenum">
               <a:rPr lang="de-DE" altLang="de-DE" smtClean="0"/>
               <a:pPr/>
+              <a:t>6</a:t>
+            </a:fld>
+            <a:endParaRPr lang="de-DE" altLang="de-DE"/>
+          </a:p>
+        </p:txBody>
+      </p:sp>
+    </p:spTree>
+    <p:extLst>
+      <p:ext uri="{BB962C8B-B14F-4D97-AF65-F5344CB8AC3E}">
+        <p14:creationId xmlns:p14="http://schemas.microsoft.com/office/powerpoint/2010/main" val="3851487306"/>
+      </p:ext>
+    </p:extLst>
+  </p:cSld>
+  <p:clrMapOvr>
+    <a:masterClrMapping/>
+  </p:clrMapOvr>
+</p:notes>
+</file>
+
+<file path=ppt/notesSlides/notesSlide6.xml><?xml version="1.0" encoding="utf-8"?>
+<p:notes xmlns:a="http://schemas.openxmlformats.org/drawingml/2006/main" xmlns:r="http://schemas.openxmlformats.org/officeDocument/2006/relationships" xmlns:p="http://schemas.openxmlformats.org/presentationml/2006/main">
+  <p:cSld>
+    <p:spTree>
+      <p:nvGrpSpPr>
+        <p:cNvPr id="1" name=""/>
+        <p:cNvGrpSpPr/>
+        <p:nvPr/>
+      </p:nvGrpSpPr>
+      <p:grpSpPr>
+        <a:xfrm>
+          <a:off x="0" y="0"/>
+          <a:ext cx="0" cy="0"/>
+          <a:chOff x="0" y="0"/>
+          <a:chExt cx="0" cy="0"/>
+        </a:xfrm>
+      </p:grpSpPr>
+      <p:sp>
+        <p:nvSpPr>
+          <p:cNvPr id="2" name="Folienbildplatzhalter 1"/>
+          <p:cNvSpPr>
+            <a:spLocks noGrp="1" noRot="1" noChangeAspect="1"/>
+          </p:cNvSpPr>
+          <p:nvPr>
+            <p:ph type="sldImg"/>
+          </p:nvPr>
+        </p:nvSpPr>
+        <p:spPr/>
+      </p:sp>
+      <p:sp>
+        <p:nvSpPr>
+          <p:cNvPr id="3" name="Notizenplatzhalter 2"/>
+          <p:cNvSpPr>
+            <a:spLocks noGrp="1"/>
+          </p:cNvSpPr>
+          <p:nvPr>
+            <p:ph type="body" idx="1"/>
+          </p:nvPr>
+        </p:nvSpPr>
+        <p:spPr/>
+        <p:txBody>
+          <a:bodyPr/>
+          <a:lstStyle/>
+          <a:p>
+            <a:endParaRPr lang="de-DE" dirty="0"/>
+          </a:p>
+        </p:txBody>
+      </p:sp>
+      <p:sp>
+        <p:nvSpPr>
+          <p:cNvPr id="4" name="Foliennummernplatzhalter 3"/>
+          <p:cNvSpPr>
+            <a:spLocks noGrp="1"/>
+          </p:cNvSpPr>
+          <p:nvPr>
+            <p:ph type="sldNum" sz="quarter" idx="5"/>
+          </p:nvPr>
+        </p:nvSpPr>
+        <p:spPr/>
+        <p:txBody>
+          <a:bodyPr/>
+          <a:lstStyle/>
+          <a:p>
+            <a:fld id="{18182567-388C-4D33-8B7B-A651F195F118}" type="slidenum">
+              <a:rPr lang="de-DE" altLang="de-DE" smtClean="0"/>
+              <a:pPr/>
+              <a:t>8</a:t>
+            </a:fld>
+            <a:endParaRPr lang="de-DE" altLang="de-DE"/>
+          </a:p>
+        </p:txBody>
+      </p:sp>
+    </p:spTree>
+    <p:extLst>
+      <p:ext uri="{BB962C8B-B14F-4D97-AF65-F5344CB8AC3E}">
+        <p14:creationId xmlns:p14="http://schemas.microsoft.com/office/powerpoint/2010/main" val="1399969878"/>
+      </p:ext>
+    </p:extLst>
+  </p:cSld>
+  <p:clrMapOvr>
+    <a:masterClrMapping/>
+  </p:clrMapOvr>
+</p:notes>
+</file>
+
+<file path=ppt/notesSlides/notesSlide7.xml><?xml version="1.0" encoding="utf-8"?>
+<p:notes xmlns:a="http://schemas.openxmlformats.org/drawingml/2006/main" xmlns:r="http://schemas.openxmlformats.org/officeDocument/2006/relationships" xmlns:p="http://schemas.openxmlformats.org/presentationml/2006/main">
+  <p:cSld>
+    <p:spTree>
+      <p:nvGrpSpPr>
+        <p:cNvPr id="1" name=""/>
+        <p:cNvGrpSpPr/>
+        <p:nvPr/>
+      </p:nvGrpSpPr>
+      <p:grpSpPr>
+        <a:xfrm>
+          <a:off x="0" y="0"/>
+          <a:ext cx="0" cy="0"/>
+          <a:chOff x="0" y="0"/>
+          <a:chExt cx="0" cy="0"/>
+        </a:xfrm>
+      </p:grpSpPr>
+      <p:sp>
+        <p:nvSpPr>
+          <p:cNvPr id="2" name="Folienbildplatzhalter 1"/>
+          <p:cNvSpPr>
+            <a:spLocks noGrp="1" noRot="1" noChangeAspect="1"/>
+          </p:cNvSpPr>
+          <p:nvPr>
+            <p:ph type="sldImg"/>
+          </p:nvPr>
+        </p:nvSpPr>
+        <p:spPr/>
+      </p:sp>
+      <p:sp>
+        <p:nvSpPr>
+          <p:cNvPr id="3" name="Notizenplatzhalter 2"/>
+          <p:cNvSpPr>
+            <a:spLocks noGrp="1"/>
+          </p:cNvSpPr>
+          <p:nvPr>
+            <p:ph type="body" idx="1"/>
+          </p:nvPr>
+        </p:nvSpPr>
+        <p:spPr/>
+        <p:txBody>
+          <a:bodyPr/>
+          <a:lstStyle/>
+          <a:p>
+            <a:endParaRPr lang="de-DE" dirty="0"/>
+          </a:p>
+        </p:txBody>
+      </p:sp>
+      <p:sp>
+        <p:nvSpPr>
+          <p:cNvPr id="4" name="Foliennummernplatzhalter 3"/>
+          <p:cNvSpPr>
+            <a:spLocks noGrp="1"/>
+          </p:cNvSpPr>
+          <p:nvPr>
+            <p:ph type="sldNum" sz="quarter" idx="5"/>
+          </p:nvPr>
+        </p:nvSpPr>
+        <p:spPr/>
+        <p:txBody>
+          <a:bodyPr/>
+          <a:lstStyle/>
+          <a:p>
+            <a:fld id="{18182567-388C-4D33-8B7B-A651F195F118}" type="slidenum">
+              <a:rPr lang="de-DE" altLang="de-DE" smtClean="0"/>
+              <a:pPr/>
               <a:t>10</a:t>
             </a:fld>
             <a:endParaRPr lang="de-DE" altLang="de-DE"/>
@@ -1356,7 +1526,7 @@
 </p:notes>
 </file>
 
-<file path=ppt/notesSlides/notesSlide6.xml><?xml version="1.0" encoding="utf-8"?>
+<file path=ppt/notesSlides/notesSlide8.xml><?xml version="1.0" encoding="utf-8"?>
 <p:notes xmlns:a="http://schemas.openxmlformats.org/drawingml/2006/main" xmlns:r="http://schemas.openxmlformats.org/officeDocument/2006/relationships" xmlns:p="http://schemas.openxmlformats.org/presentationml/2006/main">
   <p:cSld>
     <p:spTree>
@@ -2279,7 +2449,7 @@
                 </a:solidFill>
                 <a:latin typeface="Arial" charset="0"/>
               </a:rPr>
-              <a:t>&lt;Autor&gt;</a:t>
+              <a:t>Daniel Krämer &amp; Malte Fischer</a:t>
             </a:r>
           </a:p>
         </p:txBody>
@@ -3917,8 +4087,12 @@
           <a:p>
             <a:pPr algn="l" eaLnBrk="1" hangingPunct="1"/>
             <a:r>
+              <a:rPr lang="de-DE" altLang="de-DE" sz="3200" dirty="0" err="1"/>
+              <a:t>GitLab</a:t>
+            </a:r>
+            <a:r>
               <a:rPr lang="de-DE" altLang="de-DE" sz="3200" dirty="0"/>
-              <a:t>Tag 1: </a:t>
+              <a:t>: </a:t>
             </a:r>
             <a:r>
               <a:rPr lang="de-DE" altLang="de-DE" sz="3200" dirty="0" err="1"/>
@@ -3926,26 +4100,19 @@
             </a:r>
             <a:r>
               <a:rPr lang="de-DE" altLang="de-DE" sz="3200" dirty="0"/>
-              <a:t> &amp; </a:t>
+              <a:t>-Workflows &amp; </a:t>
             </a:r>
             <a:r>
               <a:rPr lang="de-DE" altLang="de-DE" sz="3200" dirty="0" err="1"/>
-              <a:t>GitLab</a:t>
+              <a:t>GitOps</a:t>
             </a:r>
             <a:r>
               <a:rPr lang="de-DE" altLang="de-DE" sz="3200" dirty="0"/>
-              <a:t>,</a:t>
-            </a:r>
-            <a:br>
-              <a:rPr lang="de-DE" altLang="de-DE" sz="3200" dirty="0"/>
-            </a:br>
+              <a:t> – CI/CD mit Docker und </a:t>
+            </a:r>
             <a:r>
               <a:rPr lang="de-DE" altLang="de-DE" sz="3200" dirty="0" err="1"/>
               <a:t>Git</a:t>
-            </a:r>
-            <a:r>
-              <a:rPr lang="de-DE" altLang="de-DE" sz="3200" dirty="0"/>
-              <a:t>-Workflow im Team</a:t>
             </a:r>
             <a:br>
               <a:rPr lang="de-DE" altLang="de-DE" sz="3200" dirty="0"/>
@@ -3972,8 +4139,8 @@
         </p:nvSpPr>
         <p:spPr bwMode="auto">
           <a:xfrm>
-            <a:off x="468313" y="4462463"/>
-            <a:ext cx="2159000" cy="622300"/>
+            <a:off x="468312" y="4462463"/>
+            <a:ext cx="4190603" cy="622300"/>
           </a:xfrm>
           <a:prstGeom prst="rect">
             <a:avLst/>
@@ -4008,8 +4175,8 @@
               <a:buNone/>
             </a:pPr>
             <a:r>
-              <a:rPr lang="de-DE" altLang="de-DE" sz="1600"/>
-              <a:t>&lt;Datum, Autor&gt;</a:t>
+              <a:rPr lang="de-DE" altLang="de-DE" sz="1600" dirty="0"/>
+              <a:t>17.06.2024, Daniel Krämer &amp; Malte Fischer</a:t>
             </a:r>
           </a:p>
         </p:txBody>
@@ -4162,18 +4329,54 @@
           </a:lstStyle>
           <a:p>
             <a:pPr eaLnBrk="1" hangingPunct="1"/>
-            <a:r>
-              <a:rPr lang="de-DE" altLang="de-DE" sz="4400">
-                <a:solidFill>
-                  <a:schemeClr val="tx2"/>
-                </a:solidFill>
-                <a:latin typeface="Arial" panose="020B0604020202020204" pitchFamily="34" charset="0"/>
-              </a:rPr>
-              <a:t>&lt;Kundenlogo&gt;</a:t>
-            </a:r>
+            <a:endParaRPr lang="de-DE" altLang="de-DE" sz="4400" dirty="0">
+              <a:solidFill>
+                <a:schemeClr val="tx2"/>
+              </a:solidFill>
+              <a:latin typeface="Arial" panose="020B0604020202020204" pitchFamily="34" charset="0"/>
+            </a:endParaRPr>
           </a:p>
         </p:txBody>
       </p:sp>
+      <p:pic>
+        <p:nvPicPr>
+          <p:cNvPr id="3" name="Grafik 2">
+            <a:extLst>
+              <a:ext uri="{FF2B5EF4-FFF2-40B4-BE49-F238E27FC236}">
+                <a16:creationId xmlns:a16="http://schemas.microsoft.com/office/drawing/2014/main" id="{F795EC6A-86ED-78D6-3916-EC81E8315965}"/>
+              </a:ext>
+            </a:extLst>
+          </p:cNvPr>
+          <p:cNvPicPr>
+            <a:picLocks noChangeAspect="1"/>
+          </p:cNvPicPr>
+          <p:nvPr/>
+        </p:nvPicPr>
+        <p:blipFill>
+          <a:blip r:embed="rId3">
+            <a:extLst>
+              <a:ext uri="{28A0092B-C50C-407E-A947-70E740481C1C}">
+                <a14:useLocalDpi xmlns:a14="http://schemas.microsoft.com/office/drawing/2010/main" val="0"/>
+              </a:ext>
+              <a:ext uri="{96DAC541-7B7A-43D3-8B79-37D633B846F1}">
+                <asvg:svgBlip xmlns:asvg="http://schemas.microsoft.com/office/drawing/2016/SVG/main" r:embed="rId4"/>
+              </a:ext>
+            </a:extLst>
+          </a:blip>
+          <a:stretch>
+            <a:fillRect/>
+          </a:stretch>
+        </p:blipFill>
+        <p:spPr>
+          <a:xfrm>
+            <a:off x="309959" y="263970"/>
+            <a:ext cx="4348957" cy="1508822"/>
+          </a:xfrm>
+          <a:prstGeom prst="rect">
+            <a:avLst/>
+          </a:prstGeom>
+        </p:spPr>
+      </p:pic>
     </p:spTree>
   </p:cSld>
   <p:clrMapOvr>
@@ -4842,7 +5045,7 @@
 </file>
 
 <file path=ppt/slides/slide3.xml><?xml version="1.0" encoding="utf-8"?>
-<p:sld xmlns:a="http://schemas.openxmlformats.org/drawingml/2006/main" xmlns:r="http://schemas.openxmlformats.org/officeDocument/2006/relationships" xmlns:p="http://schemas.openxmlformats.org/presentationml/2006/main" show="0">
+<p:sld xmlns:a="http://schemas.openxmlformats.org/drawingml/2006/main" xmlns:r="http://schemas.openxmlformats.org/officeDocument/2006/relationships" xmlns:p="http://schemas.openxmlformats.org/presentationml/2006/main">
   <p:cSld>
     <p:spTree>
       <p:nvGrpSpPr>
@@ -5070,7 +5273,7 @@
 </file>
 
 <file path=ppt/slides/slide4.xml><?xml version="1.0" encoding="utf-8"?>
-<p:sld xmlns:a="http://schemas.openxmlformats.org/drawingml/2006/main" xmlns:r="http://schemas.openxmlformats.org/officeDocument/2006/relationships" xmlns:p="http://schemas.openxmlformats.org/presentationml/2006/main" show="0">
+<p:sld xmlns:a="http://schemas.openxmlformats.org/drawingml/2006/main" xmlns:r="http://schemas.openxmlformats.org/officeDocument/2006/relationships" xmlns:p="http://schemas.openxmlformats.org/presentationml/2006/main">
   <p:cSld>
     <p:spTree>
       <p:nvGrpSpPr>
@@ -9772,7 +9975,132 @@
               <a:buFont typeface="Arial" panose="020B0604020202020204" pitchFamily="34" charset="0"/>
               <a:buChar char="•"/>
             </a:pPr>
-            <a:endParaRPr lang="de-DE" altLang="de-DE" sz="1800" b="1" dirty="0"/>
+            <a:r>
+              <a:rPr lang="de-DE" altLang="de-DE" sz="1800" b="1" dirty="0"/>
+              <a:t>Tag 1 – Einführung in </a:t>
+            </a:r>
+            <a:r>
+              <a:rPr lang="de-DE" altLang="de-DE" sz="1800" b="1" dirty="0" err="1"/>
+              <a:t>Git</a:t>
+            </a:r>
+            <a:r>
+              <a:rPr lang="de-DE" altLang="de-DE" sz="1800" b="1" dirty="0"/>
+              <a:t> und </a:t>
+            </a:r>
+            <a:r>
+              <a:rPr lang="de-DE" altLang="de-DE" sz="1800" b="1" dirty="0" err="1"/>
+              <a:t>GitLab</a:t>
+            </a:r>
+            <a:r>
+              <a:rPr lang="de-DE" altLang="de-DE" sz="1800" b="1" dirty="0"/>
+              <a:t>, </a:t>
+            </a:r>
+            <a:r>
+              <a:rPr lang="de-DE" altLang="de-DE" sz="1800" b="1" dirty="0" err="1"/>
+              <a:t>Git</a:t>
+            </a:r>
+            <a:r>
+              <a:rPr lang="de-DE" altLang="de-DE" sz="1800" b="1" dirty="0"/>
+              <a:t>-Workflow im Team</a:t>
+            </a:r>
+          </a:p>
+          <a:p>
+            <a:pPr lvl="1">
+              <a:buFont typeface="Arial" panose="020B0604020202020204" pitchFamily="34" charset="0"/>
+              <a:buChar char="•"/>
+            </a:pPr>
+            <a:r>
+              <a:rPr lang="de-DE" altLang="de-DE" sz="1400" dirty="0"/>
+              <a:t>Einführung &amp; Kursüberblick</a:t>
+            </a:r>
+          </a:p>
+          <a:p>
+            <a:pPr lvl="1">
+              <a:buFont typeface="Arial" panose="020B0604020202020204" pitchFamily="34" charset="0"/>
+              <a:buChar char="•"/>
+            </a:pPr>
+            <a:r>
+              <a:rPr lang="de-DE" altLang="de-DE" sz="1400" dirty="0"/>
+              <a:t>Grundlagen von </a:t>
+            </a:r>
+            <a:r>
+              <a:rPr lang="de-DE" altLang="de-DE" sz="1400" dirty="0" err="1"/>
+              <a:t>Git</a:t>
+            </a:r>
+            <a:endParaRPr lang="de-DE" altLang="de-DE" sz="1400" dirty="0"/>
+          </a:p>
+          <a:p>
+            <a:pPr lvl="1">
+              <a:buFont typeface="Arial" panose="020B0604020202020204" pitchFamily="34" charset="0"/>
+              <a:buChar char="•"/>
+            </a:pPr>
+            <a:r>
+              <a:rPr lang="de-DE" altLang="de-DE" sz="1400" dirty="0" err="1"/>
+              <a:t>Git</a:t>
+            </a:r>
+            <a:r>
+              <a:rPr lang="de-DE" altLang="de-DE" sz="1400" dirty="0"/>
+              <a:t> </a:t>
+            </a:r>
+            <a:r>
+              <a:rPr lang="de-DE" altLang="de-DE" sz="1400" dirty="0" err="1"/>
+              <a:t>Rebase</a:t>
+            </a:r>
+            <a:r>
+              <a:rPr lang="de-DE" altLang="de-DE" sz="1400" dirty="0"/>
+              <a:t> und </a:t>
+            </a:r>
+            <a:r>
+              <a:rPr lang="de-DE" altLang="de-DE" sz="1400" dirty="0" err="1"/>
+              <a:t>Merge</a:t>
+            </a:r>
+            <a:r>
+              <a:rPr lang="de-DE" altLang="de-DE" sz="1400" dirty="0"/>
+              <a:t>-Strategien</a:t>
+            </a:r>
+          </a:p>
+          <a:p>
+            <a:pPr lvl="1">
+              <a:buFont typeface="Arial" panose="020B0604020202020204" pitchFamily="34" charset="0"/>
+              <a:buChar char="•"/>
+            </a:pPr>
+            <a:r>
+              <a:rPr lang="de-DE" altLang="de-DE" sz="1400" dirty="0" err="1"/>
+              <a:t>Git</a:t>
+            </a:r>
+            <a:r>
+              <a:rPr lang="de-DE" altLang="de-DE" sz="1400" dirty="0"/>
+              <a:t> Remote</a:t>
+            </a:r>
+          </a:p>
+          <a:p>
+            <a:pPr lvl="1">
+              <a:buFont typeface="Arial" panose="020B0604020202020204" pitchFamily="34" charset="0"/>
+              <a:buChar char="•"/>
+            </a:pPr>
+            <a:r>
+              <a:rPr lang="de-DE" altLang="de-DE" sz="1400" dirty="0"/>
+              <a:t>Grundlagen von </a:t>
+            </a:r>
+            <a:r>
+              <a:rPr lang="de-DE" altLang="de-DE" sz="1400" dirty="0" err="1"/>
+              <a:t>GitLab</a:t>
+            </a:r>
+            <a:endParaRPr lang="de-DE" altLang="de-DE" sz="1400" dirty="0"/>
+          </a:p>
+          <a:p>
+            <a:pPr lvl="1">
+              <a:buFont typeface="Arial" panose="020B0604020202020204" pitchFamily="34" charset="0"/>
+              <a:buChar char="•"/>
+            </a:pPr>
+            <a:r>
+              <a:rPr lang="de-DE" altLang="de-DE" sz="1400" dirty="0" err="1"/>
+              <a:t>Git</a:t>
+            </a:r>
+            <a:r>
+              <a:rPr lang="de-DE" altLang="de-DE" sz="1400" dirty="0"/>
+              <a:t>-Workflow im Team</a:t>
+            </a:r>
           </a:p>
           <a:p>
             <a:pPr>
@@ -9781,7 +10109,7 @@
             </a:pPr>
             <a:r>
               <a:rPr lang="de-DE" altLang="de-DE" sz="1800" b="1" dirty="0"/>
-              <a:t>Tag 1 – Einführung in </a:t>
+              <a:t>Tag 2 – Vertiefung </a:t>
             </a:r>
             <a:r>
               <a:rPr lang="de-DE" altLang="de-DE" sz="1800" b="1" dirty="0" err="1"/>
@@ -9789,7 +10117,7 @@
             </a:r>
             <a:r>
               <a:rPr lang="de-DE" altLang="de-DE" sz="1800" b="1" dirty="0"/>
-              <a:t> und </a:t>
+              <a:t>-Workflow, CI/CD &amp; </a:t>
             </a:r>
             <a:r>
               <a:rPr lang="de-DE" altLang="de-DE" sz="1800" b="1" dirty="0" err="1"/>
@@ -9797,15 +10125,7 @@
             </a:r>
             <a:r>
               <a:rPr lang="de-DE" altLang="de-DE" sz="1800" b="1" dirty="0"/>
-              <a:t>, </a:t>
-            </a:r>
-            <a:r>
-              <a:rPr lang="de-DE" altLang="de-DE" sz="1800" b="1" dirty="0" err="1"/>
-              <a:t>Git</a:t>
-            </a:r>
-            <a:r>
-              <a:rPr lang="de-DE" altLang="de-DE" sz="1800" b="1" dirty="0"/>
-              <a:t>-Workflow im Team</a:t>
+              <a:t> CI </a:t>
             </a:r>
           </a:p>
           <a:p>
@@ -9814,8 +10134,12 @@
               <a:buChar char="•"/>
             </a:pPr>
             <a:r>
+              <a:rPr lang="de-DE" altLang="de-DE" sz="1400" dirty="0" err="1"/>
+              <a:t>Gitflow</a:t>
+            </a:r>
+            <a:r>
               <a:rPr lang="de-DE" altLang="de-DE" sz="1400" dirty="0"/>
-              <a:t>Einführung &amp; Kursüberblick</a:t>
+              <a:t>-Workflow</a:t>
             </a:r>
           </a:p>
           <a:p>
@@ -9825,21 +10149,8 @@
             </a:pPr>
             <a:r>
               <a:rPr lang="de-DE" altLang="de-DE" sz="1400" dirty="0"/>
-              <a:t>Grundlagen von </a:t>
-            </a:r>
-            <a:r>
-              <a:rPr lang="de-DE" altLang="de-DE" sz="1400" dirty="0" err="1"/>
-              <a:t>Git</a:t>
-            </a:r>
-            <a:r>
-              <a:rPr lang="de-DE" altLang="de-DE" sz="1400" dirty="0"/>
-              <a:t> und </a:t>
-            </a:r>
-            <a:r>
-              <a:rPr lang="de-DE" altLang="de-DE" sz="1400" dirty="0" err="1"/>
-              <a:t>GitLab</a:t>
-            </a:r>
-            <a:endParaRPr lang="de-DE" altLang="de-DE" sz="1400" dirty="0"/>
+              <a:t>Tags, Releases &amp; deren Verwaltung</a:t>
+            </a:r>
           </a:p>
           <a:p>
             <a:pPr lvl="1">
@@ -9848,27 +10159,11 @@
             </a:pPr>
             <a:r>
               <a:rPr lang="de-DE" altLang="de-DE" sz="1400" dirty="0" err="1"/>
-              <a:t>Git</a:t>
+              <a:t>GitLab</a:t>
             </a:r>
             <a:r>
               <a:rPr lang="de-DE" altLang="de-DE" sz="1400" dirty="0"/>
-              <a:t> </a:t>
-            </a:r>
-            <a:r>
-              <a:rPr lang="de-DE" altLang="de-DE" sz="1400" dirty="0" err="1"/>
-              <a:t>Rebase</a:t>
-            </a:r>
-            <a:r>
-              <a:rPr lang="de-DE" altLang="de-DE" sz="1400" dirty="0"/>
-              <a:t> &amp; </a:t>
-            </a:r>
-            <a:r>
-              <a:rPr lang="de-DE" altLang="de-DE" sz="1400" dirty="0" err="1"/>
-              <a:t>Merge</a:t>
-            </a:r>
-            <a:r>
-              <a:rPr lang="de-DE" altLang="de-DE" sz="1400" dirty="0"/>
-              <a:t>-Strategien</a:t>
+              <a:t>-Runner</a:t>
             </a:r>
           </a:p>
           <a:p>
@@ -9877,12 +10172,47 @@
               <a:buChar char="•"/>
             </a:pPr>
             <a:r>
+              <a:rPr lang="de-DE" altLang="de-DE" sz="1400" dirty="0"/>
+              <a:t>Einführung in </a:t>
+            </a:r>
+            <a:r>
               <a:rPr lang="de-DE" altLang="de-DE" sz="1400" dirty="0" err="1"/>
-              <a:t>Git</a:t>
+              <a:t>GitLab</a:t>
             </a:r>
             <a:r>
               <a:rPr lang="de-DE" altLang="de-DE" sz="1400" dirty="0"/>
-              <a:t>-Workflow im Team</a:t>
+              <a:t> CI/CD &amp; </a:t>
+            </a:r>
+            <a:r>
+              <a:rPr lang="de-DE" altLang="de-DE" sz="1400" dirty="0" err="1"/>
+              <a:t>gitlab.yml</a:t>
+            </a:r>
+            <a:endParaRPr lang="de-DE" altLang="de-DE" sz="1400" dirty="0"/>
+          </a:p>
+          <a:p>
+            <a:pPr>
+              <a:buFont typeface="Arial" panose="020B0604020202020204" pitchFamily="34" charset="0"/>
+              <a:buChar char="•"/>
+            </a:pPr>
+            <a:r>
+              <a:rPr lang="de-DE" altLang="de-DE" sz="1800" b="1" dirty="0"/>
+              <a:t>Tag 3 – </a:t>
+            </a:r>
+            <a:r>
+              <a:rPr lang="de-DE" altLang="de-DE" sz="1800" b="1" dirty="0" err="1"/>
+              <a:t>GitOps</a:t>
+            </a:r>
+            <a:r>
+              <a:rPr lang="de-DE" altLang="de-DE" sz="1800" b="1" dirty="0"/>
+              <a:t>, Docker in der Entwicklung und </a:t>
+            </a:r>
+            <a:r>
+              <a:rPr lang="de-DE" altLang="de-DE" sz="1800" b="1" dirty="0" err="1"/>
+              <a:t>Deployment</a:t>
+            </a:r>
+            <a:r>
+              <a:rPr lang="de-DE" altLang="de-DE" sz="1800" b="1" dirty="0"/>
+              <a:t>-Strategien</a:t>
             </a:r>
           </a:p>
           <a:p>
@@ -9890,30 +10220,14 @@
               <a:buFont typeface="Arial" panose="020B0604020202020204" pitchFamily="34" charset="0"/>
               <a:buChar char="•"/>
             </a:pPr>
-            <a:endParaRPr lang="de-DE" altLang="de-DE" sz="1400" dirty="0"/>
-          </a:p>
-          <a:p>
-            <a:pPr>
-              <a:buFont typeface="Arial" panose="020B0604020202020204" pitchFamily="34" charset="0"/>
-              <a:buChar char="•"/>
-            </a:pPr>
-            <a:r>
-              <a:rPr lang="de-DE" altLang="de-DE" sz="1800" b="1" dirty="0"/>
-              <a:t>Tag 2 – Vertiefung </a:t>
-            </a:r>
-            <a:r>
-              <a:rPr lang="de-DE" altLang="de-DE" sz="1800" b="1" dirty="0" err="1"/>
-              <a:t>Git</a:t>
-            </a:r>
-            <a:r>
-              <a:rPr lang="de-DE" altLang="de-DE" sz="1800" b="1" dirty="0"/>
-              <a:t>-Workflow, CI/CD &amp; </a:t>
-            </a:r>
-            <a:r>
-              <a:rPr lang="de-DE" altLang="de-DE" sz="1800" b="1" dirty="0" err="1"/>
+            <a:r>
+              <a:rPr lang="de-DE" altLang="de-DE" sz="1400" dirty="0" err="1"/>
               <a:t>GitOps</a:t>
             </a:r>
-            <a:endParaRPr lang="de-DE" altLang="de-DE" sz="1800" b="1" dirty="0"/>
+            <a:r>
+              <a:rPr lang="de-DE" altLang="de-DE" sz="1400" dirty="0"/>
+              <a:t> Grundlagen</a:t>
+            </a:r>
           </a:p>
           <a:p>
             <a:pPr lvl="1">
@@ -9921,12 +10235,8 @@
               <a:buChar char="•"/>
             </a:pPr>
             <a:r>
-              <a:rPr lang="de-DE" altLang="de-DE" sz="1400" dirty="0" err="1"/>
-              <a:t>Gitflow</a:t>
-            </a:r>
-            <a:r>
               <a:rPr lang="de-DE" altLang="de-DE" sz="1400" dirty="0"/>
-              <a:t>-Workflow</a:t>
+              <a:t>Lokale Entwicklung mit Docker</a:t>
             </a:r>
           </a:p>
           <a:p>
@@ -9936,7 +10246,7 @@
             </a:pPr>
             <a:r>
               <a:rPr lang="de-DE" altLang="de-DE" sz="1400" dirty="0"/>
-              <a:t>Tags, Releases &amp; deren Verwaltung</a:t>
+              <a:t>Container/Docker-Registry</a:t>
             </a:r>
           </a:p>
           <a:p>
@@ -9946,21 +10256,16 @@
             </a:pPr>
             <a:r>
               <a:rPr lang="de-DE" altLang="de-DE" sz="1400" dirty="0"/>
-              <a:t>Einführung in </a:t>
+              <a:t>Erstellen von Release- und </a:t>
             </a:r>
             <a:r>
               <a:rPr lang="de-DE" altLang="de-DE" sz="1400" dirty="0" err="1"/>
-              <a:t>GitLab</a:t>
+              <a:t>Tagged</a:t>
             </a:r>
             <a:r>
               <a:rPr lang="de-DE" altLang="de-DE" sz="1400" dirty="0"/>
-              <a:t> CI/CD &amp; </a:t>
-            </a:r>
-            <a:r>
-              <a:rPr lang="de-DE" altLang="de-DE" sz="1400" dirty="0" err="1"/>
-              <a:t>gitlab.yml</a:t>
-            </a:r>
-            <a:endParaRPr lang="de-DE" altLang="de-DE" sz="1400" dirty="0"/>
+              <a:t>-Images</a:t>
+            </a:r>
           </a:p>
           <a:p>
             <a:pPr lvl="1">
@@ -9969,105 +10274,25 @@
             </a:pPr>
             <a:r>
               <a:rPr lang="de-DE" altLang="de-DE" sz="1400" dirty="0"/>
-              <a:t>Grundlagen von </a:t>
+              <a:t>Möglichkeiten des </a:t>
             </a:r>
             <a:r>
               <a:rPr lang="de-DE" altLang="de-DE" sz="1400" dirty="0" err="1"/>
-              <a:t>GitOps</a:t>
-            </a:r>
-            <a:endParaRPr lang="de-DE" altLang="de-DE" sz="1400" dirty="0"/>
+              <a:t>Deployments</a:t>
+            </a:r>
+            <a:r>
+              <a:rPr lang="de-DE" altLang="de-DE" sz="1400" dirty="0"/>
+              <a:t> &amp; Verwaltung von Konfiguration</a:t>
+            </a:r>
           </a:p>
           <a:p>
             <a:pPr lvl="1">
               <a:buFont typeface="Arial" panose="020B0604020202020204" pitchFamily="34" charset="0"/>
               <a:buChar char="•"/>
             </a:pPr>
-            <a:endParaRPr lang="de-DE" altLang="de-DE" sz="1400" dirty="0"/>
-          </a:p>
-          <a:p>
-            <a:pPr>
-              <a:buFont typeface="Arial" panose="020B0604020202020204" pitchFamily="34" charset="0"/>
-              <a:buChar char="•"/>
-            </a:pPr>
-            <a:r>
-              <a:rPr lang="de-DE" altLang="de-DE" sz="1800" b="1" dirty="0"/>
-              <a:t>Tag 3 – Docker in der Entwicklung, </a:t>
-            </a:r>
-            <a:r>
-              <a:rPr lang="de-DE" altLang="de-DE" sz="1800" b="1" dirty="0" err="1"/>
-              <a:t>GitLab</a:t>
-            </a:r>
-            <a:r>
-              <a:rPr lang="de-DE" altLang="de-DE" sz="1800" b="1" dirty="0"/>
-              <a:t> CI und </a:t>
-            </a:r>
-            <a:r>
-              <a:rPr lang="de-DE" altLang="de-DE" sz="1800" b="1" dirty="0" err="1"/>
-              <a:t>Deployment</a:t>
-            </a:r>
-            <a:r>
-              <a:rPr lang="de-DE" altLang="de-DE" sz="1800" b="1" dirty="0"/>
-              <a:t>-Strategien</a:t>
-            </a:r>
-          </a:p>
-          <a:p>
-            <a:pPr lvl="1">
-              <a:buFont typeface="Arial" panose="020B0604020202020204" pitchFamily="34" charset="0"/>
-              <a:buChar char="•"/>
-            </a:pPr>
             <a:r>
               <a:rPr lang="de-DE" altLang="de-DE" sz="1400" dirty="0"/>
-              <a:t>Lokale Entwicklung mit Docker</a:t>
-            </a:r>
-          </a:p>
-          <a:p>
-            <a:pPr lvl="1">
-              <a:buFont typeface="Arial" panose="020B0604020202020204" pitchFamily="34" charset="0"/>
-              <a:buChar char="•"/>
-            </a:pPr>
-            <a:r>
-              <a:rPr lang="de-DE" altLang="de-DE" sz="1400" dirty="0" err="1"/>
-              <a:t>GitLab</a:t>
-            </a:r>
-            <a:r>
-              <a:rPr lang="de-DE" altLang="de-DE" sz="1400" dirty="0"/>
-              <a:t>-Runner &amp; Docker-Registry</a:t>
-            </a:r>
-          </a:p>
-          <a:p>
-            <a:pPr lvl="1">
-              <a:buFont typeface="Arial" panose="020B0604020202020204" pitchFamily="34" charset="0"/>
-              <a:buChar char="•"/>
-            </a:pPr>
-            <a:r>
-              <a:rPr lang="de-DE" altLang="de-DE" sz="1400" dirty="0"/>
-              <a:t>Erstellen von Release- und </a:t>
-            </a:r>
-            <a:r>
-              <a:rPr lang="de-DE" altLang="de-DE" sz="1400" dirty="0" err="1"/>
-              <a:t>Tagged</a:t>
-            </a:r>
-            <a:r>
-              <a:rPr lang="de-DE" altLang="de-DE" sz="1400" dirty="0"/>
-              <a:t>-Images</a:t>
-            </a:r>
-          </a:p>
-          <a:p>
-            <a:pPr lvl="1">
-              <a:buFont typeface="Arial" panose="020B0604020202020204" pitchFamily="34" charset="0"/>
-              <a:buChar char="•"/>
-            </a:pPr>
-            <a:r>
-              <a:rPr lang="de-DE" altLang="de-DE" sz="1400" dirty="0"/>
-              <a:t>Möglichkeiten des </a:t>
-            </a:r>
-            <a:r>
-              <a:rPr lang="de-DE" altLang="de-DE" sz="1400" dirty="0" err="1"/>
-              <a:t>Deployments</a:t>
-            </a:r>
-            <a:r>
-              <a:rPr lang="de-DE" altLang="de-DE" sz="1400" dirty="0"/>
-              <a:t> &amp; Verwaltung von Konfiguration</a:t>
+              <a:t>Abschlussübung &amp; Diskussion</a:t>
             </a:r>
           </a:p>
           <a:p>
@@ -10162,7 +10387,132 @@
               <a:buFont typeface="Arial" panose="020B0604020202020204" pitchFamily="34" charset="0"/>
               <a:buChar char="•"/>
             </a:pPr>
-            <a:endParaRPr lang="de-DE" altLang="de-DE" sz="1800" b="1" dirty="0"/>
+            <a:r>
+              <a:rPr lang="de-DE" altLang="de-DE" sz="1800" b="1" dirty="0"/>
+              <a:t>Tag 1 – Einführung in </a:t>
+            </a:r>
+            <a:r>
+              <a:rPr lang="de-DE" altLang="de-DE" sz="1800" b="1" dirty="0" err="1"/>
+              <a:t>Git</a:t>
+            </a:r>
+            <a:r>
+              <a:rPr lang="de-DE" altLang="de-DE" sz="1800" b="1" dirty="0"/>
+              <a:t> und </a:t>
+            </a:r>
+            <a:r>
+              <a:rPr lang="de-DE" altLang="de-DE" sz="1800" b="1" dirty="0" err="1"/>
+              <a:t>GitLab</a:t>
+            </a:r>
+            <a:r>
+              <a:rPr lang="de-DE" altLang="de-DE" sz="1800" b="1" dirty="0"/>
+              <a:t>, </a:t>
+            </a:r>
+            <a:r>
+              <a:rPr lang="de-DE" altLang="de-DE" sz="1800" b="1" dirty="0" err="1"/>
+              <a:t>Git</a:t>
+            </a:r>
+            <a:r>
+              <a:rPr lang="de-DE" altLang="de-DE" sz="1800" b="1" dirty="0"/>
+              <a:t>-Workflow im Team</a:t>
+            </a:r>
+          </a:p>
+          <a:p>
+            <a:pPr lvl="1">
+              <a:buFont typeface="Arial" panose="020B0604020202020204" pitchFamily="34" charset="0"/>
+              <a:buChar char="•"/>
+            </a:pPr>
+            <a:r>
+              <a:rPr lang="de-DE" altLang="de-DE" sz="1400" u="sng" dirty="0"/>
+              <a:t>Einführung &amp; Kursüberblick</a:t>
+            </a:r>
+          </a:p>
+          <a:p>
+            <a:pPr lvl="1">
+              <a:buFont typeface="Arial" panose="020B0604020202020204" pitchFamily="34" charset="0"/>
+              <a:buChar char="•"/>
+            </a:pPr>
+            <a:r>
+              <a:rPr lang="de-DE" altLang="de-DE" sz="1400" dirty="0"/>
+              <a:t>Grundlagen von </a:t>
+            </a:r>
+            <a:r>
+              <a:rPr lang="de-DE" altLang="de-DE" sz="1400" dirty="0" err="1"/>
+              <a:t>Git</a:t>
+            </a:r>
+            <a:endParaRPr lang="de-DE" altLang="de-DE" sz="1400" dirty="0"/>
+          </a:p>
+          <a:p>
+            <a:pPr lvl="1">
+              <a:buFont typeface="Arial" panose="020B0604020202020204" pitchFamily="34" charset="0"/>
+              <a:buChar char="•"/>
+            </a:pPr>
+            <a:r>
+              <a:rPr lang="de-DE" altLang="de-DE" sz="1400" dirty="0" err="1"/>
+              <a:t>Git</a:t>
+            </a:r>
+            <a:r>
+              <a:rPr lang="de-DE" altLang="de-DE" sz="1400" dirty="0"/>
+              <a:t> </a:t>
+            </a:r>
+            <a:r>
+              <a:rPr lang="de-DE" altLang="de-DE" sz="1400" dirty="0" err="1"/>
+              <a:t>Rebase</a:t>
+            </a:r>
+            <a:r>
+              <a:rPr lang="de-DE" altLang="de-DE" sz="1400" dirty="0"/>
+              <a:t> und </a:t>
+            </a:r>
+            <a:r>
+              <a:rPr lang="de-DE" altLang="de-DE" sz="1400" dirty="0" err="1"/>
+              <a:t>Merge</a:t>
+            </a:r>
+            <a:r>
+              <a:rPr lang="de-DE" altLang="de-DE" sz="1400" dirty="0"/>
+              <a:t>-Strategien</a:t>
+            </a:r>
+          </a:p>
+          <a:p>
+            <a:pPr lvl="1">
+              <a:buFont typeface="Arial" panose="020B0604020202020204" pitchFamily="34" charset="0"/>
+              <a:buChar char="•"/>
+            </a:pPr>
+            <a:r>
+              <a:rPr lang="de-DE" altLang="de-DE" sz="1400" dirty="0" err="1"/>
+              <a:t>Git</a:t>
+            </a:r>
+            <a:r>
+              <a:rPr lang="de-DE" altLang="de-DE" sz="1400" dirty="0"/>
+              <a:t> Remote</a:t>
+            </a:r>
+          </a:p>
+          <a:p>
+            <a:pPr lvl="1">
+              <a:buFont typeface="Arial" panose="020B0604020202020204" pitchFamily="34" charset="0"/>
+              <a:buChar char="•"/>
+            </a:pPr>
+            <a:r>
+              <a:rPr lang="de-DE" altLang="de-DE" sz="1400" dirty="0"/>
+              <a:t>Grundlagen von </a:t>
+            </a:r>
+            <a:r>
+              <a:rPr lang="de-DE" altLang="de-DE" sz="1400" dirty="0" err="1"/>
+              <a:t>GitLab</a:t>
+            </a:r>
+            <a:endParaRPr lang="de-DE" altLang="de-DE" sz="1400" dirty="0"/>
+          </a:p>
+          <a:p>
+            <a:pPr lvl="1">
+              <a:buFont typeface="Arial" panose="020B0604020202020204" pitchFamily="34" charset="0"/>
+              <a:buChar char="•"/>
+            </a:pPr>
+            <a:r>
+              <a:rPr lang="de-DE" altLang="de-DE" sz="1400" dirty="0" err="1"/>
+              <a:t>Git</a:t>
+            </a:r>
+            <a:r>
+              <a:rPr lang="de-DE" altLang="de-DE" sz="1400" dirty="0"/>
+              <a:t>-Workflow im Team</a:t>
+            </a:r>
           </a:p>
           <a:p>
             <a:pPr>
@@ -10171,7 +10521,7 @@
             </a:pPr>
             <a:r>
               <a:rPr lang="de-DE" altLang="de-DE" sz="1800" b="1" dirty="0"/>
-              <a:t>Tag 1 – Einführung in </a:t>
+              <a:t>Tag 2 – Vertiefung </a:t>
             </a:r>
             <a:r>
               <a:rPr lang="de-DE" altLang="de-DE" sz="1800" b="1" dirty="0" err="1"/>
@@ -10179,7 +10529,7 @@
             </a:r>
             <a:r>
               <a:rPr lang="de-DE" altLang="de-DE" sz="1800" b="1" dirty="0"/>
-              <a:t> und </a:t>
+              <a:t>-Workflow, CI/CD &amp; </a:t>
             </a:r>
             <a:r>
               <a:rPr lang="de-DE" altLang="de-DE" sz="1800" b="1" dirty="0" err="1"/>
@@ -10187,15 +10537,7 @@
             </a:r>
             <a:r>
               <a:rPr lang="de-DE" altLang="de-DE" sz="1800" b="1" dirty="0"/>
-              <a:t>, </a:t>
-            </a:r>
-            <a:r>
-              <a:rPr lang="de-DE" altLang="de-DE" sz="1800" b="1" dirty="0" err="1"/>
-              <a:t>Git</a:t>
-            </a:r>
-            <a:r>
-              <a:rPr lang="de-DE" altLang="de-DE" sz="1800" b="1" dirty="0"/>
-              <a:t>-Workflow im Team</a:t>
+              <a:t> CI </a:t>
             </a:r>
           </a:p>
           <a:p>
@@ -10204,8 +10546,12 @@
               <a:buChar char="•"/>
             </a:pPr>
             <a:r>
-              <a:rPr lang="de-DE" altLang="de-DE" sz="1400" u="sng" dirty="0"/>
-              <a:t>Einführung &amp; Kursüberblick</a:t>
+              <a:rPr lang="de-DE" altLang="de-DE" sz="1400" dirty="0" err="1"/>
+              <a:t>Gitflow</a:t>
+            </a:r>
+            <a:r>
+              <a:rPr lang="de-DE" altLang="de-DE" sz="1400" dirty="0"/>
+              <a:t>-Workflow</a:t>
             </a:r>
           </a:p>
           <a:p>
@@ -10215,21 +10561,8 @@
             </a:pPr>
             <a:r>
               <a:rPr lang="de-DE" altLang="de-DE" sz="1400" dirty="0"/>
-              <a:t>Grundlagen von </a:t>
-            </a:r>
-            <a:r>
-              <a:rPr lang="de-DE" altLang="de-DE" sz="1400" dirty="0" err="1"/>
-              <a:t>Git</a:t>
-            </a:r>
-            <a:r>
-              <a:rPr lang="de-DE" altLang="de-DE" sz="1400" dirty="0"/>
-              <a:t> und </a:t>
-            </a:r>
-            <a:r>
-              <a:rPr lang="de-DE" altLang="de-DE" sz="1400" dirty="0" err="1"/>
-              <a:t>GitLab</a:t>
-            </a:r>
-            <a:endParaRPr lang="de-DE" altLang="de-DE" sz="1400" dirty="0"/>
+              <a:t>Tags, Releases &amp; deren Verwaltung</a:t>
+            </a:r>
           </a:p>
           <a:p>
             <a:pPr lvl="1">
@@ -10238,27 +10571,11 @@
             </a:pPr>
             <a:r>
               <a:rPr lang="de-DE" altLang="de-DE" sz="1400" dirty="0" err="1"/>
-              <a:t>Git</a:t>
+              <a:t>GitLab</a:t>
             </a:r>
             <a:r>
               <a:rPr lang="de-DE" altLang="de-DE" sz="1400" dirty="0"/>
-              <a:t> </a:t>
-            </a:r>
-            <a:r>
-              <a:rPr lang="de-DE" altLang="de-DE" sz="1400" dirty="0" err="1"/>
-              <a:t>Rebase</a:t>
-            </a:r>
-            <a:r>
-              <a:rPr lang="de-DE" altLang="de-DE" sz="1400" dirty="0"/>
-              <a:t> &amp; </a:t>
-            </a:r>
-            <a:r>
-              <a:rPr lang="de-DE" altLang="de-DE" sz="1400" dirty="0" err="1"/>
-              <a:t>Merge</a:t>
-            </a:r>
-            <a:r>
-              <a:rPr lang="de-DE" altLang="de-DE" sz="1400" dirty="0"/>
-              <a:t>-Strategien</a:t>
+              <a:t>-Runner</a:t>
             </a:r>
           </a:p>
           <a:p>
@@ -10267,12 +10584,47 @@
               <a:buChar char="•"/>
             </a:pPr>
             <a:r>
+              <a:rPr lang="de-DE" altLang="de-DE" sz="1400" dirty="0"/>
+              <a:t>Einführung in </a:t>
+            </a:r>
+            <a:r>
               <a:rPr lang="de-DE" altLang="de-DE" sz="1400" dirty="0" err="1"/>
-              <a:t>Git</a:t>
+              <a:t>GitLab</a:t>
             </a:r>
             <a:r>
               <a:rPr lang="de-DE" altLang="de-DE" sz="1400" dirty="0"/>
-              <a:t>-Workflow im Team</a:t>
+              <a:t> CI/CD &amp; </a:t>
+            </a:r>
+            <a:r>
+              <a:rPr lang="de-DE" altLang="de-DE" sz="1400" dirty="0" err="1"/>
+              <a:t>gitlab.yml</a:t>
+            </a:r>
+            <a:endParaRPr lang="de-DE" altLang="de-DE" sz="1400" dirty="0"/>
+          </a:p>
+          <a:p>
+            <a:pPr>
+              <a:buFont typeface="Arial" panose="020B0604020202020204" pitchFamily="34" charset="0"/>
+              <a:buChar char="•"/>
+            </a:pPr>
+            <a:r>
+              <a:rPr lang="de-DE" altLang="de-DE" sz="1800" b="1" dirty="0"/>
+              <a:t>Tag 3 – </a:t>
+            </a:r>
+            <a:r>
+              <a:rPr lang="de-DE" altLang="de-DE" sz="1800" b="1" dirty="0" err="1"/>
+              <a:t>GitOps</a:t>
+            </a:r>
+            <a:r>
+              <a:rPr lang="de-DE" altLang="de-DE" sz="1800" b="1" dirty="0"/>
+              <a:t>, Docker in der Entwicklung und </a:t>
+            </a:r>
+            <a:r>
+              <a:rPr lang="de-DE" altLang="de-DE" sz="1800" b="1" dirty="0" err="1"/>
+              <a:t>Deployment</a:t>
+            </a:r>
+            <a:r>
+              <a:rPr lang="de-DE" altLang="de-DE" sz="1800" b="1" dirty="0"/>
+              <a:t>-Strategien</a:t>
             </a:r>
           </a:p>
           <a:p>
@@ -10280,30 +10632,14 @@
               <a:buFont typeface="Arial" panose="020B0604020202020204" pitchFamily="34" charset="0"/>
               <a:buChar char="•"/>
             </a:pPr>
-            <a:endParaRPr lang="de-DE" altLang="de-DE" sz="1400" dirty="0"/>
-          </a:p>
-          <a:p>
-            <a:pPr>
-              <a:buFont typeface="Arial" panose="020B0604020202020204" pitchFamily="34" charset="0"/>
-              <a:buChar char="•"/>
-            </a:pPr>
-            <a:r>
-              <a:rPr lang="de-DE" altLang="de-DE" sz="1800" b="1" dirty="0"/>
-              <a:t>Tag 2 – Vertiefung </a:t>
-            </a:r>
-            <a:r>
-              <a:rPr lang="de-DE" altLang="de-DE" sz="1800" b="1" dirty="0" err="1"/>
-              <a:t>Git</a:t>
-            </a:r>
-            <a:r>
-              <a:rPr lang="de-DE" altLang="de-DE" sz="1800" b="1" dirty="0"/>
-              <a:t>-Workflow, CI/CD &amp; </a:t>
-            </a:r>
-            <a:r>
-              <a:rPr lang="de-DE" altLang="de-DE" sz="1800" b="1" dirty="0" err="1"/>
+            <a:r>
+              <a:rPr lang="de-DE" altLang="de-DE" sz="1400" dirty="0" err="1"/>
               <a:t>GitOps</a:t>
             </a:r>
-            <a:endParaRPr lang="de-DE" altLang="de-DE" sz="1800" b="1" dirty="0"/>
+            <a:r>
+              <a:rPr lang="de-DE" altLang="de-DE" sz="1400" dirty="0"/>
+              <a:t> Grundlagen</a:t>
+            </a:r>
           </a:p>
           <a:p>
             <a:pPr lvl="1">
@@ -10311,12 +10647,8 @@
               <a:buChar char="•"/>
             </a:pPr>
             <a:r>
-              <a:rPr lang="de-DE" altLang="de-DE" sz="1400" dirty="0" err="1"/>
-              <a:t>Gitflow</a:t>
-            </a:r>
-            <a:r>
               <a:rPr lang="de-DE" altLang="de-DE" sz="1400" dirty="0"/>
-              <a:t>-Workflow</a:t>
+              <a:t>Lokale Entwicklung mit Docker</a:t>
             </a:r>
           </a:p>
           <a:p>
@@ -10326,7 +10658,7 @@
             </a:pPr>
             <a:r>
               <a:rPr lang="de-DE" altLang="de-DE" sz="1400" dirty="0"/>
-              <a:t>Tags, Releases &amp; deren Verwaltung</a:t>
+              <a:t>Container/Docker-Registry</a:t>
             </a:r>
           </a:p>
           <a:p>
@@ -10336,21 +10668,16 @@
             </a:pPr>
             <a:r>
               <a:rPr lang="de-DE" altLang="de-DE" sz="1400" dirty="0"/>
-              <a:t>Einführung in </a:t>
+              <a:t>Erstellen von Release- und </a:t>
             </a:r>
             <a:r>
               <a:rPr lang="de-DE" altLang="de-DE" sz="1400" dirty="0" err="1"/>
-              <a:t>GitLab</a:t>
+              <a:t>Tagged</a:t>
             </a:r>
             <a:r>
               <a:rPr lang="de-DE" altLang="de-DE" sz="1400" dirty="0"/>
-              <a:t> CI/CD &amp; </a:t>
-            </a:r>
-            <a:r>
-              <a:rPr lang="de-DE" altLang="de-DE" sz="1400" dirty="0" err="1"/>
-              <a:t>gitlab.yml</a:t>
-            </a:r>
-            <a:endParaRPr lang="de-DE" altLang="de-DE" sz="1400" dirty="0"/>
+              <a:t>-Images</a:t>
+            </a:r>
           </a:p>
           <a:p>
             <a:pPr lvl="1">
@@ -10359,105 +10686,25 @@
             </a:pPr>
             <a:r>
               <a:rPr lang="de-DE" altLang="de-DE" sz="1400" dirty="0"/>
-              <a:t>Grundlagen von </a:t>
+              <a:t>Möglichkeiten des </a:t>
             </a:r>
             <a:r>
               <a:rPr lang="de-DE" altLang="de-DE" sz="1400" dirty="0" err="1"/>
-              <a:t>GitOps</a:t>
-            </a:r>
-            <a:endParaRPr lang="de-DE" altLang="de-DE" sz="1400" dirty="0"/>
+              <a:t>Deployments</a:t>
+            </a:r>
+            <a:r>
+              <a:rPr lang="de-DE" altLang="de-DE" sz="1400" dirty="0"/>
+              <a:t> &amp; Verwaltung von Konfiguration</a:t>
+            </a:r>
           </a:p>
           <a:p>
             <a:pPr lvl="1">
               <a:buFont typeface="Arial" panose="020B0604020202020204" pitchFamily="34" charset="0"/>
               <a:buChar char="•"/>
             </a:pPr>
-            <a:endParaRPr lang="de-DE" altLang="de-DE" sz="1400" dirty="0"/>
-          </a:p>
-          <a:p>
-            <a:pPr>
-              <a:buFont typeface="Arial" panose="020B0604020202020204" pitchFamily="34" charset="0"/>
-              <a:buChar char="•"/>
-            </a:pPr>
-            <a:r>
-              <a:rPr lang="de-DE" altLang="de-DE" sz="1800" b="1" dirty="0"/>
-              <a:t>Tag 3 – Docker in der Entwicklung, </a:t>
-            </a:r>
-            <a:r>
-              <a:rPr lang="de-DE" altLang="de-DE" sz="1800" b="1" dirty="0" err="1"/>
-              <a:t>GitLab</a:t>
-            </a:r>
-            <a:r>
-              <a:rPr lang="de-DE" altLang="de-DE" sz="1800" b="1" dirty="0"/>
-              <a:t> CI und </a:t>
-            </a:r>
-            <a:r>
-              <a:rPr lang="de-DE" altLang="de-DE" sz="1800" b="1" dirty="0" err="1"/>
-              <a:t>Deployment</a:t>
-            </a:r>
-            <a:r>
-              <a:rPr lang="de-DE" altLang="de-DE" sz="1800" b="1" dirty="0"/>
-              <a:t>-Strategien</a:t>
-            </a:r>
-          </a:p>
-          <a:p>
-            <a:pPr lvl="1">
-              <a:buFont typeface="Arial" panose="020B0604020202020204" pitchFamily="34" charset="0"/>
-              <a:buChar char="•"/>
-            </a:pPr>
             <a:r>
               <a:rPr lang="de-DE" altLang="de-DE" sz="1400" dirty="0"/>
-              <a:t>Lokale Entwicklung mit Docker</a:t>
-            </a:r>
-          </a:p>
-          <a:p>
-            <a:pPr lvl="1">
-              <a:buFont typeface="Arial" panose="020B0604020202020204" pitchFamily="34" charset="0"/>
-              <a:buChar char="•"/>
-            </a:pPr>
-            <a:r>
-              <a:rPr lang="de-DE" altLang="de-DE" sz="1400" dirty="0" err="1"/>
-              <a:t>GitLab</a:t>
-            </a:r>
-            <a:r>
-              <a:rPr lang="de-DE" altLang="de-DE" sz="1400" dirty="0"/>
-              <a:t>-Runner &amp; Docker-Registry</a:t>
-            </a:r>
-          </a:p>
-          <a:p>
-            <a:pPr lvl="1">
-              <a:buFont typeface="Arial" panose="020B0604020202020204" pitchFamily="34" charset="0"/>
-              <a:buChar char="•"/>
-            </a:pPr>
-            <a:r>
-              <a:rPr lang="de-DE" altLang="de-DE" sz="1400" dirty="0"/>
-              <a:t>Erstellen von Release- und </a:t>
-            </a:r>
-            <a:r>
-              <a:rPr lang="de-DE" altLang="de-DE" sz="1400" dirty="0" err="1"/>
-              <a:t>Tagged</a:t>
-            </a:r>
-            <a:r>
-              <a:rPr lang="de-DE" altLang="de-DE" sz="1400" dirty="0"/>
-              <a:t>-Images</a:t>
-            </a:r>
-          </a:p>
-          <a:p>
-            <a:pPr lvl="1">
-              <a:buFont typeface="Arial" panose="020B0604020202020204" pitchFamily="34" charset="0"/>
-              <a:buChar char="•"/>
-            </a:pPr>
-            <a:r>
-              <a:rPr lang="de-DE" altLang="de-DE" sz="1400" dirty="0"/>
-              <a:t>Möglichkeiten des </a:t>
-            </a:r>
-            <a:r>
-              <a:rPr lang="de-DE" altLang="de-DE" sz="1400" dirty="0" err="1"/>
-              <a:t>Deployments</a:t>
-            </a:r>
-            <a:r>
-              <a:rPr lang="de-DE" altLang="de-DE" sz="1400" dirty="0"/>
-              <a:t> &amp; Verwaltung von Konfiguration</a:t>
+              <a:t>Abschlussübung &amp; Diskussion</a:t>
             </a:r>
           </a:p>
           <a:p>
@@ -10505,7 +10752,7 @@
     </p:spTree>
     <p:extLst>
       <p:ext uri="{BB962C8B-B14F-4D97-AF65-F5344CB8AC3E}">
-        <p14:creationId xmlns:p14="http://schemas.microsoft.com/office/powerpoint/2010/main" val="3071277897"/>
+        <p14:creationId xmlns:p14="http://schemas.microsoft.com/office/powerpoint/2010/main" val="2427702387"/>
       </p:ext>
     </p:extLst>
   </p:cSld>
@@ -10630,7 +10877,7 @@
                 <a:ea typeface="+mn-ea"/>
                 <a:cs typeface="+mn-cs"/>
               </a:rPr>
-              <a:t>Kaffeepause:          ~ 10:30 Uhr</a:t>
+              <a:t>Kaffeepause:          ~ 10:30 Uhr &amp; ~15:00 Uhr</a:t>
             </a:r>
           </a:p>
           <a:p>

</xml_diff>

<commit_message>
Fine tuning for day 1 slides
</commit_message>
<xml_diff>
--- a/slides/Tag-1_1-Begruessung.pptx
+++ b/slides/Tag-1_1-Begruessung.pptx
@@ -4572,7 +4572,7 @@
                 <a:ea typeface="+mn-ea"/>
                 <a:cs typeface="+mn-cs"/>
               </a:rPr>
-              <a:t>Musterlösung</a:t>
+              <a:t>Musterlösungen</a:t>
             </a:r>
           </a:p>
           <a:p>
@@ -5225,7 +5225,7 @@
             </a:pPr>
             <a:r>
               <a:rPr lang="de-DE" altLang="de-DE" sz="2000" dirty="0"/>
-              <a:t>Web Engineering</a:t>
+              <a:t>Clean Code</a:t>
             </a:r>
           </a:p>
           <a:p>
@@ -5234,9 +5234,10 @@
               <a:buChar char="●"/>
             </a:pPr>
             <a:r>
-              <a:rPr lang="de-DE" altLang="de-DE" sz="2000" dirty="0"/>
-              <a:t>Clean Code</a:t>
-            </a:r>
+              <a:rPr lang="de-DE" altLang="de-DE" sz="2000" dirty="0" err="1"/>
+              <a:t>DevOps</a:t>
+            </a:r>
+            <a:endParaRPr lang="de-DE" altLang="de-DE" sz="2000" dirty="0"/>
           </a:p>
           <a:p>
             <a:pPr marL="762000" lvl="3" indent="-342900">
@@ -5245,17 +5246,7 @@
             </a:pPr>
             <a:r>
               <a:rPr lang="de-DE" altLang="de-DE" sz="2000" dirty="0"/>
-              <a:t>Testautomatisierung</a:t>
-            </a:r>
-          </a:p>
-          <a:p>
-            <a:pPr marL="762000" lvl="3" indent="-342900">
-              <a:buFont typeface="Arial" charset="0"/>
-              <a:buChar char="●"/>
-            </a:pPr>
-            <a:r>
-              <a:rPr lang="de-DE" altLang="de-DE" sz="2000" dirty="0"/>
-              <a:t>Trainings</a:t>
+              <a:t>Trainings, Vorträge, Artikel</a:t>
             </a:r>
           </a:p>
           <a:p>
@@ -5486,10 +5477,13 @@
               </a:rPr>
               <a:t>React</a:t>
             </a:r>
-            <a:endParaRPr lang="de-DE" altLang="de-DE" dirty="0">
-              <a:ea typeface="+mn-ea"/>
-              <a:cs typeface="+mn-cs"/>
-            </a:endParaRPr>
+            <a:r>
+              <a:rPr lang="de-DE" altLang="de-DE" dirty="0">
+                <a:ea typeface="+mn-ea"/>
+                <a:cs typeface="+mn-cs"/>
+              </a:rPr>
+              <a:t>, …</a:t>
+            </a:r>
           </a:p>
         </p:txBody>
       </p:sp>
@@ -9844,7 +9838,7 @@
             </a:r>
             <a:r>
               <a:rPr lang="de-DE" sz="1800" dirty="0"/>
-              <a:t>-Workflows und die Hosting-Plattform </a:t>
+              <a:t>-Workflows und </a:t>
             </a:r>
             <a:r>
               <a:rPr lang="de-DE" sz="1800" dirty="0" err="1"/>
@@ -9877,12 +9871,13 @@
             </a:r>
             <a:r>
               <a:rPr lang="de-DE" sz="1800" dirty="0"/>
-              <a:t>-Workflows und Erstellung unterschiedlicher CI/CD Pipelines für einfache bis komplexe Software Projekte/Szenarien</a:t>
-            </a:r>
-          </a:p>
-          <a:p>
-            <a:pPr marL="0" indent="0">
-              <a:buNone/>
+              <a:t>-Workflows und Erstellung unterschiedlicher CI/CD Pipelines für einfache bis komplexe Software-Projekte</a:t>
+            </a:r>
+          </a:p>
+          <a:p>
+            <a:pPr lvl="1">
+              <a:buFont typeface="Arial" panose="020B0604020202020204" pitchFamily="34" charset="0"/>
+              <a:buChar char="•"/>
             </a:pPr>
             <a:endParaRPr lang="de-DE" sz="2000" dirty="0"/>
           </a:p>
@@ -9903,7 +9898,7 @@
             </a:pPr>
             <a:r>
               <a:rPr lang="de-DE" sz="1800" dirty="0"/>
-              <a:t>Alle die </a:t>
+              <a:t>Alle, die </a:t>
             </a:r>
             <a:r>
               <a:rPr lang="de-DE" sz="1800" dirty="0" err="1"/>
@@ -9977,7 +9972,7 @@
             </a:pPr>
             <a:r>
               <a:rPr lang="de-DE" sz="1800" dirty="0"/>
-              <a:t>Sicherer Umgang mit Linux</a:t>
+              <a:t>Sicherer Umgang mit Linux (Shell)</a:t>
             </a:r>
           </a:p>
           <a:p>

</xml_diff>

<commit_message>
Added URL to GitHub repo
</commit_message>
<xml_diff>
--- a/slides/Tag-1_1-Begruessung.pptx
+++ b/slides/Tag-1_1-Begruessung.pptx
@@ -2086,7 +2086,7 @@
               <a:pPr algn="ctr">
                 <a:defRPr/>
               </a:pPr>
-              <a:t>11.06.2024</a:t>
+              <a:t>12.06.2024</a:t>
             </a:fld>
             <a:endParaRPr lang="de-DE" sz="1000">
               <a:solidFill>
@@ -4574,6 +4574,33 @@
               </a:rPr>
               <a:t>Musterlösungen</a:t>
             </a:r>
+          </a:p>
+          <a:p>
+            <a:pPr marL="342900" lvl="1" indent="-342900">
+              <a:buFont typeface="Arial" charset="0"/>
+              <a:buChar char="●"/>
+            </a:pPr>
+            <a:r>
+              <a:rPr lang="de-DE" altLang="de-DE" dirty="0">
+                <a:ea typeface="+mn-ea"/>
+                <a:cs typeface="+mn-cs"/>
+                <a:hlinkClick r:id="rId3"/>
+              </a:rPr>
+              <a:t>https://github.com/anderscore-gmbh/gitlab-24.06</a:t>
+            </a:r>
+            <a:endParaRPr lang="de-DE" altLang="de-DE" dirty="0">
+              <a:ea typeface="+mn-ea"/>
+              <a:cs typeface="+mn-cs"/>
+            </a:endParaRPr>
+          </a:p>
+          <a:p>
+            <a:pPr marL="0" lvl="1" indent="0">
+              <a:buNone/>
+            </a:pPr>
+            <a:endParaRPr lang="de-DE" altLang="de-DE" dirty="0">
+              <a:ea typeface="+mn-ea"/>
+              <a:cs typeface="+mn-cs"/>
+            </a:endParaRPr>
           </a:p>
           <a:p>
             <a:pPr marL="342900" lvl="1" indent="-342900">

</xml_diff>

<commit_message>
Updated git and workflow slides
</commit_message>
<xml_diff>
--- a/slides/Tag-1_1-Begruessung.pptx
+++ b/slides/Tag-1_1-Begruessung.pptx
@@ -2086,7 +2086,7 @@
               <a:pPr algn="ctr">
                 <a:defRPr/>
               </a:pPr>
-              <a:t>12.06.2024</a:t>
+              <a:t>13.06.2024</a:t>
             </a:fld>
             <a:endParaRPr lang="de-DE" sz="1000">
               <a:solidFill>
@@ -2470,7 +2470,7 @@
         </p:nvSpPr>
         <p:spPr bwMode="auto">
           <a:xfrm>
-            <a:off x="4252913" y="6424613"/>
+            <a:off x="3995936" y="6424613"/>
             <a:ext cx="1699504" cy="246221"/>
           </a:xfrm>
           <a:prstGeom prst="rect">
@@ -4980,6 +4980,19 @@
                 <a:cs typeface="+mn-cs"/>
               </a:rPr>
               <a:t>Name</a:t>
+            </a:r>
+          </a:p>
+          <a:p>
+            <a:pPr marL="342900" lvl="1" indent="-342900">
+              <a:buFont typeface="Arial" charset="0"/>
+              <a:buChar char="●"/>
+            </a:pPr>
+            <a:r>
+              <a:rPr lang="de-DE" altLang="de-DE" dirty="0">
+                <a:ea typeface="+mn-ea"/>
+                <a:cs typeface="+mn-cs"/>
+              </a:rPr>
+              <a:t>Anrede</a:t>
             </a:r>
           </a:p>
           <a:p>
@@ -10898,7 +10911,7 @@
             </a:pPr>
             <a:r>
               <a:rPr lang="de-DE" sz="2000" b="1" dirty="0"/>
-              <a:t>Montag, 17.06.2024</a:t>
+              <a:t>Montag, 17.06.2024		Daniel Krämer &amp; Malte Fischer</a:t>
             </a:r>
           </a:p>
           <a:p>
@@ -10907,7 +10920,7 @@
             </a:pPr>
             <a:r>
               <a:rPr lang="de-DE" sz="2000" b="1" dirty="0"/>
-              <a:t>Dienstag, 18.06.2024</a:t>
+              <a:t>Dienstag, 18.06.2024		Daniel Krämer &amp; Malte Fischer</a:t>
             </a:r>
           </a:p>
           <a:p>
@@ -10916,7 +10929,7 @@
             </a:pPr>
             <a:r>
               <a:rPr lang="de-DE" sz="2000" b="1" dirty="0"/>
-              <a:t>Mittwoch, 19.06.2024</a:t>
+              <a:t>Mittwoch, 19.06.2024		Malte Fischer</a:t>
             </a:r>
           </a:p>
           <a:p>

</xml_diff>

<commit_message>
Brockhaus AG link von Folienmaster entfernt Formatfix in 2-3 Folie 6
</commit_message>
<xml_diff>
--- a/slides/Tag-1_1-Begruessung.pptx
+++ b/slides/Tag-1_1-Begruessung.pptx
@@ -2086,7 +2086,7 @@
               <a:pPr algn="ctr">
                 <a:defRPr/>
               </a:pPr>
-              <a:t>13.06.2024</a:t>
+              <a:t>14.06.2024</a:t>
             </a:fld>
             <a:endParaRPr lang="de-DE" sz="1000">
               <a:solidFill>
@@ -2514,53 +2514,6 @@
       </p:sp>
       <p:sp>
         <p:nvSpPr>
-          <p:cNvPr id="1063" name="Rectangle 39">
-            <a:hlinkClick r:id="rId4"/>
-            <a:extLst>
-              <a:ext uri="{FF2B5EF4-FFF2-40B4-BE49-F238E27FC236}">
-                <a16:creationId xmlns:a16="http://schemas.microsoft.com/office/drawing/2014/main" id="{613611E0-DAA0-F230-CD0B-8592F1472163}"/>
-              </a:ext>
-            </a:extLst>
-          </p:cNvPr>
-          <p:cNvSpPr>
-            <a:spLocks noChangeArrowheads="1"/>
-          </p:cNvSpPr>
-          <p:nvPr userDrawn="1"/>
-        </p:nvSpPr>
-        <p:spPr bwMode="auto">
-          <a:xfrm>
-            <a:off x="3914775" y="3105150"/>
-            <a:ext cx="9144000" cy="461963"/>
-          </a:xfrm>
-          <a:prstGeom prst="rect">
-            <a:avLst/>
-          </a:prstGeom>
-          <a:noFill/>
-          <a:ln w="12700">
-            <a:noFill/>
-            <a:miter lim="800000"/>
-            <a:headEnd type="none" w="sm" len="sm"/>
-            <a:tailEnd type="none" w="sm" len="sm"/>
-          </a:ln>
-          <a:effectLst/>
-        </p:spPr>
-        <p:txBody>
-          <a:bodyPr>
-            <a:spAutoFit/>
-          </a:bodyPr>
-          <a:lstStyle/>
-          <a:p>
-            <a:pPr>
-              <a:defRPr/>
-            </a:pPr>
-            <a:endParaRPr lang="de-DE" dirty="0">
-              <a:latin typeface="Arial" pitchFamily="34" charset="0"/>
-            </a:endParaRPr>
-          </a:p>
-        </p:txBody>
-      </p:sp>
-      <p:sp>
-        <p:nvSpPr>
           <p:cNvPr id="1064" name="Rectangle 40">
             <a:extLst>
               <a:ext uri="{FF2B5EF4-FFF2-40B4-BE49-F238E27FC236}">
@@ -2766,7 +2719,7 @@
           <p:nvPr userDrawn="1"/>
         </p:nvPicPr>
         <p:blipFill>
-          <a:blip r:embed="rId5">
+          <a:blip r:embed="rId4">
             <a:extLst>
               <a:ext uri="{28A0092B-C50C-407E-A947-70E740481C1C}">
                 <a14:useLocalDpi xmlns:a14="http://schemas.microsoft.com/office/drawing/2010/main" val="0"/>
@@ -2826,7 +2779,7 @@
           <p:nvPr userDrawn="1"/>
         </p:nvPicPr>
         <p:blipFill>
-          <a:blip r:embed="rId6">
+          <a:blip r:embed="rId5">
             <a:extLst>
               <a:ext uri="{28A0092B-C50C-407E-A947-70E740481C1C}">
                 <a14:useLocalDpi xmlns:a14="http://schemas.microsoft.com/office/drawing/2010/main" val="0"/>
@@ -2950,7 +2903,7 @@
           <p:nvPr userDrawn="1"/>
         </p:nvPicPr>
         <p:blipFill>
-          <a:blip r:embed="rId7">
+          <a:blip r:embed="rId6">
             <a:extLst>
               <a:ext uri="{28A0092B-C50C-407E-A947-70E740481C1C}">
                 <a14:useLocalDpi xmlns:a14="http://schemas.microsoft.com/office/drawing/2010/main" val="0"/>

</xml_diff>

<commit_message>
Updated day 1 and 2 slides after training
</commit_message>
<xml_diff>
--- a/slides/Tag-1_1-Begruessung.pptx
+++ b/slides/Tag-1_1-Begruessung.pptx
@@ -2086,7 +2086,7 @@
               <a:pPr algn="ctr">
                 <a:defRPr/>
               </a:pPr>
-              <a:t>14.06.2024</a:t>
+              <a:t>17.06.2024</a:t>
             </a:fld>
             <a:endParaRPr lang="de-DE" sz="1000">
               <a:solidFill>
@@ -4201,7 +4201,7 @@
             </a:pPr>
             <a:r>
               <a:rPr lang="de-DE" altLang="de-DE" sz="1600" dirty="0"/>
-              <a:t>17.06.2024, Daniel Krämer &amp; Malte Fischer</a:t>
+              <a:t>17.06.2024, Daniel Krämer</a:t>
             </a:r>
           </a:p>
         </p:txBody>
@@ -5329,7 +5329,7 @@
 </file>
 
 <file path=ppt/slides/slide4.xml><?xml version="1.0" encoding="utf-8"?>
-<p:sld xmlns:a="http://schemas.openxmlformats.org/drawingml/2006/main" xmlns:r="http://schemas.openxmlformats.org/officeDocument/2006/relationships" xmlns:p="http://schemas.openxmlformats.org/presentationml/2006/main">
+<p:sld xmlns:a="http://schemas.openxmlformats.org/drawingml/2006/main" xmlns:r="http://schemas.openxmlformats.org/officeDocument/2006/relationships" xmlns:p="http://schemas.openxmlformats.org/presentationml/2006/main" show="0">
   <p:cSld>
     <p:spTree>
       <p:nvGrpSpPr>
@@ -10864,7 +10864,7 @@
             </a:pPr>
             <a:r>
               <a:rPr lang="de-DE" sz="2000" b="1" dirty="0"/>
-              <a:t>Montag, 17.06.2024		Daniel Krämer &amp; Malte Fischer</a:t>
+              <a:t>Montag, 17.06.2024</a:t>
             </a:r>
           </a:p>
           <a:p>
@@ -10873,7 +10873,7 @@
             </a:pPr>
             <a:r>
               <a:rPr lang="de-DE" sz="2000" b="1" dirty="0"/>
-              <a:t>Dienstag, 18.06.2024		Daniel Krämer &amp; Malte Fischer</a:t>
+              <a:t>Dienstag, 18.06.2024</a:t>
             </a:r>
           </a:p>
           <a:p>
@@ -10882,7 +10882,7 @@
             </a:pPr>
             <a:r>
               <a:rPr lang="de-DE" sz="2000" b="1" dirty="0"/>
-              <a:t>Mittwoch, 19.06.2024		Malte Fischer</a:t>
+              <a:t>Mittwoch, 19.06.2024</a:t>
             </a:r>
           </a:p>
           <a:p>

</xml_diff>

<commit_message>
Changed topic order, updated slide masters
</commit_message>
<xml_diff>
--- a/slides/Tag-1_1-Begruessung.pptx
+++ b/slides/Tag-1_1-Begruessung.pptx
@@ -1422,7 +1422,7 @@
             <a:fld id="{18182567-388C-4D33-8B7B-A651F195F118}" type="slidenum">
               <a:rPr lang="de-DE" altLang="de-DE" smtClean="0"/>
               <a:pPr/>
-              <a:t>8</a:t>
+              <a:t>7</a:t>
             </a:fld>
             <a:endParaRPr lang="de-DE" altLang="de-DE"/>
           </a:p>
@@ -1431,7 +1431,7 @@
     </p:spTree>
     <p:extLst>
       <p:ext uri="{BB962C8B-B14F-4D97-AF65-F5344CB8AC3E}">
-        <p14:creationId xmlns:p14="http://schemas.microsoft.com/office/powerpoint/2010/main" val="1399969878"/>
+        <p14:creationId xmlns:p14="http://schemas.microsoft.com/office/powerpoint/2010/main" val="3869861341"/>
       </p:ext>
     </p:extLst>
   </p:cSld>
@@ -2086,7 +2086,7 @@
               <a:pPr algn="ctr">
                 <a:defRPr/>
               </a:pPr>
-              <a:t>17.06.2024</a:t>
+              <a:t>18.06.2024</a:t>
             </a:fld>
             <a:endParaRPr lang="de-DE" sz="1000">
               <a:solidFill>
@@ -2449,7 +2449,7 @@
                 </a:solidFill>
                 <a:latin typeface="Arial" charset="0"/>
               </a:rPr>
-              <a:t>Daniel Krämer &amp; Malte Fischer</a:t>
+              <a:t>Daniel Krämer</a:t>
             </a:r>
           </a:p>
         </p:txBody>
@@ -10051,18 +10051,7 @@
               <a:rPr lang="de-DE" altLang="de-DE" sz="1800" b="1" dirty="0" err="1"/>
               <a:t>GitLab</a:t>
             </a:r>
-            <a:r>
-              <a:rPr lang="de-DE" altLang="de-DE" sz="1800" b="1" dirty="0"/>
-              <a:t>, </a:t>
-            </a:r>
-            <a:r>
-              <a:rPr lang="de-DE" altLang="de-DE" sz="1800" b="1" dirty="0" err="1"/>
-              <a:t>Git</a:t>
-            </a:r>
-            <a:r>
-              <a:rPr lang="de-DE" altLang="de-DE" sz="1800" b="1" dirty="0"/>
-              <a:t>-Workflow im Team</a:t>
-            </a:r>
+            <a:endParaRPr lang="de-DE" altLang="de-DE" sz="1800" b="1" dirty="0"/>
           </a:p>
           <a:p>
             <a:pPr lvl="1">
@@ -10149,6 +10138,32 @@
             <a:endParaRPr lang="de-DE" altLang="de-DE" sz="1400" dirty="0"/>
           </a:p>
           <a:p>
+            <a:pPr>
+              <a:buFont typeface="Arial" panose="020B0604020202020204" pitchFamily="34" charset="0"/>
+              <a:buChar char="•"/>
+            </a:pPr>
+            <a:r>
+              <a:rPr lang="de-DE" altLang="de-DE" sz="1800" b="1" dirty="0"/>
+              <a:t>Tag 2 – </a:t>
+            </a:r>
+            <a:r>
+              <a:rPr lang="de-DE" altLang="de-DE" sz="1800" b="1" dirty="0" err="1"/>
+              <a:t>Git</a:t>
+            </a:r>
+            <a:r>
+              <a:rPr lang="de-DE" altLang="de-DE" sz="1800" b="1" dirty="0"/>
+              <a:t>-Workflows, CI/CD, </a:t>
+            </a:r>
+            <a:r>
+              <a:rPr lang="de-DE" altLang="de-DE" sz="1800" b="1" dirty="0" err="1"/>
+              <a:t>GitLab</a:t>
+            </a:r>
+            <a:r>
+              <a:rPr lang="de-DE" altLang="de-DE" sz="1800" b="1" dirty="0"/>
+              <a:t> CI </a:t>
+            </a:r>
+          </a:p>
+          <a:p>
             <a:pPr lvl="1">
               <a:buFont typeface="Arial" panose="020B0604020202020204" pitchFamily="34" charset="0"/>
               <a:buChar char="•"/>
@@ -10163,29 +10178,90 @@
             </a:r>
           </a:p>
           <a:p>
+            <a:pPr lvl="1">
+              <a:buFont typeface="Arial" panose="020B0604020202020204" pitchFamily="34" charset="0"/>
+              <a:buChar char="•"/>
+            </a:pPr>
+            <a:r>
+              <a:rPr lang="de-DE" altLang="de-DE" sz="1400" dirty="0" err="1"/>
+              <a:t>Gitflow</a:t>
+            </a:r>
+            <a:r>
+              <a:rPr lang="de-DE" altLang="de-DE" sz="1400" dirty="0"/>
+              <a:t>-Workflow</a:t>
+            </a:r>
+          </a:p>
+          <a:p>
+            <a:pPr lvl="1">
+              <a:buFont typeface="Arial" panose="020B0604020202020204" pitchFamily="34" charset="0"/>
+              <a:buChar char="•"/>
+            </a:pPr>
+            <a:r>
+              <a:rPr lang="de-DE" altLang="de-DE" sz="1400" dirty="0"/>
+              <a:t>Tags, Releases &amp; deren Verwaltung</a:t>
+            </a:r>
+          </a:p>
+          <a:p>
+            <a:pPr lvl="1">
+              <a:buFont typeface="Arial" panose="020B0604020202020204" pitchFamily="34" charset="0"/>
+              <a:buChar char="•"/>
+            </a:pPr>
+            <a:r>
+              <a:rPr lang="de-DE" altLang="de-DE" sz="1400" dirty="0"/>
+              <a:t>Einführung in </a:t>
+            </a:r>
+            <a:r>
+              <a:rPr lang="de-DE" altLang="de-DE" sz="1400" dirty="0" err="1"/>
+              <a:t>GitLab</a:t>
+            </a:r>
+            <a:r>
+              <a:rPr lang="de-DE" altLang="de-DE" sz="1400" dirty="0"/>
+              <a:t> CI/CD &amp; </a:t>
+            </a:r>
+            <a:r>
+              <a:rPr lang="de-DE" altLang="de-DE" sz="1400" dirty="0" err="1"/>
+              <a:t>gitlab-ci.yml</a:t>
+            </a:r>
+            <a:endParaRPr lang="de-DE" altLang="de-DE" sz="1400" dirty="0"/>
+          </a:p>
+          <a:p>
+            <a:pPr lvl="1">
+              <a:buFont typeface="Arial" panose="020B0604020202020204" pitchFamily="34" charset="0"/>
+              <a:buChar char="•"/>
+            </a:pPr>
+            <a:r>
+              <a:rPr lang="de-DE" altLang="de-DE" sz="1400" dirty="0" err="1"/>
+              <a:t>GitLab</a:t>
+            </a:r>
+            <a:r>
+              <a:rPr lang="de-DE" altLang="de-DE" sz="1400" dirty="0"/>
+              <a:t> Runner</a:t>
+            </a:r>
+          </a:p>
+          <a:p>
             <a:pPr>
               <a:buFont typeface="Arial" panose="020B0604020202020204" pitchFamily="34" charset="0"/>
               <a:buChar char="•"/>
             </a:pPr>
             <a:r>
               <a:rPr lang="de-DE" altLang="de-DE" sz="1800" b="1" dirty="0"/>
-              <a:t>Tag 2 – Vertiefung </a:t>
+              <a:t>Tag 3 – </a:t>
             </a:r>
             <a:r>
               <a:rPr lang="de-DE" altLang="de-DE" sz="1800" b="1" dirty="0" err="1"/>
-              <a:t>Git</a:t>
+              <a:t>GitOps</a:t>
             </a:r>
             <a:r>
               <a:rPr lang="de-DE" altLang="de-DE" sz="1800" b="1" dirty="0"/>
-              <a:t>-Workflow, CI/CD &amp; </a:t>
+              <a:t>, Docker, </a:t>
             </a:r>
             <a:r>
               <a:rPr lang="de-DE" altLang="de-DE" sz="1800" b="1" dirty="0" err="1"/>
-              <a:t>GitLab</a:t>
+              <a:t>Deployment</a:t>
             </a:r>
             <a:r>
               <a:rPr lang="de-DE" altLang="de-DE" sz="1800" b="1" dirty="0"/>
-              <a:t> CI </a:t>
+              <a:t>-Strategien</a:t>
             </a:r>
           </a:p>
           <a:p>
@@ -10195,11 +10271,11 @@
             </a:pPr>
             <a:r>
               <a:rPr lang="de-DE" altLang="de-DE" sz="1400" dirty="0" err="1"/>
-              <a:t>Gitflow</a:t>
+              <a:t>GitOps</a:t>
             </a:r>
             <a:r>
               <a:rPr lang="de-DE" altLang="de-DE" sz="1400" dirty="0"/>
-              <a:t>-Workflow</a:t>
+              <a:t> Grundlagen</a:t>
             </a:r>
           </a:p>
           <a:p>
@@ -10209,94 +10285,7 @@
             </a:pPr>
             <a:r>
               <a:rPr lang="de-DE" altLang="de-DE" sz="1400" dirty="0"/>
-              <a:t>Tags, Releases &amp; deren Verwaltung</a:t>
-            </a:r>
-          </a:p>
-          <a:p>
-            <a:pPr lvl="1">
-              <a:buFont typeface="Arial" panose="020B0604020202020204" pitchFamily="34" charset="0"/>
-              <a:buChar char="•"/>
-            </a:pPr>
-            <a:r>
-              <a:rPr lang="de-DE" altLang="de-DE" sz="1400" dirty="0" err="1"/>
-              <a:t>GitLab</a:t>
-            </a:r>
-            <a:r>
-              <a:rPr lang="de-DE" altLang="de-DE" sz="1400" dirty="0"/>
-              <a:t>-Runner</a:t>
-            </a:r>
-          </a:p>
-          <a:p>
-            <a:pPr lvl="1">
-              <a:buFont typeface="Arial" panose="020B0604020202020204" pitchFamily="34" charset="0"/>
-              <a:buChar char="•"/>
-            </a:pPr>
-            <a:r>
-              <a:rPr lang="de-DE" altLang="de-DE" sz="1400" dirty="0"/>
-              <a:t>Einführung in </a:t>
-            </a:r>
-            <a:r>
-              <a:rPr lang="de-DE" altLang="de-DE" sz="1400" dirty="0" err="1"/>
-              <a:t>GitLab</a:t>
-            </a:r>
-            <a:r>
-              <a:rPr lang="de-DE" altLang="de-DE" sz="1400" dirty="0"/>
-              <a:t> CI/CD &amp; </a:t>
-            </a:r>
-            <a:r>
-              <a:rPr lang="de-DE" altLang="de-DE" sz="1400" dirty="0" err="1"/>
-              <a:t>gitlab.yml</a:t>
-            </a:r>
-            <a:endParaRPr lang="de-DE" altLang="de-DE" sz="1400" dirty="0"/>
-          </a:p>
-          <a:p>
-            <a:pPr>
-              <a:buFont typeface="Arial" panose="020B0604020202020204" pitchFamily="34" charset="0"/>
-              <a:buChar char="•"/>
-            </a:pPr>
-            <a:r>
-              <a:rPr lang="de-DE" altLang="de-DE" sz="1800" b="1" dirty="0"/>
-              <a:t>Tag 3 – </a:t>
-            </a:r>
-            <a:r>
-              <a:rPr lang="de-DE" altLang="de-DE" sz="1800" b="1" dirty="0" err="1"/>
-              <a:t>GitOps</a:t>
-            </a:r>
-            <a:r>
-              <a:rPr lang="de-DE" altLang="de-DE" sz="1800" b="1" dirty="0"/>
-              <a:t>, Docker in der Entwicklung und </a:t>
-            </a:r>
-            <a:r>
-              <a:rPr lang="de-DE" altLang="de-DE" sz="1800" b="1" dirty="0" err="1"/>
-              <a:t>Deployment</a:t>
-            </a:r>
-            <a:r>
-              <a:rPr lang="de-DE" altLang="de-DE" sz="1800" b="1" dirty="0"/>
-              <a:t>-Strategien</a:t>
-            </a:r>
-          </a:p>
-          <a:p>
-            <a:pPr lvl="1">
-              <a:buFont typeface="Arial" panose="020B0604020202020204" pitchFamily="34" charset="0"/>
-              <a:buChar char="•"/>
-            </a:pPr>
-            <a:r>
-              <a:rPr lang="de-DE" altLang="de-DE" sz="1400" dirty="0" err="1"/>
-              <a:t>GitOps</a:t>
-            </a:r>
-            <a:r>
-              <a:rPr lang="de-DE" altLang="de-DE" sz="1400" dirty="0"/>
-              <a:t> Grundlagen</a:t>
-            </a:r>
-          </a:p>
-          <a:p>
-            <a:pPr lvl="1">
-              <a:buFont typeface="Arial" panose="020B0604020202020204" pitchFamily="34" charset="0"/>
-              <a:buChar char="•"/>
-            </a:pPr>
-            <a:r>
-              <a:rPr lang="de-DE" altLang="de-DE" sz="1400" dirty="0"/>
-              <a:t>Lokale Entwicklung mit Docker</a:t>
+              <a:t>Entwicklung mit Docker</a:t>
             </a:r>
           </a:p>
           <a:p>
@@ -10463,18 +10452,7 @@
               <a:rPr lang="de-DE" altLang="de-DE" sz="1800" b="1" dirty="0" err="1"/>
               <a:t>GitLab</a:t>
             </a:r>
-            <a:r>
-              <a:rPr lang="de-DE" altLang="de-DE" sz="1800" b="1" dirty="0"/>
-              <a:t>, </a:t>
-            </a:r>
-            <a:r>
-              <a:rPr lang="de-DE" altLang="de-DE" sz="1800" b="1" dirty="0" err="1"/>
-              <a:t>Git</a:t>
-            </a:r>
-            <a:r>
-              <a:rPr lang="de-DE" altLang="de-DE" sz="1800" b="1" dirty="0"/>
-              <a:t>-Workflow im Team</a:t>
-            </a:r>
+            <a:endParaRPr lang="de-DE" altLang="de-DE" sz="1800" b="1" dirty="0"/>
           </a:p>
           <a:p>
             <a:pPr lvl="1">
@@ -10561,6 +10539,32 @@
             <a:endParaRPr lang="de-DE" altLang="de-DE" sz="1400" dirty="0"/>
           </a:p>
           <a:p>
+            <a:pPr>
+              <a:buFont typeface="Arial" panose="020B0604020202020204" pitchFamily="34" charset="0"/>
+              <a:buChar char="•"/>
+            </a:pPr>
+            <a:r>
+              <a:rPr lang="de-DE" altLang="de-DE" sz="1800" b="1" dirty="0"/>
+              <a:t>Tag 2 – </a:t>
+            </a:r>
+            <a:r>
+              <a:rPr lang="de-DE" altLang="de-DE" sz="1800" b="1" dirty="0" err="1"/>
+              <a:t>Git</a:t>
+            </a:r>
+            <a:r>
+              <a:rPr lang="de-DE" altLang="de-DE" sz="1800" b="1" dirty="0"/>
+              <a:t>-Workflows, CI/CD, </a:t>
+            </a:r>
+            <a:r>
+              <a:rPr lang="de-DE" altLang="de-DE" sz="1800" b="1" dirty="0" err="1"/>
+              <a:t>GitLab</a:t>
+            </a:r>
+            <a:r>
+              <a:rPr lang="de-DE" altLang="de-DE" sz="1800" b="1" dirty="0"/>
+              <a:t> CI </a:t>
+            </a:r>
+          </a:p>
+          <a:p>
             <a:pPr lvl="1">
               <a:buFont typeface="Arial" panose="020B0604020202020204" pitchFamily="34" charset="0"/>
               <a:buChar char="•"/>
@@ -10575,29 +10579,90 @@
             </a:r>
           </a:p>
           <a:p>
+            <a:pPr lvl="1">
+              <a:buFont typeface="Arial" panose="020B0604020202020204" pitchFamily="34" charset="0"/>
+              <a:buChar char="•"/>
+            </a:pPr>
+            <a:r>
+              <a:rPr lang="de-DE" altLang="de-DE" sz="1400" dirty="0" err="1"/>
+              <a:t>Gitflow</a:t>
+            </a:r>
+            <a:r>
+              <a:rPr lang="de-DE" altLang="de-DE" sz="1400" dirty="0"/>
+              <a:t>-Workflow</a:t>
+            </a:r>
+          </a:p>
+          <a:p>
+            <a:pPr lvl="1">
+              <a:buFont typeface="Arial" panose="020B0604020202020204" pitchFamily="34" charset="0"/>
+              <a:buChar char="•"/>
+            </a:pPr>
+            <a:r>
+              <a:rPr lang="de-DE" altLang="de-DE" sz="1400" dirty="0"/>
+              <a:t>Tags, Releases &amp; deren Verwaltung</a:t>
+            </a:r>
+          </a:p>
+          <a:p>
+            <a:pPr lvl="1">
+              <a:buFont typeface="Arial" panose="020B0604020202020204" pitchFamily="34" charset="0"/>
+              <a:buChar char="•"/>
+            </a:pPr>
+            <a:r>
+              <a:rPr lang="de-DE" altLang="de-DE" sz="1400" dirty="0"/>
+              <a:t>Einführung in </a:t>
+            </a:r>
+            <a:r>
+              <a:rPr lang="de-DE" altLang="de-DE" sz="1400" dirty="0" err="1"/>
+              <a:t>GitLab</a:t>
+            </a:r>
+            <a:r>
+              <a:rPr lang="de-DE" altLang="de-DE" sz="1400" dirty="0"/>
+              <a:t> CI/CD &amp; </a:t>
+            </a:r>
+            <a:r>
+              <a:rPr lang="de-DE" altLang="de-DE" sz="1400" dirty="0" err="1"/>
+              <a:t>gitlab-ci.yml</a:t>
+            </a:r>
+            <a:endParaRPr lang="de-DE" altLang="de-DE" sz="1400" dirty="0"/>
+          </a:p>
+          <a:p>
+            <a:pPr lvl="1">
+              <a:buFont typeface="Arial" panose="020B0604020202020204" pitchFamily="34" charset="0"/>
+              <a:buChar char="•"/>
+            </a:pPr>
+            <a:r>
+              <a:rPr lang="de-DE" altLang="de-DE" sz="1400" dirty="0" err="1"/>
+              <a:t>GitLab</a:t>
+            </a:r>
+            <a:r>
+              <a:rPr lang="de-DE" altLang="de-DE" sz="1400" dirty="0"/>
+              <a:t> Runner</a:t>
+            </a:r>
+          </a:p>
+          <a:p>
             <a:pPr>
               <a:buFont typeface="Arial" panose="020B0604020202020204" pitchFamily="34" charset="0"/>
               <a:buChar char="•"/>
             </a:pPr>
             <a:r>
               <a:rPr lang="de-DE" altLang="de-DE" sz="1800" b="1" dirty="0"/>
-              <a:t>Tag 2 – Vertiefung </a:t>
+              <a:t>Tag 3 – </a:t>
             </a:r>
             <a:r>
               <a:rPr lang="de-DE" altLang="de-DE" sz="1800" b="1" dirty="0" err="1"/>
-              <a:t>Git</a:t>
+              <a:t>GitOps</a:t>
             </a:r>
             <a:r>
               <a:rPr lang="de-DE" altLang="de-DE" sz="1800" b="1" dirty="0"/>
-              <a:t>-Workflow, CI/CD &amp; </a:t>
+              <a:t>, Docker, </a:t>
             </a:r>
             <a:r>
               <a:rPr lang="de-DE" altLang="de-DE" sz="1800" b="1" dirty="0" err="1"/>
-              <a:t>GitLab</a:t>
+              <a:t>Deployment</a:t>
             </a:r>
             <a:r>
               <a:rPr lang="de-DE" altLang="de-DE" sz="1800" b="1" dirty="0"/>
-              <a:t> CI </a:t>
+              <a:t>-Strategien</a:t>
             </a:r>
           </a:p>
           <a:p>
@@ -10607,11 +10672,11 @@
             </a:pPr>
             <a:r>
               <a:rPr lang="de-DE" altLang="de-DE" sz="1400" dirty="0" err="1"/>
-              <a:t>Gitflow</a:t>
+              <a:t>GitOps</a:t>
             </a:r>
             <a:r>
               <a:rPr lang="de-DE" altLang="de-DE" sz="1400" dirty="0"/>
-              <a:t>-Workflow</a:t>
+              <a:t> Grundlagen</a:t>
             </a:r>
           </a:p>
           <a:p>
@@ -10621,94 +10686,7 @@
             </a:pPr>
             <a:r>
               <a:rPr lang="de-DE" altLang="de-DE" sz="1400" dirty="0"/>
-              <a:t>Tags, Releases &amp; deren Verwaltung</a:t>
-            </a:r>
-          </a:p>
-          <a:p>
-            <a:pPr lvl="1">
-              <a:buFont typeface="Arial" panose="020B0604020202020204" pitchFamily="34" charset="0"/>
-              <a:buChar char="•"/>
-            </a:pPr>
-            <a:r>
-              <a:rPr lang="de-DE" altLang="de-DE" sz="1400" dirty="0" err="1"/>
-              <a:t>GitLab</a:t>
-            </a:r>
-            <a:r>
-              <a:rPr lang="de-DE" altLang="de-DE" sz="1400" dirty="0"/>
-              <a:t>-Runner</a:t>
-            </a:r>
-          </a:p>
-          <a:p>
-            <a:pPr lvl="1">
-              <a:buFont typeface="Arial" panose="020B0604020202020204" pitchFamily="34" charset="0"/>
-              <a:buChar char="•"/>
-            </a:pPr>
-            <a:r>
-              <a:rPr lang="de-DE" altLang="de-DE" sz="1400" dirty="0"/>
-              <a:t>Einführung in </a:t>
-            </a:r>
-            <a:r>
-              <a:rPr lang="de-DE" altLang="de-DE" sz="1400" dirty="0" err="1"/>
-              <a:t>GitLab</a:t>
-            </a:r>
-            <a:r>
-              <a:rPr lang="de-DE" altLang="de-DE" sz="1400" dirty="0"/>
-              <a:t> CI/CD &amp; </a:t>
-            </a:r>
-            <a:r>
-              <a:rPr lang="de-DE" altLang="de-DE" sz="1400" dirty="0" err="1"/>
-              <a:t>gitlab.yml</a:t>
-            </a:r>
-            <a:endParaRPr lang="de-DE" altLang="de-DE" sz="1400" dirty="0"/>
-          </a:p>
-          <a:p>
-            <a:pPr>
-              <a:buFont typeface="Arial" panose="020B0604020202020204" pitchFamily="34" charset="0"/>
-              <a:buChar char="•"/>
-            </a:pPr>
-            <a:r>
-              <a:rPr lang="de-DE" altLang="de-DE" sz="1800" b="1" dirty="0"/>
-              <a:t>Tag 3 – </a:t>
-            </a:r>
-            <a:r>
-              <a:rPr lang="de-DE" altLang="de-DE" sz="1800" b="1" dirty="0" err="1"/>
-              <a:t>GitOps</a:t>
-            </a:r>
-            <a:r>
-              <a:rPr lang="de-DE" altLang="de-DE" sz="1800" b="1" dirty="0"/>
-              <a:t>, Docker in der Entwicklung und </a:t>
-            </a:r>
-            <a:r>
-              <a:rPr lang="de-DE" altLang="de-DE" sz="1800" b="1" dirty="0" err="1"/>
-              <a:t>Deployment</a:t>
-            </a:r>
-            <a:r>
-              <a:rPr lang="de-DE" altLang="de-DE" sz="1800" b="1" dirty="0"/>
-              <a:t>-Strategien</a:t>
-            </a:r>
-          </a:p>
-          <a:p>
-            <a:pPr lvl="1">
-              <a:buFont typeface="Arial" panose="020B0604020202020204" pitchFamily="34" charset="0"/>
-              <a:buChar char="•"/>
-            </a:pPr>
-            <a:r>
-              <a:rPr lang="de-DE" altLang="de-DE" sz="1400" dirty="0" err="1"/>
-              <a:t>GitOps</a:t>
-            </a:r>
-            <a:r>
-              <a:rPr lang="de-DE" altLang="de-DE" sz="1400" dirty="0"/>
-              <a:t> Grundlagen</a:t>
-            </a:r>
-          </a:p>
-          <a:p>
-            <a:pPr lvl="1">
-              <a:buFont typeface="Arial" panose="020B0604020202020204" pitchFamily="34" charset="0"/>
-              <a:buChar char="•"/>
-            </a:pPr>
-            <a:r>
-              <a:rPr lang="de-DE" altLang="de-DE" sz="1400" dirty="0"/>
-              <a:t>Lokale Entwicklung mit Docker</a:t>
+              <a:t>Entwicklung mit Docker</a:t>
             </a:r>
           </a:p>
           <a:p>
@@ -10812,7 +10790,7 @@
     </p:spTree>
     <p:extLst>
       <p:ext uri="{BB962C8B-B14F-4D97-AF65-F5344CB8AC3E}">
-        <p14:creationId xmlns:p14="http://schemas.microsoft.com/office/powerpoint/2010/main" val="2427702387"/>
+        <p14:creationId xmlns:p14="http://schemas.microsoft.com/office/powerpoint/2010/main" val="969879471"/>
       </p:ext>
     </p:extLst>
   </p:cSld>

</xml_diff>

<commit_message>
Changed day 3 topic order
</commit_message>
<xml_diff>
--- a/slides/Tag-1_1-Begruessung.pptx
+++ b/slides/Tag-1_1-Begruessung.pptx
@@ -18,7 +18,7 @@
     <p:sldId id="589" r:id="rId6"/>
     <p:sldId id="466" r:id="rId7"/>
     <p:sldId id="590" r:id="rId8"/>
-    <p:sldId id="289" r:id="rId9"/>
+    <p:sldId id="592" r:id="rId9"/>
     <p:sldId id="591" r:id="rId10"/>
     <p:sldId id="458" r:id="rId11"/>
     <p:sldId id="459" r:id="rId12"/>
@@ -1422,91 +1422,6 @@
             <a:fld id="{18182567-388C-4D33-8B7B-A651F195F118}" type="slidenum">
               <a:rPr lang="de-DE" altLang="de-DE" smtClean="0"/>
               <a:pPr/>
-              <a:t>7</a:t>
-            </a:fld>
-            <a:endParaRPr lang="de-DE" altLang="de-DE"/>
-          </a:p>
-        </p:txBody>
-      </p:sp>
-    </p:spTree>
-    <p:extLst>
-      <p:ext uri="{BB962C8B-B14F-4D97-AF65-F5344CB8AC3E}">
-        <p14:creationId xmlns:p14="http://schemas.microsoft.com/office/powerpoint/2010/main" val="3869861341"/>
-      </p:ext>
-    </p:extLst>
-  </p:cSld>
-  <p:clrMapOvr>
-    <a:masterClrMapping/>
-  </p:clrMapOvr>
-</p:notes>
-</file>
-
-<file path=ppt/notesSlides/notesSlide7.xml><?xml version="1.0" encoding="utf-8"?>
-<p:notes xmlns:a="http://schemas.openxmlformats.org/drawingml/2006/main" xmlns:r="http://schemas.openxmlformats.org/officeDocument/2006/relationships" xmlns:p="http://schemas.openxmlformats.org/presentationml/2006/main">
-  <p:cSld>
-    <p:spTree>
-      <p:nvGrpSpPr>
-        <p:cNvPr id="1" name=""/>
-        <p:cNvGrpSpPr/>
-        <p:nvPr/>
-      </p:nvGrpSpPr>
-      <p:grpSpPr>
-        <a:xfrm>
-          <a:off x="0" y="0"/>
-          <a:ext cx="0" cy="0"/>
-          <a:chOff x="0" y="0"/>
-          <a:chExt cx="0" cy="0"/>
-        </a:xfrm>
-      </p:grpSpPr>
-      <p:sp>
-        <p:nvSpPr>
-          <p:cNvPr id="2" name="Folienbildplatzhalter 1"/>
-          <p:cNvSpPr>
-            <a:spLocks noGrp="1" noRot="1" noChangeAspect="1"/>
-          </p:cNvSpPr>
-          <p:nvPr>
-            <p:ph type="sldImg"/>
-          </p:nvPr>
-        </p:nvSpPr>
-        <p:spPr/>
-      </p:sp>
-      <p:sp>
-        <p:nvSpPr>
-          <p:cNvPr id="3" name="Notizenplatzhalter 2"/>
-          <p:cNvSpPr>
-            <a:spLocks noGrp="1"/>
-          </p:cNvSpPr>
-          <p:nvPr>
-            <p:ph type="body" idx="1"/>
-          </p:nvPr>
-        </p:nvSpPr>
-        <p:spPr/>
-        <p:txBody>
-          <a:bodyPr/>
-          <a:lstStyle/>
-          <a:p>
-            <a:endParaRPr lang="de-DE" dirty="0"/>
-          </a:p>
-        </p:txBody>
-      </p:sp>
-      <p:sp>
-        <p:nvSpPr>
-          <p:cNvPr id="4" name="Foliennummernplatzhalter 3"/>
-          <p:cNvSpPr>
-            <a:spLocks noGrp="1"/>
-          </p:cNvSpPr>
-          <p:nvPr>
-            <p:ph type="sldNum" sz="quarter" idx="5"/>
-          </p:nvPr>
-        </p:nvSpPr>
-        <p:spPr/>
-        <p:txBody>
-          <a:bodyPr/>
-          <a:lstStyle/>
-          <a:p>
-            <a:fld id="{18182567-388C-4D33-8B7B-A651F195F118}" type="slidenum">
-              <a:rPr lang="de-DE" altLang="de-DE" smtClean="0"/>
-              <a:pPr/>
               <a:t>10</a:t>
             </a:fld>
             <a:endParaRPr lang="de-DE" altLang="de-DE"/>
@@ -1526,7 +1441,7 @@
 </p:notes>
 </file>
 
-<file path=ppt/notesSlides/notesSlide8.xml><?xml version="1.0" encoding="utf-8"?>
+<file path=ppt/notesSlides/notesSlide7.xml><?xml version="1.0" encoding="utf-8"?>
 <p:notes xmlns:a="http://schemas.openxmlformats.org/drawingml/2006/main" xmlns:r="http://schemas.openxmlformats.org/officeDocument/2006/relationships" xmlns:p="http://schemas.openxmlformats.org/presentationml/2006/main">
   <p:cSld>
     <p:spTree>
@@ -2086,7 +2001,7 @@
               <a:pPr algn="ctr">
                 <a:defRPr/>
               </a:pPr>
-              <a:t>18.06.2024</a:t>
+              <a:t>19.06.2024</a:t>
             </a:fld>
             <a:endParaRPr lang="de-DE" sz="1000">
               <a:solidFill>
@@ -10245,7 +10160,7 @@
             </a:pPr>
             <a:r>
               <a:rPr lang="de-DE" altLang="de-DE" sz="1800" b="1" dirty="0"/>
-              <a:t>Tag 3 – </a:t>
+              <a:t>Tag 3 – Docker, </a:t>
             </a:r>
             <a:r>
               <a:rPr lang="de-DE" altLang="de-DE" sz="1800" b="1" dirty="0" err="1"/>
@@ -10253,7 +10168,7 @@
             </a:r>
             <a:r>
               <a:rPr lang="de-DE" altLang="de-DE" sz="1800" b="1" dirty="0"/>
-              <a:t>, Docker, </a:t>
+              <a:t>, </a:t>
             </a:r>
             <a:r>
               <a:rPr lang="de-DE" altLang="de-DE" sz="1800" b="1" dirty="0" err="1"/>
@@ -10270,12 +10185,8 @@
               <a:buChar char="•"/>
             </a:pPr>
             <a:r>
-              <a:rPr lang="de-DE" altLang="de-DE" sz="1400" dirty="0" err="1"/>
-              <a:t>GitOps</a:t>
-            </a:r>
-            <a:r>
               <a:rPr lang="de-DE" altLang="de-DE" sz="1400" dirty="0"/>
-              <a:t> Grundlagen</a:t>
+              <a:t>Entwicklung mit Docker</a:t>
             </a:r>
           </a:p>
           <a:p>
@@ -10285,7 +10196,7 @@
             </a:pPr>
             <a:r>
               <a:rPr lang="de-DE" altLang="de-DE" sz="1400" dirty="0"/>
-              <a:t>Entwicklung mit Docker</a:t>
+              <a:t>Container/Docker-Registry</a:t>
             </a:r>
           </a:p>
           <a:p>
@@ -10295,7 +10206,15 @@
             </a:pPr>
             <a:r>
               <a:rPr lang="de-DE" altLang="de-DE" sz="1400" dirty="0"/>
-              <a:t>Container/Docker-Registry</a:t>
+              <a:t>Erstellen von Release- und </a:t>
+            </a:r>
+            <a:r>
+              <a:rPr lang="de-DE" altLang="de-DE" sz="1400" dirty="0" err="1"/>
+              <a:t>Tagged</a:t>
+            </a:r>
+            <a:r>
+              <a:rPr lang="de-DE" altLang="de-DE" sz="1400" dirty="0"/>
+              <a:t>-Images</a:t>
             </a:r>
           </a:p>
           <a:p>
@@ -10304,16 +10223,12 @@
               <a:buChar char="•"/>
             </a:pPr>
             <a:r>
+              <a:rPr lang="de-DE" altLang="de-DE" sz="1400" dirty="0" err="1"/>
+              <a:t>GitOps</a:t>
+            </a:r>
+            <a:r>
               <a:rPr lang="de-DE" altLang="de-DE" sz="1400" dirty="0"/>
-              <a:t>Erstellen von Release- und </a:t>
-            </a:r>
-            <a:r>
-              <a:rPr lang="de-DE" altLang="de-DE" sz="1400" dirty="0" err="1"/>
-              <a:t>Tagged</a:t>
-            </a:r>
-            <a:r>
-              <a:rPr lang="de-DE" altLang="de-DE" sz="1400" dirty="0"/>
-              <a:t>-Images</a:t>
+              <a:t> Grundlagen</a:t>
             </a:r>
           </a:p>
           <a:p>
@@ -10387,6 +10302,11 @@
         </p:txBody>
       </p:sp>
     </p:spTree>
+    <p:extLst>
+      <p:ext uri="{BB962C8B-B14F-4D97-AF65-F5344CB8AC3E}">
+        <p14:creationId xmlns:p14="http://schemas.microsoft.com/office/powerpoint/2010/main" val="3781715788"/>
+      </p:ext>
+    </p:extLst>
   </p:cSld>
   <p:clrMapOvr>
     <a:masterClrMapping/>
@@ -10646,7 +10566,7 @@
             </a:pPr>
             <a:r>
               <a:rPr lang="de-DE" altLang="de-DE" sz="1800" b="1" dirty="0"/>
-              <a:t>Tag 3 – </a:t>
+              <a:t>Tag 3 – Docker, </a:t>
             </a:r>
             <a:r>
               <a:rPr lang="de-DE" altLang="de-DE" sz="1800" b="1" dirty="0" err="1"/>
@@ -10654,7 +10574,7 @@
             </a:r>
             <a:r>
               <a:rPr lang="de-DE" altLang="de-DE" sz="1800" b="1" dirty="0"/>
-              <a:t>, Docker, </a:t>
+              <a:t>, </a:t>
             </a:r>
             <a:r>
               <a:rPr lang="de-DE" altLang="de-DE" sz="1800" b="1" dirty="0" err="1"/>
@@ -10671,12 +10591,8 @@
               <a:buChar char="•"/>
             </a:pPr>
             <a:r>
-              <a:rPr lang="de-DE" altLang="de-DE" sz="1400" dirty="0" err="1"/>
-              <a:t>GitOps</a:t>
-            </a:r>
-            <a:r>
               <a:rPr lang="de-DE" altLang="de-DE" sz="1400" dirty="0"/>
-              <a:t> Grundlagen</a:t>
+              <a:t>Entwicklung mit Docker</a:t>
             </a:r>
           </a:p>
           <a:p>
@@ -10686,7 +10602,7 @@
             </a:pPr>
             <a:r>
               <a:rPr lang="de-DE" altLang="de-DE" sz="1400" dirty="0"/>
-              <a:t>Entwicklung mit Docker</a:t>
+              <a:t>Container/Docker-Registry</a:t>
             </a:r>
           </a:p>
           <a:p>
@@ -10696,7 +10612,15 @@
             </a:pPr>
             <a:r>
               <a:rPr lang="de-DE" altLang="de-DE" sz="1400" dirty="0"/>
-              <a:t>Container/Docker-Registry</a:t>
+              <a:t>Erstellen von Release- und </a:t>
+            </a:r>
+            <a:r>
+              <a:rPr lang="de-DE" altLang="de-DE" sz="1400" dirty="0" err="1"/>
+              <a:t>Tagged</a:t>
+            </a:r>
+            <a:r>
+              <a:rPr lang="de-DE" altLang="de-DE" sz="1400" dirty="0"/>
+              <a:t>-Images</a:t>
             </a:r>
           </a:p>
           <a:p>
@@ -10705,16 +10629,12 @@
               <a:buChar char="•"/>
             </a:pPr>
             <a:r>
+              <a:rPr lang="de-DE" altLang="de-DE" sz="1400" dirty="0" err="1"/>
+              <a:t>GitOps</a:t>
+            </a:r>
+            <a:r>
               <a:rPr lang="de-DE" altLang="de-DE" sz="1400" dirty="0"/>
-              <a:t>Erstellen von Release- und </a:t>
-            </a:r>
-            <a:r>
-              <a:rPr lang="de-DE" altLang="de-DE" sz="1400" dirty="0" err="1"/>
-              <a:t>Tagged</a:t>
-            </a:r>
-            <a:r>
-              <a:rPr lang="de-DE" altLang="de-DE" sz="1400" dirty="0"/>
-              <a:t>-Images</a:t>
+              <a:t> Grundlagen</a:t>
             </a:r>
           </a:p>
           <a:p>

</xml_diff>

<commit_message>
Updated slides for second training
</commit_message>
<xml_diff>
--- a/slides/Tag-1_1-Begruessung.pptx
+++ b/slides/Tag-1_1-Begruessung.pptx
@@ -2001,7 +2001,7 @@
               <a:pPr algn="ctr">
                 <a:defRPr/>
               </a:pPr>
-              <a:t>19.06.2024</a:t>
+              <a:t>06.07.2024</a:t>
             </a:fld>
             <a:endParaRPr lang="de-DE" sz="1000">
               <a:solidFill>
@@ -4116,7 +4116,7 @@
             </a:pPr>
             <a:r>
               <a:rPr lang="de-DE" altLang="de-DE" sz="1600" dirty="0"/>
-              <a:t>17.06.2024, Daniel Krämer</a:t>
+              <a:t>08.07.2024, Daniel Krämer</a:t>
             </a:r>
           </a:p>
         </p:txBody>
@@ -4454,17 +4454,8 @@
                 <a:cs typeface="+mn-cs"/>
                 <a:hlinkClick r:id="rId3"/>
               </a:rPr>
-              <a:t>https://github.com/anderscore-gmbh/gitlab-24.06</a:t>
-            </a:r>
-            <a:endParaRPr lang="de-DE" altLang="de-DE" dirty="0">
-              <a:ea typeface="+mn-ea"/>
-              <a:cs typeface="+mn-cs"/>
-            </a:endParaRPr>
-          </a:p>
-          <a:p>
-            <a:pPr marL="0" lvl="1" indent="0">
-              <a:buNone/>
-            </a:pPr>
+              <a:t>https://github.com/anderscore-gmbh/gitlab-24.07</a:t>
+            </a:r>
             <a:endParaRPr lang="de-DE" altLang="de-DE" dirty="0">
               <a:ea typeface="+mn-ea"/>
               <a:cs typeface="+mn-cs"/>
@@ -10762,7 +10753,7 @@
             </a:pPr>
             <a:r>
               <a:rPr lang="de-DE" sz="2000" b="1" dirty="0"/>
-              <a:t>Montag, 17.06.2024</a:t>
+              <a:t>Montag, 08.07.2024</a:t>
             </a:r>
           </a:p>
           <a:p>
@@ -10771,7 +10762,7 @@
             </a:pPr>
             <a:r>
               <a:rPr lang="de-DE" sz="2000" b="1" dirty="0"/>
-              <a:t>Dienstag, 18.06.2024</a:t>
+              <a:t>Dienstag, 09.07.2024</a:t>
             </a:r>
           </a:p>
           <a:p>
@@ -10780,7 +10771,7 @@
             </a:pPr>
             <a:r>
               <a:rPr lang="de-DE" sz="2000" b="1" dirty="0"/>
-              <a:t>Mittwoch, 19.06.2024</a:t>
+              <a:t>Mittwoch, 10.07.2024</a:t>
             </a:r>
           </a:p>
           <a:p>

</xml_diff>